<commit_message>
Finalizing protocol and other found glitches
</commit_message>
<xml_diff>
--- a/Manual_Paw_Joints_Marking/Paw Point Markers Diagram Powerpoint.pptx
+++ b/Manual_Paw_Joints_Marking/Paw Point Markers Diagram Powerpoint.pptx
@@ -104,6 +104,11 @@
       </a:defRPr>
     </a:lvl9pPr>
   </p:defaultTextStyle>
+  <p:extLst>
+    <p:ext uri="{EFAFB233-063F-42B5-8137-9DF3F51BA10A}">
+      <p15:sldGuideLst xmlns:p15="http://schemas.microsoft.com/office/powerpoint/2012/main"/>
+    </p:ext>
+  </p:extLst>
 </p:presentation>
 </file>
 
@@ -238,7 +243,7 @@
           <a:p>
             <a:fld id="{4C8643DD-90E0-4107-8D69-F122CF1CE135}" type="datetimeFigureOut">
               <a:rPr lang="en-US" smtClean="0"/>
-              <a:t>6/22/2015</a:t>
+              <a:t>7/1/2015</a:t>
             </a:fld>
             <a:endParaRPr lang="en-US"/>
           </a:p>
@@ -408,7 +413,7 @@
           <a:p>
             <a:fld id="{4C8643DD-90E0-4107-8D69-F122CF1CE135}" type="datetimeFigureOut">
               <a:rPr lang="en-US" smtClean="0"/>
-              <a:t>6/22/2015</a:t>
+              <a:t>7/1/2015</a:t>
             </a:fld>
             <a:endParaRPr lang="en-US"/>
           </a:p>
@@ -588,7 +593,7 @@
           <a:p>
             <a:fld id="{4C8643DD-90E0-4107-8D69-F122CF1CE135}" type="datetimeFigureOut">
               <a:rPr lang="en-US" smtClean="0"/>
-              <a:t>6/22/2015</a:t>
+              <a:t>7/1/2015</a:t>
             </a:fld>
             <a:endParaRPr lang="en-US"/>
           </a:p>
@@ -758,7 +763,7 @@
           <a:p>
             <a:fld id="{4C8643DD-90E0-4107-8D69-F122CF1CE135}" type="datetimeFigureOut">
               <a:rPr lang="en-US" smtClean="0"/>
-              <a:t>6/22/2015</a:t>
+              <a:t>7/1/2015</a:t>
             </a:fld>
             <a:endParaRPr lang="en-US"/>
           </a:p>
@@ -1004,7 +1009,7 @@
           <a:p>
             <a:fld id="{4C8643DD-90E0-4107-8D69-F122CF1CE135}" type="datetimeFigureOut">
               <a:rPr lang="en-US" smtClean="0"/>
-              <a:t>6/22/2015</a:t>
+              <a:t>7/1/2015</a:t>
             </a:fld>
             <a:endParaRPr lang="en-US"/>
           </a:p>
@@ -1236,7 +1241,7 @@
           <a:p>
             <a:fld id="{4C8643DD-90E0-4107-8D69-F122CF1CE135}" type="datetimeFigureOut">
               <a:rPr lang="en-US" smtClean="0"/>
-              <a:t>6/22/2015</a:t>
+              <a:t>7/1/2015</a:t>
             </a:fld>
             <a:endParaRPr lang="en-US"/>
           </a:p>
@@ -1603,7 +1608,7 @@
           <a:p>
             <a:fld id="{4C8643DD-90E0-4107-8D69-F122CF1CE135}" type="datetimeFigureOut">
               <a:rPr lang="en-US" smtClean="0"/>
-              <a:t>6/22/2015</a:t>
+              <a:t>7/1/2015</a:t>
             </a:fld>
             <a:endParaRPr lang="en-US"/>
           </a:p>
@@ -1721,7 +1726,7 @@
           <a:p>
             <a:fld id="{4C8643DD-90E0-4107-8D69-F122CF1CE135}" type="datetimeFigureOut">
               <a:rPr lang="en-US" smtClean="0"/>
-              <a:t>6/22/2015</a:t>
+              <a:t>7/1/2015</a:t>
             </a:fld>
             <a:endParaRPr lang="en-US"/>
           </a:p>
@@ -1816,7 +1821,7 @@
           <a:p>
             <a:fld id="{4C8643DD-90E0-4107-8D69-F122CF1CE135}" type="datetimeFigureOut">
               <a:rPr lang="en-US" smtClean="0"/>
-              <a:t>6/22/2015</a:t>
+              <a:t>7/1/2015</a:t>
             </a:fld>
             <a:endParaRPr lang="en-US"/>
           </a:p>
@@ -2093,7 +2098,7 @@
           <a:p>
             <a:fld id="{4C8643DD-90E0-4107-8D69-F122CF1CE135}" type="datetimeFigureOut">
               <a:rPr lang="en-US" smtClean="0"/>
-              <a:t>6/22/2015</a:t>
+              <a:t>7/1/2015</a:t>
             </a:fld>
             <a:endParaRPr lang="en-US"/>
           </a:p>
@@ -2346,7 +2351,7 @@
           <a:p>
             <a:fld id="{4C8643DD-90E0-4107-8D69-F122CF1CE135}" type="datetimeFigureOut">
               <a:rPr lang="en-US" smtClean="0"/>
-              <a:t>6/22/2015</a:t>
+              <a:t>7/1/2015</a:t>
             </a:fld>
             <a:endParaRPr lang="en-US"/>
           </a:p>
@@ -2559,7 +2564,7 @@
           <a:p>
             <a:fld id="{4C8643DD-90E0-4107-8D69-F122CF1CE135}" type="datetimeFigureOut">
               <a:rPr lang="en-US" smtClean="0"/>
-              <a:t>6/22/2015</a:t>
+              <a:t>7/1/2015</a:t>
             </a:fld>
             <a:endParaRPr lang="en-US"/>
           </a:p>
@@ -3045,7 +3050,7 @@
         </p:nvSpPr>
         <p:spPr bwMode="auto">
           <a:xfrm>
-            <a:off x="8848724" y="4086905"/>
+            <a:off x="9257217" y="4571840"/>
             <a:ext cx="428625" cy="409575"/>
           </a:xfrm>
           <a:prstGeom prst="ellipse">
@@ -3132,7 +3137,7 @@
         </p:nvSpPr>
         <p:spPr bwMode="auto">
           <a:xfrm>
-            <a:off x="9169719" y="3291563"/>
+            <a:off x="9234780" y="3805182"/>
             <a:ext cx="428625" cy="409575"/>
           </a:xfrm>
           <a:prstGeom prst="ellipse">
@@ -3219,7 +3224,7 @@
         </p:nvSpPr>
         <p:spPr bwMode="auto">
           <a:xfrm>
-            <a:off x="9531122" y="2597654"/>
+            <a:off x="9638780" y="2888234"/>
             <a:ext cx="428625" cy="409575"/>
           </a:xfrm>
           <a:prstGeom prst="ellipse">
@@ -3306,7 +3311,7 @@
         </p:nvSpPr>
         <p:spPr bwMode="auto">
           <a:xfrm>
-            <a:off x="8512319" y="1872341"/>
+            <a:off x="8742697" y="2092029"/>
             <a:ext cx="428625" cy="409575"/>
           </a:xfrm>
           <a:prstGeom prst="ellipse">
@@ -3385,7 +3390,7 @@
         </p:nvSpPr>
         <p:spPr bwMode="auto">
           <a:xfrm>
-            <a:off x="8395590" y="1198109"/>
+            <a:off x="8508854" y="1248187"/>
             <a:ext cx="428625" cy="409575"/>
           </a:xfrm>
           <a:prstGeom prst="ellipse">
@@ -3464,7 +3469,7 @@
         </p:nvSpPr>
         <p:spPr bwMode="auto">
           <a:xfrm>
-            <a:off x="7488411" y="405490"/>
+            <a:off x="7621761" y="615040"/>
             <a:ext cx="428625" cy="409575"/>
           </a:xfrm>
           <a:prstGeom prst="ellipse">
@@ -3554,9 +3559,9 @@
           </a:stretch>
         </p:blipFill>
         <p:spPr>
-          <a:xfrm rot="14143565">
-            <a:off x="6789609" y="3306623"/>
-            <a:ext cx="884557" cy="3193036"/>
+          <a:xfrm rot="15234035">
+            <a:off x="7007852" y="3134028"/>
+            <a:ext cx="941888" cy="3399986"/>
           </a:xfrm>
           <a:prstGeom prst="rect">
             <a:avLst/>
@@ -3584,8 +3589,8 @@
           </a:stretch>
         </p:blipFill>
         <p:spPr>
-          <a:xfrm rot="14143565">
-            <a:off x="7802007" y="2904408"/>
+          <a:xfrm rot="14934727">
+            <a:off x="7877458" y="3113934"/>
             <a:ext cx="572974" cy="2068297"/>
           </a:xfrm>
           <a:prstGeom prst="rect">
@@ -3614,9 +3619,9 @@
           </a:stretch>
         </p:blipFill>
         <p:spPr>
-          <a:xfrm rot="14143565">
-            <a:off x="8188063" y="2197518"/>
-            <a:ext cx="572974" cy="2068297"/>
+          <a:xfrm rot="14581177">
+            <a:off x="8256784" y="2293934"/>
+            <a:ext cx="585410" cy="2113188"/>
           </a:xfrm>
           <a:prstGeom prst="rect">
             <a:avLst/>
@@ -3645,8 +3650,8 @@
         </p:blipFill>
         <p:spPr>
           <a:xfrm rot="8843385">
-            <a:off x="4710320" y="683242"/>
-            <a:ext cx="417744" cy="1507955"/>
+            <a:off x="4604225" y="320548"/>
+            <a:ext cx="518641" cy="1872169"/>
           </a:xfrm>
           <a:prstGeom prst="rect">
             <a:avLst/>
@@ -3674,9 +3679,9 @@
           </a:stretch>
         </p:blipFill>
         <p:spPr>
-          <a:xfrm rot="5862735">
-            <a:off x="3729435" y="1831132"/>
-            <a:ext cx="400478" cy="1445628"/>
+          <a:xfrm rot="2869124">
+            <a:off x="3401105" y="2204230"/>
+            <a:ext cx="553152" cy="1996744"/>
           </a:xfrm>
           <a:prstGeom prst="rect">
             <a:avLst/>
@@ -3704,9 +3709,9 @@
           </a:stretch>
         </p:blipFill>
         <p:spPr>
-          <a:xfrm rot="5028337">
-            <a:off x="3766769" y="2832402"/>
-            <a:ext cx="572974" cy="2068297"/>
+          <a:xfrm rot="2471502">
+            <a:off x="3678220" y="3406441"/>
+            <a:ext cx="723812" cy="2612787"/>
           </a:xfrm>
           <a:prstGeom prst="rect">
             <a:avLst/>
@@ -3734,9 +3739,9 @@
           </a:stretch>
         </p:blipFill>
         <p:spPr>
-          <a:xfrm rot="5174921">
-            <a:off x="3544839" y="2085256"/>
-            <a:ext cx="534235" cy="1928458"/>
+          <a:xfrm rot="2504184">
+            <a:off x="3513768" y="2640392"/>
+            <a:ext cx="577995" cy="2431933"/>
           </a:xfrm>
           <a:prstGeom prst="rect">
             <a:avLst/>
@@ -3764,9 +3769,9 @@
           </a:stretch>
         </p:blipFill>
         <p:spPr>
-          <a:xfrm rot="7995929">
-            <a:off x="4598122" y="1185145"/>
-            <a:ext cx="470939" cy="1699976"/>
+          <a:xfrm rot="7845659">
+            <a:off x="4374686" y="871765"/>
+            <a:ext cx="577495" cy="2084616"/>
           </a:xfrm>
           <a:prstGeom prst="rect">
             <a:avLst/>
@@ -3794,9 +3799,9 @@
           </a:stretch>
         </p:blipFill>
         <p:spPr>
-          <a:xfrm rot="8091361">
-            <a:off x="4555164" y="1702897"/>
-            <a:ext cx="619004" cy="2234454"/>
+          <a:xfrm rot="7934390">
+            <a:off x="4354189" y="1437646"/>
+            <a:ext cx="708532" cy="2557627"/>
           </a:xfrm>
           <a:prstGeom prst="rect">
             <a:avLst/>
@@ -3824,9 +3829,9 @@
           </a:stretch>
         </p:blipFill>
         <p:spPr>
-          <a:xfrm rot="11058583">
-            <a:off x="5860276" y="645974"/>
-            <a:ext cx="301580" cy="1088631"/>
+          <a:xfrm rot="8331613">
+            <a:off x="5544246" y="837925"/>
+            <a:ext cx="265688" cy="959071"/>
           </a:xfrm>
           <a:prstGeom prst="rect">
             <a:avLst/>
@@ -3854,9 +3859,9 @@
           </a:stretch>
         </p:blipFill>
         <p:spPr>
-          <a:xfrm rot="9066144">
-            <a:off x="5493218" y="1045098"/>
-            <a:ext cx="393129" cy="1419100"/>
+          <a:xfrm rot="11021896">
+            <a:off x="5836103" y="553731"/>
+            <a:ext cx="533127" cy="1924459"/>
           </a:xfrm>
           <a:prstGeom prst="rect">
             <a:avLst/>
@@ -3915,8 +3920,8 @@
         </p:blipFill>
         <p:spPr>
           <a:xfrm rot="13788628">
-            <a:off x="7109718" y="955540"/>
-            <a:ext cx="572974" cy="2068297"/>
+            <a:off x="7162663" y="901584"/>
+            <a:ext cx="601187" cy="2170139"/>
           </a:xfrm>
           <a:prstGeom prst="rect">
             <a:avLst/>
@@ -3944,9 +3949,9 @@
           </a:stretch>
         </p:blipFill>
         <p:spPr>
-          <a:xfrm rot="13539613">
-            <a:off x="7017532" y="1591382"/>
-            <a:ext cx="688017" cy="2483574"/>
+          <a:xfrm rot="13897894">
+            <a:off x="7112416" y="1553794"/>
+            <a:ext cx="733093" cy="2646287"/>
           </a:xfrm>
           <a:prstGeom prst="rect">
             <a:avLst/>
@@ -3963,7 +3968,7 @@
         </p:nvSpPr>
         <p:spPr bwMode="auto">
           <a:xfrm>
-            <a:off x="5980758" y="107373"/>
+            <a:off x="5104907" y="325885"/>
             <a:ext cx="539800" cy="507043"/>
           </a:xfrm>
           <a:prstGeom prst="ellipse">
@@ -4042,7 +4047,7 @@
         </p:nvSpPr>
         <p:spPr bwMode="auto">
           <a:xfrm>
-            <a:off x="5139789" y="612557"/>
+            <a:off x="6231160" y="136630"/>
             <a:ext cx="428625" cy="409575"/>
           </a:xfrm>
           <a:prstGeom prst="ellipse">
@@ -4116,7 +4121,7 @@
         </p:nvSpPr>
         <p:spPr bwMode="auto">
           <a:xfrm>
-            <a:off x="6934889" y="-95888"/>
+            <a:off x="7185607" y="-103736"/>
             <a:ext cx="428625" cy="409575"/>
           </a:xfrm>
           <a:prstGeom prst="ellipse">
@@ -4195,7 +4200,7 @@
         </p:nvSpPr>
         <p:spPr bwMode="auto">
           <a:xfrm>
-            <a:off x="4357524" y="150210"/>
+            <a:off x="4123040" y="-158461"/>
             <a:ext cx="539800" cy="507043"/>
           </a:xfrm>
           <a:prstGeom prst="ellipse">
@@ -4266,7 +4271,7 @@
       </p:sp>
       <p:sp>
         <p:nvSpPr>
-          <p:cNvPr id="100" name="Oval 32"/>
+          <p:cNvPr id="101" name="Oval 32"/>
           <p:cNvSpPr>
             <a:spLocks noChangeArrowheads="1"/>
           </p:cNvSpPr>
@@ -4274,7 +4279,7 @@
         </p:nvSpPr>
         <p:spPr bwMode="auto">
           <a:xfrm>
-            <a:off x="3956568" y="764571"/>
+            <a:off x="3397175" y="1369276"/>
             <a:ext cx="539800" cy="507043"/>
           </a:xfrm>
           <a:prstGeom prst="ellipse">
@@ -4328,7 +4333,7 @@
                 <a:latin typeface="Calibri" panose="020F0502020204030204" pitchFamily="34" charset="0"/>
                 <a:cs typeface="Times New Roman" panose="02020603050405020304" pitchFamily="18" charset="0"/>
               </a:rPr>
-              <a:t>12</a:t>
+              <a:t>13</a:t>
             </a:r>
             <a:endParaRPr kumimoji="0" lang="en-US" altLang="en-US" sz="1800" b="0" i="0" u="none" strike="noStrike" cap="none" normalizeH="0" baseline="0" dirty="0" smtClean="0">
               <a:ln>
@@ -4345,7 +4350,7 @@
       </p:sp>
       <p:sp>
         <p:nvSpPr>
-          <p:cNvPr id="101" name="Oval 32"/>
+          <p:cNvPr id="102" name="Oval 32"/>
           <p:cNvSpPr>
             <a:spLocks noChangeArrowheads="1"/>
           </p:cNvSpPr>
@@ -4353,7 +4358,7 @@
         </p:nvSpPr>
         <p:spPr bwMode="auto">
           <a:xfrm>
-            <a:off x="3763022" y="1391341"/>
+            <a:off x="2201866" y="3457759"/>
             <a:ext cx="539800" cy="507043"/>
           </a:xfrm>
           <a:prstGeom prst="ellipse">
@@ -4407,7 +4412,7 @@
                 <a:latin typeface="Calibri" panose="020F0502020204030204" pitchFamily="34" charset="0"/>
                 <a:cs typeface="Times New Roman" panose="02020603050405020304" pitchFamily="18" charset="0"/>
               </a:rPr>
-              <a:t>13</a:t>
+              <a:t>14</a:t>
             </a:r>
             <a:endParaRPr kumimoji="0" lang="en-US" altLang="en-US" sz="1800" b="0" i="0" u="none" strike="noStrike" cap="none" normalizeH="0" baseline="0" dirty="0" smtClean="0">
               <a:ln>
@@ -4424,7 +4429,7 @@
       </p:sp>
       <p:sp>
         <p:nvSpPr>
-          <p:cNvPr id="102" name="Oval 32"/>
+          <p:cNvPr id="103" name="Oval 32"/>
           <p:cNvSpPr>
             <a:spLocks noChangeArrowheads="1"/>
           </p:cNvSpPr>
@@ -4432,7 +4437,7 @@
         </p:nvSpPr>
         <p:spPr bwMode="auto">
           <a:xfrm>
-            <a:off x="2697166" y="1838509"/>
+            <a:off x="2216846" y="4410462"/>
             <a:ext cx="539800" cy="507043"/>
           </a:xfrm>
           <a:prstGeom prst="ellipse">
@@ -4486,24 +4491,14 @@
                 <a:latin typeface="Calibri" panose="020F0502020204030204" pitchFamily="34" charset="0"/>
                 <a:cs typeface="Times New Roman" panose="02020603050405020304" pitchFamily="18" charset="0"/>
               </a:rPr>
-              <a:t>14</a:t>
-            </a:r>
-            <a:endParaRPr kumimoji="0" lang="en-US" altLang="en-US" sz="1800" b="0" i="0" u="none" strike="noStrike" cap="none" normalizeH="0" baseline="0" dirty="0" smtClean="0">
-              <a:ln>
-                <a:noFill/>
-              </a:ln>
-              <a:solidFill>
-                <a:schemeClr val="tx1"/>
-              </a:solidFill>
-              <a:effectLst/>
-              <a:latin typeface="Arial" panose="020B0604020202020204" pitchFamily="34" charset="0"/>
-            </a:endParaRPr>
-          </a:p>
-        </p:txBody>
-      </p:sp>
-      <p:sp>
-        <p:nvSpPr>
-          <p:cNvPr id="103" name="Oval 32"/>
+              <a:t>15</a:t>
+            </a:r>
+          </a:p>
+        </p:txBody>
+      </p:sp>
+      <p:sp>
+        <p:nvSpPr>
+          <p:cNvPr id="104" name="Oval 32"/>
           <p:cNvSpPr>
             <a:spLocks noChangeArrowheads="1"/>
           </p:cNvSpPr>
@@ -4511,7 +4506,7 @@
         </p:nvSpPr>
         <p:spPr bwMode="auto">
           <a:xfrm>
-            <a:off x="2245421" y="2543562"/>
+            <a:off x="2395079" y="5344868"/>
             <a:ext cx="539800" cy="507043"/>
           </a:xfrm>
           <a:prstGeom prst="ellipse">
@@ -4565,14 +4560,168 @@
                 <a:latin typeface="Calibri" panose="020F0502020204030204" pitchFamily="34" charset="0"/>
                 <a:cs typeface="Times New Roman" panose="02020603050405020304" pitchFamily="18" charset="0"/>
               </a:rPr>
-              <a:t>15</a:t>
-            </a:r>
-          </a:p>
-        </p:txBody>
-      </p:sp>
-      <p:sp>
-        <p:nvSpPr>
-          <p:cNvPr id="104" name="Oval 32"/>
+              <a:t>16</a:t>
+            </a:r>
+            <a:endParaRPr kumimoji="0" lang="en-US" altLang="en-US" sz="1800" b="0" i="0" u="none" strike="noStrike" cap="none" normalizeH="0" baseline="0" dirty="0" smtClean="0">
+              <a:ln>
+                <a:noFill/>
+              </a:ln>
+              <a:solidFill>
+                <a:schemeClr val="tx1"/>
+              </a:solidFill>
+              <a:effectLst/>
+              <a:latin typeface="Arial" panose="020B0604020202020204" pitchFamily="34" charset="0"/>
+            </a:endParaRPr>
+          </a:p>
+        </p:txBody>
+      </p:sp>
+      <p:sp>
+        <p:nvSpPr>
+          <p:cNvPr id="2068" name="TextBox 2067"/>
+          <p:cNvSpPr txBox="1"/>
+          <p:nvPr/>
+        </p:nvSpPr>
+        <p:spPr>
+          <a:xfrm>
+            <a:off x="9646049" y="4591962"/>
+            <a:ext cx="1492992" cy="369332"/>
+          </a:xfrm>
+          <a:prstGeom prst="rect">
+            <a:avLst/>
+          </a:prstGeom>
+          <a:noFill/>
+          <a:ln>
+            <a:noFill/>
+          </a:ln>
+        </p:spPr>
+        <p:txBody>
+          <a:bodyPr wrap="square" rtlCol="0">
+            <a:spAutoFit/>
+          </a:bodyPr>
+          <a:lstStyle/>
+          <a:p>
+            <a:r>
+              <a:rPr lang="en-US" dirty="0" smtClean="0"/>
+              <a:t>Center of Paw</a:t>
+            </a:r>
+            <a:endParaRPr lang="en-US" dirty="0"/>
+          </a:p>
+        </p:txBody>
+      </p:sp>
+      <p:sp>
+        <p:nvSpPr>
+          <p:cNvPr id="106" name="TextBox 105"/>
+          <p:cNvSpPr txBox="1"/>
+          <p:nvPr/>
+        </p:nvSpPr>
+        <p:spPr>
+          <a:xfrm>
+            <a:off x="9646049" y="3711476"/>
+            <a:ext cx="2425535" cy="803277"/>
+          </a:xfrm>
+          <a:prstGeom prst="rect">
+            <a:avLst/>
+          </a:prstGeom>
+          <a:noFill/>
+          <a:ln>
+            <a:noFill/>
+          </a:ln>
+        </p:spPr>
+        <p:txBody>
+          <a:bodyPr wrap="square" rtlCol="0">
+            <a:normAutofit fontScale="92500"/>
+          </a:bodyPr>
+          <a:lstStyle/>
+          <a:p>
+            <a:r>
+              <a:rPr lang="en-US" dirty="0" smtClean="0"/>
+              <a:t>Thumb Metacarpal- Proximal Phalanges Joint</a:t>
+            </a:r>
+            <a:endParaRPr lang="en-US" dirty="0"/>
+          </a:p>
+        </p:txBody>
+      </p:sp>
+      <p:sp>
+        <p:nvSpPr>
+          <p:cNvPr id="107" name="TextBox 106"/>
+          <p:cNvSpPr txBox="1"/>
+          <p:nvPr/>
+        </p:nvSpPr>
+        <p:spPr>
+          <a:xfrm>
+            <a:off x="10002567" y="2786615"/>
+            <a:ext cx="2077192" cy="683534"/>
+          </a:xfrm>
+          <a:prstGeom prst="rect">
+            <a:avLst/>
+          </a:prstGeom>
+          <a:noFill/>
+          <a:ln>
+            <a:noFill/>
+          </a:ln>
+        </p:spPr>
+        <p:txBody>
+          <a:bodyPr wrap="square" rtlCol="0">
+            <a:normAutofit fontScale="92500"/>
+          </a:bodyPr>
+          <a:lstStyle/>
+          <a:p>
+            <a:r>
+              <a:rPr lang="en-US" dirty="0" smtClean="0"/>
+              <a:t>Thumb Proximal-Distal Phalanges Joint</a:t>
+            </a:r>
+            <a:endParaRPr lang="en-US" dirty="0"/>
+          </a:p>
+        </p:txBody>
+      </p:sp>
+      <p:sp>
+        <p:nvSpPr>
+          <p:cNvPr id="108" name="TextBox 107"/>
+          <p:cNvSpPr txBox="1"/>
+          <p:nvPr/>
+        </p:nvSpPr>
+        <p:spPr>
+          <a:xfrm>
+            <a:off x="9138958" y="2021650"/>
+            <a:ext cx="3100451" cy="562555"/>
+          </a:xfrm>
+          <a:prstGeom prst="rect">
+            <a:avLst/>
+          </a:prstGeom>
+          <a:noFill/>
+          <a:ln>
+            <a:noFill/>
+          </a:ln>
+        </p:spPr>
+        <p:txBody>
+          <a:bodyPr wrap="square" rtlCol="0">
+            <a:normAutofit fontScale="92500" lnSpcReduction="10000"/>
+          </a:bodyPr>
+          <a:lstStyle/>
+          <a:p>
+            <a:r>
+              <a:rPr lang="en-US" dirty="0"/>
+              <a:t>Index </a:t>
+            </a:r>
+            <a:r>
+              <a:rPr lang="en-US" dirty="0" smtClean="0"/>
+              <a:t>Finger Metacarpal- </a:t>
+            </a:r>
+            <a:r>
+              <a:rPr lang="en-US" dirty="0"/>
+              <a:t>Proximal Phalanges </a:t>
+            </a:r>
+            <a:r>
+              <a:rPr lang="en-US" dirty="0" smtClean="0"/>
+              <a:t>Joint</a:t>
+            </a:r>
+            <a:endParaRPr lang="en-US" dirty="0"/>
+          </a:p>
+        </p:txBody>
+      </p:sp>
+      <p:sp>
+        <p:nvSpPr>
+          <p:cNvPr id="109" name="Oval 27"/>
           <p:cNvSpPr>
             <a:spLocks noChangeArrowheads="1"/>
           </p:cNvSpPr>
@@ -4580,8 +4729,8 @@
         </p:nvSpPr>
         <p:spPr bwMode="auto">
           <a:xfrm>
-            <a:off x="2413578" y="3407024"/>
-            <a:ext cx="539800" cy="507043"/>
+            <a:off x="9407107" y="5130217"/>
+            <a:ext cx="428625" cy="409575"/>
           </a:xfrm>
           <a:prstGeom prst="ellipse">
             <a:avLst/>
@@ -4630,11 +4779,11 @@
               <a:tabLst/>
             </a:pPr>
             <a:r>
-              <a:rPr lang="en-US" altLang="en-US" sz="1400" b="1" dirty="0" smtClean="0">
+              <a:rPr lang="en-US" altLang="en-US" sz="1400" b="1" dirty="0">
                 <a:latin typeface="Calibri" panose="020F0502020204030204" pitchFamily="34" charset="0"/>
                 <a:cs typeface="Times New Roman" panose="02020603050405020304" pitchFamily="18" charset="0"/>
               </a:rPr>
-              <a:t>16</a:t>
+              <a:t>1</a:t>
             </a:r>
             <a:endParaRPr kumimoji="0" lang="en-US" altLang="en-US" sz="1800" b="0" i="0" u="none" strike="noStrike" cap="none" normalizeH="0" baseline="0" dirty="0" smtClean="0">
               <a:ln>
@@ -4651,14 +4800,14 @@
       </p:sp>
       <p:sp>
         <p:nvSpPr>
-          <p:cNvPr id="2068" name="TextBox 2067"/>
+          <p:cNvPr id="110" name="TextBox 109"/>
           <p:cNvSpPr txBox="1"/>
           <p:nvPr/>
         </p:nvSpPr>
         <p:spPr>
           <a:xfrm>
-            <a:off x="9349179" y="4089172"/>
-            <a:ext cx="1492992" cy="369332"/>
+            <a:off x="9795494" y="5153252"/>
+            <a:ext cx="1645392" cy="369332"/>
           </a:xfrm>
           <a:prstGeom prst="rect">
             <a:avLst/>
@@ -4676,7 +4825,7 @@
           <a:p>
             <a:r>
               <a:rPr lang="en-US" dirty="0" smtClean="0"/>
-              <a:t>Center of Paw</a:t>
+              <a:t>Center of Pellet</a:t>
             </a:r>
             <a:endParaRPr lang="en-US" dirty="0"/>
           </a:p>
@@ -4684,14 +4833,14 @@
       </p:sp>
       <p:sp>
         <p:nvSpPr>
-          <p:cNvPr id="106" name="TextBox 105"/>
+          <p:cNvPr id="111" name="TextBox 110"/>
           <p:cNvSpPr txBox="1"/>
           <p:nvPr/>
         </p:nvSpPr>
         <p:spPr>
           <a:xfrm>
-            <a:off x="9664865" y="3283630"/>
-            <a:ext cx="1776022" cy="369332"/>
+            <a:off x="8885766" y="1154921"/>
+            <a:ext cx="3209308" cy="632856"/>
           </a:xfrm>
           <a:prstGeom prst="rect">
             <a:avLst/>
@@ -4703,28 +4852,36 @@
         </p:spPr>
         <p:txBody>
           <a:bodyPr wrap="square" rtlCol="0">
-            <a:spAutoFit/>
+            <a:normAutofit/>
           </a:bodyPr>
           <a:lstStyle/>
           <a:p>
             <a:r>
-              <a:rPr lang="en-US" dirty="0" smtClean="0"/>
-              <a:t>Far Thumb Joint</a:t>
-            </a:r>
-            <a:endParaRPr lang="en-US" dirty="0"/>
-          </a:p>
-        </p:txBody>
-      </p:sp>
-      <p:sp>
-        <p:nvSpPr>
-          <p:cNvPr id="107" name="TextBox 106"/>
+              <a:rPr lang="en-US" sz="1700" dirty="0" smtClean="0"/>
+              <a:t>Index Finger </a:t>
+            </a:r>
+            <a:r>
+              <a:rPr lang="en-US" sz="1700" dirty="0"/>
+              <a:t>Proximal-Middle Phalanges </a:t>
+            </a:r>
+            <a:r>
+              <a:rPr lang="en-US" sz="1700" dirty="0" smtClean="0"/>
+              <a:t>Joint</a:t>
+            </a:r>
+            <a:endParaRPr lang="en-US" sz="1700" dirty="0"/>
+          </a:p>
+        </p:txBody>
+      </p:sp>
+      <p:sp>
+        <p:nvSpPr>
+          <p:cNvPr id="112" name="TextBox 111"/>
           <p:cNvSpPr txBox="1"/>
           <p:nvPr/>
         </p:nvSpPr>
         <p:spPr>
           <a:xfrm>
-            <a:off x="10013207" y="2597827"/>
-            <a:ext cx="1863108" cy="369332"/>
+            <a:off x="8005791" y="648152"/>
+            <a:ext cx="4134598" cy="618211"/>
           </a:xfrm>
           <a:prstGeom prst="rect">
             <a:avLst/>
@@ -4736,28 +4893,36 @@
         </p:spPr>
         <p:txBody>
           <a:bodyPr wrap="square" rtlCol="0">
-            <a:spAutoFit/>
+            <a:normAutofit/>
           </a:bodyPr>
           <a:lstStyle/>
           <a:p>
             <a:r>
-              <a:rPr lang="en-US" dirty="0" smtClean="0"/>
-              <a:t>Near Thumb Joint</a:t>
-            </a:r>
-            <a:endParaRPr lang="en-US" dirty="0"/>
-          </a:p>
-        </p:txBody>
-      </p:sp>
-      <p:sp>
-        <p:nvSpPr>
-          <p:cNvPr id="108" name="TextBox 107"/>
+              <a:rPr lang="en-US" sz="1700" dirty="0" smtClean="0"/>
+              <a:t>Index Finger </a:t>
+            </a:r>
+            <a:r>
+              <a:rPr lang="en-US" sz="1700" dirty="0"/>
+              <a:t>Middle-Distal Phalanges </a:t>
+            </a:r>
+            <a:r>
+              <a:rPr lang="en-US" sz="1700" dirty="0" smtClean="0"/>
+              <a:t>Joint</a:t>
+            </a:r>
+            <a:endParaRPr lang="en-US" sz="1700" dirty="0"/>
+          </a:p>
+        </p:txBody>
+      </p:sp>
+      <p:sp>
+        <p:nvSpPr>
+          <p:cNvPr id="113" name="TextBox 112"/>
           <p:cNvSpPr txBox="1"/>
           <p:nvPr/>
         </p:nvSpPr>
         <p:spPr>
           <a:xfrm>
-            <a:off x="8989948" y="1879375"/>
-            <a:ext cx="2363852" cy="369332"/>
+            <a:off x="-358803" y="3496350"/>
+            <a:ext cx="2599435" cy="515746"/>
           </a:xfrm>
           <a:prstGeom prst="rect">
             <a:avLst/>
@@ -4769,13 +4934,29 @@
         </p:spPr>
         <p:txBody>
           <a:bodyPr wrap="square" rtlCol="0">
-            <a:spAutoFit/>
+            <a:normAutofit fontScale="92500" lnSpcReduction="20000"/>
           </a:bodyPr>
           <a:lstStyle/>
           <a:p>
+            <a:pPr algn="r"/>
             <a:r>
               <a:rPr lang="en-US" dirty="0" smtClean="0"/>
-              <a:t>Far Index Finger Joint</a:t>
+              <a:t>Pinky Finger Middle-</a:t>
+            </a:r>
+          </a:p>
+          <a:p>
+            <a:pPr algn="r"/>
+            <a:r>
+              <a:rPr lang="en-US" dirty="0" smtClean="0"/>
+              <a:t>Distal </a:t>
+            </a:r>
+            <a:r>
+              <a:rPr lang="en-US" dirty="0"/>
+              <a:t>Phalanges </a:t>
+            </a:r>
+            <a:r>
+              <a:rPr lang="en-US" dirty="0" smtClean="0"/>
+              <a:t>Joint</a:t>
             </a:r>
             <a:endParaRPr lang="en-US" dirty="0"/>
           </a:p>
@@ -4783,7 +4964,803 @@
       </p:sp>
       <p:sp>
         <p:nvSpPr>
-          <p:cNvPr id="109" name="Oval 27"/>
+          <p:cNvPr id="115" name="TextBox 114"/>
+          <p:cNvSpPr txBox="1"/>
+          <p:nvPr/>
+        </p:nvSpPr>
+        <p:spPr>
+          <a:xfrm>
+            <a:off x="-286557" y="4428222"/>
+            <a:ext cx="2514609" cy="507217"/>
+          </a:xfrm>
+          <a:prstGeom prst="rect">
+            <a:avLst/>
+          </a:prstGeom>
+          <a:noFill/>
+          <a:ln>
+            <a:noFill/>
+          </a:ln>
+        </p:spPr>
+        <p:txBody>
+          <a:bodyPr wrap="square" rtlCol="0">
+            <a:normAutofit fontScale="92500" lnSpcReduction="20000"/>
+          </a:bodyPr>
+          <a:lstStyle/>
+          <a:p>
+            <a:pPr algn="r"/>
+            <a:r>
+              <a:rPr lang="en-US" dirty="0" smtClean="0"/>
+              <a:t>Pinky Finger Proximal-</a:t>
+            </a:r>
+          </a:p>
+          <a:p>
+            <a:pPr algn="r"/>
+            <a:r>
+              <a:rPr lang="en-US" dirty="0" smtClean="0"/>
+              <a:t>Middle </a:t>
+            </a:r>
+            <a:r>
+              <a:rPr lang="en-US" dirty="0"/>
+              <a:t>Phalanges </a:t>
+            </a:r>
+            <a:r>
+              <a:rPr lang="en-US" dirty="0" smtClean="0"/>
+              <a:t>Joint</a:t>
+            </a:r>
+            <a:endParaRPr lang="en-US" dirty="0"/>
+          </a:p>
+        </p:txBody>
+      </p:sp>
+      <p:sp>
+        <p:nvSpPr>
+          <p:cNvPr id="116" name="TextBox 115"/>
+          <p:cNvSpPr txBox="1"/>
+          <p:nvPr/>
+        </p:nvSpPr>
+        <p:spPr>
+          <a:xfrm>
+            <a:off x="22356" y="5192936"/>
+            <a:ext cx="2346486" cy="810909"/>
+          </a:xfrm>
+          <a:prstGeom prst="rect">
+            <a:avLst/>
+          </a:prstGeom>
+          <a:noFill/>
+          <a:ln>
+            <a:noFill/>
+          </a:ln>
+        </p:spPr>
+        <p:txBody>
+          <a:bodyPr wrap="square" rtlCol="0">
+            <a:noAutofit/>
+          </a:bodyPr>
+          <a:lstStyle/>
+          <a:p>
+            <a:pPr algn="r"/>
+            <a:r>
+              <a:rPr lang="en-US" sz="1700" dirty="0"/>
+              <a:t>Pinky Finger Metacarpal- </a:t>
+            </a:r>
+          </a:p>
+          <a:p>
+            <a:pPr algn="r"/>
+            <a:r>
+              <a:rPr lang="en-US" sz="1700" dirty="0" smtClean="0"/>
+              <a:t>Proximal </a:t>
+            </a:r>
+            <a:r>
+              <a:rPr lang="en-US" sz="1700" dirty="0"/>
+              <a:t>Phalanges </a:t>
+            </a:r>
+            <a:r>
+              <a:rPr lang="en-US" sz="1700" dirty="0" smtClean="0"/>
+              <a:t>Joint</a:t>
+            </a:r>
+            <a:endParaRPr lang="en-US" sz="1700" dirty="0"/>
+          </a:p>
+        </p:txBody>
+      </p:sp>
+      <p:sp>
+        <p:nvSpPr>
+          <p:cNvPr id="118" name="TextBox 117"/>
+          <p:cNvSpPr txBox="1"/>
+          <p:nvPr/>
+        </p:nvSpPr>
+        <p:spPr>
+          <a:xfrm>
+            <a:off x="-127121" y="-89632"/>
+            <a:ext cx="4308492" cy="557141"/>
+          </a:xfrm>
+          <a:prstGeom prst="rect">
+            <a:avLst/>
+          </a:prstGeom>
+          <a:noFill/>
+          <a:ln>
+            <a:noFill/>
+          </a:ln>
+        </p:spPr>
+        <p:txBody>
+          <a:bodyPr wrap="square" rtlCol="0">
+            <a:normAutofit fontScale="92500" lnSpcReduction="20000"/>
+          </a:bodyPr>
+          <a:lstStyle/>
+          <a:p>
+            <a:pPr algn="r"/>
+            <a:r>
+              <a:rPr lang="en-US" dirty="0" smtClean="0"/>
+              <a:t>Ring Finger Middle-</a:t>
+            </a:r>
+          </a:p>
+          <a:p>
+            <a:pPr algn="r"/>
+            <a:r>
+              <a:rPr lang="en-US" dirty="0" smtClean="0"/>
+              <a:t>Distal </a:t>
+            </a:r>
+            <a:r>
+              <a:rPr lang="en-US" dirty="0"/>
+              <a:t>Phalanges </a:t>
+            </a:r>
+            <a:r>
+              <a:rPr lang="en-US" dirty="0" smtClean="0"/>
+              <a:t>Joint</a:t>
+            </a:r>
+            <a:endParaRPr lang="en-US" dirty="0"/>
+          </a:p>
+        </p:txBody>
+      </p:sp>
+      <p:sp>
+        <p:nvSpPr>
+          <p:cNvPr id="119" name="TextBox 118"/>
+          <p:cNvSpPr txBox="1"/>
+          <p:nvPr/>
+        </p:nvSpPr>
+        <p:spPr>
+          <a:xfrm>
+            <a:off x="-293785" y="505827"/>
+            <a:ext cx="3869852" cy="619745"/>
+          </a:xfrm>
+          <a:prstGeom prst="rect">
+            <a:avLst/>
+          </a:prstGeom>
+          <a:noFill/>
+          <a:ln>
+            <a:noFill/>
+          </a:ln>
+        </p:spPr>
+        <p:txBody>
+          <a:bodyPr wrap="square" rtlCol="0">
+            <a:noAutofit/>
+          </a:bodyPr>
+          <a:lstStyle/>
+          <a:p>
+            <a:pPr algn="r"/>
+            <a:r>
+              <a:rPr lang="en-US" sz="1700" dirty="0" smtClean="0"/>
+              <a:t>Ring Finger Proximal-</a:t>
+            </a:r>
+          </a:p>
+          <a:p>
+            <a:pPr algn="r"/>
+            <a:r>
+              <a:rPr lang="en-US" sz="1700" dirty="0" smtClean="0"/>
+              <a:t>Middle </a:t>
+            </a:r>
+            <a:r>
+              <a:rPr lang="en-US" sz="1700" dirty="0"/>
+              <a:t>Phalanges </a:t>
+            </a:r>
+            <a:r>
+              <a:rPr lang="en-US" sz="1700" dirty="0" smtClean="0"/>
+              <a:t>Joint</a:t>
+            </a:r>
+            <a:endParaRPr lang="en-US" sz="1700" dirty="0"/>
+          </a:p>
+        </p:txBody>
+      </p:sp>
+      <p:sp>
+        <p:nvSpPr>
+          <p:cNvPr id="120" name="TextBox 119"/>
+          <p:cNvSpPr txBox="1"/>
+          <p:nvPr/>
+        </p:nvSpPr>
+        <p:spPr>
+          <a:xfrm>
+            <a:off x="-329245" y="1367091"/>
+            <a:ext cx="3707202" cy="508229"/>
+          </a:xfrm>
+          <a:prstGeom prst="rect">
+            <a:avLst/>
+          </a:prstGeom>
+          <a:noFill/>
+          <a:ln>
+            <a:noFill/>
+          </a:ln>
+        </p:spPr>
+        <p:txBody>
+          <a:bodyPr wrap="square" rtlCol="0">
+            <a:normAutofit fontScale="92500" lnSpcReduction="20000"/>
+          </a:bodyPr>
+          <a:lstStyle/>
+          <a:p>
+            <a:pPr algn="r"/>
+            <a:r>
+              <a:rPr lang="en-US" dirty="0"/>
+              <a:t>Ring Finger Metacarpal- </a:t>
+            </a:r>
+            <a:endParaRPr lang="en-US" dirty="0" smtClean="0"/>
+          </a:p>
+          <a:p>
+            <a:pPr algn="r"/>
+            <a:r>
+              <a:rPr lang="en-US" dirty="0" smtClean="0"/>
+              <a:t>Proximal </a:t>
+            </a:r>
+            <a:r>
+              <a:rPr lang="en-US" dirty="0"/>
+              <a:t>Phalanges Joint</a:t>
+            </a:r>
+          </a:p>
+          <a:p>
+            <a:pPr algn="r"/>
+            <a:endParaRPr lang="en-US" dirty="0"/>
+          </a:p>
+        </p:txBody>
+      </p:sp>
+      <p:sp>
+        <p:nvSpPr>
+          <p:cNvPr id="121" name="TextBox 120"/>
+          <p:cNvSpPr txBox="1"/>
+          <p:nvPr/>
+        </p:nvSpPr>
+        <p:spPr>
+          <a:xfrm>
+            <a:off x="7557580" y="-182563"/>
+            <a:ext cx="3301236" cy="563164"/>
+          </a:xfrm>
+          <a:prstGeom prst="rect">
+            <a:avLst/>
+          </a:prstGeom>
+          <a:noFill/>
+          <a:ln>
+            <a:noFill/>
+          </a:ln>
+        </p:spPr>
+        <p:txBody>
+          <a:bodyPr wrap="square" rtlCol="0">
+            <a:normAutofit fontScale="92500" lnSpcReduction="10000"/>
+          </a:bodyPr>
+          <a:lstStyle/>
+          <a:p>
+            <a:r>
+              <a:rPr lang="en-US" dirty="0"/>
+              <a:t>Middle Finger Metacarpal- Proximal Phalanges </a:t>
+            </a:r>
+            <a:r>
+              <a:rPr lang="en-US" dirty="0" smtClean="0"/>
+              <a:t>Joint </a:t>
+            </a:r>
+            <a:endParaRPr lang="en-US" dirty="0"/>
+          </a:p>
+        </p:txBody>
+      </p:sp>
+      <p:sp>
+        <p:nvSpPr>
+          <p:cNvPr id="122" name="TextBox 121"/>
+          <p:cNvSpPr txBox="1"/>
+          <p:nvPr/>
+        </p:nvSpPr>
+        <p:spPr>
+          <a:xfrm>
+            <a:off x="4793075" y="-1313894"/>
+            <a:ext cx="1127029" cy="1542174"/>
+          </a:xfrm>
+          <a:prstGeom prst="rect">
+            <a:avLst/>
+          </a:prstGeom>
+          <a:noFill/>
+          <a:ln>
+            <a:noFill/>
+          </a:ln>
+        </p:spPr>
+        <p:txBody>
+          <a:bodyPr wrap="square" rtlCol="0">
+            <a:noAutofit/>
+          </a:bodyPr>
+          <a:lstStyle/>
+          <a:p>
+            <a:pPr algn="ctr"/>
+            <a:r>
+              <a:rPr lang="en-US" sz="1700" dirty="0" smtClean="0"/>
+              <a:t>Middle Finger </a:t>
+            </a:r>
+            <a:r>
+              <a:rPr lang="en-US" sz="1700" dirty="0"/>
+              <a:t>Middle-Distal Phalanges </a:t>
+            </a:r>
+            <a:r>
+              <a:rPr lang="en-US" sz="1700" dirty="0" smtClean="0"/>
+              <a:t>Joint</a:t>
+            </a:r>
+            <a:endParaRPr lang="en-US" sz="1700" dirty="0"/>
+          </a:p>
+        </p:txBody>
+      </p:sp>
+      <p:sp>
+        <p:nvSpPr>
+          <p:cNvPr id="123" name="TextBox 122"/>
+          <p:cNvSpPr txBox="1"/>
+          <p:nvPr/>
+        </p:nvSpPr>
+        <p:spPr>
+          <a:xfrm>
+            <a:off x="5984046" y="-1486510"/>
+            <a:ext cx="1150397" cy="1934894"/>
+          </a:xfrm>
+          <a:prstGeom prst="rect">
+            <a:avLst/>
+          </a:prstGeom>
+          <a:noFill/>
+          <a:ln>
+            <a:noFill/>
+          </a:ln>
+        </p:spPr>
+        <p:txBody>
+          <a:bodyPr wrap="square" rtlCol="0">
+            <a:normAutofit/>
+          </a:bodyPr>
+          <a:lstStyle/>
+          <a:p>
+            <a:pPr algn="ctr"/>
+            <a:r>
+              <a:rPr lang="en-US" sz="1700" dirty="0" smtClean="0"/>
+              <a:t>Middle Finger </a:t>
+            </a:r>
+            <a:r>
+              <a:rPr lang="en-US" sz="1700" dirty="0"/>
+              <a:t>Proximal-Middle Phalanges </a:t>
+            </a:r>
+            <a:r>
+              <a:rPr lang="en-US" sz="1700" dirty="0" smtClean="0"/>
+              <a:t>Joint</a:t>
+            </a:r>
+            <a:endParaRPr lang="en-US" sz="1700" dirty="0"/>
+          </a:p>
+        </p:txBody>
+      </p:sp>
+      <p:sp>
+        <p:nvSpPr>
+          <p:cNvPr id="2070" name="Rectangle 2069"/>
+          <p:cNvSpPr/>
+          <p:nvPr/>
+        </p:nvSpPr>
+        <p:spPr>
+          <a:xfrm>
+            <a:off x="7966686" y="3459263"/>
+            <a:ext cx="317343" cy="168434"/>
+          </a:xfrm>
+          <a:prstGeom prst="rect">
+            <a:avLst/>
+          </a:prstGeom>
+          <a:solidFill>
+            <a:srgbClr val="FFFF00">
+              <a:alpha val="35000"/>
+            </a:srgbClr>
+          </a:solidFill>
+          <a:ln>
+            <a:noFill/>
+          </a:ln>
+        </p:spPr>
+        <p:style>
+          <a:lnRef idx="2">
+            <a:schemeClr val="accent1">
+              <a:shade val="50000"/>
+            </a:schemeClr>
+          </a:lnRef>
+          <a:fillRef idx="1">
+            <a:schemeClr val="accent1"/>
+          </a:fillRef>
+          <a:effectRef idx="0">
+            <a:schemeClr val="accent1"/>
+          </a:effectRef>
+          <a:fontRef idx="minor">
+            <a:schemeClr val="lt1"/>
+          </a:fontRef>
+        </p:style>
+        <p:txBody>
+          <a:bodyPr rtlCol="0" anchor="ctr"/>
+          <a:lstStyle/>
+          <a:p>
+            <a:pPr algn="ctr"/>
+            <a:endParaRPr lang="en-US"/>
+          </a:p>
+        </p:txBody>
+      </p:sp>
+      <p:sp>
+        <p:nvSpPr>
+          <p:cNvPr id="125" name="Rectangle 124"/>
+          <p:cNvSpPr/>
+          <p:nvPr/>
+        </p:nvSpPr>
+        <p:spPr>
+          <a:xfrm>
+            <a:off x="7716316" y="4036205"/>
+            <a:ext cx="415313" cy="153821"/>
+          </a:xfrm>
+          <a:prstGeom prst="rect">
+            <a:avLst/>
+          </a:prstGeom>
+          <a:solidFill>
+            <a:srgbClr val="FFFF00">
+              <a:alpha val="35000"/>
+            </a:srgbClr>
+          </a:solidFill>
+          <a:ln>
+            <a:noFill/>
+          </a:ln>
+        </p:spPr>
+        <p:style>
+          <a:lnRef idx="2">
+            <a:schemeClr val="accent1">
+              <a:shade val="50000"/>
+            </a:schemeClr>
+          </a:lnRef>
+          <a:fillRef idx="1">
+            <a:schemeClr val="accent1"/>
+          </a:fillRef>
+          <a:effectRef idx="0">
+            <a:schemeClr val="accent1"/>
+          </a:effectRef>
+          <a:fontRef idx="minor">
+            <a:schemeClr val="lt1"/>
+          </a:fontRef>
+        </p:style>
+        <p:txBody>
+          <a:bodyPr rtlCol="0" anchor="ctr"/>
+          <a:lstStyle/>
+          <a:p>
+            <a:pPr algn="ctr"/>
+            <a:endParaRPr lang="en-US"/>
+          </a:p>
+        </p:txBody>
+      </p:sp>
+      <p:sp>
+        <p:nvSpPr>
+          <p:cNvPr id="126" name="Rectangle 125"/>
+          <p:cNvSpPr/>
+          <p:nvPr/>
+        </p:nvSpPr>
+        <p:spPr>
+          <a:xfrm>
+            <a:off x="6856342" y="2904087"/>
+            <a:ext cx="415313" cy="153821"/>
+          </a:xfrm>
+          <a:prstGeom prst="rect">
+            <a:avLst/>
+          </a:prstGeom>
+          <a:solidFill>
+            <a:srgbClr val="FFFF00">
+              <a:alpha val="35000"/>
+            </a:srgbClr>
+          </a:solidFill>
+          <a:ln>
+            <a:noFill/>
+          </a:ln>
+        </p:spPr>
+        <p:style>
+          <a:lnRef idx="2">
+            <a:schemeClr val="accent1">
+              <a:shade val="50000"/>
+            </a:schemeClr>
+          </a:lnRef>
+          <a:fillRef idx="1">
+            <a:schemeClr val="accent1"/>
+          </a:fillRef>
+          <a:effectRef idx="0">
+            <a:schemeClr val="accent1"/>
+          </a:effectRef>
+          <a:fontRef idx="minor">
+            <a:schemeClr val="lt1"/>
+          </a:fontRef>
+        </p:style>
+        <p:txBody>
+          <a:bodyPr rtlCol="0" anchor="ctr"/>
+          <a:lstStyle/>
+          <a:p>
+            <a:pPr algn="ctr"/>
+            <a:endParaRPr lang="en-US"/>
+          </a:p>
+        </p:txBody>
+      </p:sp>
+      <p:sp>
+        <p:nvSpPr>
+          <p:cNvPr id="127" name="Rectangle 126"/>
+          <p:cNvSpPr/>
+          <p:nvPr/>
+        </p:nvSpPr>
+        <p:spPr>
+          <a:xfrm>
+            <a:off x="6965198" y="2120319"/>
+            <a:ext cx="415313" cy="153821"/>
+          </a:xfrm>
+          <a:prstGeom prst="rect">
+            <a:avLst/>
+          </a:prstGeom>
+          <a:solidFill>
+            <a:srgbClr val="FFFF00">
+              <a:alpha val="35000"/>
+            </a:srgbClr>
+          </a:solidFill>
+          <a:ln>
+            <a:noFill/>
+          </a:ln>
+        </p:spPr>
+        <p:style>
+          <a:lnRef idx="2">
+            <a:schemeClr val="accent1">
+              <a:shade val="50000"/>
+            </a:schemeClr>
+          </a:lnRef>
+          <a:fillRef idx="1">
+            <a:schemeClr val="accent1"/>
+          </a:fillRef>
+          <a:effectRef idx="0">
+            <a:schemeClr val="accent1"/>
+          </a:effectRef>
+          <a:fontRef idx="minor">
+            <a:schemeClr val="lt1"/>
+          </a:fontRef>
+        </p:style>
+        <p:txBody>
+          <a:bodyPr rtlCol="0" anchor="ctr"/>
+          <a:lstStyle/>
+          <a:p>
+            <a:pPr algn="ctr"/>
+            <a:endParaRPr lang="en-US"/>
+          </a:p>
+        </p:txBody>
+      </p:sp>
+      <p:sp>
+        <p:nvSpPr>
+          <p:cNvPr id="128" name="Rectangle 127"/>
+          <p:cNvSpPr/>
+          <p:nvPr/>
+        </p:nvSpPr>
+        <p:spPr>
+          <a:xfrm>
+            <a:off x="7008740" y="1641347"/>
+            <a:ext cx="317569" cy="197162"/>
+          </a:xfrm>
+          <a:prstGeom prst="rect">
+            <a:avLst/>
+          </a:prstGeom>
+          <a:solidFill>
+            <a:srgbClr val="FFFF00">
+              <a:alpha val="35000"/>
+            </a:srgbClr>
+          </a:solidFill>
+          <a:ln>
+            <a:noFill/>
+          </a:ln>
+        </p:spPr>
+        <p:style>
+          <a:lnRef idx="2">
+            <a:schemeClr val="accent1">
+              <a:shade val="50000"/>
+            </a:schemeClr>
+          </a:lnRef>
+          <a:fillRef idx="1">
+            <a:schemeClr val="accent1"/>
+          </a:fillRef>
+          <a:effectRef idx="0">
+            <a:schemeClr val="accent1"/>
+          </a:effectRef>
+          <a:fontRef idx="minor">
+            <a:schemeClr val="lt1"/>
+          </a:fontRef>
+        </p:style>
+        <p:txBody>
+          <a:bodyPr rtlCol="0" anchor="ctr"/>
+          <a:lstStyle/>
+          <a:p>
+            <a:pPr algn="ctr"/>
+            <a:endParaRPr lang="en-US"/>
+          </a:p>
+        </p:txBody>
+      </p:sp>
+      <p:sp>
+        <p:nvSpPr>
+          <p:cNvPr id="129" name="Rectangle 128"/>
+          <p:cNvSpPr/>
+          <p:nvPr/>
+        </p:nvSpPr>
+        <p:spPr>
+          <a:xfrm>
+            <a:off x="3487638" y="3201126"/>
+            <a:ext cx="565618" cy="197162"/>
+          </a:xfrm>
+          <a:prstGeom prst="rect">
+            <a:avLst/>
+          </a:prstGeom>
+          <a:solidFill>
+            <a:srgbClr val="FFFF00">
+              <a:alpha val="35000"/>
+            </a:srgbClr>
+          </a:solidFill>
+          <a:ln>
+            <a:noFill/>
+          </a:ln>
+        </p:spPr>
+        <p:style>
+          <a:lnRef idx="2">
+            <a:schemeClr val="accent1">
+              <a:shade val="50000"/>
+            </a:schemeClr>
+          </a:lnRef>
+          <a:fillRef idx="1">
+            <a:schemeClr val="accent1"/>
+          </a:fillRef>
+          <a:effectRef idx="0">
+            <a:schemeClr val="accent1"/>
+          </a:effectRef>
+          <a:fontRef idx="minor">
+            <a:schemeClr val="lt1"/>
+          </a:fontRef>
+        </p:style>
+        <p:txBody>
+          <a:bodyPr rtlCol="0" anchor="ctr"/>
+          <a:lstStyle/>
+          <a:p>
+            <a:pPr algn="ctr"/>
+            <a:endParaRPr lang="en-US"/>
+          </a:p>
+        </p:txBody>
+      </p:sp>
+      <p:sp>
+        <p:nvSpPr>
+          <p:cNvPr id="130" name="Rectangle 129"/>
+          <p:cNvSpPr/>
+          <p:nvPr/>
+        </p:nvSpPr>
+        <p:spPr>
+          <a:xfrm>
+            <a:off x="3568476" y="4339492"/>
+            <a:ext cx="565618" cy="197162"/>
+          </a:xfrm>
+          <a:prstGeom prst="rect">
+            <a:avLst/>
+          </a:prstGeom>
+          <a:solidFill>
+            <a:srgbClr val="FFFF00">
+              <a:alpha val="35000"/>
+            </a:srgbClr>
+          </a:solidFill>
+          <a:ln>
+            <a:noFill/>
+          </a:ln>
+        </p:spPr>
+        <p:style>
+          <a:lnRef idx="2">
+            <a:schemeClr val="accent1">
+              <a:shade val="50000"/>
+            </a:schemeClr>
+          </a:lnRef>
+          <a:fillRef idx="1">
+            <a:schemeClr val="accent1"/>
+          </a:fillRef>
+          <a:effectRef idx="0">
+            <a:schemeClr val="accent1"/>
+          </a:effectRef>
+          <a:fontRef idx="minor">
+            <a:schemeClr val="lt1"/>
+          </a:fontRef>
+        </p:style>
+        <p:txBody>
+          <a:bodyPr rtlCol="0" anchor="ctr"/>
+          <a:lstStyle/>
+          <a:p>
+            <a:pPr algn="ctr"/>
+            <a:endParaRPr lang="en-US"/>
+          </a:p>
+        </p:txBody>
+      </p:sp>
+      <p:sp>
+        <p:nvSpPr>
+          <p:cNvPr id="131" name="Rectangle 130"/>
+          <p:cNvSpPr/>
+          <p:nvPr/>
+        </p:nvSpPr>
+        <p:spPr>
+          <a:xfrm>
+            <a:off x="4357523" y="4676077"/>
+            <a:ext cx="452781" cy="150155"/>
+          </a:xfrm>
+          <a:prstGeom prst="rect">
+            <a:avLst/>
+          </a:prstGeom>
+          <a:solidFill>
+            <a:srgbClr val="FFFF00">
+              <a:alpha val="35000"/>
+            </a:srgbClr>
+          </a:solidFill>
+          <a:ln>
+            <a:noFill/>
+          </a:ln>
+        </p:spPr>
+        <p:style>
+          <a:lnRef idx="2">
+            <a:schemeClr val="accent1">
+              <a:shade val="50000"/>
+            </a:schemeClr>
+          </a:lnRef>
+          <a:fillRef idx="1">
+            <a:schemeClr val="accent1"/>
+          </a:fillRef>
+          <a:effectRef idx="0">
+            <a:schemeClr val="accent1"/>
+          </a:effectRef>
+          <a:fontRef idx="minor">
+            <a:schemeClr val="lt1"/>
+          </a:fontRef>
+        </p:style>
+        <p:txBody>
+          <a:bodyPr rtlCol="0" anchor="ctr"/>
+          <a:lstStyle/>
+          <a:p>
+            <a:pPr algn="ctr"/>
+            <a:endParaRPr lang="en-US"/>
+          </a:p>
+        </p:txBody>
+      </p:sp>
+      <p:sp>
+        <p:nvSpPr>
+          <p:cNvPr id="2" name="Rectangle 1"/>
+          <p:cNvSpPr/>
+          <p:nvPr/>
+        </p:nvSpPr>
+        <p:spPr>
+          <a:xfrm>
+            <a:off x="3487638" y="1154921"/>
+            <a:ext cx="190043" cy="162539"/>
+          </a:xfrm>
+          <a:prstGeom prst="rect">
+            <a:avLst/>
+          </a:prstGeom>
+          <a:solidFill>
+            <a:schemeClr val="bg1"/>
+          </a:solidFill>
+          <a:ln>
+            <a:noFill/>
+          </a:ln>
+        </p:spPr>
+        <p:style>
+          <a:lnRef idx="2">
+            <a:schemeClr val="accent1">
+              <a:shade val="50000"/>
+            </a:schemeClr>
+          </a:lnRef>
+          <a:fillRef idx="1">
+            <a:schemeClr val="accent1"/>
+          </a:fillRef>
+          <a:effectRef idx="0">
+            <a:schemeClr val="accent1"/>
+          </a:effectRef>
+          <a:fontRef idx="minor">
+            <a:schemeClr val="lt1"/>
+          </a:fontRef>
+        </p:style>
+        <p:txBody>
+          <a:bodyPr rtlCol="0" anchor="ctr"/>
+          <a:lstStyle/>
+          <a:p>
+            <a:pPr algn="ctr"/>
+            <a:endParaRPr lang="en-US"/>
+          </a:p>
+        </p:txBody>
+      </p:sp>
+      <p:sp>
+        <p:nvSpPr>
+          <p:cNvPr id="100" name="Oval 32"/>
           <p:cNvSpPr>
             <a:spLocks noChangeArrowheads="1"/>
           </p:cNvSpPr>
@@ -4791,8 +5768,8 @@
         </p:nvSpPr>
         <p:spPr bwMode="auto">
           <a:xfrm>
-            <a:off x="9295039" y="5131935"/>
-            <a:ext cx="428625" cy="409575"/>
+            <a:off x="3542584" y="599471"/>
+            <a:ext cx="539800" cy="507043"/>
           </a:xfrm>
           <a:prstGeom prst="ellipse">
             <a:avLst/>
@@ -4841,11 +5818,11 @@
               <a:tabLst/>
             </a:pPr>
             <a:r>
-              <a:rPr lang="en-US" altLang="en-US" sz="1400" b="1" dirty="0">
+              <a:rPr lang="en-US" altLang="en-US" sz="1400" b="1" dirty="0" smtClean="0">
                 <a:latin typeface="Calibri" panose="020F0502020204030204" pitchFamily="34" charset="0"/>
                 <a:cs typeface="Times New Roman" panose="02020603050405020304" pitchFamily="18" charset="0"/>
               </a:rPr>
-              <a:t>1</a:t>
+              <a:t>12</a:t>
             </a:r>
             <a:endParaRPr kumimoji="0" lang="en-US" altLang="en-US" sz="1800" b="0" i="0" u="none" strike="noStrike" cap="none" normalizeH="0" baseline="0" dirty="0" smtClean="0">
               <a:ln>
@@ -4862,464 +5839,1360 @@
       </p:sp>
       <p:sp>
         <p:nvSpPr>
-          <p:cNvPr id="110" name="TextBox 109"/>
-          <p:cNvSpPr txBox="1"/>
+          <p:cNvPr id="3" name="Freeform 2"/>
+          <p:cNvSpPr/>
           <p:nvPr/>
         </p:nvSpPr>
         <p:spPr>
           <a:xfrm>
-            <a:off x="9795494" y="5134202"/>
-            <a:ext cx="1645392" cy="369332"/>
-          </a:xfrm>
-          <a:prstGeom prst="rect">
+            <a:off x="4851400" y="3445933"/>
+            <a:ext cx="2556933" cy="2345267"/>
+          </a:xfrm>
+          <a:custGeom>
             <a:avLst/>
-          </a:prstGeom>
-          <a:noFill/>
-          <a:ln>
-            <a:noFill/>
-          </a:ln>
-        </p:spPr>
-        <p:txBody>
-          <a:bodyPr wrap="square" rtlCol="0">
-            <a:spAutoFit/>
-          </a:bodyPr>
-          <a:lstStyle/>
-          <a:p>
-            <a:r>
-              <a:rPr lang="en-US" dirty="0" smtClean="0"/>
-              <a:t>Center of Pellet</a:t>
-            </a:r>
-            <a:endParaRPr lang="en-US" dirty="0"/>
-          </a:p>
-        </p:txBody>
-      </p:sp>
-      <p:sp>
-        <p:nvSpPr>
-          <p:cNvPr id="111" name="TextBox 110"/>
-          <p:cNvSpPr txBox="1"/>
-          <p:nvPr/>
-        </p:nvSpPr>
-        <p:spPr>
-          <a:xfrm>
-            <a:off x="8881090" y="1193579"/>
-            <a:ext cx="2559796" cy="369332"/>
-          </a:xfrm>
-          <a:prstGeom prst="rect">
-            <a:avLst/>
-          </a:prstGeom>
-          <a:noFill/>
-          <a:ln>
-            <a:noFill/>
-          </a:ln>
-        </p:spPr>
-        <p:txBody>
-          <a:bodyPr wrap="square" rtlCol="0">
-            <a:spAutoFit/>
-          </a:bodyPr>
-          <a:lstStyle/>
-          <a:p>
-            <a:r>
-              <a:rPr lang="en-US" dirty="0" smtClean="0"/>
-              <a:t>Middle Index Finger Joint</a:t>
-            </a:r>
-            <a:endParaRPr lang="en-US" dirty="0"/>
-          </a:p>
-        </p:txBody>
-      </p:sp>
-      <p:sp>
-        <p:nvSpPr>
-          <p:cNvPr id="112" name="TextBox 111"/>
-          <p:cNvSpPr txBox="1"/>
-          <p:nvPr/>
-        </p:nvSpPr>
-        <p:spPr>
-          <a:xfrm>
-            <a:off x="7955800" y="409806"/>
-            <a:ext cx="2559796" cy="369332"/>
-          </a:xfrm>
-          <a:prstGeom prst="rect">
-            <a:avLst/>
-          </a:prstGeom>
-          <a:noFill/>
-          <a:ln>
-            <a:noFill/>
-          </a:ln>
-        </p:spPr>
-        <p:txBody>
-          <a:bodyPr wrap="square" rtlCol="0">
-            <a:spAutoFit/>
-          </a:bodyPr>
-          <a:lstStyle/>
-          <a:p>
-            <a:r>
-              <a:rPr lang="en-US" dirty="0" smtClean="0"/>
-              <a:t>Near Index Finger Joint</a:t>
-            </a:r>
-            <a:endParaRPr lang="en-US" dirty="0"/>
-          </a:p>
-        </p:txBody>
-      </p:sp>
-      <p:sp>
-        <p:nvSpPr>
-          <p:cNvPr id="113" name="TextBox 112"/>
-          <p:cNvSpPr txBox="1"/>
-          <p:nvPr/>
-        </p:nvSpPr>
-        <p:spPr>
-          <a:xfrm>
-            <a:off x="304802" y="1890812"/>
-            <a:ext cx="2353900" cy="369332"/>
-          </a:xfrm>
-          <a:prstGeom prst="rect">
-            <a:avLst/>
-          </a:prstGeom>
-          <a:noFill/>
-          <a:ln>
-            <a:noFill/>
-          </a:ln>
-        </p:spPr>
-        <p:txBody>
-          <a:bodyPr wrap="square" rtlCol="0">
-            <a:spAutoFit/>
-          </a:bodyPr>
-          <a:lstStyle/>
-          <a:p>
-            <a:pPr algn="r"/>
-            <a:r>
-              <a:rPr lang="en-US" dirty="0" smtClean="0"/>
-              <a:t>Near Pinky Finger Joint</a:t>
-            </a:r>
-            <a:endParaRPr lang="en-US" dirty="0"/>
-          </a:p>
-        </p:txBody>
-      </p:sp>
-      <p:sp>
-        <p:nvSpPr>
-          <p:cNvPr id="115" name="TextBox 114"/>
-          <p:cNvSpPr txBox="1"/>
-          <p:nvPr/>
-        </p:nvSpPr>
-        <p:spPr>
-          <a:xfrm>
-            <a:off x="-293915" y="2608723"/>
-            <a:ext cx="2514609" cy="369332"/>
-          </a:xfrm>
-          <a:prstGeom prst="rect">
-            <a:avLst/>
-          </a:prstGeom>
-          <a:noFill/>
-          <a:ln>
-            <a:noFill/>
-          </a:ln>
-        </p:spPr>
-        <p:txBody>
-          <a:bodyPr wrap="square" rtlCol="0">
-            <a:spAutoFit/>
-          </a:bodyPr>
-          <a:lstStyle/>
-          <a:p>
-            <a:pPr algn="r"/>
-            <a:r>
-              <a:rPr lang="en-US" dirty="0" smtClean="0"/>
-              <a:t>Middle Pinky Finger Joint</a:t>
-            </a:r>
-            <a:endParaRPr lang="en-US" dirty="0"/>
-          </a:p>
-        </p:txBody>
-      </p:sp>
-      <p:sp>
-        <p:nvSpPr>
-          <p:cNvPr id="116" name="TextBox 115"/>
-          <p:cNvSpPr txBox="1"/>
-          <p:nvPr/>
-        </p:nvSpPr>
-        <p:spPr>
-          <a:xfrm>
-            <a:off x="206828" y="3479577"/>
-            <a:ext cx="2198925" cy="369332"/>
-          </a:xfrm>
-          <a:prstGeom prst="rect">
-            <a:avLst/>
-          </a:prstGeom>
-          <a:noFill/>
-          <a:ln>
-            <a:noFill/>
-          </a:ln>
-        </p:spPr>
-        <p:txBody>
-          <a:bodyPr wrap="square" rtlCol="0">
-            <a:spAutoFit/>
-          </a:bodyPr>
-          <a:lstStyle/>
-          <a:p>
-            <a:pPr algn="r"/>
-            <a:r>
-              <a:rPr lang="en-US" dirty="0" smtClean="0"/>
-              <a:t>Far Pinky Finger Joint</a:t>
-            </a:r>
-            <a:endParaRPr lang="en-US" dirty="0"/>
-          </a:p>
-        </p:txBody>
-      </p:sp>
-      <p:sp>
-        <p:nvSpPr>
-          <p:cNvPr id="2069" name="TextBox 2068"/>
-          <p:cNvSpPr txBox="1"/>
-          <p:nvPr/>
-        </p:nvSpPr>
-        <p:spPr>
-          <a:xfrm>
-            <a:off x="9295039" y="5705479"/>
-            <a:ext cx="2896961" cy="1069634"/>
-          </a:xfrm>
-          <a:prstGeom prst="rect">
-            <a:avLst/>
-          </a:prstGeom>
-          <a:noFill/>
-        </p:spPr>
-        <p:txBody>
-          <a:bodyPr wrap="square" rtlCol="0">
-            <a:noAutofit/>
-          </a:bodyPr>
-          <a:lstStyle/>
-          <a:p>
-            <a:pPr algn="just"/>
-            <a:r>
-              <a:rPr lang="en-US" sz="1400" dirty="0" smtClean="0"/>
-              <a:t>The far/middle/near designation was conceived in reference to the center frame, i.e. the farthest joint from the view of the person marking</a:t>
-            </a:r>
-            <a:endParaRPr lang="en-US" sz="1400" dirty="0"/>
-          </a:p>
-        </p:txBody>
-      </p:sp>
-      <p:sp>
-        <p:nvSpPr>
-          <p:cNvPr id="118" name="TextBox 117"/>
-          <p:cNvSpPr txBox="1"/>
-          <p:nvPr/>
-        </p:nvSpPr>
-        <p:spPr>
-          <a:xfrm>
-            <a:off x="2013858" y="127325"/>
-            <a:ext cx="2353901" cy="369332"/>
-          </a:xfrm>
-          <a:prstGeom prst="rect">
-            <a:avLst/>
-          </a:prstGeom>
-          <a:noFill/>
-          <a:ln>
-            <a:noFill/>
-          </a:ln>
-        </p:spPr>
-        <p:txBody>
-          <a:bodyPr wrap="square" rtlCol="0">
-            <a:spAutoFit/>
-          </a:bodyPr>
-          <a:lstStyle/>
-          <a:p>
-            <a:pPr algn="r"/>
-            <a:r>
-              <a:rPr lang="en-US" dirty="0" smtClean="0"/>
-              <a:t>Near Ring Finger Joint</a:t>
-            </a:r>
-            <a:endParaRPr lang="en-US" dirty="0"/>
-          </a:p>
-        </p:txBody>
-      </p:sp>
-      <p:sp>
-        <p:nvSpPr>
-          <p:cNvPr id="119" name="TextBox 118"/>
-          <p:cNvSpPr txBox="1"/>
-          <p:nvPr/>
-        </p:nvSpPr>
-        <p:spPr>
-          <a:xfrm>
-            <a:off x="1426028" y="725634"/>
-            <a:ext cx="2503091" cy="369332"/>
-          </a:xfrm>
-          <a:prstGeom prst="rect">
-            <a:avLst/>
-          </a:prstGeom>
-          <a:noFill/>
-          <a:ln>
-            <a:noFill/>
-          </a:ln>
-        </p:spPr>
-        <p:txBody>
-          <a:bodyPr wrap="square" rtlCol="0">
-            <a:spAutoFit/>
-          </a:bodyPr>
-          <a:lstStyle/>
-          <a:p>
-            <a:pPr algn="r"/>
-            <a:r>
-              <a:rPr lang="en-US" dirty="0" smtClean="0"/>
-              <a:t>Middle Ring Finger Joint</a:t>
-            </a:r>
-            <a:endParaRPr lang="en-US" dirty="0"/>
-          </a:p>
-        </p:txBody>
-      </p:sp>
-      <p:sp>
-        <p:nvSpPr>
-          <p:cNvPr id="120" name="TextBox 119"/>
-          <p:cNvSpPr txBox="1"/>
-          <p:nvPr/>
-        </p:nvSpPr>
-        <p:spPr>
-          <a:xfrm>
-            <a:off x="1644675" y="1291550"/>
-            <a:ext cx="2121794" cy="369332"/>
-          </a:xfrm>
-          <a:prstGeom prst="rect">
-            <a:avLst/>
-          </a:prstGeom>
-          <a:noFill/>
-          <a:ln>
-            <a:noFill/>
-          </a:ln>
-        </p:spPr>
-        <p:txBody>
-          <a:bodyPr wrap="square" rtlCol="0">
-            <a:spAutoFit/>
-          </a:bodyPr>
-          <a:lstStyle/>
-          <a:p>
-            <a:pPr algn="r"/>
-            <a:r>
-              <a:rPr lang="en-US" dirty="0" smtClean="0"/>
-              <a:t>Far Ring Finger Joint</a:t>
-            </a:r>
-            <a:endParaRPr lang="en-US" dirty="0"/>
-          </a:p>
-        </p:txBody>
-      </p:sp>
-      <p:sp>
-        <p:nvSpPr>
-          <p:cNvPr id="121" name="TextBox 120"/>
-          <p:cNvSpPr txBox="1"/>
-          <p:nvPr/>
-        </p:nvSpPr>
-        <p:spPr>
-          <a:xfrm>
-            <a:off x="7400632" y="-112707"/>
-            <a:ext cx="2363852" cy="369332"/>
-          </a:xfrm>
-          <a:prstGeom prst="rect">
-            <a:avLst/>
-          </a:prstGeom>
-          <a:noFill/>
-          <a:ln>
-            <a:noFill/>
-          </a:ln>
-        </p:spPr>
-        <p:txBody>
-          <a:bodyPr wrap="square" rtlCol="0">
-            <a:spAutoFit/>
-          </a:bodyPr>
-          <a:lstStyle/>
-          <a:p>
-            <a:r>
-              <a:rPr lang="en-US" dirty="0" smtClean="0"/>
-              <a:t>Far Middle Finger Joint</a:t>
-            </a:r>
-            <a:endParaRPr lang="en-US" dirty="0"/>
-          </a:p>
-        </p:txBody>
-      </p:sp>
-      <p:sp>
-        <p:nvSpPr>
-          <p:cNvPr id="122" name="TextBox 121"/>
-          <p:cNvSpPr txBox="1"/>
-          <p:nvPr/>
-        </p:nvSpPr>
-        <p:spPr>
-          <a:xfrm>
-            <a:off x="5775202" y="-354370"/>
-            <a:ext cx="1127029" cy="504580"/>
-          </a:xfrm>
-          <a:prstGeom prst="rect">
-            <a:avLst/>
-          </a:prstGeom>
-          <a:noFill/>
-          <a:ln>
-            <a:noFill/>
-          </a:ln>
-        </p:spPr>
-        <p:txBody>
-          <a:bodyPr wrap="square" rtlCol="0">
-            <a:normAutofit lnSpcReduction="10000"/>
-          </a:bodyPr>
-          <a:lstStyle/>
-          <a:p>
-            <a:pPr algn="ctr"/>
-            <a:r>
-              <a:rPr lang="en-US" sz="1400" dirty="0" smtClean="0"/>
-              <a:t>Near Middle F. J.</a:t>
-            </a:r>
-            <a:endParaRPr lang="en-US" sz="1400" dirty="0"/>
-          </a:p>
-        </p:txBody>
-      </p:sp>
-      <p:sp>
-        <p:nvSpPr>
-          <p:cNvPr id="123" name="TextBox 122"/>
-          <p:cNvSpPr txBox="1"/>
-          <p:nvPr/>
-        </p:nvSpPr>
-        <p:spPr>
-          <a:xfrm>
-            <a:off x="4911172" y="107749"/>
-            <a:ext cx="1030822" cy="492680"/>
-          </a:xfrm>
-          <a:prstGeom prst="rect">
-            <a:avLst/>
-          </a:prstGeom>
-          <a:noFill/>
-          <a:ln>
-            <a:noFill/>
-          </a:ln>
-        </p:spPr>
-        <p:txBody>
-          <a:bodyPr wrap="square" rtlCol="0">
-            <a:noAutofit/>
-          </a:bodyPr>
-          <a:lstStyle/>
-          <a:p>
-            <a:pPr algn="ctr"/>
-            <a:r>
-              <a:rPr lang="en-US" sz="1400" dirty="0" smtClean="0"/>
-              <a:t>Middle </a:t>
-            </a:r>
-            <a:r>
-              <a:rPr lang="en-US" sz="1400" dirty="0" smtClean="0"/>
-              <a:t>Middle</a:t>
-            </a:r>
-            <a:r>
-              <a:rPr lang="en-US" sz="1400" dirty="0" smtClean="0"/>
-              <a:t> F. J.</a:t>
-            </a:r>
-            <a:endParaRPr lang="en-US" sz="1400" dirty="0"/>
-          </a:p>
-        </p:txBody>
-      </p:sp>
-      <p:sp>
-        <p:nvSpPr>
-          <p:cNvPr id="2070" name="Rectangle 2069"/>
-          <p:cNvSpPr/>
-          <p:nvPr/>
-        </p:nvSpPr>
-        <p:spPr>
-          <a:xfrm>
-            <a:off x="7966686" y="3459263"/>
-            <a:ext cx="317343" cy="168434"/>
-          </a:xfrm>
-          <a:prstGeom prst="rect">
-            <a:avLst/>
-          </a:prstGeom>
+            <a:gdLst>
+              <a:gd name="connsiteX0" fmla="*/ 16933 w 2556933"/>
+              <a:gd name="connsiteY0" fmla="*/ 575734 h 2345267"/>
+              <a:gd name="connsiteX1" fmla="*/ 16933 w 2556933"/>
+              <a:gd name="connsiteY1" fmla="*/ 575734 h 2345267"/>
+              <a:gd name="connsiteX2" fmla="*/ 93133 w 2556933"/>
+              <a:gd name="connsiteY2" fmla="*/ 541867 h 2345267"/>
+              <a:gd name="connsiteX3" fmla="*/ 101600 w 2556933"/>
+              <a:gd name="connsiteY3" fmla="*/ 516467 h 2345267"/>
+              <a:gd name="connsiteX4" fmla="*/ 127000 w 2556933"/>
+              <a:gd name="connsiteY4" fmla="*/ 491067 h 2345267"/>
+              <a:gd name="connsiteX5" fmla="*/ 160867 w 2556933"/>
+              <a:gd name="connsiteY5" fmla="*/ 474134 h 2345267"/>
+              <a:gd name="connsiteX6" fmla="*/ 279400 w 2556933"/>
+              <a:gd name="connsiteY6" fmla="*/ 448734 h 2345267"/>
+              <a:gd name="connsiteX7" fmla="*/ 296333 w 2556933"/>
+              <a:gd name="connsiteY7" fmla="*/ 431800 h 2345267"/>
+              <a:gd name="connsiteX8" fmla="*/ 321733 w 2556933"/>
+              <a:gd name="connsiteY8" fmla="*/ 414867 h 2345267"/>
+              <a:gd name="connsiteX9" fmla="*/ 338667 w 2556933"/>
+              <a:gd name="connsiteY9" fmla="*/ 389467 h 2345267"/>
+              <a:gd name="connsiteX10" fmla="*/ 355600 w 2556933"/>
+              <a:gd name="connsiteY10" fmla="*/ 338667 h 2345267"/>
+              <a:gd name="connsiteX11" fmla="*/ 364067 w 2556933"/>
+              <a:gd name="connsiteY11" fmla="*/ 313267 h 2345267"/>
+              <a:gd name="connsiteX12" fmla="*/ 389467 w 2556933"/>
+              <a:gd name="connsiteY12" fmla="*/ 287867 h 2345267"/>
+              <a:gd name="connsiteX13" fmla="*/ 533400 w 2556933"/>
+              <a:gd name="connsiteY13" fmla="*/ 262467 h 2345267"/>
+              <a:gd name="connsiteX14" fmla="*/ 677333 w 2556933"/>
+              <a:gd name="connsiteY14" fmla="*/ 254000 h 2345267"/>
+              <a:gd name="connsiteX15" fmla="*/ 711200 w 2556933"/>
+              <a:gd name="connsiteY15" fmla="*/ 245534 h 2345267"/>
+              <a:gd name="connsiteX16" fmla="*/ 745067 w 2556933"/>
+              <a:gd name="connsiteY16" fmla="*/ 211667 h 2345267"/>
+              <a:gd name="connsiteX17" fmla="*/ 787400 w 2556933"/>
+              <a:gd name="connsiteY17" fmla="*/ 160867 h 2345267"/>
+              <a:gd name="connsiteX18" fmla="*/ 812800 w 2556933"/>
+              <a:gd name="connsiteY18" fmla="*/ 135467 h 2345267"/>
+              <a:gd name="connsiteX19" fmla="*/ 838200 w 2556933"/>
+              <a:gd name="connsiteY19" fmla="*/ 84667 h 2345267"/>
+              <a:gd name="connsiteX20" fmla="*/ 863600 w 2556933"/>
+              <a:gd name="connsiteY20" fmla="*/ 59267 h 2345267"/>
+              <a:gd name="connsiteX21" fmla="*/ 1303867 w 2556933"/>
+              <a:gd name="connsiteY21" fmla="*/ 50800 h 2345267"/>
+              <a:gd name="connsiteX22" fmla="*/ 1354667 w 2556933"/>
+              <a:gd name="connsiteY22" fmla="*/ 42334 h 2345267"/>
+              <a:gd name="connsiteX23" fmla="*/ 1388533 w 2556933"/>
+              <a:gd name="connsiteY23" fmla="*/ 33867 h 2345267"/>
+              <a:gd name="connsiteX24" fmla="*/ 1397000 w 2556933"/>
+              <a:gd name="connsiteY24" fmla="*/ 0 h 2345267"/>
+              <a:gd name="connsiteX25" fmla="*/ 1490133 w 2556933"/>
+              <a:gd name="connsiteY25" fmla="*/ 8467 h 2345267"/>
+              <a:gd name="connsiteX26" fmla="*/ 1540933 w 2556933"/>
+              <a:gd name="connsiteY26" fmla="*/ 33867 h 2345267"/>
+              <a:gd name="connsiteX27" fmla="*/ 1566333 w 2556933"/>
+              <a:gd name="connsiteY27" fmla="*/ 42334 h 2345267"/>
+              <a:gd name="connsiteX28" fmla="*/ 1634067 w 2556933"/>
+              <a:gd name="connsiteY28" fmla="*/ 59267 h 2345267"/>
+              <a:gd name="connsiteX29" fmla="*/ 1659467 w 2556933"/>
+              <a:gd name="connsiteY29" fmla="*/ 67734 h 2345267"/>
+              <a:gd name="connsiteX30" fmla="*/ 1735667 w 2556933"/>
+              <a:gd name="connsiteY30" fmla="*/ 76200 h 2345267"/>
+              <a:gd name="connsiteX31" fmla="*/ 1769533 w 2556933"/>
+              <a:gd name="connsiteY31" fmla="*/ 118534 h 2345267"/>
+              <a:gd name="connsiteX32" fmla="*/ 1786467 w 2556933"/>
+              <a:gd name="connsiteY32" fmla="*/ 135467 h 2345267"/>
+              <a:gd name="connsiteX33" fmla="*/ 1803400 w 2556933"/>
+              <a:gd name="connsiteY33" fmla="*/ 160867 h 2345267"/>
+              <a:gd name="connsiteX34" fmla="*/ 1828800 w 2556933"/>
+              <a:gd name="connsiteY34" fmla="*/ 186267 h 2345267"/>
+              <a:gd name="connsiteX35" fmla="*/ 1845733 w 2556933"/>
+              <a:gd name="connsiteY35" fmla="*/ 211667 h 2345267"/>
+              <a:gd name="connsiteX36" fmla="*/ 1888067 w 2556933"/>
+              <a:gd name="connsiteY36" fmla="*/ 245534 h 2345267"/>
+              <a:gd name="connsiteX37" fmla="*/ 1921933 w 2556933"/>
+              <a:gd name="connsiteY37" fmla="*/ 296334 h 2345267"/>
+              <a:gd name="connsiteX38" fmla="*/ 1938867 w 2556933"/>
+              <a:gd name="connsiteY38" fmla="*/ 321734 h 2345267"/>
+              <a:gd name="connsiteX39" fmla="*/ 1955800 w 2556933"/>
+              <a:gd name="connsiteY39" fmla="*/ 347134 h 2345267"/>
+              <a:gd name="connsiteX40" fmla="*/ 1964267 w 2556933"/>
+              <a:gd name="connsiteY40" fmla="*/ 372534 h 2345267"/>
+              <a:gd name="connsiteX41" fmla="*/ 1998133 w 2556933"/>
+              <a:gd name="connsiteY41" fmla="*/ 423334 h 2345267"/>
+              <a:gd name="connsiteX42" fmla="*/ 2015067 w 2556933"/>
+              <a:gd name="connsiteY42" fmla="*/ 448734 h 2345267"/>
+              <a:gd name="connsiteX43" fmla="*/ 2040467 w 2556933"/>
+              <a:gd name="connsiteY43" fmla="*/ 499534 h 2345267"/>
+              <a:gd name="connsiteX44" fmla="*/ 2048933 w 2556933"/>
+              <a:gd name="connsiteY44" fmla="*/ 524934 h 2345267"/>
+              <a:gd name="connsiteX45" fmla="*/ 2065867 w 2556933"/>
+              <a:gd name="connsiteY45" fmla="*/ 541867 h 2345267"/>
+              <a:gd name="connsiteX46" fmla="*/ 2082800 w 2556933"/>
+              <a:gd name="connsiteY46" fmla="*/ 567267 h 2345267"/>
+              <a:gd name="connsiteX47" fmla="*/ 2108200 w 2556933"/>
+              <a:gd name="connsiteY47" fmla="*/ 618067 h 2345267"/>
+              <a:gd name="connsiteX48" fmla="*/ 2133600 w 2556933"/>
+              <a:gd name="connsiteY48" fmla="*/ 635000 h 2345267"/>
+              <a:gd name="connsiteX49" fmla="*/ 2150533 w 2556933"/>
+              <a:gd name="connsiteY49" fmla="*/ 660400 h 2345267"/>
+              <a:gd name="connsiteX50" fmla="*/ 2167467 w 2556933"/>
+              <a:gd name="connsiteY50" fmla="*/ 677334 h 2345267"/>
+              <a:gd name="connsiteX51" fmla="*/ 2175933 w 2556933"/>
+              <a:gd name="connsiteY51" fmla="*/ 702734 h 2345267"/>
+              <a:gd name="connsiteX52" fmla="*/ 2209800 w 2556933"/>
+              <a:gd name="connsiteY52" fmla="*/ 753534 h 2345267"/>
+              <a:gd name="connsiteX53" fmla="*/ 2243667 w 2556933"/>
+              <a:gd name="connsiteY53" fmla="*/ 804334 h 2345267"/>
+              <a:gd name="connsiteX54" fmla="*/ 2319867 w 2556933"/>
+              <a:gd name="connsiteY54" fmla="*/ 838200 h 2345267"/>
+              <a:gd name="connsiteX55" fmla="*/ 2345267 w 2556933"/>
+              <a:gd name="connsiteY55" fmla="*/ 846667 h 2345267"/>
+              <a:gd name="connsiteX56" fmla="*/ 2370667 w 2556933"/>
+              <a:gd name="connsiteY56" fmla="*/ 855134 h 2345267"/>
+              <a:gd name="connsiteX57" fmla="*/ 2387600 w 2556933"/>
+              <a:gd name="connsiteY57" fmla="*/ 880534 h 2345267"/>
+              <a:gd name="connsiteX58" fmla="*/ 2463800 w 2556933"/>
+              <a:gd name="connsiteY58" fmla="*/ 922867 h 2345267"/>
+              <a:gd name="connsiteX59" fmla="*/ 2489200 w 2556933"/>
+              <a:gd name="connsiteY59" fmla="*/ 948267 h 2345267"/>
+              <a:gd name="connsiteX60" fmla="*/ 2514600 w 2556933"/>
+              <a:gd name="connsiteY60" fmla="*/ 965200 h 2345267"/>
+              <a:gd name="connsiteX61" fmla="*/ 2548467 w 2556933"/>
+              <a:gd name="connsiteY61" fmla="*/ 999067 h 2345267"/>
+              <a:gd name="connsiteX62" fmla="*/ 2556933 w 2556933"/>
+              <a:gd name="connsiteY62" fmla="*/ 1032934 h 2345267"/>
+              <a:gd name="connsiteX63" fmla="*/ 2548467 w 2556933"/>
+              <a:gd name="connsiteY63" fmla="*/ 1058334 h 2345267"/>
+              <a:gd name="connsiteX64" fmla="*/ 2506133 w 2556933"/>
+              <a:gd name="connsiteY64" fmla="*/ 1100667 h 2345267"/>
+              <a:gd name="connsiteX65" fmla="*/ 2463800 w 2556933"/>
+              <a:gd name="connsiteY65" fmla="*/ 1159934 h 2345267"/>
+              <a:gd name="connsiteX66" fmla="*/ 2429933 w 2556933"/>
+              <a:gd name="connsiteY66" fmla="*/ 1202267 h 2345267"/>
+              <a:gd name="connsiteX67" fmla="*/ 2396067 w 2556933"/>
+              <a:gd name="connsiteY67" fmla="*/ 1253067 h 2345267"/>
+              <a:gd name="connsiteX68" fmla="*/ 2362200 w 2556933"/>
+              <a:gd name="connsiteY68" fmla="*/ 1295400 h 2345267"/>
+              <a:gd name="connsiteX69" fmla="*/ 2345267 w 2556933"/>
+              <a:gd name="connsiteY69" fmla="*/ 1312334 h 2345267"/>
+              <a:gd name="connsiteX70" fmla="*/ 2311400 w 2556933"/>
+              <a:gd name="connsiteY70" fmla="*/ 1363134 h 2345267"/>
+              <a:gd name="connsiteX71" fmla="*/ 2286000 w 2556933"/>
+              <a:gd name="connsiteY71" fmla="*/ 1388534 h 2345267"/>
+              <a:gd name="connsiteX72" fmla="*/ 2252133 w 2556933"/>
+              <a:gd name="connsiteY72" fmla="*/ 1439334 h 2345267"/>
+              <a:gd name="connsiteX73" fmla="*/ 2209800 w 2556933"/>
+              <a:gd name="connsiteY73" fmla="*/ 1481667 h 2345267"/>
+              <a:gd name="connsiteX74" fmla="*/ 2159000 w 2556933"/>
+              <a:gd name="connsiteY74" fmla="*/ 1540934 h 2345267"/>
+              <a:gd name="connsiteX75" fmla="*/ 2133600 w 2556933"/>
+              <a:gd name="connsiteY75" fmla="*/ 1566334 h 2345267"/>
+              <a:gd name="connsiteX76" fmla="*/ 2065867 w 2556933"/>
+              <a:gd name="connsiteY76" fmla="*/ 1667934 h 2345267"/>
+              <a:gd name="connsiteX77" fmla="*/ 2048933 w 2556933"/>
+              <a:gd name="connsiteY77" fmla="*/ 1693334 h 2345267"/>
+              <a:gd name="connsiteX78" fmla="*/ 2032000 w 2556933"/>
+              <a:gd name="connsiteY78" fmla="*/ 1718734 h 2345267"/>
+              <a:gd name="connsiteX79" fmla="*/ 2006600 w 2556933"/>
+              <a:gd name="connsiteY79" fmla="*/ 1735667 h 2345267"/>
+              <a:gd name="connsiteX80" fmla="*/ 1955800 w 2556933"/>
+              <a:gd name="connsiteY80" fmla="*/ 1786467 h 2345267"/>
+              <a:gd name="connsiteX81" fmla="*/ 1930400 w 2556933"/>
+              <a:gd name="connsiteY81" fmla="*/ 1803400 h 2345267"/>
+              <a:gd name="connsiteX82" fmla="*/ 1896533 w 2556933"/>
+              <a:gd name="connsiteY82" fmla="*/ 1845734 h 2345267"/>
+              <a:gd name="connsiteX83" fmla="*/ 1871133 w 2556933"/>
+              <a:gd name="connsiteY83" fmla="*/ 1871134 h 2345267"/>
+              <a:gd name="connsiteX84" fmla="*/ 1794933 w 2556933"/>
+              <a:gd name="connsiteY84" fmla="*/ 1913467 h 2345267"/>
+              <a:gd name="connsiteX85" fmla="*/ 1744133 w 2556933"/>
+              <a:gd name="connsiteY85" fmla="*/ 1947334 h 2345267"/>
+              <a:gd name="connsiteX86" fmla="*/ 1693333 w 2556933"/>
+              <a:gd name="connsiteY86" fmla="*/ 1981200 h 2345267"/>
+              <a:gd name="connsiteX87" fmla="*/ 1659467 w 2556933"/>
+              <a:gd name="connsiteY87" fmla="*/ 2023534 h 2345267"/>
+              <a:gd name="connsiteX88" fmla="*/ 1642533 w 2556933"/>
+              <a:gd name="connsiteY88" fmla="*/ 2040467 h 2345267"/>
+              <a:gd name="connsiteX89" fmla="*/ 1634067 w 2556933"/>
+              <a:gd name="connsiteY89" fmla="*/ 2065867 h 2345267"/>
+              <a:gd name="connsiteX90" fmla="*/ 1608667 w 2556933"/>
+              <a:gd name="connsiteY90" fmla="*/ 2082800 h 2345267"/>
+              <a:gd name="connsiteX91" fmla="*/ 1591733 w 2556933"/>
+              <a:gd name="connsiteY91" fmla="*/ 2099734 h 2345267"/>
+              <a:gd name="connsiteX92" fmla="*/ 1473200 w 2556933"/>
+              <a:gd name="connsiteY92" fmla="*/ 2116667 h 2345267"/>
+              <a:gd name="connsiteX93" fmla="*/ 1422400 w 2556933"/>
+              <a:gd name="connsiteY93" fmla="*/ 2142067 h 2345267"/>
+              <a:gd name="connsiteX94" fmla="*/ 1397000 w 2556933"/>
+              <a:gd name="connsiteY94" fmla="*/ 2150534 h 2345267"/>
+              <a:gd name="connsiteX95" fmla="*/ 1371600 w 2556933"/>
+              <a:gd name="connsiteY95" fmla="*/ 2167467 h 2345267"/>
+              <a:gd name="connsiteX96" fmla="*/ 1346200 w 2556933"/>
+              <a:gd name="connsiteY96" fmla="*/ 2175934 h 2345267"/>
+              <a:gd name="connsiteX97" fmla="*/ 1286933 w 2556933"/>
+              <a:gd name="connsiteY97" fmla="*/ 2201334 h 2345267"/>
+              <a:gd name="connsiteX98" fmla="*/ 1261533 w 2556933"/>
+              <a:gd name="connsiteY98" fmla="*/ 2218267 h 2345267"/>
+              <a:gd name="connsiteX99" fmla="*/ 1168400 w 2556933"/>
+              <a:gd name="connsiteY99" fmla="*/ 2243667 h 2345267"/>
+              <a:gd name="connsiteX100" fmla="*/ 1117600 w 2556933"/>
+              <a:gd name="connsiteY100" fmla="*/ 2260600 h 2345267"/>
+              <a:gd name="connsiteX101" fmla="*/ 1083733 w 2556933"/>
+              <a:gd name="connsiteY101" fmla="*/ 2277534 h 2345267"/>
+              <a:gd name="connsiteX102" fmla="*/ 999067 w 2556933"/>
+              <a:gd name="connsiteY102" fmla="*/ 2286000 h 2345267"/>
+              <a:gd name="connsiteX103" fmla="*/ 973667 w 2556933"/>
+              <a:gd name="connsiteY103" fmla="*/ 2294467 h 2345267"/>
+              <a:gd name="connsiteX104" fmla="*/ 914400 w 2556933"/>
+              <a:gd name="connsiteY104" fmla="*/ 2311400 h 2345267"/>
+              <a:gd name="connsiteX105" fmla="*/ 889000 w 2556933"/>
+              <a:gd name="connsiteY105" fmla="*/ 2328334 h 2345267"/>
+              <a:gd name="connsiteX106" fmla="*/ 829733 w 2556933"/>
+              <a:gd name="connsiteY106" fmla="*/ 2345267 h 2345267"/>
+              <a:gd name="connsiteX107" fmla="*/ 745067 w 2556933"/>
+              <a:gd name="connsiteY107" fmla="*/ 2319867 h 2345267"/>
+              <a:gd name="connsiteX108" fmla="*/ 694267 w 2556933"/>
+              <a:gd name="connsiteY108" fmla="*/ 2302934 h 2345267"/>
+              <a:gd name="connsiteX109" fmla="*/ 575733 w 2556933"/>
+              <a:gd name="connsiteY109" fmla="*/ 2286000 h 2345267"/>
+              <a:gd name="connsiteX110" fmla="*/ 524933 w 2556933"/>
+              <a:gd name="connsiteY110" fmla="*/ 2243667 h 2345267"/>
+              <a:gd name="connsiteX111" fmla="*/ 499533 w 2556933"/>
+              <a:gd name="connsiteY111" fmla="*/ 2226734 h 2345267"/>
+              <a:gd name="connsiteX112" fmla="*/ 457200 w 2556933"/>
+              <a:gd name="connsiteY112" fmla="*/ 2184400 h 2345267"/>
+              <a:gd name="connsiteX113" fmla="*/ 431800 w 2556933"/>
+              <a:gd name="connsiteY113" fmla="*/ 2099734 h 2345267"/>
+              <a:gd name="connsiteX114" fmla="*/ 406400 w 2556933"/>
+              <a:gd name="connsiteY114" fmla="*/ 1710267 h 2345267"/>
+              <a:gd name="connsiteX115" fmla="*/ 389467 w 2556933"/>
+              <a:gd name="connsiteY115" fmla="*/ 1676400 h 2345267"/>
+              <a:gd name="connsiteX116" fmla="*/ 372533 w 2556933"/>
+              <a:gd name="connsiteY116" fmla="*/ 1625600 h 2345267"/>
+              <a:gd name="connsiteX117" fmla="*/ 347133 w 2556933"/>
+              <a:gd name="connsiteY117" fmla="*/ 1600200 h 2345267"/>
+              <a:gd name="connsiteX118" fmla="*/ 313267 w 2556933"/>
+              <a:gd name="connsiteY118" fmla="*/ 1549400 h 2345267"/>
+              <a:gd name="connsiteX119" fmla="*/ 287867 w 2556933"/>
+              <a:gd name="connsiteY119" fmla="*/ 1464734 h 2345267"/>
+              <a:gd name="connsiteX120" fmla="*/ 270933 w 2556933"/>
+              <a:gd name="connsiteY120" fmla="*/ 1439334 h 2345267"/>
+              <a:gd name="connsiteX121" fmla="*/ 254000 w 2556933"/>
+              <a:gd name="connsiteY121" fmla="*/ 1388534 h 2345267"/>
+              <a:gd name="connsiteX122" fmla="*/ 245533 w 2556933"/>
+              <a:gd name="connsiteY122" fmla="*/ 1363134 h 2345267"/>
+              <a:gd name="connsiteX123" fmla="*/ 228600 w 2556933"/>
+              <a:gd name="connsiteY123" fmla="*/ 1253067 h 2345267"/>
+              <a:gd name="connsiteX124" fmla="*/ 220133 w 2556933"/>
+              <a:gd name="connsiteY124" fmla="*/ 1202267 h 2345267"/>
+              <a:gd name="connsiteX125" fmla="*/ 211667 w 2556933"/>
+              <a:gd name="connsiteY125" fmla="*/ 1176867 h 2345267"/>
+              <a:gd name="connsiteX126" fmla="*/ 203200 w 2556933"/>
+              <a:gd name="connsiteY126" fmla="*/ 1143000 h 2345267"/>
+              <a:gd name="connsiteX127" fmla="*/ 160867 w 2556933"/>
+              <a:gd name="connsiteY127" fmla="*/ 1092200 h 2345267"/>
+              <a:gd name="connsiteX128" fmla="*/ 152400 w 2556933"/>
+              <a:gd name="connsiteY128" fmla="*/ 1066800 h 2345267"/>
+              <a:gd name="connsiteX129" fmla="*/ 118533 w 2556933"/>
+              <a:gd name="connsiteY129" fmla="*/ 1016000 h 2345267"/>
+              <a:gd name="connsiteX130" fmla="*/ 93133 w 2556933"/>
+              <a:gd name="connsiteY130" fmla="*/ 965200 h 2345267"/>
+              <a:gd name="connsiteX131" fmla="*/ 76200 w 2556933"/>
+              <a:gd name="connsiteY131" fmla="*/ 914400 h 2345267"/>
+              <a:gd name="connsiteX132" fmla="*/ 59267 w 2556933"/>
+              <a:gd name="connsiteY132" fmla="*/ 863600 h 2345267"/>
+              <a:gd name="connsiteX133" fmla="*/ 33867 w 2556933"/>
+              <a:gd name="connsiteY133" fmla="*/ 778934 h 2345267"/>
+              <a:gd name="connsiteX134" fmla="*/ 8467 w 2556933"/>
+              <a:gd name="connsiteY134" fmla="*/ 702734 h 2345267"/>
+              <a:gd name="connsiteX135" fmla="*/ 0 w 2556933"/>
+              <a:gd name="connsiteY135" fmla="*/ 677334 h 2345267"/>
+              <a:gd name="connsiteX136" fmla="*/ 16933 w 2556933"/>
+              <a:gd name="connsiteY136" fmla="*/ 575734 h 2345267"/>
+            </a:gdLst>
+            <a:ahLst/>
+            <a:cxnLst>
+              <a:cxn ang="0">
+                <a:pos x="connsiteX0" y="connsiteY0"/>
+              </a:cxn>
+              <a:cxn ang="0">
+                <a:pos x="connsiteX1" y="connsiteY1"/>
+              </a:cxn>
+              <a:cxn ang="0">
+                <a:pos x="connsiteX2" y="connsiteY2"/>
+              </a:cxn>
+              <a:cxn ang="0">
+                <a:pos x="connsiteX3" y="connsiteY3"/>
+              </a:cxn>
+              <a:cxn ang="0">
+                <a:pos x="connsiteX4" y="connsiteY4"/>
+              </a:cxn>
+              <a:cxn ang="0">
+                <a:pos x="connsiteX5" y="connsiteY5"/>
+              </a:cxn>
+              <a:cxn ang="0">
+                <a:pos x="connsiteX6" y="connsiteY6"/>
+              </a:cxn>
+              <a:cxn ang="0">
+                <a:pos x="connsiteX7" y="connsiteY7"/>
+              </a:cxn>
+              <a:cxn ang="0">
+                <a:pos x="connsiteX8" y="connsiteY8"/>
+              </a:cxn>
+              <a:cxn ang="0">
+                <a:pos x="connsiteX9" y="connsiteY9"/>
+              </a:cxn>
+              <a:cxn ang="0">
+                <a:pos x="connsiteX10" y="connsiteY10"/>
+              </a:cxn>
+              <a:cxn ang="0">
+                <a:pos x="connsiteX11" y="connsiteY11"/>
+              </a:cxn>
+              <a:cxn ang="0">
+                <a:pos x="connsiteX12" y="connsiteY12"/>
+              </a:cxn>
+              <a:cxn ang="0">
+                <a:pos x="connsiteX13" y="connsiteY13"/>
+              </a:cxn>
+              <a:cxn ang="0">
+                <a:pos x="connsiteX14" y="connsiteY14"/>
+              </a:cxn>
+              <a:cxn ang="0">
+                <a:pos x="connsiteX15" y="connsiteY15"/>
+              </a:cxn>
+              <a:cxn ang="0">
+                <a:pos x="connsiteX16" y="connsiteY16"/>
+              </a:cxn>
+              <a:cxn ang="0">
+                <a:pos x="connsiteX17" y="connsiteY17"/>
+              </a:cxn>
+              <a:cxn ang="0">
+                <a:pos x="connsiteX18" y="connsiteY18"/>
+              </a:cxn>
+              <a:cxn ang="0">
+                <a:pos x="connsiteX19" y="connsiteY19"/>
+              </a:cxn>
+              <a:cxn ang="0">
+                <a:pos x="connsiteX20" y="connsiteY20"/>
+              </a:cxn>
+              <a:cxn ang="0">
+                <a:pos x="connsiteX21" y="connsiteY21"/>
+              </a:cxn>
+              <a:cxn ang="0">
+                <a:pos x="connsiteX22" y="connsiteY22"/>
+              </a:cxn>
+              <a:cxn ang="0">
+                <a:pos x="connsiteX23" y="connsiteY23"/>
+              </a:cxn>
+              <a:cxn ang="0">
+                <a:pos x="connsiteX24" y="connsiteY24"/>
+              </a:cxn>
+              <a:cxn ang="0">
+                <a:pos x="connsiteX25" y="connsiteY25"/>
+              </a:cxn>
+              <a:cxn ang="0">
+                <a:pos x="connsiteX26" y="connsiteY26"/>
+              </a:cxn>
+              <a:cxn ang="0">
+                <a:pos x="connsiteX27" y="connsiteY27"/>
+              </a:cxn>
+              <a:cxn ang="0">
+                <a:pos x="connsiteX28" y="connsiteY28"/>
+              </a:cxn>
+              <a:cxn ang="0">
+                <a:pos x="connsiteX29" y="connsiteY29"/>
+              </a:cxn>
+              <a:cxn ang="0">
+                <a:pos x="connsiteX30" y="connsiteY30"/>
+              </a:cxn>
+              <a:cxn ang="0">
+                <a:pos x="connsiteX31" y="connsiteY31"/>
+              </a:cxn>
+              <a:cxn ang="0">
+                <a:pos x="connsiteX32" y="connsiteY32"/>
+              </a:cxn>
+              <a:cxn ang="0">
+                <a:pos x="connsiteX33" y="connsiteY33"/>
+              </a:cxn>
+              <a:cxn ang="0">
+                <a:pos x="connsiteX34" y="connsiteY34"/>
+              </a:cxn>
+              <a:cxn ang="0">
+                <a:pos x="connsiteX35" y="connsiteY35"/>
+              </a:cxn>
+              <a:cxn ang="0">
+                <a:pos x="connsiteX36" y="connsiteY36"/>
+              </a:cxn>
+              <a:cxn ang="0">
+                <a:pos x="connsiteX37" y="connsiteY37"/>
+              </a:cxn>
+              <a:cxn ang="0">
+                <a:pos x="connsiteX38" y="connsiteY38"/>
+              </a:cxn>
+              <a:cxn ang="0">
+                <a:pos x="connsiteX39" y="connsiteY39"/>
+              </a:cxn>
+              <a:cxn ang="0">
+                <a:pos x="connsiteX40" y="connsiteY40"/>
+              </a:cxn>
+              <a:cxn ang="0">
+                <a:pos x="connsiteX41" y="connsiteY41"/>
+              </a:cxn>
+              <a:cxn ang="0">
+                <a:pos x="connsiteX42" y="connsiteY42"/>
+              </a:cxn>
+              <a:cxn ang="0">
+                <a:pos x="connsiteX43" y="connsiteY43"/>
+              </a:cxn>
+              <a:cxn ang="0">
+                <a:pos x="connsiteX44" y="connsiteY44"/>
+              </a:cxn>
+              <a:cxn ang="0">
+                <a:pos x="connsiteX45" y="connsiteY45"/>
+              </a:cxn>
+              <a:cxn ang="0">
+                <a:pos x="connsiteX46" y="connsiteY46"/>
+              </a:cxn>
+              <a:cxn ang="0">
+                <a:pos x="connsiteX47" y="connsiteY47"/>
+              </a:cxn>
+              <a:cxn ang="0">
+                <a:pos x="connsiteX48" y="connsiteY48"/>
+              </a:cxn>
+              <a:cxn ang="0">
+                <a:pos x="connsiteX49" y="connsiteY49"/>
+              </a:cxn>
+              <a:cxn ang="0">
+                <a:pos x="connsiteX50" y="connsiteY50"/>
+              </a:cxn>
+              <a:cxn ang="0">
+                <a:pos x="connsiteX51" y="connsiteY51"/>
+              </a:cxn>
+              <a:cxn ang="0">
+                <a:pos x="connsiteX52" y="connsiteY52"/>
+              </a:cxn>
+              <a:cxn ang="0">
+                <a:pos x="connsiteX53" y="connsiteY53"/>
+              </a:cxn>
+              <a:cxn ang="0">
+                <a:pos x="connsiteX54" y="connsiteY54"/>
+              </a:cxn>
+              <a:cxn ang="0">
+                <a:pos x="connsiteX55" y="connsiteY55"/>
+              </a:cxn>
+              <a:cxn ang="0">
+                <a:pos x="connsiteX56" y="connsiteY56"/>
+              </a:cxn>
+              <a:cxn ang="0">
+                <a:pos x="connsiteX57" y="connsiteY57"/>
+              </a:cxn>
+              <a:cxn ang="0">
+                <a:pos x="connsiteX58" y="connsiteY58"/>
+              </a:cxn>
+              <a:cxn ang="0">
+                <a:pos x="connsiteX59" y="connsiteY59"/>
+              </a:cxn>
+              <a:cxn ang="0">
+                <a:pos x="connsiteX60" y="connsiteY60"/>
+              </a:cxn>
+              <a:cxn ang="0">
+                <a:pos x="connsiteX61" y="connsiteY61"/>
+              </a:cxn>
+              <a:cxn ang="0">
+                <a:pos x="connsiteX62" y="connsiteY62"/>
+              </a:cxn>
+              <a:cxn ang="0">
+                <a:pos x="connsiteX63" y="connsiteY63"/>
+              </a:cxn>
+              <a:cxn ang="0">
+                <a:pos x="connsiteX64" y="connsiteY64"/>
+              </a:cxn>
+              <a:cxn ang="0">
+                <a:pos x="connsiteX65" y="connsiteY65"/>
+              </a:cxn>
+              <a:cxn ang="0">
+                <a:pos x="connsiteX66" y="connsiteY66"/>
+              </a:cxn>
+              <a:cxn ang="0">
+                <a:pos x="connsiteX67" y="connsiteY67"/>
+              </a:cxn>
+              <a:cxn ang="0">
+                <a:pos x="connsiteX68" y="connsiteY68"/>
+              </a:cxn>
+              <a:cxn ang="0">
+                <a:pos x="connsiteX69" y="connsiteY69"/>
+              </a:cxn>
+              <a:cxn ang="0">
+                <a:pos x="connsiteX70" y="connsiteY70"/>
+              </a:cxn>
+              <a:cxn ang="0">
+                <a:pos x="connsiteX71" y="connsiteY71"/>
+              </a:cxn>
+              <a:cxn ang="0">
+                <a:pos x="connsiteX72" y="connsiteY72"/>
+              </a:cxn>
+              <a:cxn ang="0">
+                <a:pos x="connsiteX73" y="connsiteY73"/>
+              </a:cxn>
+              <a:cxn ang="0">
+                <a:pos x="connsiteX74" y="connsiteY74"/>
+              </a:cxn>
+              <a:cxn ang="0">
+                <a:pos x="connsiteX75" y="connsiteY75"/>
+              </a:cxn>
+              <a:cxn ang="0">
+                <a:pos x="connsiteX76" y="connsiteY76"/>
+              </a:cxn>
+              <a:cxn ang="0">
+                <a:pos x="connsiteX77" y="connsiteY77"/>
+              </a:cxn>
+              <a:cxn ang="0">
+                <a:pos x="connsiteX78" y="connsiteY78"/>
+              </a:cxn>
+              <a:cxn ang="0">
+                <a:pos x="connsiteX79" y="connsiteY79"/>
+              </a:cxn>
+              <a:cxn ang="0">
+                <a:pos x="connsiteX80" y="connsiteY80"/>
+              </a:cxn>
+              <a:cxn ang="0">
+                <a:pos x="connsiteX81" y="connsiteY81"/>
+              </a:cxn>
+              <a:cxn ang="0">
+                <a:pos x="connsiteX82" y="connsiteY82"/>
+              </a:cxn>
+              <a:cxn ang="0">
+                <a:pos x="connsiteX83" y="connsiteY83"/>
+              </a:cxn>
+              <a:cxn ang="0">
+                <a:pos x="connsiteX84" y="connsiteY84"/>
+              </a:cxn>
+              <a:cxn ang="0">
+                <a:pos x="connsiteX85" y="connsiteY85"/>
+              </a:cxn>
+              <a:cxn ang="0">
+                <a:pos x="connsiteX86" y="connsiteY86"/>
+              </a:cxn>
+              <a:cxn ang="0">
+                <a:pos x="connsiteX87" y="connsiteY87"/>
+              </a:cxn>
+              <a:cxn ang="0">
+                <a:pos x="connsiteX88" y="connsiteY88"/>
+              </a:cxn>
+              <a:cxn ang="0">
+                <a:pos x="connsiteX89" y="connsiteY89"/>
+              </a:cxn>
+              <a:cxn ang="0">
+                <a:pos x="connsiteX90" y="connsiteY90"/>
+              </a:cxn>
+              <a:cxn ang="0">
+                <a:pos x="connsiteX91" y="connsiteY91"/>
+              </a:cxn>
+              <a:cxn ang="0">
+                <a:pos x="connsiteX92" y="connsiteY92"/>
+              </a:cxn>
+              <a:cxn ang="0">
+                <a:pos x="connsiteX93" y="connsiteY93"/>
+              </a:cxn>
+              <a:cxn ang="0">
+                <a:pos x="connsiteX94" y="connsiteY94"/>
+              </a:cxn>
+              <a:cxn ang="0">
+                <a:pos x="connsiteX95" y="connsiteY95"/>
+              </a:cxn>
+              <a:cxn ang="0">
+                <a:pos x="connsiteX96" y="connsiteY96"/>
+              </a:cxn>
+              <a:cxn ang="0">
+                <a:pos x="connsiteX97" y="connsiteY97"/>
+              </a:cxn>
+              <a:cxn ang="0">
+                <a:pos x="connsiteX98" y="connsiteY98"/>
+              </a:cxn>
+              <a:cxn ang="0">
+                <a:pos x="connsiteX99" y="connsiteY99"/>
+              </a:cxn>
+              <a:cxn ang="0">
+                <a:pos x="connsiteX100" y="connsiteY100"/>
+              </a:cxn>
+              <a:cxn ang="0">
+                <a:pos x="connsiteX101" y="connsiteY101"/>
+              </a:cxn>
+              <a:cxn ang="0">
+                <a:pos x="connsiteX102" y="connsiteY102"/>
+              </a:cxn>
+              <a:cxn ang="0">
+                <a:pos x="connsiteX103" y="connsiteY103"/>
+              </a:cxn>
+              <a:cxn ang="0">
+                <a:pos x="connsiteX104" y="connsiteY104"/>
+              </a:cxn>
+              <a:cxn ang="0">
+                <a:pos x="connsiteX105" y="connsiteY105"/>
+              </a:cxn>
+              <a:cxn ang="0">
+                <a:pos x="connsiteX106" y="connsiteY106"/>
+              </a:cxn>
+              <a:cxn ang="0">
+                <a:pos x="connsiteX107" y="connsiteY107"/>
+              </a:cxn>
+              <a:cxn ang="0">
+                <a:pos x="connsiteX108" y="connsiteY108"/>
+              </a:cxn>
+              <a:cxn ang="0">
+                <a:pos x="connsiteX109" y="connsiteY109"/>
+              </a:cxn>
+              <a:cxn ang="0">
+                <a:pos x="connsiteX110" y="connsiteY110"/>
+              </a:cxn>
+              <a:cxn ang="0">
+                <a:pos x="connsiteX111" y="connsiteY111"/>
+              </a:cxn>
+              <a:cxn ang="0">
+                <a:pos x="connsiteX112" y="connsiteY112"/>
+              </a:cxn>
+              <a:cxn ang="0">
+                <a:pos x="connsiteX113" y="connsiteY113"/>
+              </a:cxn>
+              <a:cxn ang="0">
+                <a:pos x="connsiteX114" y="connsiteY114"/>
+              </a:cxn>
+              <a:cxn ang="0">
+                <a:pos x="connsiteX115" y="connsiteY115"/>
+              </a:cxn>
+              <a:cxn ang="0">
+                <a:pos x="connsiteX116" y="connsiteY116"/>
+              </a:cxn>
+              <a:cxn ang="0">
+                <a:pos x="connsiteX117" y="connsiteY117"/>
+              </a:cxn>
+              <a:cxn ang="0">
+                <a:pos x="connsiteX118" y="connsiteY118"/>
+              </a:cxn>
+              <a:cxn ang="0">
+                <a:pos x="connsiteX119" y="connsiteY119"/>
+              </a:cxn>
+              <a:cxn ang="0">
+                <a:pos x="connsiteX120" y="connsiteY120"/>
+              </a:cxn>
+              <a:cxn ang="0">
+                <a:pos x="connsiteX121" y="connsiteY121"/>
+              </a:cxn>
+              <a:cxn ang="0">
+                <a:pos x="connsiteX122" y="connsiteY122"/>
+              </a:cxn>
+              <a:cxn ang="0">
+                <a:pos x="connsiteX123" y="connsiteY123"/>
+              </a:cxn>
+              <a:cxn ang="0">
+                <a:pos x="connsiteX124" y="connsiteY124"/>
+              </a:cxn>
+              <a:cxn ang="0">
+                <a:pos x="connsiteX125" y="connsiteY125"/>
+              </a:cxn>
+              <a:cxn ang="0">
+                <a:pos x="connsiteX126" y="connsiteY126"/>
+              </a:cxn>
+              <a:cxn ang="0">
+                <a:pos x="connsiteX127" y="connsiteY127"/>
+              </a:cxn>
+              <a:cxn ang="0">
+                <a:pos x="connsiteX128" y="connsiteY128"/>
+              </a:cxn>
+              <a:cxn ang="0">
+                <a:pos x="connsiteX129" y="connsiteY129"/>
+              </a:cxn>
+              <a:cxn ang="0">
+                <a:pos x="connsiteX130" y="connsiteY130"/>
+              </a:cxn>
+              <a:cxn ang="0">
+                <a:pos x="connsiteX131" y="connsiteY131"/>
+              </a:cxn>
+              <a:cxn ang="0">
+                <a:pos x="connsiteX132" y="connsiteY132"/>
+              </a:cxn>
+              <a:cxn ang="0">
+                <a:pos x="connsiteX133" y="connsiteY133"/>
+              </a:cxn>
+              <a:cxn ang="0">
+                <a:pos x="connsiteX134" y="connsiteY134"/>
+              </a:cxn>
+              <a:cxn ang="0">
+                <a:pos x="connsiteX135" y="connsiteY135"/>
+              </a:cxn>
+              <a:cxn ang="0">
+                <a:pos x="connsiteX136" y="connsiteY136"/>
+              </a:cxn>
+            </a:cxnLst>
+            <a:rect l="l" t="t" r="r" b="b"/>
+            <a:pathLst>
+              <a:path w="2556933" h="2345267">
+                <a:moveTo>
+                  <a:pt x="16933" y="575734"/>
+                </a:moveTo>
+                <a:lnTo>
+                  <a:pt x="16933" y="575734"/>
+                </a:lnTo>
+                <a:cubicBezTo>
+                  <a:pt x="42333" y="564445"/>
+                  <a:pt x="70362" y="557807"/>
+                  <a:pt x="93133" y="541867"/>
+                </a:cubicBezTo>
+                <a:cubicBezTo>
+                  <a:pt x="100444" y="536749"/>
+                  <a:pt x="96649" y="523893"/>
+                  <a:pt x="101600" y="516467"/>
+                </a:cubicBezTo>
+                <a:cubicBezTo>
+                  <a:pt x="108242" y="506504"/>
+                  <a:pt x="117257" y="498026"/>
+                  <a:pt x="127000" y="491067"/>
+                </a:cubicBezTo>
+                <a:cubicBezTo>
+                  <a:pt x="137271" y="483731"/>
+                  <a:pt x="149148" y="478821"/>
+                  <a:pt x="160867" y="474134"/>
+                </a:cubicBezTo>
+                <a:cubicBezTo>
+                  <a:pt x="215708" y="452197"/>
+                  <a:pt x="216320" y="456618"/>
+                  <a:pt x="279400" y="448734"/>
+                </a:cubicBezTo>
+                <a:cubicBezTo>
+                  <a:pt x="285044" y="443089"/>
+                  <a:pt x="290100" y="436787"/>
+                  <a:pt x="296333" y="431800"/>
+                </a:cubicBezTo>
+                <a:cubicBezTo>
+                  <a:pt x="304279" y="425443"/>
+                  <a:pt x="314538" y="422062"/>
+                  <a:pt x="321733" y="414867"/>
+                </a:cubicBezTo>
+                <a:cubicBezTo>
+                  <a:pt x="328928" y="407672"/>
+                  <a:pt x="333022" y="397934"/>
+                  <a:pt x="338667" y="389467"/>
+                </a:cubicBezTo>
+                <a:lnTo>
+                  <a:pt x="355600" y="338667"/>
+                </a:lnTo>
+                <a:cubicBezTo>
+                  <a:pt x="358422" y="330200"/>
+                  <a:pt x="357756" y="319578"/>
+                  <a:pt x="364067" y="313267"/>
+                </a:cubicBezTo>
+                <a:cubicBezTo>
+                  <a:pt x="372534" y="304800"/>
+                  <a:pt x="379000" y="293682"/>
+                  <a:pt x="389467" y="287867"/>
+                </a:cubicBezTo>
+                <a:cubicBezTo>
+                  <a:pt x="430391" y="265132"/>
+                  <a:pt x="491385" y="265468"/>
+                  <a:pt x="533400" y="262467"/>
+                </a:cubicBezTo>
+                <a:cubicBezTo>
+                  <a:pt x="581338" y="259043"/>
+                  <a:pt x="629355" y="256822"/>
+                  <a:pt x="677333" y="254000"/>
+                </a:cubicBezTo>
+                <a:cubicBezTo>
+                  <a:pt x="688622" y="251178"/>
+                  <a:pt x="701332" y="251701"/>
+                  <a:pt x="711200" y="245534"/>
+                </a:cubicBezTo>
+                <a:cubicBezTo>
+                  <a:pt x="724738" y="237073"/>
+                  <a:pt x="733778" y="222956"/>
+                  <a:pt x="745067" y="211667"/>
+                </a:cubicBezTo>
+                <a:cubicBezTo>
+                  <a:pt x="819274" y="137460"/>
+                  <a:pt x="728463" y="231593"/>
+                  <a:pt x="787400" y="160867"/>
+                </a:cubicBezTo>
+                <a:cubicBezTo>
+                  <a:pt x="795065" y="151669"/>
+                  <a:pt x="805135" y="144665"/>
+                  <a:pt x="812800" y="135467"/>
+                </a:cubicBezTo>
+                <a:cubicBezTo>
+                  <a:pt x="879411" y="55533"/>
+                  <a:pt x="787286" y="161037"/>
+                  <a:pt x="838200" y="84667"/>
+                </a:cubicBezTo>
+                <a:cubicBezTo>
+                  <a:pt x="844842" y="74704"/>
+                  <a:pt x="851658" y="60136"/>
+                  <a:pt x="863600" y="59267"/>
+                </a:cubicBezTo>
+                <a:cubicBezTo>
+                  <a:pt x="1009996" y="48620"/>
+                  <a:pt x="1157111" y="53622"/>
+                  <a:pt x="1303867" y="50800"/>
+                </a:cubicBezTo>
+                <a:cubicBezTo>
+                  <a:pt x="1320800" y="47978"/>
+                  <a:pt x="1337833" y="45701"/>
+                  <a:pt x="1354667" y="42334"/>
+                </a:cubicBezTo>
+                <a:cubicBezTo>
+                  <a:pt x="1366077" y="40052"/>
+                  <a:pt x="1380305" y="42095"/>
+                  <a:pt x="1388533" y="33867"/>
+                </a:cubicBezTo>
+                <a:cubicBezTo>
+                  <a:pt x="1396761" y="25639"/>
+                  <a:pt x="1394178" y="11289"/>
+                  <a:pt x="1397000" y="0"/>
+                </a:cubicBezTo>
+                <a:cubicBezTo>
+                  <a:pt x="1428044" y="2822"/>
+                  <a:pt x="1459274" y="4058"/>
+                  <a:pt x="1490133" y="8467"/>
+                </a:cubicBezTo>
+                <a:cubicBezTo>
+                  <a:pt x="1519925" y="12723"/>
+                  <a:pt x="1514106" y="20454"/>
+                  <a:pt x="1540933" y="33867"/>
+                </a:cubicBezTo>
+                <a:cubicBezTo>
+                  <a:pt x="1548915" y="37858"/>
+                  <a:pt x="1557723" y="39986"/>
+                  <a:pt x="1566333" y="42334"/>
+                </a:cubicBezTo>
+                <a:cubicBezTo>
+                  <a:pt x="1588786" y="48457"/>
+                  <a:pt x="1611989" y="51907"/>
+                  <a:pt x="1634067" y="59267"/>
+                </a:cubicBezTo>
+                <a:cubicBezTo>
+                  <a:pt x="1642534" y="62089"/>
+                  <a:pt x="1650664" y="66267"/>
+                  <a:pt x="1659467" y="67734"/>
+                </a:cubicBezTo>
+                <a:cubicBezTo>
+                  <a:pt x="1684676" y="71935"/>
+                  <a:pt x="1710267" y="73378"/>
+                  <a:pt x="1735667" y="76200"/>
+                </a:cubicBezTo>
+                <a:cubicBezTo>
+                  <a:pt x="1776561" y="117096"/>
+                  <a:pt x="1726800" y="65119"/>
+                  <a:pt x="1769533" y="118534"/>
+                </a:cubicBezTo>
+                <a:cubicBezTo>
+                  <a:pt x="1774520" y="124767"/>
+                  <a:pt x="1781480" y="129234"/>
+                  <a:pt x="1786467" y="135467"/>
+                </a:cubicBezTo>
+                <a:cubicBezTo>
+                  <a:pt x="1792824" y="143413"/>
+                  <a:pt x="1796886" y="153050"/>
+                  <a:pt x="1803400" y="160867"/>
+                </a:cubicBezTo>
+                <a:cubicBezTo>
+                  <a:pt x="1811065" y="170065"/>
+                  <a:pt x="1821135" y="177069"/>
+                  <a:pt x="1828800" y="186267"/>
+                </a:cubicBezTo>
+                <a:cubicBezTo>
+                  <a:pt x="1835314" y="194084"/>
+                  <a:pt x="1838538" y="204472"/>
+                  <a:pt x="1845733" y="211667"/>
+                </a:cubicBezTo>
+                <a:cubicBezTo>
+                  <a:pt x="1879060" y="244994"/>
+                  <a:pt x="1862930" y="212018"/>
+                  <a:pt x="1888067" y="245534"/>
+                </a:cubicBezTo>
+                <a:cubicBezTo>
+                  <a:pt x="1900278" y="261815"/>
+                  <a:pt x="1910644" y="279401"/>
+                  <a:pt x="1921933" y="296334"/>
+                </a:cubicBezTo>
+                <a:lnTo>
+                  <a:pt x="1938867" y="321734"/>
+                </a:lnTo>
+                <a:cubicBezTo>
+                  <a:pt x="1944511" y="330201"/>
+                  <a:pt x="1952582" y="337481"/>
+                  <a:pt x="1955800" y="347134"/>
+                </a:cubicBezTo>
+                <a:cubicBezTo>
+                  <a:pt x="1958622" y="355601"/>
+                  <a:pt x="1959933" y="364732"/>
+                  <a:pt x="1964267" y="372534"/>
+                </a:cubicBezTo>
+                <a:cubicBezTo>
+                  <a:pt x="1974150" y="390324"/>
+                  <a:pt x="1986844" y="406401"/>
+                  <a:pt x="1998133" y="423334"/>
+                </a:cubicBezTo>
+                <a:lnTo>
+                  <a:pt x="2015067" y="448734"/>
+                </a:lnTo>
+                <a:cubicBezTo>
+                  <a:pt x="2036346" y="512577"/>
+                  <a:pt x="2007641" y="433883"/>
+                  <a:pt x="2040467" y="499534"/>
+                </a:cubicBezTo>
+                <a:cubicBezTo>
+                  <a:pt x="2044458" y="507516"/>
+                  <a:pt x="2044341" y="517281"/>
+                  <a:pt x="2048933" y="524934"/>
+                </a:cubicBezTo>
+                <a:cubicBezTo>
+                  <a:pt x="2053040" y="531779"/>
+                  <a:pt x="2060880" y="535634"/>
+                  <a:pt x="2065867" y="541867"/>
+                </a:cubicBezTo>
+                <a:cubicBezTo>
+                  <a:pt x="2072224" y="549813"/>
+                  <a:pt x="2078249" y="558166"/>
+                  <a:pt x="2082800" y="567267"/>
+                </a:cubicBezTo>
+                <a:cubicBezTo>
+                  <a:pt x="2096571" y="594810"/>
+                  <a:pt x="2083938" y="593805"/>
+                  <a:pt x="2108200" y="618067"/>
+                </a:cubicBezTo>
+                <a:cubicBezTo>
+                  <a:pt x="2115395" y="625262"/>
+                  <a:pt x="2125133" y="629356"/>
+                  <a:pt x="2133600" y="635000"/>
+                </a:cubicBezTo>
+                <a:cubicBezTo>
+                  <a:pt x="2139244" y="643467"/>
+                  <a:pt x="2144176" y="652454"/>
+                  <a:pt x="2150533" y="660400"/>
+                </a:cubicBezTo>
+                <a:cubicBezTo>
+                  <a:pt x="2155520" y="666634"/>
+                  <a:pt x="2163360" y="670489"/>
+                  <a:pt x="2167467" y="677334"/>
+                </a:cubicBezTo>
+                <a:cubicBezTo>
+                  <a:pt x="2172059" y="684987"/>
+                  <a:pt x="2171599" y="694932"/>
+                  <a:pt x="2175933" y="702734"/>
+                </a:cubicBezTo>
+                <a:cubicBezTo>
+                  <a:pt x="2185816" y="720524"/>
+                  <a:pt x="2198511" y="736601"/>
+                  <a:pt x="2209800" y="753534"/>
+                </a:cubicBezTo>
+                <a:lnTo>
+                  <a:pt x="2243667" y="804334"/>
+                </a:lnTo>
+                <a:cubicBezTo>
+                  <a:pt x="2283919" y="831168"/>
+                  <a:pt x="2259412" y="818048"/>
+                  <a:pt x="2319867" y="838200"/>
+                </a:cubicBezTo>
+                <a:lnTo>
+                  <a:pt x="2345267" y="846667"/>
+                </a:lnTo>
+                <a:lnTo>
+                  <a:pt x="2370667" y="855134"/>
+                </a:lnTo>
+                <a:cubicBezTo>
+                  <a:pt x="2376311" y="863601"/>
+                  <a:pt x="2379942" y="873833"/>
+                  <a:pt x="2387600" y="880534"/>
+                </a:cubicBezTo>
+                <a:cubicBezTo>
+                  <a:pt x="2423430" y="911885"/>
+                  <a:pt x="2428915" y="911238"/>
+                  <a:pt x="2463800" y="922867"/>
+                </a:cubicBezTo>
+                <a:cubicBezTo>
+                  <a:pt x="2472267" y="931334"/>
+                  <a:pt x="2480002" y="940602"/>
+                  <a:pt x="2489200" y="948267"/>
+                </a:cubicBezTo>
+                <a:cubicBezTo>
+                  <a:pt x="2497017" y="954781"/>
+                  <a:pt x="2506874" y="958578"/>
+                  <a:pt x="2514600" y="965200"/>
+                </a:cubicBezTo>
+                <a:cubicBezTo>
+                  <a:pt x="2526722" y="975590"/>
+                  <a:pt x="2548467" y="999067"/>
+                  <a:pt x="2548467" y="999067"/>
+                </a:cubicBezTo>
+                <a:cubicBezTo>
+                  <a:pt x="2551289" y="1010356"/>
+                  <a:pt x="2556933" y="1021298"/>
+                  <a:pt x="2556933" y="1032934"/>
+                </a:cubicBezTo>
+                <a:cubicBezTo>
+                  <a:pt x="2556933" y="1041859"/>
+                  <a:pt x="2553822" y="1051194"/>
+                  <a:pt x="2548467" y="1058334"/>
+                </a:cubicBezTo>
+                <a:cubicBezTo>
+                  <a:pt x="2536493" y="1074299"/>
+                  <a:pt x="2517203" y="1084062"/>
+                  <a:pt x="2506133" y="1100667"/>
+                </a:cubicBezTo>
+                <a:cubicBezTo>
+                  <a:pt x="2481373" y="1137808"/>
+                  <a:pt x="2495305" y="1117926"/>
+                  <a:pt x="2463800" y="1159934"/>
+                </a:cubicBezTo>
+                <a:cubicBezTo>
+                  <a:pt x="2444732" y="1217135"/>
+                  <a:pt x="2471177" y="1155131"/>
+                  <a:pt x="2429933" y="1202267"/>
+                </a:cubicBezTo>
+                <a:cubicBezTo>
+                  <a:pt x="2416532" y="1217583"/>
+                  <a:pt x="2410458" y="1238677"/>
+                  <a:pt x="2396067" y="1253067"/>
+                </a:cubicBezTo>
+                <a:cubicBezTo>
+                  <a:pt x="2355188" y="1293943"/>
+                  <a:pt x="2404912" y="1242009"/>
+                  <a:pt x="2362200" y="1295400"/>
+                </a:cubicBezTo>
+                <a:cubicBezTo>
+                  <a:pt x="2357213" y="1301633"/>
+                  <a:pt x="2350056" y="1305948"/>
+                  <a:pt x="2345267" y="1312334"/>
+                </a:cubicBezTo>
+                <a:cubicBezTo>
+                  <a:pt x="2333056" y="1328615"/>
+                  <a:pt x="2325791" y="1348743"/>
+                  <a:pt x="2311400" y="1363134"/>
+                </a:cubicBezTo>
+                <a:lnTo>
+                  <a:pt x="2286000" y="1388534"/>
+                </a:lnTo>
+                <a:cubicBezTo>
+                  <a:pt x="2271120" y="1433172"/>
+                  <a:pt x="2287368" y="1397052"/>
+                  <a:pt x="2252133" y="1439334"/>
+                </a:cubicBezTo>
+                <a:cubicBezTo>
+                  <a:pt x="2216856" y="1481667"/>
+                  <a:pt x="2256367" y="1450623"/>
+                  <a:pt x="2209800" y="1481667"/>
+                </a:cubicBezTo>
+                <a:cubicBezTo>
+                  <a:pt x="2184011" y="1520351"/>
+                  <a:pt x="2200062" y="1499872"/>
+                  <a:pt x="2159000" y="1540934"/>
+                </a:cubicBezTo>
+                <a:cubicBezTo>
+                  <a:pt x="2150533" y="1549401"/>
+                  <a:pt x="2140242" y="1556371"/>
+                  <a:pt x="2133600" y="1566334"/>
+                </a:cubicBezTo>
+                <a:lnTo>
+                  <a:pt x="2065867" y="1667934"/>
+                </a:lnTo>
+                <a:lnTo>
+                  <a:pt x="2048933" y="1693334"/>
+                </a:lnTo>
+                <a:cubicBezTo>
+                  <a:pt x="2043289" y="1701801"/>
+                  <a:pt x="2040467" y="1713090"/>
+                  <a:pt x="2032000" y="1718734"/>
+                </a:cubicBezTo>
+                <a:cubicBezTo>
+                  <a:pt x="2023533" y="1724378"/>
+                  <a:pt x="2014205" y="1728907"/>
+                  <a:pt x="2006600" y="1735667"/>
+                </a:cubicBezTo>
+                <a:cubicBezTo>
+                  <a:pt x="1988701" y="1751577"/>
+                  <a:pt x="1975726" y="1773184"/>
+                  <a:pt x="1955800" y="1786467"/>
+                </a:cubicBezTo>
+                <a:lnTo>
+                  <a:pt x="1930400" y="1803400"/>
+                </a:lnTo>
+                <a:cubicBezTo>
+                  <a:pt x="1916500" y="1845097"/>
+                  <a:pt x="1931884" y="1816275"/>
+                  <a:pt x="1896533" y="1845734"/>
+                </a:cubicBezTo>
+                <a:cubicBezTo>
+                  <a:pt x="1887335" y="1853399"/>
+                  <a:pt x="1880584" y="1863783"/>
+                  <a:pt x="1871133" y="1871134"/>
+                </a:cubicBezTo>
+                <a:cubicBezTo>
+                  <a:pt x="1827465" y="1905098"/>
+                  <a:pt x="1833256" y="1900692"/>
+                  <a:pt x="1794933" y="1913467"/>
+                </a:cubicBezTo>
+                <a:cubicBezTo>
+                  <a:pt x="1713905" y="1994495"/>
+                  <a:pt x="1817651" y="1898321"/>
+                  <a:pt x="1744133" y="1947334"/>
+                </a:cubicBezTo>
+                <a:cubicBezTo>
+                  <a:pt x="1680715" y="1989613"/>
+                  <a:pt x="1753725" y="1961071"/>
+                  <a:pt x="1693333" y="1981200"/>
+                </a:cubicBezTo>
+                <a:cubicBezTo>
+                  <a:pt x="1652439" y="2022096"/>
+                  <a:pt x="1702200" y="1970119"/>
+                  <a:pt x="1659467" y="2023534"/>
+                </a:cubicBezTo>
+                <a:cubicBezTo>
+                  <a:pt x="1654480" y="2029767"/>
+                  <a:pt x="1648178" y="2034823"/>
+                  <a:pt x="1642533" y="2040467"/>
+                </a:cubicBezTo>
+                <a:cubicBezTo>
+                  <a:pt x="1639711" y="2048934"/>
+                  <a:pt x="1639642" y="2058898"/>
+                  <a:pt x="1634067" y="2065867"/>
+                </a:cubicBezTo>
+                <a:cubicBezTo>
+                  <a:pt x="1627710" y="2073813"/>
+                  <a:pt x="1616613" y="2076443"/>
+                  <a:pt x="1608667" y="2082800"/>
+                </a:cubicBezTo>
+                <a:cubicBezTo>
+                  <a:pt x="1602433" y="2087787"/>
+                  <a:pt x="1599208" y="2096931"/>
+                  <a:pt x="1591733" y="2099734"/>
+                </a:cubicBezTo>
+                <a:cubicBezTo>
+                  <a:pt x="1579531" y="2104310"/>
+                  <a:pt x="1477061" y="2116184"/>
+                  <a:pt x="1473200" y="2116667"/>
+                </a:cubicBezTo>
+                <a:cubicBezTo>
+                  <a:pt x="1409356" y="2137949"/>
+                  <a:pt x="1488052" y="2109241"/>
+                  <a:pt x="1422400" y="2142067"/>
+                </a:cubicBezTo>
+                <a:cubicBezTo>
+                  <a:pt x="1414418" y="2146058"/>
+                  <a:pt x="1404982" y="2146543"/>
+                  <a:pt x="1397000" y="2150534"/>
+                </a:cubicBezTo>
+                <a:cubicBezTo>
+                  <a:pt x="1387899" y="2155085"/>
+                  <a:pt x="1380701" y="2162916"/>
+                  <a:pt x="1371600" y="2167467"/>
+                </a:cubicBezTo>
+                <a:cubicBezTo>
+                  <a:pt x="1363618" y="2171458"/>
+                  <a:pt x="1354182" y="2171943"/>
+                  <a:pt x="1346200" y="2175934"/>
+                </a:cubicBezTo>
+                <a:cubicBezTo>
+                  <a:pt x="1287731" y="2205169"/>
+                  <a:pt x="1357416" y="2183713"/>
+                  <a:pt x="1286933" y="2201334"/>
+                </a:cubicBezTo>
+                <a:cubicBezTo>
+                  <a:pt x="1278466" y="2206978"/>
+                  <a:pt x="1270832" y="2214134"/>
+                  <a:pt x="1261533" y="2218267"/>
+                </a:cubicBezTo>
+                <a:cubicBezTo>
+                  <a:pt x="1207355" y="2242345"/>
+                  <a:pt x="1219952" y="2229607"/>
+                  <a:pt x="1168400" y="2243667"/>
+                </a:cubicBezTo>
+                <a:cubicBezTo>
+                  <a:pt x="1151180" y="2248363"/>
+                  <a:pt x="1133565" y="2252617"/>
+                  <a:pt x="1117600" y="2260600"/>
+                </a:cubicBezTo>
+                <a:cubicBezTo>
+                  <a:pt x="1106311" y="2266245"/>
+                  <a:pt x="1096074" y="2274889"/>
+                  <a:pt x="1083733" y="2277534"/>
+                </a:cubicBezTo>
+                <a:cubicBezTo>
+                  <a:pt x="1056000" y="2283477"/>
+                  <a:pt x="1027289" y="2283178"/>
+                  <a:pt x="999067" y="2286000"/>
+                </a:cubicBezTo>
+                <a:cubicBezTo>
+                  <a:pt x="990600" y="2288822"/>
+                  <a:pt x="982248" y="2292015"/>
+                  <a:pt x="973667" y="2294467"/>
+                </a:cubicBezTo>
+                <a:cubicBezTo>
+                  <a:pt x="899222" y="2315738"/>
+                  <a:pt x="975320" y="2291095"/>
+                  <a:pt x="914400" y="2311400"/>
+                </a:cubicBezTo>
+                <a:cubicBezTo>
+                  <a:pt x="905933" y="2317045"/>
+                  <a:pt x="898102" y="2323783"/>
+                  <a:pt x="889000" y="2328334"/>
+                </a:cubicBezTo>
+                <a:cubicBezTo>
+                  <a:pt x="876858" y="2334405"/>
+                  <a:pt x="840577" y="2342556"/>
+                  <a:pt x="829733" y="2345267"/>
+                </a:cubicBezTo>
+                <a:cubicBezTo>
+                  <a:pt x="778554" y="2332471"/>
+                  <a:pt x="806901" y="2340478"/>
+                  <a:pt x="745067" y="2319867"/>
+                </a:cubicBezTo>
+                <a:lnTo>
+                  <a:pt x="694267" y="2302934"/>
+                </a:lnTo>
+                <a:lnTo>
+                  <a:pt x="575733" y="2286000"/>
+                </a:lnTo>
+                <a:cubicBezTo>
+                  <a:pt x="512670" y="2243959"/>
+                  <a:pt x="590123" y="2297992"/>
+                  <a:pt x="524933" y="2243667"/>
+                </a:cubicBezTo>
+                <a:cubicBezTo>
+                  <a:pt x="517116" y="2237153"/>
+                  <a:pt x="507191" y="2233435"/>
+                  <a:pt x="499533" y="2226734"/>
+                </a:cubicBezTo>
+                <a:cubicBezTo>
+                  <a:pt x="484514" y="2213593"/>
+                  <a:pt x="457200" y="2184400"/>
+                  <a:pt x="457200" y="2184400"/>
+                </a:cubicBezTo>
+                <a:cubicBezTo>
+                  <a:pt x="436587" y="2122561"/>
+                  <a:pt x="444596" y="2150916"/>
+                  <a:pt x="431800" y="2099734"/>
+                </a:cubicBezTo>
+                <a:cubicBezTo>
+                  <a:pt x="431652" y="2093796"/>
+                  <a:pt x="457657" y="1812784"/>
+                  <a:pt x="406400" y="1710267"/>
+                </a:cubicBezTo>
+                <a:cubicBezTo>
+                  <a:pt x="400756" y="1698978"/>
+                  <a:pt x="394154" y="1688119"/>
+                  <a:pt x="389467" y="1676400"/>
+                </a:cubicBezTo>
+                <a:cubicBezTo>
+                  <a:pt x="382838" y="1659827"/>
+                  <a:pt x="385154" y="1638221"/>
+                  <a:pt x="372533" y="1625600"/>
+                </a:cubicBezTo>
+                <a:cubicBezTo>
+                  <a:pt x="364066" y="1617133"/>
+                  <a:pt x="354484" y="1609651"/>
+                  <a:pt x="347133" y="1600200"/>
+                </a:cubicBezTo>
+                <a:cubicBezTo>
+                  <a:pt x="334639" y="1584136"/>
+                  <a:pt x="313267" y="1549400"/>
+                  <a:pt x="313267" y="1549400"/>
+                </a:cubicBezTo>
+                <a:cubicBezTo>
+                  <a:pt x="308534" y="1530471"/>
+                  <a:pt x="296110" y="1477098"/>
+                  <a:pt x="287867" y="1464734"/>
+                </a:cubicBezTo>
+                <a:lnTo>
+                  <a:pt x="270933" y="1439334"/>
+                </a:lnTo>
+                <a:lnTo>
+                  <a:pt x="254000" y="1388534"/>
+                </a:lnTo>
+                <a:lnTo>
+                  <a:pt x="245533" y="1363134"/>
+                </a:lnTo>
+                <a:cubicBezTo>
+                  <a:pt x="224401" y="1236333"/>
+                  <a:pt x="250405" y="1394795"/>
+                  <a:pt x="228600" y="1253067"/>
+                </a:cubicBezTo>
+                <a:cubicBezTo>
+                  <a:pt x="225990" y="1236100"/>
+                  <a:pt x="223857" y="1219025"/>
+                  <a:pt x="220133" y="1202267"/>
+                </a:cubicBezTo>
+                <a:cubicBezTo>
+                  <a:pt x="218197" y="1193555"/>
+                  <a:pt x="214119" y="1185448"/>
+                  <a:pt x="211667" y="1176867"/>
+                </a:cubicBezTo>
+                <a:cubicBezTo>
+                  <a:pt x="208470" y="1165678"/>
+                  <a:pt x="208404" y="1153408"/>
+                  <a:pt x="203200" y="1143000"/>
+                </a:cubicBezTo>
+                <a:cubicBezTo>
+                  <a:pt x="193138" y="1122877"/>
+                  <a:pt x="176391" y="1107725"/>
+                  <a:pt x="160867" y="1092200"/>
+                </a:cubicBezTo>
+                <a:cubicBezTo>
+                  <a:pt x="158045" y="1083733"/>
+                  <a:pt x="156734" y="1074602"/>
+                  <a:pt x="152400" y="1066800"/>
+                </a:cubicBezTo>
+                <a:cubicBezTo>
+                  <a:pt x="142516" y="1049010"/>
+                  <a:pt x="118533" y="1016000"/>
+                  <a:pt x="118533" y="1016000"/>
+                </a:cubicBezTo>
+                <a:cubicBezTo>
+                  <a:pt x="87661" y="923378"/>
+                  <a:pt x="136896" y="1063665"/>
+                  <a:pt x="93133" y="965200"/>
+                </a:cubicBezTo>
+                <a:cubicBezTo>
+                  <a:pt x="85884" y="948889"/>
+                  <a:pt x="81844" y="931333"/>
+                  <a:pt x="76200" y="914400"/>
+                </a:cubicBezTo>
+                <a:lnTo>
+                  <a:pt x="59267" y="863600"/>
+                </a:lnTo>
+                <a:cubicBezTo>
+                  <a:pt x="46471" y="812421"/>
+                  <a:pt x="54478" y="840768"/>
+                  <a:pt x="33867" y="778934"/>
+                </a:cubicBezTo>
+                <a:lnTo>
+                  <a:pt x="8467" y="702734"/>
+                </a:lnTo>
+                <a:lnTo>
+                  <a:pt x="0" y="677334"/>
+                </a:lnTo>
+                <a:lnTo>
+                  <a:pt x="16933" y="575734"/>
+                </a:lnTo>
+                <a:close/>
+              </a:path>
+            </a:pathLst>
+          </a:custGeom>
           <a:solidFill>
-            <a:srgbClr val="FFFF00">
-              <a:alpha val="35000"/>
+            <a:srgbClr val="7030A0">
+              <a:alpha val="60000"/>
             </a:srgbClr>
           </a:solidFill>
           <a:ln>
@@ -5346,440 +7219,27 @@
           <a:bodyPr rtlCol="0" anchor="ctr"/>
           <a:lstStyle/>
           <a:p>
-            <a:pPr algn="ctr"/>
-            <a:endParaRPr lang="en-US"/>
-          </a:p>
-        </p:txBody>
-      </p:sp>
-      <p:sp>
-        <p:nvSpPr>
-          <p:cNvPr id="125" name="Rectangle 124"/>
-          <p:cNvSpPr/>
-          <p:nvPr/>
-        </p:nvSpPr>
-        <p:spPr>
-          <a:xfrm>
-            <a:off x="7716316" y="4036205"/>
-            <a:ext cx="415313" cy="153821"/>
-          </a:xfrm>
-          <a:prstGeom prst="rect">
-            <a:avLst/>
-          </a:prstGeom>
-          <a:solidFill>
-            <a:srgbClr val="FFFF00">
-              <a:alpha val="35000"/>
-            </a:srgbClr>
-          </a:solidFill>
-          <a:ln>
-            <a:noFill/>
-          </a:ln>
-        </p:spPr>
-        <p:style>
-          <a:lnRef idx="2">
-            <a:schemeClr val="accent1">
-              <a:shade val="50000"/>
-            </a:schemeClr>
-          </a:lnRef>
-          <a:fillRef idx="1">
-            <a:schemeClr val="accent1"/>
-          </a:fillRef>
-          <a:effectRef idx="0">
-            <a:schemeClr val="accent1"/>
-          </a:effectRef>
-          <a:fontRef idx="minor">
-            <a:schemeClr val="lt1"/>
-          </a:fontRef>
-        </p:style>
-        <p:txBody>
-          <a:bodyPr rtlCol="0" anchor="ctr"/>
-          <a:lstStyle/>
-          <a:p>
-            <a:pPr algn="ctr"/>
-            <a:endParaRPr lang="en-US"/>
-          </a:p>
-        </p:txBody>
-      </p:sp>
-      <p:sp>
-        <p:nvSpPr>
-          <p:cNvPr id="126" name="Rectangle 125"/>
-          <p:cNvSpPr/>
-          <p:nvPr/>
-        </p:nvSpPr>
-        <p:spPr>
-          <a:xfrm>
-            <a:off x="6856342" y="2904087"/>
-            <a:ext cx="415313" cy="153821"/>
-          </a:xfrm>
-          <a:prstGeom prst="rect">
-            <a:avLst/>
-          </a:prstGeom>
-          <a:solidFill>
-            <a:srgbClr val="FFFF00">
-              <a:alpha val="35000"/>
-            </a:srgbClr>
-          </a:solidFill>
-          <a:ln>
-            <a:noFill/>
-          </a:ln>
-        </p:spPr>
-        <p:style>
-          <a:lnRef idx="2">
-            <a:schemeClr val="accent1">
-              <a:shade val="50000"/>
-            </a:schemeClr>
-          </a:lnRef>
-          <a:fillRef idx="1">
-            <a:schemeClr val="accent1"/>
-          </a:fillRef>
-          <a:effectRef idx="0">
-            <a:schemeClr val="accent1"/>
-          </a:effectRef>
-          <a:fontRef idx="minor">
-            <a:schemeClr val="lt1"/>
-          </a:fontRef>
-        </p:style>
-        <p:txBody>
-          <a:bodyPr rtlCol="0" anchor="ctr"/>
-          <a:lstStyle/>
-          <a:p>
-            <a:pPr algn="ctr"/>
-            <a:endParaRPr lang="en-US"/>
-          </a:p>
-        </p:txBody>
-      </p:sp>
-      <p:sp>
-        <p:nvSpPr>
-          <p:cNvPr id="127" name="Rectangle 126"/>
-          <p:cNvSpPr/>
-          <p:nvPr/>
-        </p:nvSpPr>
-        <p:spPr>
-          <a:xfrm>
-            <a:off x="6965198" y="2120319"/>
-            <a:ext cx="415313" cy="153821"/>
-          </a:xfrm>
-          <a:prstGeom prst="rect">
-            <a:avLst/>
-          </a:prstGeom>
-          <a:solidFill>
-            <a:srgbClr val="FFFF00">
-              <a:alpha val="35000"/>
-            </a:srgbClr>
-          </a:solidFill>
-          <a:ln>
-            <a:noFill/>
-          </a:ln>
-        </p:spPr>
-        <p:style>
-          <a:lnRef idx="2">
-            <a:schemeClr val="accent1">
-              <a:shade val="50000"/>
-            </a:schemeClr>
-          </a:lnRef>
-          <a:fillRef idx="1">
-            <a:schemeClr val="accent1"/>
-          </a:fillRef>
-          <a:effectRef idx="0">
-            <a:schemeClr val="accent1"/>
-          </a:effectRef>
-          <a:fontRef idx="minor">
-            <a:schemeClr val="lt1"/>
-          </a:fontRef>
-        </p:style>
-        <p:txBody>
-          <a:bodyPr rtlCol="0" anchor="ctr"/>
-          <a:lstStyle/>
-          <a:p>
-            <a:pPr algn="ctr"/>
-            <a:endParaRPr lang="en-US"/>
-          </a:p>
-        </p:txBody>
-      </p:sp>
-      <p:sp>
-        <p:nvSpPr>
-          <p:cNvPr id="128" name="Rectangle 127"/>
-          <p:cNvSpPr/>
-          <p:nvPr/>
-        </p:nvSpPr>
-        <p:spPr>
-          <a:xfrm>
-            <a:off x="7008740" y="1641347"/>
-            <a:ext cx="317569" cy="197162"/>
-          </a:xfrm>
-          <a:prstGeom prst="rect">
-            <a:avLst/>
-          </a:prstGeom>
-          <a:solidFill>
-            <a:srgbClr val="FFFF00">
-              <a:alpha val="35000"/>
-            </a:srgbClr>
-          </a:solidFill>
-          <a:ln>
-            <a:noFill/>
-          </a:ln>
-        </p:spPr>
-        <p:style>
-          <a:lnRef idx="2">
-            <a:schemeClr val="accent1">
-              <a:shade val="50000"/>
-            </a:schemeClr>
-          </a:lnRef>
-          <a:fillRef idx="1">
-            <a:schemeClr val="accent1"/>
-          </a:fillRef>
-          <a:effectRef idx="0">
-            <a:schemeClr val="accent1"/>
-          </a:effectRef>
-          <a:fontRef idx="minor">
-            <a:schemeClr val="lt1"/>
-          </a:fontRef>
-        </p:style>
-        <p:txBody>
-          <a:bodyPr rtlCol="0" anchor="ctr"/>
-          <a:lstStyle/>
-          <a:p>
-            <a:pPr algn="ctr"/>
-            <a:endParaRPr lang="en-US"/>
-          </a:p>
-        </p:txBody>
-      </p:sp>
-      <p:sp>
-        <p:nvSpPr>
-          <p:cNvPr id="129" name="Rectangle 128"/>
-          <p:cNvSpPr/>
-          <p:nvPr/>
-        </p:nvSpPr>
-        <p:spPr>
-          <a:xfrm>
-            <a:off x="3487638" y="3201126"/>
-            <a:ext cx="565618" cy="197162"/>
-          </a:xfrm>
-          <a:prstGeom prst="rect">
-            <a:avLst/>
-          </a:prstGeom>
-          <a:solidFill>
-            <a:srgbClr val="FFFF00">
-              <a:alpha val="35000"/>
-            </a:srgbClr>
-          </a:solidFill>
-          <a:ln>
-            <a:noFill/>
-          </a:ln>
-        </p:spPr>
-        <p:style>
-          <a:lnRef idx="2">
-            <a:schemeClr val="accent1">
-              <a:shade val="50000"/>
-            </a:schemeClr>
-          </a:lnRef>
-          <a:fillRef idx="1">
-            <a:schemeClr val="accent1"/>
-          </a:fillRef>
-          <a:effectRef idx="0">
-            <a:schemeClr val="accent1"/>
-          </a:effectRef>
-          <a:fontRef idx="minor">
-            <a:schemeClr val="lt1"/>
-          </a:fontRef>
-        </p:style>
-        <p:txBody>
-          <a:bodyPr rtlCol="0" anchor="ctr"/>
-          <a:lstStyle/>
-          <a:p>
-            <a:pPr algn="ctr"/>
-            <a:endParaRPr lang="en-US"/>
-          </a:p>
-        </p:txBody>
-      </p:sp>
-      <p:sp>
-        <p:nvSpPr>
-          <p:cNvPr id="130" name="Rectangle 129"/>
-          <p:cNvSpPr/>
-          <p:nvPr/>
-        </p:nvSpPr>
-        <p:spPr>
-          <a:xfrm>
-            <a:off x="3568476" y="4339492"/>
-            <a:ext cx="565618" cy="197162"/>
-          </a:xfrm>
-          <a:prstGeom prst="rect">
-            <a:avLst/>
-          </a:prstGeom>
-          <a:solidFill>
-            <a:srgbClr val="FFFF00">
-              <a:alpha val="35000"/>
-            </a:srgbClr>
-          </a:solidFill>
-          <a:ln>
-            <a:noFill/>
-          </a:ln>
-        </p:spPr>
-        <p:style>
-          <a:lnRef idx="2">
-            <a:schemeClr val="accent1">
-              <a:shade val="50000"/>
-            </a:schemeClr>
-          </a:lnRef>
-          <a:fillRef idx="1">
-            <a:schemeClr val="accent1"/>
-          </a:fillRef>
-          <a:effectRef idx="0">
-            <a:schemeClr val="accent1"/>
-          </a:effectRef>
-          <a:fontRef idx="minor">
-            <a:schemeClr val="lt1"/>
-          </a:fontRef>
-        </p:style>
-        <p:txBody>
-          <a:bodyPr rtlCol="0" anchor="ctr"/>
-          <a:lstStyle/>
-          <a:p>
-            <a:pPr algn="ctr"/>
-            <a:endParaRPr lang="en-US"/>
-          </a:p>
-        </p:txBody>
-      </p:sp>
-      <p:sp>
-        <p:nvSpPr>
-          <p:cNvPr id="131" name="Rectangle 130"/>
-          <p:cNvSpPr/>
-          <p:nvPr/>
-        </p:nvSpPr>
-        <p:spPr>
-          <a:xfrm>
-            <a:off x="4357523" y="4676077"/>
-            <a:ext cx="452781" cy="150155"/>
-          </a:xfrm>
-          <a:prstGeom prst="rect">
-            <a:avLst/>
-          </a:prstGeom>
-          <a:solidFill>
-            <a:srgbClr val="FFFF00">
-              <a:alpha val="35000"/>
-            </a:srgbClr>
-          </a:solidFill>
-          <a:ln>
-            <a:noFill/>
-          </a:ln>
-        </p:spPr>
-        <p:style>
-          <a:lnRef idx="2">
-            <a:schemeClr val="accent1">
-              <a:shade val="50000"/>
-            </a:schemeClr>
-          </a:lnRef>
-          <a:fillRef idx="1">
-            <a:schemeClr val="accent1"/>
-          </a:fillRef>
-          <a:effectRef idx="0">
-            <a:schemeClr val="accent1"/>
-          </a:effectRef>
-          <a:fontRef idx="minor">
-            <a:schemeClr val="lt1"/>
-          </a:fontRef>
-        </p:style>
-        <p:txBody>
-          <a:bodyPr rtlCol="0" anchor="ctr"/>
-          <a:lstStyle/>
-          <a:p>
-            <a:pPr algn="ctr"/>
-            <a:endParaRPr lang="en-US"/>
-          </a:p>
-        </p:txBody>
-      </p:sp>
-      <p:sp>
-        <p:nvSpPr>
-          <p:cNvPr id="132" name="Rectangle 131"/>
-          <p:cNvSpPr/>
-          <p:nvPr/>
-        </p:nvSpPr>
-        <p:spPr>
-          <a:xfrm>
-            <a:off x="4346479" y="5217592"/>
-            <a:ext cx="452781" cy="150155"/>
-          </a:xfrm>
-          <a:prstGeom prst="rect">
-            <a:avLst/>
-          </a:prstGeom>
-          <a:solidFill>
-            <a:srgbClr val="FFFF00">
-              <a:alpha val="35000"/>
-            </a:srgbClr>
-          </a:solidFill>
-          <a:ln>
-            <a:noFill/>
-          </a:ln>
-        </p:spPr>
-        <p:style>
-          <a:lnRef idx="2">
-            <a:schemeClr val="accent1">
-              <a:shade val="50000"/>
-            </a:schemeClr>
-          </a:lnRef>
-          <a:fillRef idx="1">
-            <a:schemeClr val="accent1"/>
-          </a:fillRef>
-          <a:effectRef idx="0">
-            <a:schemeClr val="accent1"/>
-          </a:effectRef>
-          <a:fontRef idx="minor">
-            <a:schemeClr val="lt1"/>
-          </a:fontRef>
-        </p:style>
-        <p:txBody>
-          <a:bodyPr rtlCol="0" anchor="ctr"/>
-          <a:lstStyle/>
-          <a:p>
-            <a:pPr algn="ctr"/>
-            <a:endParaRPr lang="en-US"/>
-          </a:p>
-        </p:txBody>
-      </p:sp>
-      <p:sp>
-        <p:nvSpPr>
-          <p:cNvPr id="133" name="Rectangle 132"/>
-          <p:cNvSpPr/>
-          <p:nvPr/>
-        </p:nvSpPr>
-        <p:spPr>
-          <a:xfrm>
-            <a:off x="4373629" y="5931027"/>
-            <a:ext cx="452781" cy="150155"/>
-          </a:xfrm>
-          <a:prstGeom prst="rect">
-            <a:avLst/>
-          </a:prstGeom>
-          <a:solidFill>
-            <a:srgbClr val="FFFF00">
-              <a:alpha val="35000"/>
-            </a:srgbClr>
-          </a:solidFill>
-          <a:ln>
-            <a:noFill/>
-          </a:ln>
-        </p:spPr>
-        <p:style>
-          <a:lnRef idx="2">
-            <a:schemeClr val="accent1">
-              <a:shade val="50000"/>
-            </a:schemeClr>
-          </a:lnRef>
-          <a:fillRef idx="1">
-            <a:schemeClr val="accent1"/>
-          </a:fillRef>
-          <a:effectRef idx="0">
-            <a:schemeClr val="accent1"/>
-          </a:effectRef>
-          <a:fontRef idx="minor">
-            <a:schemeClr val="lt1"/>
-          </a:fontRef>
-        </p:style>
-        <p:txBody>
-          <a:bodyPr rtlCol="0" anchor="ctr"/>
-          <a:lstStyle/>
-          <a:p>
-            <a:pPr algn="ctr"/>
-            <a:endParaRPr lang="en-US"/>
+            <a:r>
+              <a:rPr lang="en-US" sz="3200" b="1" dirty="0" smtClean="0">
+                <a:solidFill>
+                  <a:schemeClr val="bg1"/>
+                </a:solidFill>
+              </a:rPr>
+              <a:t>       </a:t>
+            </a:r>
+            <a:r>
+              <a:rPr lang="en-US" sz="3200" b="1" dirty="0" smtClean="0">
+                <a:solidFill>
+                  <a:schemeClr val="bg1"/>
+                </a:solidFill>
+              </a:rPr>
+              <a:t> Palm</a:t>
+            </a:r>
+            <a:endParaRPr lang="en-US" sz="3200" b="1" dirty="0">
+              <a:solidFill>
+                <a:schemeClr val="bg1"/>
+              </a:solidFill>
+            </a:endParaRPr>
           </a:p>
         </p:txBody>
       </p:sp>

</xml_diff>

<commit_message>
Revert "Finalizing protocol and other found glitches"
This reverts commit 2737f624ca489fc8a29a080368efe6bc8b37ed98.
</commit_message>
<xml_diff>
--- a/Manual_Paw_Joints_Marking/Paw Point Markers Diagram Powerpoint.pptx
+++ b/Manual_Paw_Joints_Marking/Paw Point Markers Diagram Powerpoint.pptx
@@ -104,11 +104,6 @@
       </a:defRPr>
     </a:lvl9pPr>
   </p:defaultTextStyle>
-  <p:extLst>
-    <p:ext uri="{EFAFB233-063F-42B5-8137-9DF3F51BA10A}">
-      <p15:sldGuideLst xmlns:p15="http://schemas.microsoft.com/office/powerpoint/2012/main"/>
-    </p:ext>
-  </p:extLst>
 </p:presentation>
 </file>
 
@@ -243,7 +238,7 @@
           <a:p>
             <a:fld id="{4C8643DD-90E0-4107-8D69-F122CF1CE135}" type="datetimeFigureOut">
               <a:rPr lang="en-US" smtClean="0"/>
-              <a:t>7/1/2015</a:t>
+              <a:t>6/22/2015</a:t>
             </a:fld>
             <a:endParaRPr lang="en-US"/>
           </a:p>
@@ -413,7 +408,7 @@
           <a:p>
             <a:fld id="{4C8643DD-90E0-4107-8D69-F122CF1CE135}" type="datetimeFigureOut">
               <a:rPr lang="en-US" smtClean="0"/>
-              <a:t>7/1/2015</a:t>
+              <a:t>6/22/2015</a:t>
             </a:fld>
             <a:endParaRPr lang="en-US"/>
           </a:p>
@@ -593,7 +588,7 @@
           <a:p>
             <a:fld id="{4C8643DD-90E0-4107-8D69-F122CF1CE135}" type="datetimeFigureOut">
               <a:rPr lang="en-US" smtClean="0"/>
-              <a:t>7/1/2015</a:t>
+              <a:t>6/22/2015</a:t>
             </a:fld>
             <a:endParaRPr lang="en-US"/>
           </a:p>
@@ -763,7 +758,7 @@
           <a:p>
             <a:fld id="{4C8643DD-90E0-4107-8D69-F122CF1CE135}" type="datetimeFigureOut">
               <a:rPr lang="en-US" smtClean="0"/>
-              <a:t>7/1/2015</a:t>
+              <a:t>6/22/2015</a:t>
             </a:fld>
             <a:endParaRPr lang="en-US"/>
           </a:p>
@@ -1009,7 +1004,7 @@
           <a:p>
             <a:fld id="{4C8643DD-90E0-4107-8D69-F122CF1CE135}" type="datetimeFigureOut">
               <a:rPr lang="en-US" smtClean="0"/>
-              <a:t>7/1/2015</a:t>
+              <a:t>6/22/2015</a:t>
             </a:fld>
             <a:endParaRPr lang="en-US"/>
           </a:p>
@@ -1241,7 +1236,7 @@
           <a:p>
             <a:fld id="{4C8643DD-90E0-4107-8D69-F122CF1CE135}" type="datetimeFigureOut">
               <a:rPr lang="en-US" smtClean="0"/>
-              <a:t>7/1/2015</a:t>
+              <a:t>6/22/2015</a:t>
             </a:fld>
             <a:endParaRPr lang="en-US"/>
           </a:p>
@@ -1608,7 +1603,7 @@
           <a:p>
             <a:fld id="{4C8643DD-90E0-4107-8D69-F122CF1CE135}" type="datetimeFigureOut">
               <a:rPr lang="en-US" smtClean="0"/>
-              <a:t>7/1/2015</a:t>
+              <a:t>6/22/2015</a:t>
             </a:fld>
             <a:endParaRPr lang="en-US"/>
           </a:p>
@@ -1726,7 +1721,7 @@
           <a:p>
             <a:fld id="{4C8643DD-90E0-4107-8D69-F122CF1CE135}" type="datetimeFigureOut">
               <a:rPr lang="en-US" smtClean="0"/>
-              <a:t>7/1/2015</a:t>
+              <a:t>6/22/2015</a:t>
             </a:fld>
             <a:endParaRPr lang="en-US"/>
           </a:p>
@@ -1821,7 +1816,7 @@
           <a:p>
             <a:fld id="{4C8643DD-90E0-4107-8D69-F122CF1CE135}" type="datetimeFigureOut">
               <a:rPr lang="en-US" smtClean="0"/>
-              <a:t>7/1/2015</a:t>
+              <a:t>6/22/2015</a:t>
             </a:fld>
             <a:endParaRPr lang="en-US"/>
           </a:p>
@@ -2098,7 +2093,7 @@
           <a:p>
             <a:fld id="{4C8643DD-90E0-4107-8D69-F122CF1CE135}" type="datetimeFigureOut">
               <a:rPr lang="en-US" smtClean="0"/>
-              <a:t>7/1/2015</a:t>
+              <a:t>6/22/2015</a:t>
             </a:fld>
             <a:endParaRPr lang="en-US"/>
           </a:p>
@@ -2351,7 +2346,7 @@
           <a:p>
             <a:fld id="{4C8643DD-90E0-4107-8D69-F122CF1CE135}" type="datetimeFigureOut">
               <a:rPr lang="en-US" smtClean="0"/>
-              <a:t>7/1/2015</a:t>
+              <a:t>6/22/2015</a:t>
             </a:fld>
             <a:endParaRPr lang="en-US"/>
           </a:p>
@@ -2564,7 +2559,7 @@
           <a:p>
             <a:fld id="{4C8643DD-90E0-4107-8D69-F122CF1CE135}" type="datetimeFigureOut">
               <a:rPr lang="en-US" smtClean="0"/>
-              <a:t>7/1/2015</a:t>
+              <a:t>6/22/2015</a:t>
             </a:fld>
             <a:endParaRPr lang="en-US"/>
           </a:p>
@@ -3050,7 +3045,7 @@
         </p:nvSpPr>
         <p:spPr bwMode="auto">
           <a:xfrm>
-            <a:off x="9257217" y="4571840"/>
+            <a:off x="8848724" y="4086905"/>
             <a:ext cx="428625" cy="409575"/>
           </a:xfrm>
           <a:prstGeom prst="ellipse">
@@ -3137,7 +3132,7 @@
         </p:nvSpPr>
         <p:spPr bwMode="auto">
           <a:xfrm>
-            <a:off x="9234780" y="3805182"/>
+            <a:off x="9169719" y="3291563"/>
             <a:ext cx="428625" cy="409575"/>
           </a:xfrm>
           <a:prstGeom prst="ellipse">
@@ -3224,7 +3219,7 @@
         </p:nvSpPr>
         <p:spPr bwMode="auto">
           <a:xfrm>
-            <a:off x="9638780" y="2888234"/>
+            <a:off x="9531122" y="2597654"/>
             <a:ext cx="428625" cy="409575"/>
           </a:xfrm>
           <a:prstGeom prst="ellipse">
@@ -3311,7 +3306,7 @@
         </p:nvSpPr>
         <p:spPr bwMode="auto">
           <a:xfrm>
-            <a:off x="8742697" y="2092029"/>
+            <a:off x="8512319" y="1872341"/>
             <a:ext cx="428625" cy="409575"/>
           </a:xfrm>
           <a:prstGeom prst="ellipse">
@@ -3390,7 +3385,7 @@
         </p:nvSpPr>
         <p:spPr bwMode="auto">
           <a:xfrm>
-            <a:off x="8508854" y="1248187"/>
+            <a:off x="8395590" y="1198109"/>
             <a:ext cx="428625" cy="409575"/>
           </a:xfrm>
           <a:prstGeom prst="ellipse">
@@ -3469,7 +3464,7 @@
         </p:nvSpPr>
         <p:spPr bwMode="auto">
           <a:xfrm>
-            <a:off x="7621761" y="615040"/>
+            <a:off x="7488411" y="405490"/>
             <a:ext cx="428625" cy="409575"/>
           </a:xfrm>
           <a:prstGeom prst="ellipse">
@@ -3559,9 +3554,9 @@
           </a:stretch>
         </p:blipFill>
         <p:spPr>
-          <a:xfrm rot="15234035">
-            <a:off x="7007852" y="3134028"/>
-            <a:ext cx="941888" cy="3399986"/>
+          <a:xfrm rot="14143565">
+            <a:off x="6789609" y="3306623"/>
+            <a:ext cx="884557" cy="3193036"/>
           </a:xfrm>
           <a:prstGeom prst="rect">
             <a:avLst/>
@@ -3589,8 +3584,8 @@
           </a:stretch>
         </p:blipFill>
         <p:spPr>
-          <a:xfrm rot="14934727">
-            <a:off x="7877458" y="3113934"/>
+          <a:xfrm rot="14143565">
+            <a:off x="7802007" y="2904408"/>
             <a:ext cx="572974" cy="2068297"/>
           </a:xfrm>
           <a:prstGeom prst="rect">
@@ -3619,9 +3614,9 @@
           </a:stretch>
         </p:blipFill>
         <p:spPr>
-          <a:xfrm rot="14581177">
-            <a:off x="8256784" y="2293934"/>
-            <a:ext cx="585410" cy="2113188"/>
+          <a:xfrm rot="14143565">
+            <a:off x="8188063" y="2197518"/>
+            <a:ext cx="572974" cy="2068297"/>
           </a:xfrm>
           <a:prstGeom prst="rect">
             <a:avLst/>
@@ -3650,8 +3645,8 @@
         </p:blipFill>
         <p:spPr>
           <a:xfrm rot="8843385">
-            <a:off x="4604225" y="320548"/>
-            <a:ext cx="518641" cy="1872169"/>
+            <a:off x="4710320" y="683242"/>
+            <a:ext cx="417744" cy="1507955"/>
           </a:xfrm>
           <a:prstGeom prst="rect">
             <a:avLst/>
@@ -3679,9 +3674,9 @@
           </a:stretch>
         </p:blipFill>
         <p:spPr>
-          <a:xfrm rot="2869124">
-            <a:off x="3401105" y="2204230"/>
-            <a:ext cx="553152" cy="1996744"/>
+          <a:xfrm rot="5862735">
+            <a:off x="3729435" y="1831132"/>
+            <a:ext cx="400478" cy="1445628"/>
           </a:xfrm>
           <a:prstGeom prst="rect">
             <a:avLst/>
@@ -3709,9 +3704,9 @@
           </a:stretch>
         </p:blipFill>
         <p:spPr>
-          <a:xfrm rot="2471502">
-            <a:off x="3678220" y="3406441"/>
-            <a:ext cx="723812" cy="2612787"/>
+          <a:xfrm rot="5028337">
+            <a:off x="3766769" y="2832402"/>
+            <a:ext cx="572974" cy="2068297"/>
           </a:xfrm>
           <a:prstGeom prst="rect">
             <a:avLst/>
@@ -3739,9 +3734,9 @@
           </a:stretch>
         </p:blipFill>
         <p:spPr>
-          <a:xfrm rot="2504184">
-            <a:off x="3513768" y="2640392"/>
-            <a:ext cx="577995" cy="2431933"/>
+          <a:xfrm rot="5174921">
+            <a:off x="3544839" y="2085256"/>
+            <a:ext cx="534235" cy="1928458"/>
           </a:xfrm>
           <a:prstGeom prst="rect">
             <a:avLst/>
@@ -3769,9 +3764,9 @@
           </a:stretch>
         </p:blipFill>
         <p:spPr>
-          <a:xfrm rot="7845659">
-            <a:off x="4374686" y="871765"/>
-            <a:ext cx="577495" cy="2084616"/>
+          <a:xfrm rot="7995929">
+            <a:off x="4598122" y="1185145"/>
+            <a:ext cx="470939" cy="1699976"/>
           </a:xfrm>
           <a:prstGeom prst="rect">
             <a:avLst/>
@@ -3799,9 +3794,9 @@
           </a:stretch>
         </p:blipFill>
         <p:spPr>
-          <a:xfrm rot="7934390">
-            <a:off x="4354189" y="1437646"/>
-            <a:ext cx="708532" cy="2557627"/>
+          <a:xfrm rot="8091361">
+            <a:off x="4555164" y="1702897"/>
+            <a:ext cx="619004" cy="2234454"/>
           </a:xfrm>
           <a:prstGeom prst="rect">
             <a:avLst/>
@@ -3829,9 +3824,9 @@
           </a:stretch>
         </p:blipFill>
         <p:spPr>
-          <a:xfrm rot="8331613">
-            <a:off x="5544246" y="837925"/>
-            <a:ext cx="265688" cy="959071"/>
+          <a:xfrm rot="11058583">
+            <a:off x="5860276" y="645974"/>
+            <a:ext cx="301580" cy="1088631"/>
           </a:xfrm>
           <a:prstGeom prst="rect">
             <a:avLst/>
@@ -3859,9 +3854,9 @@
           </a:stretch>
         </p:blipFill>
         <p:spPr>
-          <a:xfrm rot="11021896">
-            <a:off x="5836103" y="553731"/>
-            <a:ext cx="533127" cy="1924459"/>
+          <a:xfrm rot="9066144">
+            <a:off x="5493218" y="1045098"/>
+            <a:ext cx="393129" cy="1419100"/>
           </a:xfrm>
           <a:prstGeom prst="rect">
             <a:avLst/>
@@ -3920,8 +3915,8 @@
         </p:blipFill>
         <p:spPr>
           <a:xfrm rot="13788628">
-            <a:off x="7162663" y="901584"/>
-            <a:ext cx="601187" cy="2170139"/>
+            <a:off x="7109718" y="955540"/>
+            <a:ext cx="572974" cy="2068297"/>
           </a:xfrm>
           <a:prstGeom prst="rect">
             <a:avLst/>
@@ -3949,9 +3944,9 @@
           </a:stretch>
         </p:blipFill>
         <p:spPr>
-          <a:xfrm rot="13897894">
-            <a:off x="7112416" y="1553794"/>
-            <a:ext cx="733093" cy="2646287"/>
+          <a:xfrm rot="13539613">
+            <a:off x="7017532" y="1591382"/>
+            <a:ext cx="688017" cy="2483574"/>
           </a:xfrm>
           <a:prstGeom prst="rect">
             <a:avLst/>
@@ -3968,7 +3963,7 @@
         </p:nvSpPr>
         <p:spPr bwMode="auto">
           <a:xfrm>
-            <a:off x="5104907" y="325885"/>
+            <a:off x="5980758" y="107373"/>
             <a:ext cx="539800" cy="507043"/>
           </a:xfrm>
           <a:prstGeom prst="ellipse">
@@ -4047,7 +4042,7 @@
         </p:nvSpPr>
         <p:spPr bwMode="auto">
           <a:xfrm>
-            <a:off x="6231160" y="136630"/>
+            <a:off x="5139789" y="612557"/>
             <a:ext cx="428625" cy="409575"/>
           </a:xfrm>
           <a:prstGeom prst="ellipse">
@@ -4121,7 +4116,7 @@
         </p:nvSpPr>
         <p:spPr bwMode="auto">
           <a:xfrm>
-            <a:off x="7185607" y="-103736"/>
+            <a:off x="6934889" y="-95888"/>
             <a:ext cx="428625" cy="409575"/>
           </a:xfrm>
           <a:prstGeom prst="ellipse">
@@ -4200,7 +4195,7 @@
         </p:nvSpPr>
         <p:spPr bwMode="auto">
           <a:xfrm>
-            <a:off x="4123040" y="-158461"/>
+            <a:off x="4357524" y="150210"/>
             <a:ext cx="539800" cy="507043"/>
           </a:xfrm>
           <a:prstGeom prst="ellipse">
@@ -4271,7 +4266,7 @@
       </p:sp>
       <p:sp>
         <p:nvSpPr>
-          <p:cNvPr id="101" name="Oval 32"/>
+          <p:cNvPr id="100" name="Oval 32"/>
           <p:cNvSpPr>
             <a:spLocks noChangeArrowheads="1"/>
           </p:cNvSpPr>
@@ -4279,7 +4274,7 @@
         </p:nvSpPr>
         <p:spPr bwMode="auto">
           <a:xfrm>
-            <a:off x="3397175" y="1369276"/>
+            <a:off x="3956568" y="764571"/>
             <a:ext cx="539800" cy="507043"/>
           </a:xfrm>
           <a:prstGeom prst="ellipse">
@@ -4333,7 +4328,7 @@
                 <a:latin typeface="Calibri" panose="020F0502020204030204" pitchFamily="34" charset="0"/>
                 <a:cs typeface="Times New Roman" panose="02020603050405020304" pitchFamily="18" charset="0"/>
               </a:rPr>
-              <a:t>13</a:t>
+              <a:t>12</a:t>
             </a:r>
             <a:endParaRPr kumimoji="0" lang="en-US" altLang="en-US" sz="1800" b="0" i="0" u="none" strike="noStrike" cap="none" normalizeH="0" baseline="0" dirty="0" smtClean="0">
               <a:ln>
@@ -4350,7 +4345,7 @@
       </p:sp>
       <p:sp>
         <p:nvSpPr>
-          <p:cNvPr id="102" name="Oval 32"/>
+          <p:cNvPr id="101" name="Oval 32"/>
           <p:cNvSpPr>
             <a:spLocks noChangeArrowheads="1"/>
           </p:cNvSpPr>
@@ -4358,7 +4353,7 @@
         </p:nvSpPr>
         <p:spPr bwMode="auto">
           <a:xfrm>
-            <a:off x="2201866" y="3457759"/>
+            <a:off x="3763022" y="1391341"/>
             <a:ext cx="539800" cy="507043"/>
           </a:xfrm>
           <a:prstGeom prst="ellipse">
@@ -4412,7 +4407,7 @@
                 <a:latin typeface="Calibri" panose="020F0502020204030204" pitchFamily="34" charset="0"/>
                 <a:cs typeface="Times New Roman" panose="02020603050405020304" pitchFamily="18" charset="0"/>
               </a:rPr>
-              <a:t>14</a:t>
+              <a:t>13</a:t>
             </a:r>
             <a:endParaRPr kumimoji="0" lang="en-US" altLang="en-US" sz="1800" b="0" i="0" u="none" strike="noStrike" cap="none" normalizeH="0" baseline="0" dirty="0" smtClean="0">
               <a:ln>
@@ -4429,7 +4424,7 @@
       </p:sp>
       <p:sp>
         <p:nvSpPr>
-          <p:cNvPr id="103" name="Oval 32"/>
+          <p:cNvPr id="102" name="Oval 32"/>
           <p:cNvSpPr>
             <a:spLocks noChangeArrowheads="1"/>
           </p:cNvSpPr>
@@ -4437,7 +4432,7 @@
         </p:nvSpPr>
         <p:spPr bwMode="auto">
           <a:xfrm>
-            <a:off x="2216846" y="4410462"/>
+            <a:off x="2697166" y="1838509"/>
             <a:ext cx="539800" cy="507043"/>
           </a:xfrm>
           <a:prstGeom prst="ellipse">
@@ -4491,14 +4486,24 @@
                 <a:latin typeface="Calibri" panose="020F0502020204030204" pitchFamily="34" charset="0"/>
                 <a:cs typeface="Times New Roman" panose="02020603050405020304" pitchFamily="18" charset="0"/>
               </a:rPr>
-              <a:t>15</a:t>
-            </a:r>
-          </a:p>
-        </p:txBody>
-      </p:sp>
-      <p:sp>
-        <p:nvSpPr>
-          <p:cNvPr id="104" name="Oval 32"/>
+              <a:t>14</a:t>
+            </a:r>
+            <a:endParaRPr kumimoji="0" lang="en-US" altLang="en-US" sz="1800" b="0" i="0" u="none" strike="noStrike" cap="none" normalizeH="0" baseline="0" dirty="0" smtClean="0">
+              <a:ln>
+                <a:noFill/>
+              </a:ln>
+              <a:solidFill>
+                <a:schemeClr val="tx1"/>
+              </a:solidFill>
+              <a:effectLst/>
+              <a:latin typeface="Arial" panose="020B0604020202020204" pitchFamily="34" charset="0"/>
+            </a:endParaRPr>
+          </a:p>
+        </p:txBody>
+      </p:sp>
+      <p:sp>
+        <p:nvSpPr>
+          <p:cNvPr id="103" name="Oval 32"/>
           <p:cNvSpPr>
             <a:spLocks noChangeArrowheads="1"/>
           </p:cNvSpPr>
@@ -4506,7 +4511,7 @@
         </p:nvSpPr>
         <p:spPr bwMode="auto">
           <a:xfrm>
-            <a:off x="2395079" y="5344868"/>
+            <a:off x="2245421" y="2543562"/>
             <a:ext cx="539800" cy="507043"/>
           </a:xfrm>
           <a:prstGeom prst="ellipse">
@@ -4560,177 +4565,23 @@
                 <a:latin typeface="Calibri" panose="020F0502020204030204" pitchFamily="34" charset="0"/>
                 <a:cs typeface="Times New Roman" panose="02020603050405020304" pitchFamily="18" charset="0"/>
               </a:rPr>
-              <a:t>16</a:t>
-            </a:r>
-            <a:endParaRPr kumimoji="0" lang="en-US" altLang="en-US" sz="1800" b="0" i="0" u="none" strike="noStrike" cap="none" normalizeH="0" baseline="0" dirty="0" smtClean="0">
-              <a:ln>
-                <a:noFill/>
-              </a:ln>
-              <a:solidFill>
-                <a:schemeClr val="tx1"/>
-              </a:solidFill>
-              <a:effectLst/>
-              <a:latin typeface="Arial" panose="020B0604020202020204" pitchFamily="34" charset="0"/>
-            </a:endParaRPr>
-          </a:p>
-        </p:txBody>
-      </p:sp>
-      <p:sp>
-        <p:nvSpPr>
-          <p:cNvPr id="2068" name="TextBox 2067"/>
-          <p:cNvSpPr txBox="1"/>
+              <a:t>15</a:t>
+            </a:r>
+          </a:p>
+        </p:txBody>
+      </p:sp>
+      <p:sp>
+        <p:nvSpPr>
+          <p:cNvPr id="104" name="Oval 32"/>
+          <p:cNvSpPr>
+            <a:spLocks noChangeArrowheads="1"/>
+          </p:cNvSpPr>
           <p:nvPr/>
         </p:nvSpPr>
-        <p:spPr>
-          <a:xfrm>
-            <a:off x="9646049" y="4591962"/>
-            <a:ext cx="1492992" cy="369332"/>
-          </a:xfrm>
-          <a:prstGeom prst="rect">
-            <a:avLst/>
-          </a:prstGeom>
-          <a:noFill/>
-          <a:ln>
-            <a:noFill/>
-          </a:ln>
-        </p:spPr>
-        <p:txBody>
-          <a:bodyPr wrap="square" rtlCol="0">
-            <a:spAutoFit/>
-          </a:bodyPr>
-          <a:lstStyle/>
-          <a:p>
-            <a:r>
-              <a:rPr lang="en-US" dirty="0" smtClean="0"/>
-              <a:t>Center of Paw</a:t>
-            </a:r>
-            <a:endParaRPr lang="en-US" dirty="0"/>
-          </a:p>
-        </p:txBody>
-      </p:sp>
-      <p:sp>
-        <p:nvSpPr>
-          <p:cNvPr id="106" name="TextBox 105"/>
-          <p:cNvSpPr txBox="1"/>
-          <p:nvPr/>
-        </p:nvSpPr>
-        <p:spPr>
-          <a:xfrm>
-            <a:off x="9646049" y="3711476"/>
-            <a:ext cx="2425535" cy="803277"/>
-          </a:xfrm>
-          <a:prstGeom prst="rect">
-            <a:avLst/>
-          </a:prstGeom>
-          <a:noFill/>
-          <a:ln>
-            <a:noFill/>
-          </a:ln>
-        </p:spPr>
-        <p:txBody>
-          <a:bodyPr wrap="square" rtlCol="0">
-            <a:normAutofit fontScale="92500"/>
-          </a:bodyPr>
-          <a:lstStyle/>
-          <a:p>
-            <a:r>
-              <a:rPr lang="en-US" dirty="0" smtClean="0"/>
-              <a:t>Thumb Metacarpal- Proximal Phalanges Joint</a:t>
-            </a:r>
-            <a:endParaRPr lang="en-US" dirty="0"/>
-          </a:p>
-        </p:txBody>
-      </p:sp>
-      <p:sp>
-        <p:nvSpPr>
-          <p:cNvPr id="107" name="TextBox 106"/>
-          <p:cNvSpPr txBox="1"/>
-          <p:nvPr/>
-        </p:nvSpPr>
-        <p:spPr>
-          <a:xfrm>
-            <a:off x="10002567" y="2786615"/>
-            <a:ext cx="2077192" cy="683534"/>
-          </a:xfrm>
-          <a:prstGeom prst="rect">
-            <a:avLst/>
-          </a:prstGeom>
-          <a:noFill/>
-          <a:ln>
-            <a:noFill/>
-          </a:ln>
-        </p:spPr>
-        <p:txBody>
-          <a:bodyPr wrap="square" rtlCol="0">
-            <a:normAutofit fontScale="92500"/>
-          </a:bodyPr>
-          <a:lstStyle/>
-          <a:p>
-            <a:r>
-              <a:rPr lang="en-US" dirty="0" smtClean="0"/>
-              <a:t>Thumb Proximal-Distal Phalanges Joint</a:t>
-            </a:r>
-            <a:endParaRPr lang="en-US" dirty="0"/>
-          </a:p>
-        </p:txBody>
-      </p:sp>
-      <p:sp>
-        <p:nvSpPr>
-          <p:cNvPr id="108" name="TextBox 107"/>
-          <p:cNvSpPr txBox="1"/>
-          <p:nvPr/>
-        </p:nvSpPr>
-        <p:spPr>
-          <a:xfrm>
-            <a:off x="9138958" y="2021650"/>
-            <a:ext cx="3100451" cy="562555"/>
-          </a:xfrm>
-          <a:prstGeom prst="rect">
-            <a:avLst/>
-          </a:prstGeom>
-          <a:noFill/>
-          <a:ln>
-            <a:noFill/>
-          </a:ln>
-        </p:spPr>
-        <p:txBody>
-          <a:bodyPr wrap="square" rtlCol="0">
-            <a:normAutofit fontScale="92500" lnSpcReduction="10000"/>
-          </a:bodyPr>
-          <a:lstStyle/>
-          <a:p>
-            <a:r>
-              <a:rPr lang="en-US" dirty="0"/>
-              <a:t>Index </a:t>
-            </a:r>
-            <a:r>
-              <a:rPr lang="en-US" dirty="0" smtClean="0"/>
-              <a:t>Finger Metacarpal- </a:t>
-            </a:r>
-            <a:r>
-              <a:rPr lang="en-US" dirty="0"/>
-              <a:t>Proximal Phalanges </a:t>
-            </a:r>
-            <a:r>
-              <a:rPr lang="en-US" dirty="0" smtClean="0"/>
-              <a:t>Joint</a:t>
-            </a:r>
-            <a:endParaRPr lang="en-US" dirty="0"/>
-          </a:p>
-        </p:txBody>
-      </p:sp>
-      <p:sp>
-        <p:nvSpPr>
-          <p:cNvPr id="109" name="Oval 27"/>
-          <p:cNvSpPr>
-            <a:spLocks noChangeArrowheads="1"/>
-          </p:cNvSpPr>
-          <p:nvPr/>
-        </p:nvSpPr>
         <p:spPr bwMode="auto">
           <a:xfrm>
-            <a:off x="9407107" y="5130217"/>
-            <a:ext cx="428625" cy="409575"/>
+            <a:off x="2413578" y="3407024"/>
+            <a:ext cx="539800" cy="507043"/>
           </a:xfrm>
           <a:prstGeom prst="ellipse">
             <a:avLst/>
@@ -4779,11 +4630,11 @@
               <a:tabLst/>
             </a:pPr>
             <a:r>
-              <a:rPr lang="en-US" altLang="en-US" sz="1400" b="1" dirty="0">
+              <a:rPr lang="en-US" altLang="en-US" sz="1400" b="1" dirty="0" smtClean="0">
                 <a:latin typeface="Calibri" panose="020F0502020204030204" pitchFamily="34" charset="0"/>
                 <a:cs typeface="Times New Roman" panose="02020603050405020304" pitchFamily="18" charset="0"/>
               </a:rPr>
-              <a:t>1</a:t>
+              <a:t>16</a:t>
             </a:r>
             <a:endParaRPr kumimoji="0" lang="en-US" altLang="en-US" sz="1800" b="0" i="0" u="none" strike="noStrike" cap="none" normalizeH="0" baseline="0" dirty="0" smtClean="0">
               <a:ln>
@@ -4800,14 +4651,14 @@
       </p:sp>
       <p:sp>
         <p:nvSpPr>
-          <p:cNvPr id="110" name="TextBox 109"/>
+          <p:cNvPr id="2068" name="TextBox 2067"/>
           <p:cNvSpPr txBox="1"/>
           <p:nvPr/>
         </p:nvSpPr>
         <p:spPr>
           <a:xfrm>
-            <a:off x="9795494" y="5153252"/>
-            <a:ext cx="1645392" cy="369332"/>
+            <a:off x="9349179" y="4089172"/>
+            <a:ext cx="1492992" cy="369332"/>
           </a:xfrm>
           <a:prstGeom prst="rect">
             <a:avLst/>
@@ -4825,7 +4676,7 @@
           <a:p>
             <a:r>
               <a:rPr lang="en-US" dirty="0" smtClean="0"/>
-              <a:t>Center of Pellet</a:t>
+              <a:t>Center of Paw</a:t>
             </a:r>
             <a:endParaRPr lang="en-US" dirty="0"/>
           </a:p>
@@ -4833,14 +4684,14 @@
       </p:sp>
       <p:sp>
         <p:nvSpPr>
-          <p:cNvPr id="111" name="TextBox 110"/>
+          <p:cNvPr id="106" name="TextBox 105"/>
           <p:cNvSpPr txBox="1"/>
           <p:nvPr/>
         </p:nvSpPr>
         <p:spPr>
           <a:xfrm>
-            <a:off x="8885766" y="1154921"/>
-            <a:ext cx="3209308" cy="632856"/>
+            <a:off x="9664865" y="3283630"/>
+            <a:ext cx="1776022" cy="369332"/>
           </a:xfrm>
           <a:prstGeom prst="rect">
             <a:avLst/>
@@ -4852,36 +4703,28 @@
         </p:spPr>
         <p:txBody>
           <a:bodyPr wrap="square" rtlCol="0">
-            <a:normAutofit/>
+            <a:spAutoFit/>
           </a:bodyPr>
           <a:lstStyle/>
           <a:p>
             <a:r>
-              <a:rPr lang="en-US" sz="1700" dirty="0" smtClean="0"/>
-              <a:t>Index Finger </a:t>
-            </a:r>
-            <a:r>
-              <a:rPr lang="en-US" sz="1700" dirty="0"/>
-              <a:t>Proximal-Middle Phalanges </a:t>
-            </a:r>
-            <a:r>
-              <a:rPr lang="en-US" sz="1700" dirty="0" smtClean="0"/>
-              <a:t>Joint</a:t>
-            </a:r>
-            <a:endParaRPr lang="en-US" sz="1700" dirty="0"/>
-          </a:p>
-        </p:txBody>
-      </p:sp>
-      <p:sp>
-        <p:nvSpPr>
-          <p:cNvPr id="112" name="TextBox 111"/>
+              <a:rPr lang="en-US" dirty="0" smtClean="0"/>
+              <a:t>Far Thumb Joint</a:t>
+            </a:r>
+            <a:endParaRPr lang="en-US" dirty="0"/>
+          </a:p>
+        </p:txBody>
+      </p:sp>
+      <p:sp>
+        <p:nvSpPr>
+          <p:cNvPr id="107" name="TextBox 106"/>
           <p:cNvSpPr txBox="1"/>
           <p:nvPr/>
         </p:nvSpPr>
         <p:spPr>
           <a:xfrm>
-            <a:off x="8005791" y="648152"/>
-            <a:ext cx="4134598" cy="618211"/>
+            <a:off x="10013207" y="2597827"/>
+            <a:ext cx="1863108" cy="369332"/>
           </a:xfrm>
           <a:prstGeom prst="rect">
             <a:avLst/>
@@ -4893,36 +4736,28 @@
         </p:spPr>
         <p:txBody>
           <a:bodyPr wrap="square" rtlCol="0">
-            <a:normAutofit/>
+            <a:spAutoFit/>
           </a:bodyPr>
           <a:lstStyle/>
           <a:p>
             <a:r>
-              <a:rPr lang="en-US" sz="1700" dirty="0" smtClean="0"/>
-              <a:t>Index Finger </a:t>
-            </a:r>
-            <a:r>
-              <a:rPr lang="en-US" sz="1700" dirty="0"/>
-              <a:t>Middle-Distal Phalanges </a:t>
-            </a:r>
-            <a:r>
-              <a:rPr lang="en-US" sz="1700" dirty="0" smtClean="0"/>
-              <a:t>Joint</a:t>
-            </a:r>
-            <a:endParaRPr lang="en-US" sz="1700" dirty="0"/>
-          </a:p>
-        </p:txBody>
-      </p:sp>
-      <p:sp>
-        <p:nvSpPr>
-          <p:cNvPr id="113" name="TextBox 112"/>
+              <a:rPr lang="en-US" dirty="0" smtClean="0"/>
+              <a:t>Near Thumb Joint</a:t>
+            </a:r>
+            <a:endParaRPr lang="en-US" dirty="0"/>
+          </a:p>
+        </p:txBody>
+      </p:sp>
+      <p:sp>
+        <p:nvSpPr>
+          <p:cNvPr id="108" name="TextBox 107"/>
           <p:cNvSpPr txBox="1"/>
           <p:nvPr/>
         </p:nvSpPr>
         <p:spPr>
           <a:xfrm>
-            <a:off x="-358803" y="3496350"/>
-            <a:ext cx="2599435" cy="515746"/>
+            <a:off x="8989948" y="1879375"/>
+            <a:ext cx="2363852" cy="369332"/>
           </a:xfrm>
           <a:prstGeom prst="rect">
             <a:avLst/>
@@ -4934,29 +4769,13 @@
         </p:spPr>
         <p:txBody>
           <a:bodyPr wrap="square" rtlCol="0">
-            <a:normAutofit fontScale="92500" lnSpcReduction="20000"/>
+            <a:spAutoFit/>
           </a:bodyPr>
           <a:lstStyle/>
           <a:p>
-            <a:pPr algn="r"/>
             <a:r>
               <a:rPr lang="en-US" dirty="0" smtClean="0"/>
-              <a:t>Pinky Finger Middle-</a:t>
-            </a:r>
-          </a:p>
-          <a:p>
-            <a:pPr algn="r"/>
-            <a:r>
-              <a:rPr lang="en-US" dirty="0" smtClean="0"/>
-              <a:t>Distal </a:t>
-            </a:r>
-            <a:r>
-              <a:rPr lang="en-US" dirty="0"/>
-              <a:t>Phalanges </a:t>
-            </a:r>
-            <a:r>
-              <a:rPr lang="en-US" dirty="0" smtClean="0"/>
-              <a:t>Joint</a:t>
+              <a:t>Far Index Finger Joint</a:t>
             </a:r>
             <a:endParaRPr lang="en-US" dirty="0"/>
           </a:p>
@@ -4964,812 +4783,16 @@
       </p:sp>
       <p:sp>
         <p:nvSpPr>
-          <p:cNvPr id="115" name="TextBox 114"/>
-          <p:cNvSpPr txBox="1"/>
+          <p:cNvPr id="109" name="Oval 27"/>
+          <p:cNvSpPr>
+            <a:spLocks noChangeArrowheads="1"/>
+          </p:cNvSpPr>
           <p:nvPr/>
         </p:nvSpPr>
-        <p:spPr>
-          <a:xfrm>
-            <a:off x="-286557" y="4428222"/>
-            <a:ext cx="2514609" cy="507217"/>
-          </a:xfrm>
-          <a:prstGeom prst="rect">
-            <a:avLst/>
-          </a:prstGeom>
-          <a:noFill/>
-          <a:ln>
-            <a:noFill/>
-          </a:ln>
-        </p:spPr>
-        <p:txBody>
-          <a:bodyPr wrap="square" rtlCol="0">
-            <a:normAutofit fontScale="92500" lnSpcReduction="20000"/>
-          </a:bodyPr>
-          <a:lstStyle/>
-          <a:p>
-            <a:pPr algn="r"/>
-            <a:r>
-              <a:rPr lang="en-US" dirty="0" smtClean="0"/>
-              <a:t>Pinky Finger Proximal-</a:t>
-            </a:r>
-          </a:p>
-          <a:p>
-            <a:pPr algn="r"/>
-            <a:r>
-              <a:rPr lang="en-US" dirty="0" smtClean="0"/>
-              <a:t>Middle </a:t>
-            </a:r>
-            <a:r>
-              <a:rPr lang="en-US" dirty="0"/>
-              <a:t>Phalanges </a:t>
-            </a:r>
-            <a:r>
-              <a:rPr lang="en-US" dirty="0" smtClean="0"/>
-              <a:t>Joint</a:t>
-            </a:r>
-            <a:endParaRPr lang="en-US" dirty="0"/>
-          </a:p>
-        </p:txBody>
-      </p:sp>
-      <p:sp>
-        <p:nvSpPr>
-          <p:cNvPr id="116" name="TextBox 115"/>
-          <p:cNvSpPr txBox="1"/>
-          <p:nvPr/>
-        </p:nvSpPr>
-        <p:spPr>
-          <a:xfrm>
-            <a:off x="22356" y="5192936"/>
-            <a:ext cx="2346486" cy="810909"/>
-          </a:xfrm>
-          <a:prstGeom prst="rect">
-            <a:avLst/>
-          </a:prstGeom>
-          <a:noFill/>
-          <a:ln>
-            <a:noFill/>
-          </a:ln>
-        </p:spPr>
-        <p:txBody>
-          <a:bodyPr wrap="square" rtlCol="0">
-            <a:noAutofit/>
-          </a:bodyPr>
-          <a:lstStyle/>
-          <a:p>
-            <a:pPr algn="r"/>
-            <a:r>
-              <a:rPr lang="en-US" sz="1700" dirty="0"/>
-              <a:t>Pinky Finger Metacarpal- </a:t>
-            </a:r>
-          </a:p>
-          <a:p>
-            <a:pPr algn="r"/>
-            <a:r>
-              <a:rPr lang="en-US" sz="1700" dirty="0" smtClean="0"/>
-              <a:t>Proximal </a:t>
-            </a:r>
-            <a:r>
-              <a:rPr lang="en-US" sz="1700" dirty="0"/>
-              <a:t>Phalanges </a:t>
-            </a:r>
-            <a:r>
-              <a:rPr lang="en-US" sz="1700" dirty="0" smtClean="0"/>
-              <a:t>Joint</a:t>
-            </a:r>
-            <a:endParaRPr lang="en-US" sz="1700" dirty="0"/>
-          </a:p>
-        </p:txBody>
-      </p:sp>
-      <p:sp>
-        <p:nvSpPr>
-          <p:cNvPr id="118" name="TextBox 117"/>
-          <p:cNvSpPr txBox="1"/>
-          <p:nvPr/>
-        </p:nvSpPr>
-        <p:spPr>
-          <a:xfrm>
-            <a:off x="-127121" y="-89632"/>
-            <a:ext cx="4308492" cy="557141"/>
-          </a:xfrm>
-          <a:prstGeom prst="rect">
-            <a:avLst/>
-          </a:prstGeom>
-          <a:noFill/>
-          <a:ln>
-            <a:noFill/>
-          </a:ln>
-        </p:spPr>
-        <p:txBody>
-          <a:bodyPr wrap="square" rtlCol="0">
-            <a:normAutofit fontScale="92500" lnSpcReduction="20000"/>
-          </a:bodyPr>
-          <a:lstStyle/>
-          <a:p>
-            <a:pPr algn="r"/>
-            <a:r>
-              <a:rPr lang="en-US" dirty="0" smtClean="0"/>
-              <a:t>Ring Finger Middle-</a:t>
-            </a:r>
-          </a:p>
-          <a:p>
-            <a:pPr algn="r"/>
-            <a:r>
-              <a:rPr lang="en-US" dirty="0" smtClean="0"/>
-              <a:t>Distal </a:t>
-            </a:r>
-            <a:r>
-              <a:rPr lang="en-US" dirty="0"/>
-              <a:t>Phalanges </a:t>
-            </a:r>
-            <a:r>
-              <a:rPr lang="en-US" dirty="0" smtClean="0"/>
-              <a:t>Joint</a:t>
-            </a:r>
-            <a:endParaRPr lang="en-US" dirty="0"/>
-          </a:p>
-        </p:txBody>
-      </p:sp>
-      <p:sp>
-        <p:nvSpPr>
-          <p:cNvPr id="119" name="TextBox 118"/>
-          <p:cNvSpPr txBox="1"/>
-          <p:nvPr/>
-        </p:nvSpPr>
-        <p:spPr>
-          <a:xfrm>
-            <a:off x="-293785" y="505827"/>
-            <a:ext cx="3869852" cy="619745"/>
-          </a:xfrm>
-          <a:prstGeom prst="rect">
-            <a:avLst/>
-          </a:prstGeom>
-          <a:noFill/>
-          <a:ln>
-            <a:noFill/>
-          </a:ln>
-        </p:spPr>
-        <p:txBody>
-          <a:bodyPr wrap="square" rtlCol="0">
-            <a:noAutofit/>
-          </a:bodyPr>
-          <a:lstStyle/>
-          <a:p>
-            <a:pPr algn="r"/>
-            <a:r>
-              <a:rPr lang="en-US" sz="1700" dirty="0" smtClean="0"/>
-              <a:t>Ring Finger Proximal-</a:t>
-            </a:r>
-          </a:p>
-          <a:p>
-            <a:pPr algn="r"/>
-            <a:r>
-              <a:rPr lang="en-US" sz="1700" dirty="0" smtClean="0"/>
-              <a:t>Middle </a:t>
-            </a:r>
-            <a:r>
-              <a:rPr lang="en-US" sz="1700" dirty="0"/>
-              <a:t>Phalanges </a:t>
-            </a:r>
-            <a:r>
-              <a:rPr lang="en-US" sz="1700" dirty="0" smtClean="0"/>
-              <a:t>Joint</a:t>
-            </a:r>
-            <a:endParaRPr lang="en-US" sz="1700" dirty="0"/>
-          </a:p>
-        </p:txBody>
-      </p:sp>
-      <p:sp>
-        <p:nvSpPr>
-          <p:cNvPr id="120" name="TextBox 119"/>
-          <p:cNvSpPr txBox="1"/>
-          <p:nvPr/>
-        </p:nvSpPr>
-        <p:spPr>
-          <a:xfrm>
-            <a:off x="-329245" y="1367091"/>
-            <a:ext cx="3707202" cy="508229"/>
-          </a:xfrm>
-          <a:prstGeom prst="rect">
-            <a:avLst/>
-          </a:prstGeom>
-          <a:noFill/>
-          <a:ln>
-            <a:noFill/>
-          </a:ln>
-        </p:spPr>
-        <p:txBody>
-          <a:bodyPr wrap="square" rtlCol="0">
-            <a:normAutofit fontScale="92500" lnSpcReduction="20000"/>
-          </a:bodyPr>
-          <a:lstStyle/>
-          <a:p>
-            <a:pPr algn="r"/>
-            <a:r>
-              <a:rPr lang="en-US" dirty="0"/>
-              <a:t>Ring Finger Metacarpal- </a:t>
-            </a:r>
-            <a:endParaRPr lang="en-US" dirty="0" smtClean="0"/>
-          </a:p>
-          <a:p>
-            <a:pPr algn="r"/>
-            <a:r>
-              <a:rPr lang="en-US" dirty="0" smtClean="0"/>
-              <a:t>Proximal </a:t>
-            </a:r>
-            <a:r>
-              <a:rPr lang="en-US" dirty="0"/>
-              <a:t>Phalanges Joint</a:t>
-            </a:r>
-          </a:p>
-          <a:p>
-            <a:pPr algn="r"/>
-            <a:endParaRPr lang="en-US" dirty="0"/>
-          </a:p>
-        </p:txBody>
-      </p:sp>
-      <p:sp>
-        <p:nvSpPr>
-          <p:cNvPr id="121" name="TextBox 120"/>
-          <p:cNvSpPr txBox="1"/>
-          <p:nvPr/>
-        </p:nvSpPr>
-        <p:spPr>
-          <a:xfrm>
-            <a:off x="7557580" y="-182563"/>
-            <a:ext cx="3301236" cy="563164"/>
-          </a:xfrm>
-          <a:prstGeom prst="rect">
-            <a:avLst/>
-          </a:prstGeom>
-          <a:noFill/>
-          <a:ln>
-            <a:noFill/>
-          </a:ln>
-        </p:spPr>
-        <p:txBody>
-          <a:bodyPr wrap="square" rtlCol="0">
-            <a:normAutofit fontScale="92500" lnSpcReduction="10000"/>
-          </a:bodyPr>
-          <a:lstStyle/>
-          <a:p>
-            <a:r>
-              <a:rPr lang="en-US" dirty="0"/>
-              <a:t>Middle Finger Metacarpal- Proximal Phalanges </a:t>
-            </a:r>
-            <a:r>
-              <a:rPr lang="en-US" dirty="0" smtClean="0"/>
-              <a:t>Joint </a:t>
-            </a:r>
-            <a:endParaRPr lang="en-US" dirty="0"/>
-          </a:p>
-        </p:txBody>
-      </p:sp>
-      <p:sp>
-        <p:nvSpPr>
-          <p:cNvPr id="122" name="TextBox 121"/>
-          <p:cNvSpPr txBox="1"/>
-          <p:nvPr/>
-        </p:nvSpPr>
-        <p:spPr>
-          <a:xfrm>
-            <a:off x="4793075" y="-1313894"/>
-            <a:ext cx="1127029" cy="1542174"/>
-          </a:xfrm>
-          <a:prstGeom prst="rect">
-            <a:avLst/>
-          </a:prstGeom>
-          <a:noFill/>
-          <a:ln>
-            <a:noFill/>
-          </a:ln>
-        </p:spPr>
-        <p:txBody>
-          <a:bodyPr wrap="square" rtlCol="0">
-            <a:noAutofit/>
-          </a:bodyPr>
-          <a:lstStyle/>
-          <a:p>
-            <a:pPr algn="ctr"/>
-            <a:r>
-              <a:rPr lang="en-US" sz="1700" dirty="0" smtClean="0"/>
-              <a:t>Middle Finger </a:t>
-            </a:r>
-            <a:r>
-              <a:rPr lang="en-US" sz="1700" dirty="0"/>
-              <a:t>Middle-Distal Phalanges </a:t>
-            </a:r>
-            <a:r>
-              <a:rPr lang="en-US" sz="1700" dirty="0" smtClean="0"/>
-              <a:t>Joint</a:t>
-            </a:r>
-            <a:endParaRPr lang="en-US" sz="1700" dirty="0"/>
-          </a:p>
-        </p:txBody>
-      </p:sp>
-      <p:sp>
-        <p:nvSpPr>
-          <p:cNvPr id="123" name="TextBox 122"/>
-          <p:cNvSpPr txBox="1"/>
-          <p:nvPr/>
-        </p:nvSpPr>
-        <p:spPr>
-          <a:xfrm>
-            <a:off x="5984046" y="-1486510"/>
-            <a:ext cx="1150397" cy="1934894"/>
-          </a:xfrm>
-          <a:prstGeom prst="rect">
-            <a:avLst/>
-          </a:prstGeom>
-          <a:noFill/>
-          <a:ln>
-            <a:noFill/>
-          </a:ln>
-        </p:spPr>
-        <p:txBody>
-          <a:bodyPr wrap="square" rtlCol="0">
-            <a:normAutofit/>
-          </a:bodyPr>
-          <a:lstStyle/>
-          <a:p>
-            <a:pPr algn="ctr"/>
-            <a:r>
-              <a:rPr lang="en-US" sz="1700" dirty="0" smtClean="0"/>
-              <a:t>Middle Finger </a:t>
-            </a:r>
-            <a:r>
-              <a:rPr lang="en-US" sz="1700" dirty="0"/>
-              <a:t>Proximal-Middle Phalanges </a:t>
-            </a:r>
-            <a:r>
-              <a:rPr lang="en-US" sz="1700" dirty="0" smtClean="0"/>
-              <a:t>Joint</a:t>
-            </a:r>
-            <a:endParaRPr lang="en-US" sz="1700" dirty="0"/>
-          </a:p>
-        </p:txBody>
-      </p:sp>
-      <p:sp>
-        <p:nvSpPr>
-          <p:cNvPr id="2070" name="Rectangle 2069"/>
-          <p:cNvSpPr/>
-          <p:nvPr/>
-        </p:nvSpPr>
-        <p:spPr>
-          <a:xfrm>
-            <a:off x="7966686" y="3459263"/>
-            <a:ext cx="317343" cy="168434"/>
-          </a:xfrm>
-          <a:prstGeom prst="rect">
-            <a:avLst/>
-          </a:prstGeom>
-          <a:solidFill>
-            <a:srgbClr val="FFFF00">
-              <a:alpha val="35000"/>
-            </a:srgbClr>
-          </a:solidFill>
-          <a:ln>
-            <a:noFill/>
-          </a:ln>
-        </p:spPr>
-        <p:style>
-          <a:lnRef idx="2">
-            <a:schemeClr val="accent1">
-              <a:shade val="50000"/>
-            </a:schemeClr>
-          </a:lnRef>
-          <a:fillRef idx="1">
-            <a:schemeClr val="accent1"/>
-          </a:fillRef>
-          <a:effectRef idx="0">
-            <a:schemeClr val="accent1"/>
-          </a:effectRef>
-          <a:fontRef idx="minor">
-            <a:schemeClr val="lt1"/>
-          </a:fontRef>
-        </p:style>
-        <p:txBody>
-          <a:bodyPr rtlCol="0" anchor="ctr"/>
-          <a:lstStyle/>
-          <a:p>
-            <a:pPr algn="ctr"/>
-            <a:endParaRPr lang="en-US"/>
-          </a:p>
-        </p:txBody>
-      </p:sp>
-      <p:sp>
-        <p:nvSpPr>
-          <p:cNvPr id="125" name="Rectangle 124"/>
-          <p:cNvSpPr/>
-          <p:nvPr/>
-        </p:nvSpPr>
-        <p:spPr>
-          <a:xfrm>
-            <a:off x="7716316" y="4036205"/>
-            <a:ext cx="415313" cy="153821"/>
-          </a:xfrm>
-          <a:prstGeom prst="rect">
-            <a:avLst/>
-          </a:prstGeom>
-          <a:solidFill>
-            <a:srgbClr val="FFFF00">
-              <a:alpha val="35000"/>
-            </a:srgbClr>
-          </a:solidFill>
-          <a:ln>
-            <a:noFill/>
-          </a:ln>
-        </p:spPr>
-        <p:style>
-          <a:lnRef idx="2">
-            <a:schemeClr val="accent1">
-              <a:shade val="50000"/>
-            </a:schemeClr>
-          </a:lnRef>
-          <a:fillRef idx="1">
-            <a:schemeClr val="accent1"/>
-          </a:fillRef>
-          <a:effectRef idx="0">
-            <a:schemeClr val="accent1"/>
-          </a:effectRef>
-          <a:fontRef idx="minor">
-            <a:schemeClr val="lt1"/>
-          </a:fontRef>
-        </p:style>
-        <p:txBody>
-          <a:bodyPr rtlCol="0" anchor="ctr"/>
-          <a:lstStyle/>
-          <a:p>
-            <a:pPr algn="ctr"/>
-            <a:endParaRPr lang="en-US"/>
-          </a:p>
-        </p:txBody>
-      </p:sp>
-      <p:sp>
-        <p:nvSpPr>
-          <p:cNvPr id="126" name="Rectangle 125"/>
-          <p:cNvSpPr/>
-          <p:nvPr/>
-        </p:nvSpPr>
-        <p:spPr>
-          <a:xfrm>
-            <a:off x="6856342" y="2904087"/>
-            <a:ext cx="415313" cy="153821"/>
-          </a:xfrm>
-          <a:prstGeom prst="rect">
-            <a:avLst/>
-          </a:prstGeom>
-          <a:solidFill>
-            <a:srgbClr val="FFFF00">
-              <a:alpha val="35000"/>
-            </a:srgbClr>
-          </a:solidFill>
-          <a:ln>
-            <a:noFill/>
-          </a:ln>
-        </p:spPr>
-        <p:style>
-          <a:lnRef idx="2">
-            <a:schemeClr val="accent1">
-              <a:shade val="50000"/>
-            </a:schemeClr>
-          </a:lnRef>
-          <a:fillRef idx="1">
-            <a:schemeClr val="accent1"/>
-          </a:fillRef>
-          <a:effectRef idx="0">
-            <a:schemeClr val="accent1"/>
-          </a:effectRef>
-          <a:fontRef idx="minor">
-            <a:schemeClr val="lt1"/>
-          </a:fontRef>
-        </p:style>
-        <p:txBody>
-          <a:bodyPr rtlCol="0" anchor="ctr"/>
-          <a:lstStyle/>
-          <a:p>
-            <a:pPr algn="ctr"/>
-            <a:endParaRPr lang="en-US"/>
-          </a:p>
-        </p:txBody>
-      </p:sp>
-      <p:sp>
-        <p:nvSpPr>
-          <p:cNvPr id="127" name="Rectangle 126"/>
-          <p:cNvSpPr/>
-          <p:nvPr/>
-        </p:nvSpPr>
-        <p:spPr>
-          <a:xfrm>
-            <a:off x="6965198" y="2120319"/>
-            <a:ext cx="415313" cy="153821"/>
-          </a:xfrm>
-          <a:prstGeom prst="rect">
-            <a:avLst/>
-          </a:prstGeom>
-          <a:solidFill>
-            <a:srgbClr val="FFFF00">
-              <a:alpha val="35000"/>
-            </a:srgbClr>
-          </a:solidFill>
-          <a:ln>
-            <a:noFill/>
-          </a:ln>
-        </p:spPr>
-        <p:style>
-          <a:lnRef idx="2">
-            <a:schemeClr val="accent1">
-              <a:shade val="50000"/>
-            </a:schemeClr>
-          </a:lnRef>
-          <a:fillRef idx="1">
-            <a:schemeClr val="accent1"/>
-          </a:fillRef>
-          <a:effectRef idx="0">
-            <a:schemeClr val="accent1"/>
-          </a:effectRef>
-          <a:fontRef idx="minor">
-            <a:schemeClr val="lt1"/>
-          </a:fontRef>
-        </p:style>
-        <p:txBody>
-          <a:bodyPr rtlCol="0" anchor="ctr"/>
-          <a:lstStyle/>
-          <a:p>
-            <a:pPr algn="ctr"/>
-            <a:endParaRPr lang="en-US"/>
-          </a:p>
-        </p:txBody>
-      </p:sp>
-      <p:sp>
-        <p:nvSpPr>
-          <p:cNvPr id="128" name="Rectangle 127"/>
-          <p:cNvSpPr/>
-          <p:nvPr/>
-        </p:nvSpPr>
-        <p:spPr>
-          <a:xfrm>
-            <a:off x="7008740" y="1641347"/>
-            <a:ext cx="317569" cy="197162"/>
-          </a:xfrm>
-          <a:prstGeom prst="rect">
-            <a:avLst/>
-          </a:prstGeom>
-          <a:solidFill>
-            <a:srgbClr val="FFFF00">
-              <a:alpha val="35000"/>
-            </a:srgbClr>
-          </a:solidFill>
-          <a:ln>
-            <a:noFill/>
-          </a:ln>
-        </p:spPr>
-        <p:style>
-          <a:lnRef idx="2">
-            <a:schemeClr val="accent1">
-              <a:shade val="50000"/>
-            </a:schemeClr>
-          </a:lnRef>
-          <a:fillRef idx="1">
-            <a:schemeClr val="accent1"/>
-          </a:fillRef>
-          <a:effectRef idx="0">
-            <a:schemeClr val="accent1"/>
-          </a:effectRef>
-          <a:fontRef idx="minor">
-            <a:schemeClr val="lt1"/>
-          </a:fontRef>
-        </p:style>
-        <p:txBody>
-          <a:bodyPr rtlCol="0" anchor="ctr"/>
-          <a:lstStyle/>
-          <a:p>
-            <a:pPr algn="ctr"/>
-            <a:endParaRPr lang="en-US"/>
-          </a:p>
-        </p:txBody>
-      </p:sp>
-      <p:sp>
-        <p:nvSpPr>
-          <p:cNvPr id="129" name="Rectangle 128"/>
-          <p:cNvSpPr/>
-          <p:nvPr/>
-        </p:nvSpPr>
-        <p:spPr>
-          <a:xfrm>
-            <a:off x="3487638" y="3201126"/>
-            <a:ext cx="565618" cy="197162"/>
-          </a:xfrm>
-          <a:prstGeom prst="rect">
-            <a:avLst/>
-          </a:prstGeom>
-          <a:solidFill>
-            <a:srgbClr val="FFFF00">
-              <a:alpha val="35000"/>
-            </a:srgbClr>
-          </a:solidFill>
-          <a:ln>
-            <a:noFill/>
-          </a:ln>
-        </p:spPr>
-        <p:style>
-          <a:lnRef idx="2">
-            <a:schemeClr val="accent1">
-              <a:shade val="50000"/>
-            </a:schemeClr>
-          </a:lnRef>
-          <a:fillRef idx="1">
-            <a:schemeClr val="accent1"/>
-          </a:fillRef>
-          <a:effectRef idx="0">
-            <a:schemeClr val="accent1"/>
-          </a:effectRef>
-          <a:fontRef idx="minor">
-            <a:schemeClr val="lt1"/>
-          </a:fontRef>
-        </p:style>
-        <p:txBody>
-          <a:bodyPr rtlCol="0" anchor="ctr"/>
-          <a:lstStyle/>
-          <a:p>
-            <a:pPr algn="ctr"/>
-            <a:endParaRPr lang="en-US"/>
-          </a:p>
-        </p:txBody>
-      </p:sp>
-      <p:sp>
-        <p:nvSpPr>
-          <p:cNvPr id="130" name="Rectangle 129"/>
-          <p:cNvSpPr/>
-          <p:nvPr/>
-        </p:nvSpPr>
-        <p:spPr>
-          <a:xfrm>
-            <a:off x="3568476" y="4339492"/>
-            <a:ext cx="565618" cy="197162"/>
-          </a:xfrm>
-          <a:prstGeom prst="rect">
-            <a:avLst/>
-          </a:prstGeom>
-          <a:solidFill>
-            <a:srgbClr val="FFFF00">
-              <a:alpha val="35000"/>
-            </a:srgbClr>
-          </a:solidFill>
-          <a:ln>
-            <a:noFill/>
-          </a:ln>
-        </p:spPr>
-        <p:style>
-          <a:lnRef idx="2">
-            <a:schemeClr val="accent1">
-              <a:shade val="50000"/>
-            </a:schemeClr>
-          </a:lnRef>
-          <a:fillRef idx="1">
-            <a:schemeClr val="accent1"/>
-          </a:fillRef>
-          <a:effectRef idx="0">
-            <a:schemeClr val="accent1"/>
-          </a:effectRef>
-          <a:fontRef idx="minor">
-            <a:schemeClr val="lt1"/>
-          </a:fontRef>
-        </p:style>
-        <p:txBody>
-          <a:bodyPr rtlCol="0" anchor="ctr"/>
-          <a:lstStyle/>
-          <a:p>
-            <a:pPr algn="ctr"/>
-            <a:endParaRPr lang="en-US"/>
-          </a:p>
-        </p:txBody>
-      </p:sp>
-      <p:sp>
-        <p:nvSpPr>
-          <p:cNvPr id="131" name="Rectangle 130"/>
-          <p:cNvSpPr/>
-          <p:nvPr/>
-        </p:nvSpPr>
-        <p:spPr>
-          <a:xfrm>
-            <a:off x="4357523" y="4676077"/>
-            <a:ext cx="452781" cy="150155"/>
-          </a:xfrm>
-          <a:prstGeom prst="rect">
-            <a:avLst/>
-          </a:prstGeom>
-          <a:solidFill>
-            <a:srgbClr val="FFFF00">
-              <a:alpha val="35000"/>
-            </a:srgbClr>
-          </a:solidFill>
-          <a:ln>
-            <a:noFill/>
-          </a:ln>
-        </p:spPr>
-        <p:style>
-          <a:lnRef idx="2">
-            <a:schemeClr val="accent1">
-              <a:shade val="50000"/>
-            </a:schemeClr>
-          </a:lnRef>
-          <a:fillRef idx="1">
-            <a:schemeClr val="accent1"/>
-          </a:fillRef>
-          <a:effectRef idx="0">
-            <a:schemeClr val="accent1"/>
-          </a:effectRef>
-          <a:fontRef idx="minor">
-            <a:schemeClr val="lt1"/>
-          </a:fontRef>
-        </p:style>
-        <p:txBody>
-          <a:bodyPr rtlCol="0" anchor="ctr"/>
-          <a:lstStyle/>
-          <a:p>
-            <a:pPr algn="ctr"/>
-            <a:endParaRPr lang="en-US"/>
-          </a:p>
-        </p:txBody>
-      </p:sp>
-      <p:sp>
-        <p:nvSpPr>
-          <p:cNvPr id="2" name="Rectangle 1"/>
-          <p:cNvSpPr/>
-          <p:nvPr/>
-        </p:nvSpPr>
-        <p:spPr>
-          <a:xfrm>
-            <a:off x="3487638" y="1154921"/>
-            <a:ext cx="190043" cy="162539"/>
-          </a:xfrm>
-          <a:prstGeom prst="rect">
-            <a:avLst/>
-          </a:prstGeom>
-          <a:solidFill>
-            <a:schemeClr val="bg1"/>
-          </a:solidFill>
-          <a:ln>
-            <a:noFill/>
-          </a:ln>
-        </p:spPr>
-        <p:style>
-          <a:lnRef idx="2">
-            <a:schemeClr val="accent1">
-              <a:shade val="50000"/>
-            </a:schemeClr>
-          </a:lnRef>
-          <a:fillRef idx="1">
-            <a:schemeClr val="accent1"/>
-          </a:fillRef>
-          <a:effectRef idx="0">
-            <a:schemeClr val="accent1"/>
-          </a:effectRef>
-          <a:fontRef idx="minor">
-            <a:schemeClr val="lt1"/>
-          </a:fontRef>
-        </p:style>
-        <p:txBody>
-          <a:bodyPr rtlCol="0" anchor="ctr"/>
-          <a:lstStyle/>
-          <a:p>
-            <a:pPr algn="ctr"/>
-            <a:endParaRPr lang="en-US"/>
-          </a:p>
-        </p:txBody>
-      </p:sp>
-      <p:sp>
-        <p:nvSpPr>
-          <p:cNvPr id="100" name="Oval 32"/>
-          <p:cNvSpPr>
-            <a:spLocks noChangeArrowheads="1"/>
-          </p:cNvSpPr>
-          <p:nvPr/>
-        </p:nvSpPr>
         <p:spPr bwMode="auto">
           <a:xfrm>
-            <a:off x="3542584" y="599471"/>
-            <a:ext cx="539800" cy="507043"/>
+            <a:off x="9295039" y="5131935"/>
+            <a:ext cx="428625" cy="409575"/>
           </a:xfrm>
           <a:prstGeom prst="ellipse">
             <a:avLst/>
@@ -5818,11 +4841,11 @@
               <a:tabLst/>
             </a:pPr>
             <a:r>
-              <a:rPr lang="en-US" altLang="en-US" sz="1400" b="1" dirty="0" smtClean="0">
+              <a:rPr lang="en-US" altLang="en-US" sz="1400" b="1" dirty="0">
                 <a:latin typeface="Calibri" panose="020F0502020204030204" pitchFamily="34" charset="0"/>
                 <a:cs typeface="Times New Roman" panose="02020603050405020304" pitchFamily="18" charset="0"/>
               </a:rPr>
-              <a:t>12</a:t>
+              <a:t>1</a:t>
             </a:r>
             <a:endParaRPr kumimoji="0" lang="en-US" altLang="en-US" sz="1800" b="0" i="0" u="none" strike="noStrike" cap="none" normalizeH="0" baseline="0" dirty="0" smtClean="0">
               <a:ln>
@@ -5839,1360 +4862,464 @@
       </p:sp>
       <p:sp>
         <p:nvSpPr>
-          <p:cNvPr id="3" name="Freeform 2"/>
+          <p:cNvPr id="110" name="TextBox 109"/>
+          <p:cNvSpPr txBox="1"/>
+          <p:nvPr/>
+        </p:nvSpPr>
+        <p:spPr>
+          <a:xfrm>
+            <a:off x="9795494" y="5134202"/>
+            <a:ext cx="1645392" cy="369332"/>
+          </a:xfrm>
+          <a:prstGeom prst="rect">
+            <a:avLst/>
+          </a:prstGeom>
+          <a:noFill/>
+          <a:ln>
+            <a:noFill/>
+          </a:ln>
+        </p:spPr>
+        <p:txBody>
+          <a:bodyPr wrap="square" rtlCol="0">
+            <a:spAutoFit/>
+          </a:bodyPr>
+          <a:lstStyle/>
+          <a:p>
+            <a:r>
+              <a:rPr lang="en-US" dirty="0" smtClean="0"/>
+              <a:t>Center of Pellet</a:t>
+            </a:r>
+            <a:endParaRPr lang="en-US" dirty="0"/>
+          </a:p>
+        </p:txBody>
+      </p:sp>
+      <p:sp>
+        <p:nvSpPr>
+          <p:cNvPr id="111" name="TextBox 110"/>
+          <p:cNvSpPr txBox="1"/>
+          <p:nvPr/>
+        </p:nvSpPr>
+        <p:spPr>
+          <a:xfrm>
+            <a:off x="8881090" y="1193579"/>
+            <a:ext cx="2559796" cy="369332"/>
+          </a:xfrm>
+          <a:prstGeom prst="rect">
+            <a:avLst/>
+          </a:prstGeom>
+          <a:noFill/>
+          <a:ln>
+            <a:noFill/>
+          </a:ln>
+        </p:spPr>
+        <p:txBody>
+          <a:bodyPr wrap="square" rtlCol="0">
+            <a:spAutoFit/>
+          </a:bodyPr>
+          <a:lstStyle/>
+          <a:p>
+            <a:r>
+              <a:rPr lang="en-US" dirty="0" smtClean="0"/>
+              <a:t>Middle Index Finger Joint</a:t>
+            </a:r>
+            <a:endParaRPr lang="en-US" dirty="0"/>
+          </a:p>
+        </p:txBody>
+      </p:sp>
+      <p:sp>
+        <p:nvSpPr>
+          <p:cNvPr id="112" name="TextBox 111"/>
+          <p:cNvSpPr txBox="1"/>
+          <p:nvPr/>
+        </p:nvSpPr>
+        <p:spPr>
+          <a:xfrm>
+            <a:off x="7955800" y="409806"/>
+            <a:ext cx="2559796" cy="369332"/>
+          </a:xfrm>
+          <a:prstGeom prst="rect">
+            <a:avLst/>
+          </a:prstGeom>
+          <a:noFill/>
+          <a:ln>
+            <a:noFill/>
+          </a:ln>
+        </p:spPr>
+        <p:txBody>
+          <a:bodyPr wrap="square" rtlCol="0">
+            <a:spAutoFit/>
+          </a:bodyPr>
+          <a:lstStyle/>
+          <a:p>
+            <a:r>
+              <a:rPr lang="en-US" dirty="0" smtClean="0"/>
+              <a:t>Near Index Finger Joint</a:t>
+            </a:r>
+            <a:endParaRPr lang="en-US" dirty="0"/>
+          </a:p>
+        </p:txBody>
+      </p:sp>
+      <p:sp>
+        <p:nvSpPr>
+          <p:cNvPr id="113" name="TextBox 112"/>
+          <p:cNvSpPr txBox="1"/>
+          <p:nvPr/>
+        </p:nvSpPr>
+        <p:spPr>
+          <a:xfrm>
+            <a:off x="304802" y="1890812"/>
+            <a:ext cx="2353900" cy="369332"/>
+          </a:xfrm>
+          <a:prstGeom prst="rect">
+            <a:avLst/>
+          </a:prstGeom>
+          <a:noFill/>
+          <a:ln>
+            <a:noFill/>
+          </a:ln>
+        </p:spPr>
+        <p:txBody>
+          <a:bodyPr wrap="square" rtlCol="0">
+            <a:spAutoFit/>
+          </a:bodyPr>
+          <a:lstStyle/>
+          <a:p>
+            <a:pPr algn="r"/>
+            <a:r>
+              <a:rPr lang="en-US" dirty="0" smtClean="0"/>
+              <a:t>Near Pinky Finger Joint</a:t>
+            </a:r>
+            <a:endParaRPr lang="en-US" dirty="0"/>
+          </a:p>
+        </p:txBody>
+      </p:sp>
+      <p:sp>
+        <p:nvSpPr>
+          <p:cNvPr id="115" name="TextBox 114"/>
+          <p:cNvSpPr txBox="1"/>
+          <p:nvPr/>
+        </p:nvSpPr>
+        <p:spPr>
+          <a:xfrm>
+            <a:off x="-293915" y="2608723"/>
+            <a:ext cx="2514609" cy="369332"/>
+          </a:xfrm>
+          <a:prstGeom prst="rect">
+            <a:avLst/>
+          </a:prstGeom>
+          <a:noFill/>
+          <a:ln>
+            <a:noFill/>
+          </a:ln>
+        </p:spPr>
+        <p:txBody>
+          <a:bodyPr wrap="square" rtlCol="0">
+            <a:spAutoFit/>
+          </a:bodyPr>
+          <a:lstStyle/>
+          <a:p>
+            <a:pPr algn="r"/>
+            <a:r>
+              <a:rPr lang="en-US" dirty="0" smtClean="0"/>
+              <a:t>Middle Pinky Finger Joint</a:t>
+            </a:r>
+            <a:endParaRPr lang="en-US" dirty="0"/>
+          </a:p>
+        </p:txBody>
+      </p:sp>
+      <p:sp>
+        <p:nvSpPr>
+          <p:cNvPr id="116" name="TextBox 115"/>
+          <p:cNvSpPr txBox="1"/>
+          <p:nvPr/>
+        </p:nvSpPr>
+        <p:spPr>
+          <a:xfrm>
+            <a:off x="206828" y="3479577"/>
+            <a:ext cx="2198925" cy="369332"/>
+          </a:xfrm>
+          <a:prstGeom prst="rect">
+            <a:avLst/>
+          </a:prstGeom>
+          <a:noFill/>
+          <a:ln>
+            <a:noFill/>
+          </a:ln>
+        </p:spPr>
+        <p:txBody>
+          <a:bodyPr wrap="square" rtlCol="0">
+            <a:spAutoFit/>
+          </a:bodyPr>
+          <a:lstStyle/>
+          <a:p>
+            <a:pPr algn="r"/>
+            <a:r>
+              <a:rPr lang="en-US" dirty="0" smtClean="0"/>
+              <a:t>Far Pinky Finger Joint</a:t>
+            </a:r>
+            <a:endParaRPr lang="en-US" dirty="0"/>
+          </a:p>
+        </p:txBody>
+      </p:sp>
+      <p:sp>
+        <p:nvSpPr>
+          <p:cNvPr id="2069" name="TextBox 2068"/>
+          <p:cNvSpPr txBox="1"/>
+          <p:nvPr/>
+        </p:nvSpPr>
+        <p:spPr>
+          <a:xfrm>
+            <a:off x="9295039" y="5705479"/>
+            <a:ext cx="2896961" cy="1069634"/>
+          </a:xfrm>
+          <a:prstGeom prst="rect">
+            <a:avLst/>
+          </a:prstGeom>
+          <a:noFill/>
+        </p:spPr>
+        <p:txBody>
+          <a:bodyPr wrap="square" rtlCol="0">
+            <a:noAutofit/>
+          </a:bodyPr>
+          <a:lstStyle/>
+          <a:p>
+            <a:pPr algn="just"/>
+            <a:r>
+              <a:rPr lang="en-US" sz="1400" dirty="0" smtClean="0"/>
+              <a:t>The far/middle/near designation was conceived in reference to the center frame, i.e. the farthest joint from the view of the person marking</a:t>
+            </a:r>
+            <a:endParaRPr lang="en-US" sz="1400" dirty="0"/>
+          </a:p>
+        </p:txBody>
+      </p:sp>
+      <p:sp>
+        <p:nvSpPr>
+          <p:cNvPr id="118" name="TextBox 117"/>
+          <p:cNvSpPr txBox="1"/>
+          <p:nvPr/>
+        </p:nvSpPr>
+        <p:spPr>
+          <a:xfrm>
+            <a:off x="2013858" y="127325"/>
+            <a:ext cx="2353901" cy="369332"/>
+          </a:xfrm>
+          <a:prstGeom prst="rect">
+            <a:avLst/>
+          </a:prstGeom>
+          <a:noFill/>
+          <a:ln>
+            <a:noFill/>
+          </a:ln>
+        </p:spPr>
+        <p:txBody>
+          <a:bodyPr wrap="square" rtlCol="0">
+            <a:spAutoFit/>
+          </a:bodyPr>
+          <a:lstStyle/>
+          <a:p>
+            <a:pPr algn="r"/>
+            <a:r>
+              <a:rPr lang="en-US" dirty="0" smtClean="0"/>
+              <a:t>Near Ring Finger Joint</a:t>
+            </a:r>
+            <a:endParaRPr lang="en-US" dirty="0"/>
+          </a:p>
+        </p:txBody>
+      </p:sp>
+      <p:sp>
+        <p:nvSpPr>
+          <p:cNvPr id="119" name="TextBox 118"/>
+          <p:cNvSpPr txBox="1"/>
+          <p:nvPr/>
+        </p:nvSpPr>
+        <p:spPr>
+          <a:xfrm>
+            <a:off x="1426028" y="725634"/>
+            <a:ext cx="2503091" cy="369332"/>
+          </a:xfrm>
+          <a:prstGeom prst="rect">
+            <a:avLst/>
+          </a:prstGeom>
+          <a:noFill/>
+          <a:ln>
+            <a:noFill/>
+          </a:ln>
+        </p:spPr>
+        <p:txBody>
+          <a:bodyPr wrap="square" rtlCol="0">
+            <a:spAutoFit/>
+          </a:bodyPr>
+          <a:lstStyle/>
+          <a:p>
+            <a:pPr algn="r"/>
+            <a:r>
+              <a:rPr lang="en-US" dirty="0" smtClean="0"/>
+              <a:t>Middle Ring Finger Joint</a:t>
+            </a:r>
+            <a:endParaRPr lang="en-US" dirty="0"/>
+          </a:p>
+        </p:txBody>
+      </p:sp>
+      <p:sp>
+        <p:nvSpPr>
+          <p:cNvPr id="120" name="TextBox 119"/>
+          <p:cNvSpPr txBox="1"/>
+          <p:nvPr/>
+        </p:nvSpPr>
+        <p:spPr>
+          <a:xfrm>
+            <a:off x="1644675" y="1291550"/>
+            <a:ext cx="2121794" cy="369332"/>
+          </a:xfrm>
+          <a:prstGeom prst="rect">
+            <a:avLst/>
+          </a:prstGeom>
+          <a:noFill/>
+          <a:ln>
+            <a:noFill/>
+          </a:ln>
+        </p:spPr>
+        <p:txBody>
+          <a:bodyPr wrap="square" rtlCol="0">
+            <a:spAutoFit/>
+          </a:bodyPr>
+          <a:lstStyle/>
+          <a:p>
+            <a:pPr algn="r"/>
+            <a:r>
+              <a:rPr lang="en-US" dirty="0" smtClean="0"/>
+              <a:t>Far Ring Finger Joint</a:t>
+            </a:r>
+            <a:endParaRPr lang="en-US" dirty="0"/>
+          </a:p>
+        </p:txBody>
+      </p:sp>
+      <p:sp>
+        <p:nvSpPr>
+          <p:cNvPr id="121" name="TextBox 120"/>
+          <p:cNvSpPr txBox="1"/>
+          <p:nvPr/>
+        </p:nvSpPr>
+        <p:spPr>
+          <a:xfrm>
+            <a:off x="7400632" y="-112707"/>
+            <a:ext cx="2363852" cy="369332"/>
+          </a:xfrm>
+          <a:prstGeom prst="rect">
+            <a:avLst/>
+          </a:prstGeom>
+          <a:noFill/>
+          <a:ln>
+            <a:noFill/>
+          </a:ln>
+        </p:spPr>
+        <p:txBody>
+          <a:bodyPr wrap="square" rtlCol="0">
+            <a:spAutoFit/>
+          </a:bodyPr>
+          <a:lstStyle/>
+          <a:p>
+            <a:r>
+              <a:rPr lang="en-US" dirty="0" smtClean="0"/>
+              <a:t>Far Middle Finger Joint</a:t>
+            </a:r>
+            <a:endParaRPr lang="en-US" dirty="0"/>
+          </a:p>
+        </p:txBody>
+      </p:sp>
+      <p:sp>
+        <p:nvSpPr>
+          <p:cNvPr id="122" name="TextBox 121"/>
+          <p:cNvSpPr txBox="1"/>
+          <p:nvPr/>
+        </p:nvSpPr>
+        <p:spPr>
+          <a:xfrm>
+            <a:off x="5775202" y="-354370"/>
+            <a:ext cx="1127029" cy="504580"/>
+          </a:xfrm>
+          <a:prstGeom prst="rect">
+            <a:avLst/>
+          </a:prstGeom>
+          <a:noFill/>
+          <a:ln>
+            <a:noFill/>
+          </a:ln>
+        </p:spPr>
+        <p:txBody>
+          <a:bodyPr wrap="square" rtlCol="0">
+            <a:normAutofit lnSpcReduction="10000"/>
+          </a:bodyPr>
+          <a:lstStyle/>
+          <a:p>
+            <a:pPr algn="ctr"/>
+            <a:r>
+              <a:rPr lang="en-US" sz="1400" dirty="0" smtClean="0"/>
+              <a:t>Near Middle F. J.</a:t>
+            </a:r>
+            <a:endParaRPr lang="en-US" sz="1400" dirty="0"/>
+          </a:p>
+        </p:txBody>
+      </p:sp>
+      <p:sp>
+        <p:nvSpPr>
+          <p:cNvPr id="123" name="TextBox 122"/>
+          <p:cNvSpPr txBox="1"/>
+          <p:nvPr/>
+        </p:nvSpPr>
+        <p:spPr>
+          <a:xfrm>
+            <a:off x="4911172" y="107749"/>
+            <a:ext cx="1030822" cy="492680"/>
+          </a:xfrm>
+          <a:prstGeom prst="rect">
+            <a:avLst/>
+          </a:prstGeom>
+          <a:noFill/>
+          <a:ln>
+            <a:noFill/>
+          </a:ln>
+        </p:spPr>
+        <p:txBody>
+          <a:bodyPr wrap="square" rtlCol="0">
+            <a:noAutofit/>
+          </a:bodyPr>
+          <a:lstStyle/>
+          <a:p>
+            <a:pPr algn="ctr"/>
+            <a:r>
+              <a:rPr lang="en-US" sz="1400" dirty="0" smtClean="0"/>
+              <a:t>Middle </a:t>
+            </a:r>
+            <a:r>
+              <a:rPr lang="en-US" sz="1400" dirty="0" smtClean="0"/>
+              <a:t>Middle</a:t>
+            </a:r>
+            <a:r>
+              <a:rPr lang="en-US" sz="1400" dirty="0" smtClean="0"/>
+              <a:t> F. J.</a:t>
+            </a:r>
+            <a:endParaRPr lang="en-US" sz="1400" dirty="0"/>
+          </a:p>
+        </p:txBody>
+      </p:sp>
+      <p:sp>
+        <p:nvSpPr>
+          <p:cNvPr id="2070" name="Rectangle 2069"/>
           <p:cNvSpPr/>
           <p:nvPr/>
         </p:nvSpPr>
         <p:spPr>
           <a:xfrm>
-            <a:off x="4851400" y="3445933"/>
-            <a:ext cx="2556933" cy="2345267"/>
-          </a:xfrm>
-          <a:custGeom>
-            <a:avLst/>
-            <a:gdLst>
-              <a:gd name="connsiteX0" fmla="*/ 16933 w 2556933"/>
-              <a:gd name="connsiteY0" fmla="*/ 575734 h 2345267"/>
-              <a:gd name="connsiteX1" fmla="*/ 16933 w 2556933"/>
-              <a:gd name="connsiteY1" fmla="*/ 575734 h 2345267"/>
-              <a:gd name="connsiteX2" fmla="*/ 93133 w 2556933"/>
-              <a:gd name="connsiteY2" fmla="*/ 541867 h 2345267"/>
-              <a:gd name="connsiteX3" fmla="*/ 101600 w 2556933"/>
-              <a:gd name="connsiteY3" fmla="*/ 516467 h 2345267"/>
-              <a:gd name="connsiteX4" fmla="*/ 127000 w 2556933"/>
-              <a:gd name="connsiteY4" fmla="*/ 491067 h 2345267"/>
-              <a:gd name="connsiteX5" fmla="*/ 160867 w 2556933"/>
-              <a:gd name="connsiteY5" fmla="*/ 474134 h 2345267"/>
-              <a:gd name="connsiteX6" fmla="*/ 279400 w 2556933"/>
-              <a:gd name="connsiteY6" fmla="*/ 448734 h 2345267"/>
-              <a:gd name="connsiteX7" fmla="*/ 296333 w 2556933"/>
-              <a:gd name="connsiteY7" fmla="*/ 431800 h 2345267"/>
-              <a:gd name="connsiteX8" fmla="*/ 321733 w 2556933"/>
-              <a:gd name="connsiteY8" fmla="*/ 414867 h 2345267"/>
-              <a:gd name="connsiteX9" fmla="*/ 338667 w 2556933"/>
-              <a:gd name="connsiteY9" fmla="*/ 389467 h 2345267"/>
-              <a:gd name="connsiteX10" fmla="*/ 355600 w 2556933"/>
-              <a:gd name="connsiteY10" fmla="*/ 338667 h 2345267"/>
-              <a:gd name="connsiteX11" fmla="*/ 364067 w 2556933"/>
-              <a:gd name="connsiteY11" fmla="*/ 313267 h 2345267"/>
-              <a:gd name="connsiteX12" fmla="*/ 389467 w 2556933"/>
-              <a:gd name="connsiteY12" fmla="*/ 287867 h 2345267"/>
-              <a:gd name="connsiteX13" fmla="*/ 533400 w 2556933"/>
-              <a:gd name="connsiteY13" fmla="*/ 262467 h 2345267"/>
-              <a:gd name="connsiteX14" fmla="*/ 677333 w 2556933"/>
-              <a:gd name="connsiteY14" fmla="*/ 254000 h 2345267"/>
-              <a:gd name="connsiteX15" fmla="*/ 711200 w 2556933"/>
-              <a:gd name="connsiteY15" fmla="*/ 245534 h 2345267"/>
-              <a:gd name="connsiteX16" fmla="*/ 745067 w 2556933"/>
-              <a:gd name="connsiteY16" fmla="*/ 211667 h 2345267"/>
-              <a:gd name="connsiteX17" fmla="*/ 787400 w 2556933"/>
-              <a:gd name="connsiteY17" fmla="*/ 160867 h 2345267"/>
-              <a:gd name="connsiteX18" fmla="*/ 812800 w 2556933"/>
-              <a:gd name="connsiteY18" fmla="*/ 135467 h 2345267"/>
-              <a:gd name="connsiteX19" fmla="*/ 838200 w 2556933"/>
-              <a:gd name="connsiteY19" fmla="*/ 84667 h 2345267"/>
-              <a:gd name="connsiteX20" fmla="*/ 863600 w 2556933"/>
-              <a:gd name="connsiteY20" fmla="*/ 59267 h 2345267"/>
-              <a:gd name="connsiteX21" fmla="*/ 1303867 w 2556933"/>
-              <a:gd name="connsiteY21" fmla="*/ 50800 h 2345267"/>
-              <a:gd name="connsiteX22" fmla="*/ 1354667 w 2556933"/>
-              <a:gd name="connsiteY22" fmla="*/ 42334 h 2345267"/>
-              <a:gd name="connsiteX23" fmla="*/ 1388533 w 2556933"/>
-              <a:gd name="connsiteY23" fmla="*/ 33867 h 2345267"/>
-              <a:gd name="connsiteX24" fmla="*/ 1397000 w 2556933"/>
-              <a:gd name="connsiteY24" fmla="*/ 0 h 2345267"/>
-              <a:gd name="connsiteX25" fmla="*/ 1490133 w 2556933"/>
-              <a:gd name="connsiteY25" fmla="*/ 8467 h 2345267"/>
-              <a:gd name="connsiteX26" fmla="*/ 1540933 w 2556933"/>
-              <a:gd name="connsiteY26" fmla="*/ 33867 h 2345267"/>
-              <a:gd name="connsiteX27" fmla="*/ 1566333 w 2556933"/>
-              <a:gd name="connsiteY27" fmla="*/ 42334 h 2345267"/>
-              <a:gd name="connsiteX28" fmla="*/ 1634067 w 2556933"/>
-              <a:gd name="connsiteY28" fmla="*/ 59267 h 2345267"/>
-              <a:gd name="connsiteX29" fmla="*/ 1659467 w 2556933"/>
-              <a:gd name="connsiteY29" fmla="*/ 67734 h 2345267"/>
-              <a:gd name="connsiteX30" fmla="*/ 1735667 w 2556933"/>
-              <a:gd name="connsiteY30" fmla="*/ 76200 h 2345267"/>
-              <a:gd name="connsiteX31" fmla="*/ 1769533 w 2556933"/>
-              <a:gd name="connsiteY31" fmla="*/ 118534 h 2345267"/>
-              <a:gd name="connsiteX32" fmla="*/ 1786467 w 2556933"/>
-              <a:gd name="connsiteY32" fmla="*/ 135467 h 2345267"/>
-              <a:gd name="connsiteX33" fmla="*/ 1803400 w 2556933"/>
-              <a:gd name="connsiteY33" fmla="*/ 160867 h 2345267"/>
-              <a:gd name="connsiteX34" fmla="*/ 1828800 w 2556933"/>
-              <a:gd name="connsiteY34" fmla="*/ 186267 h 2345267"/>
-              <a:gd name="connsiteX35" fmla="*/ 1845733 w 2556933"/>
-              <a:gd name="connsiteY35" fmla="*/ 211667 h 2345267"/>
-              <a:gd name="connsiteX36" fmla="*/ 1888067 w 2556933"/>
-              <a:gd name="connsiteY36" fmla="*/ 245534 h 2345267"/>
-              <a:gd name="connsiteX37" fmla="*/ 1921933 w 2556933"/>
-              <a:gd name="connsiteY37" fmla="*/ 296334 h 2345267"/>
-              <a:gd name="connsiteX38" fmla="*/ 1938867 w 2556933"/>
-              <a:gd name="connsiteY38" fmla="*/ 321734 h 2345267"/>
-              <a:gd name="connsiteX39" fmla="*/ 1955800 w 2556933"/>
-              <a:gd name="connsiteY39" fmla="*/ 347134 h 2345267"/>
-              <a:gd name="connsiteX40" fmla="*/ 1964267 w 2556933"/>
-              <a:gd name="connsiteY40" fmla="*/ 372534 h 2345267"/>
-              <a:gd name="connsiteX41" fmla="*/ 1998133 w 2556933"/>
-              <a:gd name="connsiteY41" fmla="*/ 423334 h 2345267"/>
-              <a:gd name="connsiteX42" fmla="*/ 2015067 w 2556933"/>
-              <a:gd name="connsiteY42" fmla="*/ 448734 h 2345267"/>
-              <a:gd name="connsiteX43" fmla="*/ 2040467 w 2556933"/>
-              <a:gd name="connsiteY43" fmla="*/ 499534 h 2345267"/>
-              <a:gd name="connsiteX44" fmla="*/ 2048933 w 2556933"/>
-              <a:gd name="connsiteY44" fmla="*/ 524934 h 2345267"/>
-              <a:gd name="connsiteX45" fmla="*/ 2065867 w 2556933"/>
-              <a:gd name="connsiteY45" fmla="*/ 541867 h 2345267"/>
-              <a:gd name="connsiteX46" fmla="*/ 2082800 w 2556933"/>
-              <a:gd name="connsiteY46" fmla="*/ 567267 h 2345267"/>
-              <a:gd name="connsiteX47" fmla="*/ 2108200 w 2556933"/>
-              <a:gd name="connsiteY47" fmla="*/ 618067 h 2345267"/>
-              <a:gd name="connsiteX48" fmla="*/ 2133600 w 2556933"/>
-              <a:gd name="connsiteY48" fmla="*/ 635000 h 2345267"/>
-              <a:gd name="connsiteX49" fmla="*/ 2150533 w 2556933"/>
-              <a:gd name="connsiteY49" fmla="*/ 660400 h 2345267"/>
-              <a:gd name="connsiteX50" fmla="*/ 2167467 w 2556933"/>
-              <a:gd name="connsiteY50" fmla="*/ 677334 h 2345267"/>
-              <a:gd name="connsiteX51" fmla="*/ 2175933 w 2556933"/>
-              <a:gd name="connsiteY51" fmla="*/ 702734 h 2345267"/>
-              <a:gd name="connsiteX52" fmla="*/ 2209800 w 2556933"/>
-              <a:gd name="connsiteY52" fmla="*/ 753534 h 2345267"/>
-              <a:gd name="connsiteX53" fmla="*/ 2243667 w 2556933"/>
-              <a:gd name="connsiteY53" fmla="*/ 804334 h 2345267"/>
-              <a:gd name="connsiteX54" fmla="*/ 2319867 w 2556933"/>
-              <a:gd name="connsiteY54" fmla="*/ 838200 h 2345267"/>
-              <a:gd name="connsiteX55" fmla="*/ 2345267 w 2556933"/>
-              <a:gd name="connsiteY55" fmla="*/ 846667 h 2345267"/>
-              <a:gd name="connsiteX56" fmla="*/ 2370667 w 2556933"/>
-              <a:gd name="connsiteY56" fmla="*/ 855134 h 2345267"/>
-              <a:gd name="connsiteX57" fmla="*/ 2387600 w 2556933"/>
-              <a:gd name="connsiteY57" fmla="*/ 880534 h 2345267"/>
-              <a:gd name="connsiteX58" fmla="*/ 2463800 w 2556933"/>
-              <a:gd name="connsiteY58" fmla="*/ 922867 h 2345267"/>
-              <a:gd name="connsiteX59" fmla="*/ 2489200 w 2556933"/>
-              <a:gd name="connsiteY59" fmla="*/ 948267 h 2345267"/>
-              <a:gd name="connsiteX60" fmla="*/ 2514600 w 2556933"/>
-              <a:gd name="connsiteY60" fmla="*/ 965200 h 2345267"/>
-              <a:gd name="connsiteX61" fmla="*/ 2548467 w 2556933"/>
-              <a:gd name="connsiteY61" fmla="*/ 999067 h 2345267"/>
-              <a:gd name="connsiteX62" fmla="*/ 2556933 w 2556933"/>
-              <a:gd name="connsiteY62" fmla="*/ 1032934 h 2345267"/>
-              <a:gd name="connsiteX63" fmla="*/ 2548467 w 2556933"/>
-              <a:gd name="connsiteY63" fmla="*/ 1058334 h 2345267"/>
-              <a:gd name="connsiteX64" fmla="*/ 2506133 w 2556933"/>
-              <a:gd name="connsiteY64" fmla="*/ 1100667 h 2345267"/>
-              <a:gd name="connsiteX65" fmla="*/ 2463800 w 2556933"/>
-              <a:gd name="connsiteY65" fmla="*/ 1159934 h 2345267"/>
-              <a:gd name="connsiteX66" fmla="*/ 2429933 w 2556933"/>
-              <a:gd name="connsiteY66" fmla="*/ 1202267 h 2345267"/>
-              <a:gd name="connsiteX67" fmla="*/ 2396067 w 2556933"/>
-              <a:gd name="connsiteY67" fmla="*/ 1253067 h 2345267"/>
-              <a:gd name="connsiteX68" fmla="*/ 2362200 w 2556933"/>
-              <a:gd name="connsiteY68" fmla="*/ 1295400 h 2345267"/>
-              <a:gd name="connsiteX69" fmla="*/ 2345267 w 2556933"/>
-              <a:gd name="connsiteY69" fmla="*/ 1312334 h 2345267"/>
-              <a:gd name="connsiteX70" fmla="*/ 2311400 w 2556933"/>
-              <a:gd name="connsiteY70" fmla="*/ 1363134 h 2345267"/>
-              <a:gd name="connsiteX71" fmla="*/ 2286000 w 2556933"/>
-              <a:gd name="connsiteY71" fmla="*/ 1388534 h 2345267"/>
-              <a:gd name="connsiteX72" fmla="*/ 2252133 w 2556933"/>
-              <a:gd name="connsiteY72" fmla="*/ 1439334 h 2345267"/>
-              <a:gd name="connsiteX73" fmla="*/ 2209800 w 2556933"/>
-              <a:gd name="connsiteY73" fmla="*/ 1481667 h 2345267"/>
-              <a:gd name="connsiteX74" fmla="*/ 2159000 w 2556933"/>
-              <a:gd name="connsiteY74" fmla="*/ 1540934 h 2345267"/>
-              <a:gd name="connsiteX75" fmla="*/ 2133600 w 2556933"/>
-              <a:gd name="connsiteY75" fmla="*/ 1566334 h 2345267"/>
-              <a:gd name="connsiteX76" fmla="*/ 2065867 w 2556933"/>
-              <a:gd name="connsiteY76" fmla="*/ 1667934 h 2345267"/>
-              <a:gd name="connsiteX77" fmla="*/ 2048933 w 2556933"/>
-              <a:gd name="connsiteY77" fmla="*/ 1693334 h 2345267"/>
-              <a:gd name="connsiteX78" fmla="*/ 2032000 w 2556933"/>
-              <a:gd name="connsiteY78" fmla="*/ 1718734 h 2345267"/>
-              <a:gd name="connsiteX79" fmla="*/ 2006600 w 2556933"/>
-              <a:gd name="connsiteY79" fmla="*/ 1735667 h 2345267"/>
-              <a:gd name="connsiteX80" fmla="*/ 1955800 w 2556933"/>
-              <a:gd name="connsiteY80" fmla="*/ 1786467 h 2345267"/>
-              <a:gd name="connsiteX81" fmla="*/ 1930400 w 2556933"/>
-              <a:gd name="connsiteY81" fmla="*/ 1803400 h 2345267"/>
-              <a:gd name="connsiteX82" fmla="*/ 1896533 w 2556933"/>
-              <a:gd name="connsiteY82" fmla="*/ 1845734 h 2345267"/>
-              <a:gd name="connsiteX83" fmla="*/ 1871133 w 2556933"/>
-              <a:gd name="connsiteY83" fmla="*/ 1871134 h 2345267"/>
-              <a:gd name="connsiteX84" fmla="*/ 1794933 w 2556933"/>
-              <a:gd name="connsiteY84" fmla="*/ 1913467 h 2345267"/>
-              <a:gd name="connsiteX85" fmla="*/ 1744133 w 2556933"/>
-              <a:gd name="connsiteY85" fmla="*/ 1947334 h 2345267"/>
-              <a:gd name="connsiteX86" fmla="*/ 1693333 w 2556933"/>
-              <a:gd name="connsiteY86" fmla="*/ 1981200 h 2345267"/>
-              <a:gd name="connsiteX87" fmla="*/ 1659467 w 2556933"/>
-              <a:gd name="connsiteY87" fmla="*/ 2023534 h 2345267"/>
-              <a:gd name="connsiteX88" fmla="*/ 1642533 w 2556933"/>
-              <a:gd name="connsiteY88" fmla="*/ 2040467 h 2345267"/>
-              <a:gd name="connsiteX89" fmla="*/ 1634067 w 2556933"/>
-              <a:gd name="connsiteY89" fmla="*/ 2065867 h 2345267"/>
-              <a:gd name="connsiteX90" fmla="*/ 1608667 w 2556933"/>
-              <a:gd name="connsiteY90" fmla="*/ 2082800 h 2345267"/>
-              <a:gd name="connsiteX91" fmla="*/ 1591733 w 2556933"/>
-              <a:gd name="connsiteY91" fmla="*/ 2099734 h 2345267"/>
-              <a:gd name="connsiteX92" fmla="*/ 1473200 w 2556933"/>
-              <a:gd name="connsiteY92" fmla="*/ 2116667 h 2345267"/>
-              <a:gd name="connsiteX93" fmla="*/ 1422400 w 2556933"/>
-              <a:gd name="connsiteY93" fmla="*/ 2142067 h 2345267"/>
-              <a:gd name="connsiteX94" fmla="*/ 1397000 w 2556933"/>
-              <a:gd name="connsiteY94" fmla="*/ 2150534 h 2345267"/>
-              <a:gd name="connsiteX95" fmla="*/ 1371600 w 2556933"/>
-              <a:gd name="connsiteY95" fmla="*/ 2167467 h 2345267"/>
-              <a:gd name="connsiteX96" fmla="*/ 1346200 w 2556933"/>
-              <a:gd name="connsiteY96" fmla="*/ 2175934 h 2345267"/>
-              <a:gd name="connsiteX97" fmla="*/ 1286933 w 2556933"/>
-              <a:gd name="connsiteY97" fmla="*/ 2201334 h 2345267"/>
-              <a:gd name="connsiteX98" fmla="*/ 1261533 w 2556933"/>
-              <a:gd name="connsiteY98" fmla="*/ 2218267 h 2345267"/>
-              <a:gd name="connsiteX99" fmla="*/ 1168400 w 2556933"/>
-              <a:gd name="connsiteY99" fmla="*/ 2243667 h 2345267"/>
-              <a:gd name="connsiteX100" fmla="*/ 1117600 w 2556933"/>
-              <a:gd name="connsiteY100" fmla="*/ 2260600 h 2345267"/>
-              <a:gd name="connsiteX101" fmla="*/ 1083733 w 2556933"/>
-              <a:gd name="connsiteY101" fmla="*/ 2277534 h 2345267"/>
-              <a:gd name="connsiteX102" fmla="*/ 999067 w 2556933"/>
-              <a:gd name="connsiteY102" fmla="*/ 2286000 h 2345267"/>
-              <a:gd name="connsiteX103" fmla="*/ 973667 w 2556933"/>
-              <a:gd name="connsiteY103" fmla="*/ 2294467 h 2345267"/>
-              <a:gd name="connsiteX104" fmla="*/ 914400 w 2556933"/>
-              <a:gd name="connsiteY104" fmla="*/ 2311400 h 2345267"/>
-              <a:gd name="connsiteX105" fmla="*/ 889000 w 2556933"/>
-              <a:gd name="connsiteY105" fmla="*/ 2328334 h 2345267"/>
-              <a:gd name="connsiteX106" fmla="*/ 829733 w 2556933"/>
-              <a:gd name="connsiteY106" fmla="*/ 2345267 h 2345267"/>
-              <a:gd name="connsiteX107" fmla="*/ 745067 w 2556933"/>
-              <a:gd name="connsiteY107" fmla="*/ 2319867 h 2345267"/>
-              <a:gd name="connsiteX108" fmla="*/ 694267 w 2556933"/>
-              <a:gd name="connsiteY108" fmla="*/ 2302934 h 2345267"/>
-              <a:gd name="connsiteX109" fmla="*/ 575733 w 2556933"/>
-              <a:gd name="connsiteY109" fmla="*/ 2286000 h 2345267"/>
-              <a:gd name="connsiteX110" fmla="*/ 524933 w 2556933"/>
-              <a:gd name="connsiteY110" fmla="*/ 2243667 h 2345267"/>
-              <a:gd name="connsiteX111" fmla="*/ 499533 w 2556933"/>
-              <a:gd name="connsiteY111" fmla="*/ 2226734 h 2345267"/>
-              <a:gd name="connsiteX112" fmla="*/ 457200 w 2556933"/>
-              <a:gd name="connsiteY112" fmla="*/ 2184400 h 2345267"/>
-              <a:gd name="connsiteX113" fmla="*/ 431800 w 2556933"/>
-              <a:gd name="connsiteY113" fmla="*/ 2099734 h 2345267"/>
-              <a:gd name="connsiteX114" fmla="*/ 406400 w 2556933"/>
-              <a:gd name="connsiteY114" fmla="*/ 1710267 h 2345267"/>
-              <a:gd name="connsiteX115" fmla="*/ 389467 w 2556933"/>
-              <a:gd name="connsiteY115" fmla="*/ 1676400 h 2345267"/>
-              <a:gd name="connsiteX116" fmla="*/ 372533 w 2556933"/>
-              <a:gd name="connsiteY116" fmla="*/ 1625600 h 2345267"/>
-              <a:gd name="connsiteX117" fmla="*/ 347133 w 2556933"/>
-              <a:gd name="connsiteY117" fmla="*/ 1600200 h 2345267"/>
-              <a:gd name="connsiteX118" fmla="*/ 313267 w 2556933"/>
-              <a:gd name="connsiteY118" fmla="*/ 1549400 h 2345267"/>
-              <a:gd name="connsiteX119" fmla="*/ 287867 w 2556933"/>
-              <a:gd name="connsiteY119" fmla="*/ 1464734 h 2345267"/>
-              <a:gd name="connsiteX120" fmla="*/ 270933 w 2556933"/>
-              <a:gd name="connsiteY120" fmla="*/ 1439334 h 2345267"/>
-              <a:gd name="connsiteX121" fmla="*/ 254000 w 2556933"/>
-              <a:gd name="connsiteY121" fmla="*/ 1388534 h 2345267"/>
-              <a:gd name="connsiteX122" fmla="*/ 245533 w 2556933"/>
-              <a:gd name="connsiteY122" fmla="*/ 1363134 h 2345267"/>
-              <a:gd name="connsiteX123" fmla="*/ 228600 w 2556933"/>
-              <a:gd name="connsiteY123" fmla="*/ 1253067 h 2345267"/>
-              <a:gd name="connsiteX124" fmla="*/ 220133 w 2556933"/>
-              <a:gd name="connsiteY124" fmla="*/ 1202267 h 2345267"/>
-              <a:gd name="connsiteX125" fmla="*/ 211667 w 2556933"/>
-              <a:gd name="connsiteY125" fmla="*/ 1176867 h 2345267"/>
-              <a:gd name="connsiteX126" fmla="*/ 203200 w 2556933"/>
-              <a:gd name="connsiteY126" fmla="*/ 1143000 h 2345267"/>
-              <a:gd name="connsiteX127" fmla="*/ 160867 w 2556933"/>
-              <a:gd name="connsiteY127" fmla="*/ 1092200 h 2345267"/>
-              <a:gd name="connsiteX128" fmla="*/ 152400 w 2556933"/>
-              <a:gd name="connsiteY128" fmla="*/ 1066800 h 2345267"/>
-              <a:gd name="connsiteX129" fmla="*/ 118533 w 2556933"/>
-              <a:gd name="connsiteY129" fmla="*/ 1016000 h 2345267"/>
-              <a:gd name="connsiteX130" fmla="*/ 93133 w 2556933"/>
-              <a:gd name="connsiteY130" fmla="*/ 965200 h 2345267"/>
-              <a:gd name="connsiteX131" fmla="*/ 76200 w 2556933"/>
-              <a:gd name="connsiteY131" fmla="*/ 914400 h 2345267"/>
-              <a:gd name="connsiteX132" fmla="*/ 59267 w 2556933"/>
-              <a:gd name="connsiteY132" fmla="*/ 863600 h 2345267"/>
-              <a:gd name="connsiteX133" fmla="*/ 33867 w 2556933"/>
-              <a:gd name="connsiteY133" fmla="*/ 778934 h 2345267"/>
-              <a:gd name="connsiteX134" fmla="*/ 8467 w 2556933"/>
-              <a:gd name="connsiteY134" fmla="*/ 702734 h 2345267"/>
-              <a:gd name="connsiteX135" fmla="*/ 0 w 2556933"/>
-              <a:gd name="connsiteY135" fmla="*/ 677334 h 2345267"/>
-              <a:gd name="connsiteX136" fmla="*/ 16933 w 2556933"/>
-              <a:gd name="connsiteY136" fmla="*/ 575734 h 2345267"/>
-            </a:gdLst>
-            <a:ahLst/>
-            <a:cxnLst>
-              <a:cxn ang="0">
-                <a:pos x="connsiteX0" y="connsiteY0"/>
-              </a:cxn>
-              <a:cxn ang="0">
-                <a:pos x="connsiteX1" y="connsiteY1"/>
-              </a:cxn>
-              <a:cxn ang="0">
-                <a:pos x="connsiteX2" y="connsiteY2"/>
-              </a:cxn>
-              <a:cxn ang="0">
-                <a:pos x="connsiteX3" y="connsiteY3"/>
-              </a:cxn>
-              <a:cxn ang="0">
-                <a:pos x="connsiteX4" y="connsiteY4"/>
-              </a:cxn>
-              <a:cxn ang="0">
-                <a:pos x="connsiteX5" y="connsiteY5"/>
-              </a:cxn>
-              <a:cxn ang="0">
-                <a:pos x="connsiteX6" y="connsiteY6"/>
-              </a:cxn>
-              <a:cxn ang="0">
-                <a:pos x="connsiteX7" y="connsiteY7"/>
-              </a:cxn>
-              <a:cxn ang="0">
-                <a:pos x="connsiteX8" y="connsiteY8"/>
-              </a:cxn>
-              <a:cxn ang="0">
-                <a:pos x="connsiteX9" y="connsiteY9"/>
-              </a:cxn>
-              <a:cxn ang="0">
-                <a:pos x="connsiteX10" y="connsiteY10"/>
-              </a:cxn>
-              <a:cxn ang="0">
-                <a:pos x="connsiteX11" y="connsiteY11"/>
-              </a:cxn>
-              <a:cxn ang="0">
-                <a:pos x="connsiteX12" y="connsiteY12"/>
-              </a:cxn>
-              <a:cxn ang="0">
-                <a:pos x="connsiteX13" y="connsiteY13"/>
-              </a:cxn>
-              <a:cxn ang="0">
-                <a:pos x="connsiteX14" y="connsiteY14"/>
-              </a:cxn>
-              <a:cxn ang="0">
-                <a:pos x="connsiteX15" y="connsiteY15"/>
-              </a:cxn>
-              <a:cxn ang="0">
-                <a:pos x="connsiteX16" y="connsiteY16"/>
-              </a:cxn>
-              <a:cxn ang="0">
-                <a:pos x="connsiteX17" y="connsiteY17"/>
-              </a:cxn>
-              <a:cxn ang="0">
-                <a:pos x="connsiteX18" y="connsiteY18"/>
-              </a:cxn>
-              <a:cxn ang="0">
-                <a:pos x="connsiteX19" y="connsiteY19"/>
-              </a:cxn>
-              <a:cxn ang="0">
-                <a:pos x="connsiteX20" y="connsiteY20"/>
-              </a:cxn>
-              <a:cxn ang="0">
-                <a:pos x="connsiteX21" y="connsiteY21"/>
-              </a:cxn>
-              <a:cxn ang="0">
-                <a:pos x="connsiteX22" y="connsiteY22"/>
-              </a:cxn>
-              <a:cxn ang="0">
-                <a:pos x="connsiteX23" y="connsiteY23"/>
-              </a:cxn>
-              <a:cxn ang="0">
-                <a:pos x="connsiteX24" y="connsiteY24"/>
-              </a:cxn>
-              <a:cxn ang="0">
-                <a:pos x="connsiteX25" y="connsiteY25"/>
-              </a:cxn>
-              <a:cxn ang="0">
-                <a:pos x="connsiteX26" y="connsiteY26"/>
-              </a:cxn>
-              <a:cxn ang="0">
-                <a:pos x="connsiteX27" y="connsiteY27"/>
-              </a:cxn>
-              <a:cxn ang="0">
-                <a:pos x="connsiteX28" y="connsiteY28"/>
-              </a:cxn>
-              <a:cxn ang="0">
-                <a:pos x="connsiteX29" y="connsiteY29"/>
-              </a:cxn>
-              <a:cxn ang="0">
-                <a:pos x="connsiteX30" y="connsiteY30"/>
-              </a:cxn>
-              <a:cxn ang="0">
-                <a:pos x="connsiteX31" y="connsiteY31"/>
-              </a:cxn>
-              <a:cxn ang="0">
-                <a:pos x="connsiteX32" y="connsiteY32"/>
-              </a:cxn>
-              <a:cxn ang="0">
-                <a:pos x="connsiteX33" y="connsiteY33"/>
-              </a:cxn>
-              <a:cxn ang="0">
-                <a:pos x="connsiteX34" y="connsiteY34"/>
-              </a:cxn>
-              <a:cxn ang="0">
-                <a:pos x="connsiteX35" y="connsiteY35"/>
-              </a:cxn>
-              <a:cxn ang="0">
-                <a:pos x="connsiteX36" y="connsiteY36"/>
-              </a:cxn>
-              <a:cxn ang="0">
-                <a:pos x="connsiteX37" y="connsiteY37"/>
-              </a:cxn>
-              <a:cxn ang="0">
-                <a:pos x="connsiteX38" y="connsiteY38"/>
-              </a:cxn>
-              <a:cxn ang="0">
-                <a:pos x="connsiteX39" y="connsiteY39"/>
-              </a:cxn>
-              <a:cxn ang="0">
-                <a:pos x="connsiteX40" y="connsiteY40"/>
-              </a:cxn>
-              <a:cxn ang="0">
-                <a:pos x="connsiteX41" y="connsiteY41"/>
-              </a:cxn>
-              <a:cxn ang="0">
-                <a:pos x="connsiteX42" y="connsiteY42"/>
-              </a:cxn>
-              <a:cxn ang="0">
-                <a:pos x="connsiteX43" y="connsiteY43"/>
-              </a:cxn>
-              <a:cxn ang="0">
-                <a:pos x="connsiteX44" y="connsiteY44"/>
-              </a:cxn>
-              <a:cxn ang="0">
-                <a:pos x="connsiteX45" y="connsiteY45"/>
-              </a:cxn>
-              <a:cxn ang="0">
-                <a:pos x="connsiteX46" y="connsiteY46"/>
-              </a:cxn>
-              <a:cxn ang="0">
-                <a:pos x="connsiteX47" y="connsiteY47"/>
-              </a:cxn>
-              <a:cxn ang="0">
-                <a:pos x="connsiteX48" y="connsiteY48"/>
-              </a:cxn>
-              <a:cxn ang="0">
-                <a:pos x="connsiteX49" y="connsiteY49"/>
-              </a:cxn>
-              <a:cxn ang="0">
-                <a:pos x="connsiteX50" y="connsiteY50"/>
-              </a:cxn>
-              <a:cxn ang="0">
-                <a:pos x="connsiteX51" y="connsiteY51"/>
-              </a:cxn>
-              <a:cxn ang="0">
-                <a:pos x="connsiteX52" y="connsiteY52"/>
-              </a:cxn>
-              <a:cxn ang="0">
-                <a:pos x="connsiteX53" y="connsiteY53"/>
-              </a:cxn>
-              <a:cxn ang="0">
-                <a:pos x="connsiteX54" y="connsiteY54"/>
-              </a:cxn>
-              <a:cxn ang="0">
-                <a:pos x="connsiteX55" y="connsiteY55"/>
-              </a:cxn>
-              <a:cxn ang="0">
-                <a:pos x="connsiteX56" y="connsiteY56"/>
-              </a:cxn>
-              <a:cxn ang="0">
-                <a:pos x="connsiteX57" y="connsiteY57"/>
-              </a:cxn>
-              <a:cxn ang="0">
-                <a:pos x="connsiteX58" y="connsiteY58"/>
-              </a:cxn>
-              <a:cxn ang="0">
-                <a:pos x="connsiteX59" y="connsiteY59"/>
-              </a:cxn>
-              <a:cxn ang="0">
-                <a:pos x="connsiteX60" y="connsiteY60"/>
-              </a:cxn>
-              <a:cxn ang="0">
-                <a:pos x="connsiteX61" y="connsiteY61"/>
-              </a:cxn>
-              <a:cxn ang="0">
-                <a:pos x="connsiteX62" y="connsiteY62"/>
-              </a:cxn>
-              <a:cxn ang="0">
-                <a:pos x="connsiteX63" y="connsiteY63"/>
-              </a:cxn>
-              <a:cxn ang="0">
-                <a:pos x="connsiteX64" y="connsiteY64"/>
-              </a:cxn>
-              <a:cxn ang="0">
-                <a:pos x="connsiteX65" y="connsiteY65"/>
-              </a:cxn>
-              <a:cxn ang="0">
-                <a:pos x="connsiteX66" y="connsiteY66"/>
-              </a:cxn>
-              <a:cxn ang="0">
-                <a:pos x="connsiteX67" y="connsiteY67"/>
-              </a:cxn>
-              <a:cxn ang="0">
-                <a:pos x="connsiteX68" y="connsiteY68"/>
-              </a:cxn>
-              <a:cxn ang="0">
-                <a:pos x="connsiteX69" y="connsiteY69"/>
-              </a:cxn>
-              <a:cxn ang="0">
-                <a:pos x="connsiteX70" y="connsiteY70"/>
-              </a:cxn>
-              <a:cxn ang="0">
-                <a:pos x="connsiteX71" y="connsiteY71"/>
-              </a:cxn>
-              <a:cxn ang="0">
-                <a:pos x="connsiteX72" y="connsiteY72"/>
-              </a:cxn>
-              <a:cxn ang="0">
-                <a:pos x="connsiteX73" y="connsiteY73"/>
-              </a:cxn>
-              <a:cxn ang="0">
-                <a:pos x="connsiteX74" y="connsiteY74"/>
-              </a:cxn>
-              <a:cxn ang="0">
-                <a:pos x="connsiteX75" y="connsiteY75"/>
-              </a:cxn>
-              <a:cxn ang="0">
-                <a:pos x="connsiteX76" y="connsiteY76"/>
-              </a:cxn>
-              <a:cxn ang="0">
-                <a:pos x="connsiteX77" y="connsiteY77"/>
-              </a:cxn>
-              <a:cxn ang="0">
-                <a:pos x="connsiteX78" y="connsiteY78"/>
-              </a:cxn>
-              <a:cxn ang="0">
-                <a:pos x="connsiteX79" y="connsiteY79"/>
-              </a:cxn>
-              <a:cxn ang="0">
-                <a:pos x="connsiteX80" y="connsiteY80"/>
-              </a:cxn>
-              <a:cxn ang="0">
-                <a:pos x="connsiteX81" y="connsiteY81"/>
-              </a:cxn>
-              <a:cxn ang="0">
-                <a:pos x="connsiteX82" y="connsiteY82"/>
-              </a:cxn>
-              <a:cxn ang="0">
-                <a:pos x="connsiteX83" y="connsiteY83"/>
-              </a:cxn>
-              <a:cxn ang="0">
-                <a:pos x="connsiteX84" y="connsiteY84"/>
-              </a:cxn>
-              <a:cxn ang="0">
-                <a:pos x="connsiteX85" y="connsiteY85"/>
-              </a:cxn>
-              <a:cxn ang="0">
-                <a:pos x="connsiteX86" y="connsiteY86"/>
-              </a:cxn>
-              <a:cxn ang="0">
-                <a:pos x="connsiteX87" y="connsiteY87"/>
-              </a:cxn>
-              <a:cxn ang="0">
-                <a:pos x="connsiteX88" y="connsiteY88"/>
-              </a:cxn>
-              <a:cxn ang="0">
-                <a:pos x="connsiteX89" y="connsiteY89"/>
-              </a:cxn>
-              <a:cxn ang="0">
-                <a:pos x="connsiteX90" y="connsiteY90"/>
-              </a:cxn>
-              <a:cxn ang="0">
-                <a:pos x="connsiteX91" y="connsiteY91"/>
-              </a:cxn>
-              <a:cxn ang="0">
-                <a:pos x="connsiteX92" y="connsiteY92"/>
-              </a:cxn>
-              <a:cxn ang="0">
-                <a:pos x="connsiteX93" y="connsiteY93"/>
-              </a:cxn>
-              <a:cxn ang="0">
-                <a:pos x="connsiteX94" y="connsiteY94"/>
-              </a:cxn>
-              <a:cxn ang="0">
-                <a:pos x="connsiteX95" y="connsiteY95"/>
-              </a:cxn>
-              <a:cxn ang="0">
-                <a:pos x="connsiteX96" y="connsiteY96"/>
-              </a:cxn>
-              <a:cxn ang="0">
-                <a:pos x="connsiteX97" y="connsiteY97"/>
-              </a:cxn>
-              <a:cxn ang="0">
-                <a:pos x="connsiteX98" y="connsiteY98"/>
-              </a:cxn>
-              <a:cxn ang="0">
-                <a:pos x="connsiteX99" y="connsiteY99"/>
-              </a:cxn>
-              <a:cxn ang="0">
-                <a:pos x="connsiteX100" y="connsiteY100"/>
-              </a:cxn>
-              <a:cxn ang="0">
-                <a:pos x="connsiteX101" y="connsiteY101"/>
-              </a:cxn>
-              <a:cxn ang="0">
-                <a:pos x="connsiteX102" y="connsiteY102"/>
-              </a:cxn>
-              <a:cxn ang="0">
-                <a:pos x="connsiteX103" y="connsiteY103"/>
-              </a:cxn>
-              <a:cxn ang="0">
-                <a:pos x="connsiteX104" y="connsiteY104"/>
-              </a:cxn>
-              <a:cxn ang="0">
-                <a:pos x="connsiteX105" y="connsiteY105"/>
-              </a:cxn>
-              <a:cxn ang="0">
-                <a:pos x="connsiteX106" y="connsiteY106"/>
-              </a:cxn>
-              <a:cxn ang="0">
-                <a:pos x="connsiteX107" y="connsiteY107"/>
-              </a:cxn>
-              <a:cxn ang="0">
-                <a:pos x="connsiteX108" y="connsiteY108"/>
-              </a:cxn>
-              <a:cxn ang="0">
-                <a:pos x="connsiteX109" y="connsiteY109"/>
-              </a:cxn>
-              <a:cxn ang="0">
-                <a:pos x="connsiteX110" y="connsiteY110"/>
-              </a:cxn>
-              <a:cxn ang="0">
-                <a:pos x="connsiteX111" y="connsiteY111"/>
-              </a:cxn>
-              <a:cxn ang="0">
-                <a:pos x="connsiteX112" y="connsiteY112"/>
-              </a:cxn>
-              <a:cxn ang="0">
-                <a:pos x="connsiteX113" y="connsiteY113"/>
-              </a:cxn>
-              <a:cxn ang="0">
-                <a:pos x="connsiteX114" y="connsiteY114"/>
-              </a:cxn>
-              <a:cxn ang="0">
-                <a:pos x="connsiteX115" y="connsiteY115"/>
-              </a:cxn>
-              <a:cxn ang="0">
-                <a:pos x="connsiteX116" y="connsiteY116"/>
-              </a:cxn>
-              <a:cxn ang="0">
-                <a:pos x="connsiteX117" y="connsiteY117"/>
-              </a:cxn>
-              <a:cxn ang="0">
-                <a:pos x="connsiteX118" y="connsiteY118"/>
-              </a:cxn>
-              <a:cxn ang="0">
-                <a:pos x="connsiteX119" y="connsiteY119"/>
-              </a:cxn>
-              <a:cxn ang="0">
-                <a:pos x="connsiteX120" y="connsiteY120"/>
-              </a:cxn>
-              <a:cxn ang="0">
-                <a:pos x="connsiteX121" y="connsiteY121"/>
-              </a:cxn>
-              <a:cxn ang="0">
-                <a:pos x="connsiteX122" y="connsiteY122"/>
-              </a:cxn>
-              <a:cxn ang="0">
-                <a:pos x="connsiteX123" y="connsiteY123"/>
-              </a:cxn>
-              <a:cxn ang="0">
-                <a:pos x="connsiteX124" y="connsiteY124"/>
-              </a:cxn>
-              <a:cxn ang="0">
-                <a:pos x="connsiteX125" y="connsiteY125"/>
-              </a:cxn>
-              <a:cxn ang="0">
-                <a:pos x="connsiteX126" y="connsiteY126"/>
-              </a:cxn>
-              <a:cxn ang="0">
-                <a:pos x="connsiteX127" y="connsiteY127"/>
-              </a:cxn>
-              <a:cxn ang="0">
-                <a:pos x="connsiteX128" y="connsiteY128"/>
-              </a:cxn>
-              <a:cxn ang="0">
-                <a:pos x="connsiteX129" y="connsiteY129"/>
-              </a:cxn>
-              <a:cxn ang="0">
-                <a:pos x="connsiteX130" y="connsiteY130"/>
-              </a:cxn>
-              <a:cxn ang="0">
-                <a:pos x="connsiteX131" y="connsiteY131"/>
-              </a:cxn>
-              <a:cxn ang="0">
-                <a:pos x="connsiteX132" y="connsiteY132"/>
-              </a:cxn>
-              <a:cxn ang="0">
-                <a:pos x="connsiteX133" y="connsiteY133"/>
-              </a:cxn>
-              <a:cxn ang="0">
-                <a:pos x="connsiteX134" y="connsiteY134"/>
-              </a:cxn>
-              <a:cxn ang="0">
-                <a:pos x="connsiteX135" y="connsiteY135"/>
-              </a:cxn>
-              <a:cxn ang="0">
-                <a:pos x="connsiteX136" y="connsiteY136"/>
-              </a:cxn>
-            </a:cxnLst>
-            <a:rect l="l" t="t" r="r" b="b"/>
-            <a:pathLst>
-              <a:path w="2556933" h="2345267">
-                <a:moveTo>
-                  <a:pt x="16933" y="575734"/>
-                </a:moveTo>
-                <a:lnTo>
-                  <a:pt x="16933" y="575734"/>
-                </a:lnTo>
-                <a:cubicBezTo>
-                  <a:pt x="42333" y="564445"/>
-                  <a:pt x="70362" y="557807"/>
-                  <a:pt x="93133" y="541867"/>
-                </a:cubicBezTo>
-                <a:cubicBezTo>
-                  <a:pt x="100444" y="536749"/>
-                  <a:pt x="96649" y="523893"/>
-                  <a:pt x="101600" y="516467"/>
-                </a:cubicBezTo>
-                <a:cubicBezTo>
-                  <a:pt x="108242" y="506504"/>
-                  <a:pt x="117257" y="498026"/>
-                  <a:pt x="127000" y="491067"/>
-                </a:cubicBezTo>
-                <a:cubicBezTo>
-                  <a:pt x="137271" y="483731"/>
-                  <a:pt x="149148" y="478821"/>
-                  <a:pt x="160867" y="474134"/>
-                </a:cubicBezTo>
-                <a:cubicBezTo>
-                  <a:pt x="215708" y="452197"/>
-                  <a:pt x="216320" y="456618"/>
-                  <a:pt x="279400" y="448734"/>
-                </a:cubicBezTo>
-                <a:cubicBezTo>
-                  <a:pt x="285044" y="443089"/>
-                  <a:pt x="290100" y="436787"/>
-                  <a:pt x="296333" y="431800"/>
-                </a:cubicBezTo>
-                <a:cubicBezTo>
-                  <a:pt x="304279" y="425443"/>
-                  <a:pt x="314538" y="422062"/>
-                  <a:pt x="321733" y="414867"/>
-                </a:cubicBezTo>
-                <a:cubicBezTo>
-                  <a:pt x="328928" y="407672"/>
-                  <a:pt x="333022" y="397934"/>
-                  <a:pt x="338667" y="389467"/>
-                </a:cubicBezTo>
-                <a:lnTo>
-                  <a:pt x="355600" y="338667"/>
-                </a:lnTo>
-                <a:cubicBezTo>
-                  <a:pt x="358422" y="330200"/>
-                  <a:pt x="357756" y="319578"/>
-                  <a:pt x="364067" y="313267"/>
-                </a:cubicBezTo>
-                <a:cubicBezTo>
-                  <a:pt x="372534" y="304800"/>
-                  <a:pt x="379000" y="293682"/>
-                  <a:pt x="389467" y="287867"/>
-                </a:cubicBezTo>
-                <a:cubicBezTo>
-                  <a:pt x="430391" y="265132"/>
-                  <a:pt x="491385" y="265468"/>
-                  <a:pt x="533400" y="262467"/>
-                </a:cubicBezTo>
-                <a:cubicBezTo>
-                  <a:pt x="581338" y="259043"/>
-                  <a:pt x="629355" y="256822"/>
-                  <a:pt x="677333" y="254000"/>
-                </a:cubicBezTo>
-                <a:cubicBezTo>
-                  <a:pt x="688622" y="251178"/>
-                  <a:pt x="701332" y="251701"/>
-                  <a:pt x="711200" y="245534"/>
-                </a:cubicBezTo>
-                <a:cubicBezTo>
-                  <a:pt x="724738" y="237073"/>
-                  <a:pt x="733778" y="222956"/>
-                  <a:pt x="745067" y="211667"/>
-                </a:cubicBezTo>
-                <a:cubicBezTo>
-                  <a:pt x="819274" y="137460"/>
-                  <a:pt x="728463" y="231593"/>
-                  <a:pt x="787400" y="160867"/>
-                </a:cubicBezTo>
-                <a:cubicBezTo>
-                  <a:pt x="795065" y="151669"/>
-                  <a:pt x="805135" y="144665"/>
-                  <a:pt x="812800" y="135467"/>
-                </a:cubicBezTo>
-                <a:cubicBezTo>
-                  <a:pt x="879411" y="55533"/>
-                  <a:pt x="787286" y="161037"/>
-                  <a:pt x="838200" y="84667"/>
-                </a:cubicBezTo>
-                <a:cubicBezTo>
-                  <a:pt x="844842" y="74704"/>
-                  <a:pt x="851658" y="60136"/>
-                  <a:pt x="863600" y="59267"/>
-                </a:cubicBezTo>
-                <a:cubicBezTo>
-                  <a:pt x="1009996" y="48620"/>
-                  <a:pt x="1157111" y="53622"/>
-                  <a:pt x="1303867" y="50800"/>
-                </a:cubicBezTo>
-                <a:cubicBezTo>
-                  <a:pt x="1320800" y="47978"/>
-                  <a:pt x="1337833" y="45701"/>
-                  <a:pt x="1354667" y="42334"/>
-                </a:cubicBezTo>
-                <a:cubicBezTo>
-                  <a:pt x="1366077" y="40052"/>
-                  <a:pt x="1380305" y="42095"/>
-                  <a:pt x="1388533" y="33867"/>
-                </a:cubicBezTo>
-                <a:cubicBezTo>
-                  <a:pt x="1396761" y="25639"/>
-                  <a:pt x="1394178" y="11289"/>
-                  <a:pt x="1397000" y="0"/>
-                </a:cubicBezTo>
-                <a:cubicBezTo>
-                  <a:pt x="1428044" y="2822"/>
-                  <a:pt x="1459274" y="4058"/>
-                  <a:pt x="1490133" y="8467"/>
-                </a:cubicBezTo>
-                <a:cubicBezTo>
-                  <a:pt x="1519925" y="12723"/>
-                  <a:pt x="1514106" y="20454"/>
-                  <a:pt x="1540933" y="33867"/>
-                </a:cubicBezTo>
-                <a:cubicBezTo>
-                  <a:pt x="1548915" y="37858"/>
-                  <a:pt x="1557723" y="39986"/>
-                  <a:pt x="1566333" y="42334"/>
-                </a:cubicBezTo>
-                <a:cubicBezTo>
-                  <a:pt x="1588786" y="48457"/>
-                  <a:pt x="1611989" y="51907"/>
-                  <a:pt x="1634067" y="59267"/>
-                </a:cubicBezTo>
-                <a:cubicBezTo>
-                  <a:pt x="1642534" y="62089"/>
-                  <a:pt x="1650664" y="66267"/>
-                  <a:pt x="1659467" y="67734"/>
-                </a:cubicBezTo>
-                <a:cubicBezTo>
-                  <a:pt x="1684676" y="71935"/>
-                  <a:pt x="1710267" y="73378"/>
-                  <a:pt x="1735667" y="76200"/>
-                </a:cubicBezTo>
-                <a:cubicBezTo>
-                  <a:pt x="1776561" y="117096"/>
-                  <a:pt x="1726800" y="65119"/>
-                  <a:pt x="1769533" y="118534"/>
-                </a:cubicBezTo>
-                <a:cubicBezTo>
-                  <a:pt x="1774520" y="124767"/>
-                  <a:pt x="1781480" y="129234"/>
-                  <a:pt x="1786467" y="135467"/>
-                </a:cubicBezTo>
-                <a:cubicBezTo>
-                  <a:pt x="1792824" y="143413"/>
-                  <a:pt x="1796886" y="153050"/>
-                  <a:pt x="1803400" y="160867"/>
-                </a:cubicBezTo>
-                <a:cubicBezTo>
-                  <a:pt x="1811065" y="170065"/>
-                  <a:pt x="1821135" y="177069"/>
-                  <a:pt x="1828800" y="186267"/>
-                </a:cubicBezTo>
-                <a:cubicBezTo>
-                  <a:pt x="1835314" y="194084"/>
-                  <a:pt x="1838538" y="204472"/>
-                  <a:pt x="1845733" y="211667"/>
-                </a:cubicBezTo>
-                <a:cubicBezTo>
-                  <a:pt x="1879060" y="244994"/>
-                  <a:pt x="1862930" y="212018"/>
-                  <a:pt x="1888067" y="245534"/>
-                </a:cubicBezTo>
-                <a:cubicBezTo>
-                  <a:pt x="1900278" y="261815"/>
-                  <a:pt x="1910644" y="279401"/>
-                  <a:pt x="1921933" y="296334"/>
-                </a:cubicBezTo>
-                <a:lnTo>
-                  <a:pt x="1938867" y="321734"/>
-                </a:lnTo>
-                <a:cubicBezTo>
-                  <a:pt x="1944511" y="330201"/>
-                  <a:pt x="1952582" y="337481"/>
-                  <a:pt x="1955800" y="347134"/>
-                </a:cubicBezTo>
-                <a:cubicBezTo>
-                  <a:pt x="1958622" y="355601"/>
-                  <a:pt x="1959933" y="364732"/>
-                  <a:pt x="1964267" y="372534"/>
-                </a:cubicBezTo>
-                <a:cubicBezTo>
-                  <a:pt x="1974150" y="390324"/>
-                  <a:pt x="1986844" y="406401"/>
-                  <a:pt x="1998133" y="423334"/>
-                </a:cubicBezTo>
-                <a:lnTo>
-                  <a:pt x="2015067" y="448734"/>
-                </a:lnTo>
-                <a:cubicBezTo>
-                  <a:pt x="2036346" y="512577"/>
-                  <a:pt x="2007641" y="433883"/>
-                  <a:pt x="2040467" y="499534"/>
-                </a:cubicBezTo>
-                <a:cubicBezTo>
-                  <a:pt x="2044458" y="507516"/>
-                  <a:pt x="2044341" y="517281"/>
-                  <a:pt x="2048933" y="524934"/>
-                </a:cubicBezTo>
-                <a:cubicBezTo>
-                  <a:pt x="2053040" y="531779"/>
-                  <a:pt x="2060880" y="535634"/>
-                  <a:pt x="2065867" y="541867"/>
-                </a:cubicBezTo>
-                <a:cubicBezTo>
-                  <a:pt x="2072224" y="549813"/>
-                  <a:pt x="2078249" y="558166"/>
-                  <a:pt x="2082800" y="567267"/>
-                </a:cubicBezTo>
-                <a:cubicBezTo>
-                  <a:pt x="2096571" y="594810"/>
-                  <a:pt x="2083938" y="593805"/>
-                  <a:pt x="2108200" y="618067"/>
-                </a:cubicBezTo>
-                <a:cubicBezTo>
-                  <a:pt x="2115395" y="625262"/>
-                  <a:pt x="2125133" y="629356"/>
-                  <a:pt x="2133600" y="635000"/>
-                </a:cubicBezTo>
-                <a:cubicBezTo>
-                  <a:pt x="2139244" y="643467"/>
-                  <a:pt x="2144176" y="652454"/>
-                  <a:pt x="2150533" y="660400"/>
-                </a:cubicBezTo>
-                <a:cubicBezTo>
-                  <a:pt x="2155520" y="666634"/>
-                  <a:pt x="2163360" y="670489"/>
-                  <a:pt x="2167467" y="677334"/>
-                </a:cubicBezTo>
-                <a:cubicBezTo>
-                  <a:pt x="2172059" y="684987"/>
-                  <a:pt x="2171599" y="694932"/>
-                  <a:pt x="2175933" y="702734"/>
-                </a:cubicBezTo>
-                <a:cubicBezTo>
-                  <a:pt x="2185816" y="720524"/>
-                  <a:pt x="2198511" y="736601"/>
-                  <a:pt x="2209800" y="753534"/>
-                </a:cubicBezTo>
-                <a:lnTo>
-                  <a:pt x="2243667" y="804334"/>
-                </a:lnTo>
-                <a:cubicBezTo>
-                  <a:pt x="2283919" y="831168"/>
-                  <a:pt x="2259412" y="818048"/>
-                  <a:pt x="2319867" y="838200"/>
-                </a:cubicBezTo>
-                <a:lnTo>
-                  <a:pt x="2345267" y="846667"/>
-                </a:lnTo>
-                <a:lnTo>
-                  <a:pt x="2370667" y="855134"/>
-                </a:lnTo>
-                <a:cubicBezTo>
-                  <a:pt x="2376311" y="863601"/>
-                  <a:pt x="2379942" y="873833"/>
-                  <a:pt x="2387600" y="880534"/>
-                </a:cubicBezTo>
-                <a:cubicBezTo>
-                  <a:pt x="2423430" y="911885"/>
-                  <a:pt x="2428915" y="911238"/>
-                  <a:pt x="2463800" y="922867"/>
-                </a:cubicBezTo>
-                <a:cubicBezTo>
-                  <a:pt x="2472267" y="931334"/>
-                  <a:pt x="2480002" y="940602"/>
-                  <a:pt x="2489200" y="948267"/>
-                </a:cubicBezTo>
-                <a:cubicBezTo>
-                  <a:pt x="2497017" y="954781"/>
-                  <a:pt x="2506874" y="958578"/>
-                  <a:pt x="2514600" y="965200"/>
-                </a:cubicBezTo>
-                <a:cubicBezTo>
-                  <a:pt x="2526722" y="975590"/>
-                  <a:pt x="2548467" y="999067"/>
-                  <a:pt x="2548467" y="999067"/>
-                </a:cubicBezTo>
-                <a:cubicBezTo>
-                  <a:pt x="2551289" y="1010356"/>
-                  <a:pt x="2556933" y="1021298"/>
-                  <a:pt x="2556933" y="1032934"/>
-                </a:cubicBezTo>
-                <a:cubicBezTo>
-                  <a:pt x="2556933" y="1041859"/>
-                  <a:pt x="2553822" y="1051194"/>
-                  <a:pt x="2548467" y="1058334"/>
-                </a:cubicBezTo>
-                <a:cubicBezTo>
-                  <a:pt x="2536493" y="1074299"/>
-                  <a:pt x="2517203" y="1084062"/>
-                  <a:pt x="2506133" y="1100667"/>
-                </a:cubicBezTo>
-                <a:cubicBezTo>
-                  <a:pt x="2481373" y="1137808"/>
-                  <a:pt x="2495305" y="1117926"/>
-                  <a:pt x="2463800" y="1159934"/>
-                </a:cubicBezTo>
-                <a:cubicBezTo>
-                  <a:pt x="2444732" y="1217135"/>
-                  <a:pt x="2471177" y="1155131"/>
-                  <a:pt x="2429933" y="1202267"/>
-                </a:cubicBezTo>
-                <a:cubicBezTo>
-                  <a:pt x="2416532" y="1217583"/>
-                  <a:pt x="2410458" y="1238677"/>
-                  <a:pt x="2396067" y="1253067"/>
-                </a:cubicBezTo>
-                <a:cubicBezTo>
-                  <a:pt x="2355188" y="1293943"/>
-                  <a:pt x="2404912" y="1242009"/>
-                  <a:pt x="2362200" y="1295400"/>
-                </a:cubicBezTo>
-                <a:cubicBezTo>
-                  <a:pt x="2357213" y="1301633"/>
-                  <a:pt x="2350056" y="1305948"/>
-                  <a:pt x="2345267" y="1312334"/>
-                </a:cubicBezTo>
-                <a:cubicBezTo>
-                  <a:pt x="2333056" y="1328615"/>
-                  <a:pt x="2325791" y="1348743"/>
-                  <a:pt x="2311400" y="1363134"/>
-                </a:cubicBezTo>
-                <a:lnTo>
-                  <a:pt x="2286000" y="1388534"/>
-                </a:lnTo>
-                <a:cubicBezTo>
-                  <a:pt x="2271120" y="1433172"/>
-                  <a:pt x="2287368" y="1397052"/>
-                  <a:pt x="2252133" y="1439334"/>
-                </a:cubicBezTo>
-                <a:cubicBezTo>
-                  <a:pt x="2216856" y="1481667"/>
-                  <a:pt x="2256367" y="1450623"/>
-                  <a:pt x="2209800" y="1481667"/>
-                </a:cubicBezTo>
-                <a:cubicBezTo>
-                  <a:pt x="2184011" y="1520351"/>
-                  <a:pt x="2200062" y="1499872"/>
-                  <a:pt x="2159000" y="1540934"/>
-                </a:cubicBezTo>
-                <a:cubicBezTo>
-                  <a:pt x="2150533" y="1549401"/>
-                  <a:pt x="2140242" y="1556371"/>
-                  <a:pt x="2133600" y="1566334"/>
-                </a:cubicBezTo>
-                <a:lnTo>
-                  <a:pt x="2065867" y="1667934"/>
-                </a:lnTo>
-                <a:lnTo>
-                  <a:pt x="2048933" y="1693334"/>
-                </a:lnTo>
-                <a:cubicBezTo>
-                  <a:pt x="2043289" y="1701801"/>
-                  <a:pt x="2040467" y="1713090"/>
-                  <a:pt x="2032000" y="1718734"/>
-                </a:cubicBezTo>
-                <a:cubicBezTo>
-                  <a:pt x="2023533" y="1724378"/>
-                  <a:pt x="2014205" y="1728907"/>
-                  <a:pt x="2006600" y="1735667"/>
-                </a:cubicBezTo>
-                <a:cubicBezTo>
-                  <a:pt x="1988701" y="1751577"/>
-                  <a:pt x="1975726" y="1773184"/>
-                  <a:pt x="1955800" y="1786467"/>
-                </a:cubicBezTo>
-                <a:lnTo>
-                  <a:pt x="1930400" y="1803400"/>
-                </a:lnTo>
-                <a:cubicBezTo>
-                  <a:pt x="1916500" y="1845097"/>
-                  <a:pt x="1931884" y="1816275"/>
-                  <a:pt x="1896533" y="1845734"/>
-                </a:cubicBezTo>
-                <a:cubicBezTo>
-                  <a:pt x="1887335" y="1853399"/>
-                  <a:pt x="1880584" y="1863783"/>
-                  <a:pt x="1871133" y="1871134"/>
-                </a:cubicBezTo>
-                <a:cubicBezTo>
-                  <a:pt x="1827465" y="1905098"/>
-                  <a:pt x="1833256" y="1900692"/>
-                  <a:pt x="1794933" y="1913467"/>
-                </a:cubicBezTo>
-                <a:cubicBezTo>
-                  <a:pt x="1713905" y="1994495"/>
-                  <a:pt x="1817651" y="1898321"/>
-                  <a:pt x="1744133" y="1947334"/>
-                </a:cubicBezTo>
-                <a:cubicBezTo>
-                  <a:pt x="1680715" y="1989613"/>
-                  <a:pt x="1753725" y="1961071"/>
-                  <a:pt x="1693333" y="1981200"/>
-                </a:cubicBezTo>
-                <a:cubicBezTo>
-                  <a:pt x="1652439" y="2022096"/>
-                  <a:pt x="1702200" y="1970119"/>
-                  <a:pt x="1659467" y="2023534"/>
-                </a:cubicBezTo>
-                <a:cubicBezTo>
-                  <a:pt x="1654480" y="2029767"/>
-                  <a:pt x="1648178" y="2034823"/>
-                  <a:pt x="1642533" y="2040467"/>
-                </a:cubicBezTo>
-                <a:cubicBezTo>
-                  <a:pt x="1639711" y="2048934"/>
-                  <a:pt x="1639642" y="2058898"/>
-                  <a:pt x="1634067" y="2065867"/>
-                </a:cubicBezTo>
-                <a:cubicBezTo>
-                  <a:pt x="1627710" y="2073813"/>
-                  <a:pt x="1616613" y="2076443"/>
-                  <a:pt x="1608667" y="2082800"/>
-                </a:cubicBezTo>
-                <a:cubicBezTo>
-                  <a:pt x="1602433" y="2087787"/>
-                  <a:pt x="1599208" y="2096931"/>
-                  <a:pt x="1591733" y="2099734"/>
-                </a:cubicBezTo>
-                <a:cubicBezTo>
-                  <a:pt x="1579531" y="2104310"/>
-                  <a:pt x="1477061" y="2116184"/>
-                  <a:pt x="1473200" y="2116667"/>
-                </a:cubicBezTo>
-                <a:cubicBezTo>
-                  <a:pt x="1409356" y="2137949"/>
-                  <a:pt x="1488052" y="2109241"/>
-                  <a:pt x="1422400" y="2142067"/>
-                </a:cubicBezTo>
-                <a:cubicBezTo>
-                  <a:pt x="1414418" y="2146058"/>
-                  <a:pt x="1404982" y="2146543"/>
-                  <a:pt x="1397000" y="2150534"/>
-                </a:cubicBezTo>
-                <a:cubicBezTo>
-                  <a:pt x="1387899" y="2155085"/>
-                  <a:pt x="1380701" y="2162916"/>
-                  <a:pt x="1371600" y="2167467"/>
-                </a:cubicBezTo>
-                <a:cubicBezTo>
-                  <a:pt x="1363618" y="2171458"/>
-                  <a:pt x="1354182" y="2171943"/>
-                  <a:pt x="1346200" y="2175934"/>
-                </a:cubicBezTo>
-                <a:cubicBezTo>
-                  <a:pt x="1287731" y="2205169"/>
-                  <a:pt x="1357416" y="2183713"/>
-                  <a:pt x="1286933" y="2201334"/>
-                </a:cubicBezTo>
-                <a:cubicBezTo>
-                  <a:pt x="1278466" y="2206978"/>
-                  <a:pt x="1270832" y="2214134"/>
-                  <a:pt x="1261533" y="2218267"/>
-                </a:cubicBezTo>
-                <a:cubicBezTo>
-                  <a:pt x="1207355" y="2242345"/>
-                  <a:pt x="1219952" y="2229607"/>
-                  <a:pt x="1168400" y="2243667"/>
-                </a:cubicBezTo>
-                <a:cubicBezTo>
-                  <a:pt x="1151180" y="2248363"/>
-                  <a:pt x="1133565" y="2252617"/>
-                  <a:pt x="1117600" y="2260600"/>
-                </a:cubicBezTo>
-                <a:cubicBezTo>
-                  <a:pt x="1106311" y="2266245"/>
-                  <a:pt x="1096074" y="2274889"/>
-                  <a:pt x="1083733" y="2277534"/>
-                </a:cubicBezTo>
-                <a:cubicBezTo>
-                  <a:pt x="1056000" y="2283477"/>
-                  <a:pt x="1027289" y="2283178"/>
-                  <a:pt x="999067" y="2286000"/>
-                </a:cubicBezTo>
-                <a:cubicBezTo>
-                  <a:pt x="990600" y="2288822"/>
-                  <a:pt x="982248" y="2292015"/>
-                  <a:pt x="973667" y="2294467"/>
-                </a:cubicBezTo>
-                <a:cubicBezTo>
-                  <a:pt x="899222" y="2315738"/>
-                  <a:pt x="975320" y="2291095"/>
-                  <a:pt x="914400" y="2311400"/>
-                </a:cubicBezTo>
-                <a:cubicBezTo>
-                  <a:pt x="905933" y="2317045"/>
-                  <a:pt x="898102" y="2323783"/>
-                  <a:pt x="889000" y="2328334"/>
-                </a:cubicBezTo>
-                <a:cubicBezTo>
-                  <a:pt x="876858" y="2334405"/>
-                  <a:pt x="840577" y="2342556"/>
-                  <a:pt x="829733" y="2345267"/>
-                </a:cubicBezTo>
-                <a:cubicBezTo>
-                  <a:pt x="778554" y="2332471"/>
-                  <a:pt x="806901" y="2340478"/>
-                  <a:pt x="745067" y="2319867"/>
-                </a:cubicBezTo>
-                <a:lnTo>
-                  <a:pt x="694267" y="2302934"/>
-                </a:lnTo>
-                <a:lnTo>
-                  <a:pt x="575733" y="2286000"/>
-                </a:lnTo>
-                <a:cubicBezTo>
-                  <a:pt x="512670" y="2243959"/>
-                  <a:pt x="590123" y="2297992"/>
-                  <a:pt x="524933" y="2243667"/>
-                </a:cubicBezTo>
-                <a:cubicBezTo>
-                  <a:pt x="517116" y="2237153"/>
-                  <a:pt x="507191" y="2233435"/>
-                  <a:pt x="499533" y="2226734"/>
-                </a:cubicBezTo>
-                <a:cubicBezTo>
-                  <a:pt x="484514" y="2213593"/>
-                  <a:pt x="457200" y="2184400"/>
-                  <a:pt x="457200" y="2184400"/>
-                </a:cubicBezTo>
-                <a:cubicBezTo>
-                  <a:pt x="436587" y="2122561"/>
-                  <a:pt x="444596" y="2150916"/>
-                  <a:pt x="431800" y="2099734"/>
-                </a:cubicBezTo>
-                <a:cubicBezTo>
-                  <a:pt x="431652" y="2093796"/>
-                  <a:pt x="457657" y="1812784"/>
-                  <a:pt x="406400" y="1710267"/>
-                </a:cubicBezTo>
-                <a:cubicBezTo>
-                  <a:pt x="400756" y="1698978"/>
-                  <a:pt x="394154" y="1688119"/>
-                  <a:pt x="389467" y="1676400"/>
-                </a:cubicBezTo>
-                <a:cubicBezTo>
-                  <a:pt x="382838" y="1659827"/>
-                  <a:pt x="385154" y="1638221"/>
-                  <a:pt x="372533" y="1625600"/>
-                </a:cubicBezTo>
-                <a:cubicBezTo>
-                  <a:pt x="364066" y="1617133"/>
-                  <a:pt x="354484" y="1609651"/>
-                  <a:pt x="347133" y="1600200"/>
-                </a:cubicBezTo>
-                <a:cubicBezTo>
-                  <a:pt x="334639" y="1584136"/>
-                  <a:pt x="313267" y="1549400"/>
-                  <a:pt x="313267" y="1549400"/>
-                </a:cubicBezTo>
-                <a:cubicBezTo>
-                  <a:pt x="308534" y="1530471"/>
-                  <a:pt x="296110" y="1477098"/>
-                  <a:pt x="287867" y="1464734"/>
-                </a:cubicBezTo>
-                <a:lnTo>
-                  <a:pt x="270933" y="1439334"/>
-                </a:lnTo>
-                <a:lnTo>
-                  <a:pt x="254000" y="1388534"/>
-                </a:lnTo>
-                <a:lnTo>
-                  <a:pt x="245533" y="1363134"/>
-                </a:lnTo>
-                <a:cubicBezTo>
-                  <a:pt x="224401" y="1236333"/>
-                  <a:pt x="250405" y="1394795"/>
-                  <a:pt x="228600" y="1253067"/>
-                </a:cubicBezTo>
-                <a:cubicBezTo>
-                  <a:pt x="225990" y="1236100"/>
-                  <a:pt x="223857" y="1219025"/>
-                  <a:pt x="220133" y="1202267"/>
-                </a:cubicBezTo>
-                <a:cubicBezTo>
-                  <a:pt x="218197" y="1193555"/>
-                  <a:pt x="214119" y="1185448"/>
-                  <a:pt x="211667" y="1176867"/>
-                </a:cubicBezTo>
-                <a:cubicBezTo>
-                  <a:pt x="208470" y="1165678"/>
-                  <a:pt x="208404" y="1153408"/>
-                  <a:pt x="203200" y="1143000"/>
-                </a:cubicBezTo>
-                <a:cubicBezTo>
-                  <a:pt x="193138" y="1122877"/>
-                  <a:pt x="176391" y="1107725"/>
-                  <a:pt x="160867" y="1092200"/>
-                </a:cubicBezTo>
-                <a:cubicBezTo>
-                  <a:pt x="158045" y="1083733"/>
-                  <a:pt x="156734" y="1074602"/>
-                  <a:pt x="152400" y="1066800"/>
-                </a:cubicBezTo>
-                <a:cubicBezTo>
-                  <a:pt x="142516" y="1049010"/>
-                  <a:pt x="118533" y="1016000"/>
-                  <a:pt x="118533" y="1016000"/>
-                </a:cubicBezTo>
-                <a:cubicBezTo>
-                  <a:pt x="87661" y="923378"/>
-                  <a:pt x="136896" y="1063665"/>
-                  <a:pt x="93133" y="965200"/>
-                </a:cubicBezTo>
-                <a:cubicBezTo>
-                  <a:pt x="85884" y="948889"/>
-                  <a:pt x="81844" y="931333"/>
-                  <a:pt x="76200" y="914400"/>
-                </a:cubicBezTo>
-                <a:lnTo>
-                  <a:pt x="59267" y="863600"/>
-                </a:lnTo>
-                <a:cubicBezTo>
-                  <a:pt x="46471" y="812421"/>
-                  <a:pt x="54478" y="840768"/>
-                  <a:pt x="33867" y="778934"/>
-                </a:cubicBezTo>
-                <a:lnTo>
-                  <a:pt x="8467" y="702734"/>
-                </a:lnTo>
-                <a:lnTo>
-                  <a:pt x="0" y="677334"/>
-                </a:lnTo>
-                <a:lnTo>
-                  <a:pt x="16933" y="575734"/>
-                </a:lnTo>
-                <a:close/>
-              </a:path>
-            </a:pathLst>
-          </a:custGeom>
+            <a:off x="7966686" y="3459263"/>
+            <a:ext cx="317343" cy="168434"/>
+          </a:xfrm>
+          <a:prstGeom prst="rect">
+            <a:avLst/>
+          </a:prstGeom>
           <a:solidFill>
-            <a:srgbClr val="7030A0">
-              <a:alpha val="60000"/>
+            <a:srgbClr val="FFFF00">
+              <a:alpha val="35000"/>
             </a:srgbClr>
           </a:solidFill>
           <a:ln>
@@ -7219,27 +5346,440 @@
           <a:bodyPr rtlCol="0" anchor="ctr"/>
           <a:lstStyle/>
           <a:p>
-            <a:r>
-              <a:rPr lang="en-US" sz="3200" b="1" dirty="0" smtClean="0">
-                <a:solidFill>
-                  <a:schemeClr val="bg1"/>
-                </a:solidFill>
-              </a:rPr>
-              <a:t>       </a:t>
-            </a:r>
-            <a:r>
-              <a:rPr lang="en-US" sz="3200" b="1" dirty="0" smtClean="0">
-                <a:solidFill>
-                  <a:schemeClr val="bg1"/>
-                </a:solidFill>
-              </a:rPr>
-              <a:t> Palm</a:t>
-            </a:r>
-            <a:endParaRPr lang="en-US" sz="3200" b="1" dirty="0">
-              <a:solidFill>
-                <a:schemeClr val="bg1"/>
-              </a:solidFill>
-            </a:endParaRPr>
+            <a:pPr algn="ctr"/>
+            <a:endParaRPr lang="en-US"/>
+          </a:p>
+        </p:txBody>
+      </p:sp>
+      <p:sp>
+        <p:nvSpPr>
+          <p:cNvPr id="125" name="Rectangle 124"/>
+          <p:cNvSpPr/>
+          <p:nvPr/>
+        </p:nvSpPr>
+        <p:spPr>
+          <a:xfrm>
+            <a:off x="7716316" y="4036205"/>
+            <a:ext cx="415313" cy="153821"/>
+          </a:xfrm>
+          <a:prstGeom prst="rect">
+            <a:avLst/>
+          </a:prstGeom>
+          <a:solidFill>
+            <a:srgbClr val="FFFF00">
+              <a:alpha val="35000"/>
+            </a:srgbClr>
+          </a:solidFill>
+          <a:ln>
+            <a:noFill/>
+          </a:ln>
+        </p:spPr>
+        <p:style>
+          <a:lnRef idx="2">
+            <a:schemeClr val="accent1">
+              <a:shade val="50000"/>
+            </a:schemeClr>
+          </a:lnRef>
+          <a:fillRef idx="1">
+            <a:schemeClr val="accent1"/>
+          </a:fillRef>
+          <a:effectRef idx="0">
+            <a:schemeClr val="accent1"/>
+          </a:effectRef>
+          <a:fontRef idx="minor">
+            <a:schemeClr val="lt1"/>
+          </a:fontRef>
+        </p:style>
+        <p:txBody>
+          <a:bodyPr rtlCol="0" anchor="ctr"/>
+          <a:lstStyle/>
+          <a:p>
+            <a:pPr algn="ctr"/>
+            <a:endParaRPr lang="en-US"/>
+          </a:p>
+        </p:txBody>
+      </p:sp>
+      <p:sp>
+        <p:nvSpPr>
+          <p:cNvPr id="126" name="Rectangle 125"/>
+          <p:cNvSpPr/>
+          <p:nvPr/>
+        </p:nvSpPr>
+        <p:spPr>
+          <a:xfrm>
+            <a:off x="6856342" y="2904087"/>
+            <a:ext cx="415313" cy="153821"/>
+          </a:xfrm>
+          <a:prstGeom prst="rect">
+            <a:avLst/>
+          </a:prstGeom>
+          <a:solidFill>
+            <a:srgbClr val="FFFF00">
+              <a:alpha val="35000"/>
+            </a:srgbClr>
+          </a:solidFill>
+          <a:ln>
+            <a:noFill/>
+          </a:ln>
+        </p:spPr>
+        <p:style>
+          <a:lnRef idx="2">
+            <a:schemeClr val="accent1">
+              <a:shade val="50000"/>
+            </a:schemeClr>
+          </a:lnRef>
+          <a:fillRef idx="1">
+            <a:schemeClr val="accent1"/>
+          </a:fillRef>
+          <a:effectRef idx="0">
+            <a:schemeClr val="accent1"/>
+          </a:effectRef>
+          <a:fontRef idx="minor">
+            <a:schemeClr val="lt1"/>
+          </a:fontRef>
+        </p:style>
+        <p:txBody>
+          <a:bodyPr rtlCol="0" anchor="ctr"/>
+          <a:lstStyle/>
+          <a:p>
+            <a:pPr algn="ctr"/>
+            <a:endParaRPr lang="en-US"/>
+          </a:p>
+        </p:txBody>
+      </p:sp>
+      <p:sp>
+        <p:nvSpPr>
+          <p:cNvPr id="127" name="Rectangle 126"/>
+          <p:cNvSpPr/>
+          <p:nvPr/>
+        </p:nvSpPr>
+        <p:spPr>
+          <a:xfrm>
+            <a:off x="6965198" y="2120319"/>
+            <a:ext cx="415313" cy="153821"/>
+          </a:xfrm>
+          <a:prstGeom prst="rect">
+            <a:avLst/>
+          </a:prstGeom>
+          <a:solidFill>
+            <a:srgbClr val="FFFF00">
+              <a:alpha val="35000"/>
+            </a:srgbClr>
+          </a:solidFill>
+          <a:ln>
+            <a:noFill/>
+          </a:ln>
+        </p:spPr>
+        <p:style>
+          <a:lnRef idx="2">
+            <a:schemeClr val="accent1">
+              <a:shade val="50000"/>
+            </a:schemeClr>
+          </a:lnRef>
+          <a:fillRef idx="1">
+            <a:schemeClr val="accent1"/>
+          </a:fillRef>
+          <a:effectRef idx="0">
+            <a:schemeClr val="accent1"/>
+          </a:effectRef>
+          <a:fontRef idx="minor">
+            <a:schemeClr val="lt1"/>
+          </a:fontRef>
+        </p:style>
+        <p:txBody>
+          <a:bodyPr rtlCol="0" anchor="ctr"/>
+          <a:lstStyle/>
+          <a:p>
+            <a:pPr algn="ctr"/>
+            <a:endParaRPr lang="en-US"/>
+          </a:p>
+        </p:txBody>
+      </p:sp>
+      <p:sp>
+        <p:nvSpPr>
+          <p:cNvPr id="128" name="Rectangle 127"/>
+          <p:cNvSpPr/>
+          <p:nvPr/>
+        </p:nvSpPr>
+        <p:spPr>
+          <a:xfrm>
+            <a:off x="7008740" y="1641347"/>
+            <a:ext cx="317569" cy="197162"/>
+          </a:xfrm>
+          <a:prstGeom prst="rect">
+            <a:avLst/>
+          </a:prstGeom>
+          <a:solidFill>
+            <a:srgbClr val="FFFF00">
+              <a:alpha val="35000"/>
+            </a:srgbClr>
+          </a:solidFill>
+          <a:ln>
+            <a:noFill/>
+          </a:ln>
+        </p:spPr>
+        <p:style>
+          <a:lnRef idx="2">
+            <a:schemeClr val="accent1">
+              <a:shade val="50000"/>
+            </a:schemeClr>
+          </a:lnRef>
+          <a:fillRef idx="1">
+            <a:schemeClr val="accent1"/>
+          </a:fillRef>
+          <a:effectRef idx="0">
+            <a:schemeClr val="accent1"/>
+          </a:effectRef>
+          <a:fontRef idx="minor">
+            <a:schemeClr val="lt1"/>
+          </a:fontRef>
+        </p:style>
+        <p:txBody>
+          <a:bodyPr rtlCol="0" anchor="ctr"/>
+          <a:lstStyle/>
+          <a:p>
+            <a:pPr algn="ctr"/>
+            <a:endParaRPr lang="en-US"/>
+          </a:p>
+        </p:txBody>
+      </p:sp>
+      <p:sp>
+        <p:nvSpPr>
+          <p:cNvPr id="129" name="Rectangle 128"/>
+          <p:cNvSpPr/>
+          <p:nvPr/>
+        </p:nvSpPr>
+        <p:spPr>
+          <a:xfrm>
+            <a:off x="3487638" y="3201126"/>
+            <a:ext cx="565618" cy="197162"/>
+          </a:xfrm>
+          <a:prstGeom prst="rect">
+            <a:avLst/>
+          </a:prstGeom>
+          <a:solidFill>
+            <a:srgbClr val="FFFF00">
+              <a:alpha val="35000"/>
+            </a:srgbClr>
+          </a:solidFill>
+          <a:ln>
+            <a:noFill/>
+          </a:ln>
+        </p:spPr>
+        <p:style>
+          <a:lnRef idx="2">
+            <a:schemeClr val="accent1">
+              <a:shade val="50000"/>
+            </a:schemeClr>
+          </a:lnRef>
+          <a:fillRef idx="1">
+            <a:schemeClr val="accent1"/>
+          </a:fillRef>
+          <a:effectRef idx="0">
+            <a:schemeClr val="accent1"/>
+          </a:effectRef>
+          <a:fontRef idx="minor">
+            <a:schemeClr val="lt1"/>
+          </a:fontRef>
+        </p:style>
+        <p:txBody>
+          <a:bodyPr rtlCol="0" anchor="ctr"/>
+          <a:lstStyle/>
+          <a:p>
+            <a:pPr algn="ctr"/>
+            <a:endParaRPr lang="en-US"/>
+          </a:p>
+        </p:txBody>
+      </p:sp>
+      <p:sp>
+        <p:nvSpPr>
+          <p:cNvPr id="130" name="Rectangle 129"/>
+          <p:cNvSpPr/>
+          <p:nvPr/>
+        </p:nvSpPr>
+        <p:spPr>
+          <a:xfrm>
+            <a:off x="3568476" y="4339492"/>
+            <a:ext cx="565618" cy="197162"/>
+          </a:xfrm>
+          <a:prstGeom prst="rect">
+            <a:avLst/>
+          </a:prstGeom>
+          <a:solidFill>
+            <a:srgbClr val="FFFF00">
+              <a:alpha val="35000"/>
+            </a:srgbClr>
+          </a:solidFill>
+          <a:ln>
+            <a:noFill/>
+          </a:ln>
+        </p:spPr>
+        <p:style>
+          <a:lnRef idx="2">
+            <a:schemeClr val="accent1">
+              <a:shade val="50000"/>
+            </a:schemeClr>
+          </a:lnRef>
+          <a:fillRef idx="1">
+            <a:schemeClr val="accent1"/>
+          </a:fillRef>
+          <a:effectRef idx="0">
+            <a:schemeClr val="accent1"/>
+          </a:effectRef>
+          <a:fontRef idx="minor">
+            <a:schemeClr val="lt1"/>
+          </a:fontRef>
+        </p:style>
+        <p:txBody>
+          <a:bodyPr rtlCol="0" anchor="ctr"/>
+          <a:lstStyle/>
+          <a:p>
+            <a:pPr algn="ctr"/>
+            <a:endParaRPr lang="en-US"/>
+          </a:p>
+        </p:txBody>
+      </p:sp>
+      <p:sp>
+        <p:nvSpPr>
+          <p:cNvPr id="131" name="Rectangle 130"/>
+          <p:cNvSpPr/>
+          <p:nvPr/>
+        </p:nvSpPr>
+        <p:spPr>
+          <a:xfrm>
+            <a:off x="4357523" y="4676077"/>
+            <a:ext cx="452781" cy="150155"/>
+          </a:xfrm>
+          <a:prstGeom prst="rect">
+            <a:avLst/>
+          </a:prstGeom>
+          <a:solidFill>
+            <a:srgbClr val="FFFF00">
+              <a:alpha val="35000"/>
+            </a:srgbClr>
+          </a:solidFill>
+          <a:ln>
+            <a:noFill/>
+          </a:ln>
+        </p:spPr>
+        <p:style>
+          <a:lnRef idx="2">
+            <a:schemeClr val="accent1">
+              <a:shade val="50000"/>
+            </a:schemeClr>
+          </a:lnRef>
+          <a:fillRef idx="1">
+            <a:schemeClr val="accent1"/>
+          </a:fillRef>
+          <a:effectRef idx="0">
+            <a:schemeClr val="accent1"/>
+          </a:effectRef>
+          <a:fontRef idx="minor">
+            <a:schemeClr val="lt1"/>
+          </a:fontRef>
+        </p:style>
+        <p:txBody>
+          <a:bodyPr rtlCol="0" anchor="ctr"/>
+          <a:lstStyle/>
+          <a:p>
+            <a:pPr algn="ctr"/>
+            <a:endParaRPr lang="en-US"/>
+          </a:p>
+        </p:txBody>
+      </p:sp>
+      <p:sp>
+        <p:nvSpPr>
+          <p:cNvPr id="132" name="Rectangle 131"/>
+          <p:cNvSpPr/>
+          <p:nvPr/>
+        </p:nvSpPr>
+        <p:spPr>
+          <a:xfrm>
+            <a:off x="4346479" y="5217592"/>
+            <a:ext cx="452781" cy="150155"/>
+          </a:xfrm>
+          <a:prstGeom prst="rect">
+            <a:avLst/>
+          </a:prstGeom>
+          <a:solidFill>
+            <a:srgbClr val="FFFF00">
+              <a:alpha val="35000"/>
+            </a:srgbClr>
+          </a:solidFill>
+          <a:ln>
+            <a:noFill/>
+          </a:ln>
+        </p:spPr>
+        <p:style>
+          <a:lnRef idx="2">
+            <a:schemeClr val="accent1">
+              <a:shade val="50000"/>
+            </a:schemeClr>
+          </a:lnRef>
+          <a:fillRef idx="1">
+            <a:schemeClr val="accent1"/>
+          </a:fillRef>
+          <a:effectRef idx="0">
+            <a:schemeClr val="accent1"/>
+          </a:effectRef>
+          <a:fontRef idx="minor">
+            <a:schemeClr val="lt1"/>
+          </a:fontRef>
+        </p:style>
+        <p:txBody>
+          <a:bodyPr rtlCol="0" anchor="ctr"/>
+          <a:lstStyle/>
+          <a:p>
+            <a:pPr algn="ctr"/>
+            <a:endParaRPr lang="en-US"/>
+          </a:p>
+        </p:txBody>
+      </p:sp>
+      <p:sp>
+        <p:nvSpPr>
+          <p:cNvPr id="133" name="Rectangle 132"/>
+          <p:cNvSpPr/>
+          <p:nvPr/>
+        </p:nvSpPr>
+        <p:spPr>
+          <a:xfrm>
+            <a:off x="4373629" y="5931027"/>
+            <a:ext cx="452781" cy="150155"/>
+          </a:xfrm>
+          <a:prstGeom prst="rect">
+            <a:avLst/>
+          </a:prstGeom>
+          <a:solidFill>
+            <a:srgbClr val="FFFF00">
+              <a:alpha val="35000"/>
+            </a:srgbClr>
+          </a:solidFill>
+          <a:ln>
+            <a:noFill/>
+          </a:ln>
+        </p:spPr>
+        <p:style>
+          <a:lnRef idx="2">
+            <a:schemeClr val="accent1">
+              <a:shade val="50000"/>
+            </a:schemeClr>
+          </a:lnRef>
+          <a:fillRef idx="1">
+            <a:schemeClr val="accent1"/>
+          </a:fillRef>
+          <a:effectRef idx="0">
+            <a:schemeClr val="accent1"/>
+          </a:effectRef>
+          <a:fontRef idx="minor">
+            <a:schemeClr val="lt1"/>
+          </a:fontRef>
+        </p:style>
+        <p:txBody>
+          <a:bodyPr rtlCol="0" anchor="ctr"/>
+          <a:lstStyle/>
+          <a:p>
+            <a:pPr algn="ctr"/>
+            <a:endParaRPr lang="en-US"/>
           </a:p>
         </p:txBody>
       </p:sp>

</xml_diff>

<commit_message>
Revert "Revert "Finalizing protocol and other found glitches""
This reverts commit 290251500cdd31f2b4ed3022d2fddbeaf2463175.
</commit_message>
<xml_diff>
--- a/Manual_Paw_Joints_Marking/Paw Point Markers Diagram Powerpoint.pptx
+++ b/Manual_Paw_Joints_Marking/Paw Point Markers Diagram Powerpoint.pptx
@@ -104,6 +104,11 @@
       </a:defRPr>
     </a:lvl9pPr>
   </p:defaultTextStyle>
+  <p:extLst>
+    <p:ext uri="{EFAFB233-063F-42B5-8137-9DF3F51BA10A}">
+      <p15:sldGuideLst xmlns:p15="http://schemas.microsoft.com/office/powerpoint/2012/main"/>
+    </p:ext>
+  </p:extLst>
 </p:presentation>
 </file>
 
@@ -238,7 +243,7 @@
           <a:p>
             <a:fld id="{4C8643DD-90E0-4107-8D69-F122CF1CE135}" type="datetimeFigureOut">
               <a:rPr lang="en-US" smtClean="0"/>
-              <a:t>6/22/2015</a:t>
+              <a:t>7/1/2015</a:t>
             </a:fld>
             <a:endParaRPr lang="en-US"/>
           </a:p>
@@ -408,7 +413,7 @@
           <a:p>
             <a:fld id="{4C8643DD-90E0-4107-8D69-F122CF1CE135}" type="datetimeFigureOut">
               <a:rPr lang="en-US" smtClean="0"/>
-              <a:t>6/22/2015</a:t>
+              <a:t>7/1/2015</a:t>
             </a:fld>
             <a:endParaRPr lang="en-US"/>
           </a:p>
@@ -588,7 +593,7 @@
           <a:p>
             <a:fld id="{4C8643DD-90E0-4107-8D69-F122CF1CE135}" type="datetimeFigureOut">
               <a:rPr lang="en-US" smtClean="0"/>
-              <a:t>6/22/2015</a:t>
+              <a:t>7/1/2015</a:t>
             </a:fld>
             <a:endParaRPr lang="en-US"/>
           </a:p>
@@ -758,7 +763,7 @@
           <a:p>
             <a:fld id="{4C8643DD-90E0-4107-8D69-F122CF1CE135}" type="datetimeFigureOut">
               <a:rPr lang="en-US" smtClean="0"/>
-              <a:t>6/22/2015</a:t>
+              <a:t>7/1/2015</a:t>
             </a:fld>
             <a:endParaRPr lang="en-US"/>
           </a:p>
@@ -1004,7 +1009,7 @@
           <a:p>
             <a:fld id="{4C8643DD-90E0-4107-8D69-F122CF1CE135}" type="datetimeFigureOut">
               <a:rPr lang="en-US" smtClean="0"/>
-              <a:t>6/22/2015</a:t>
+              <a:t>7/1/2015</a:t>
             </a:fld>
             <a:endParaRPr lang="en-US"/>
           </a:p>
@@ -1236,7 +1241,7 @@
           <a:p>
             <a:fld id="{4C8643DD-90E0-4107-8D69-F122CF1CE135}" type="datetimeFigureOut">
               <a:rPr lang="en-US" smtClean="0"/>
-              <a:t>6/22/2015</a:t>
+              <a:t>7/1/2015</a:t>
             </a:fld>
             <a:endParaRPr lang="en-US"/>
           </a:p>
@@ -1603,7 +1608,7 @@
           <a:p>
             <a:fld id="{4C8643DD-90E0-4107-8D69-F122CF1CE135}" type="datetimeFigureOut">
               <a:rPr lang="en-US" smtClean="0"/>
-              <a:t>6/22/2015</a:t>
+              <a:t>7/1/2015</a:t>
             </a:fld>
             <a:endParaRPr lang="en-US"/>
           </a:p>
@@ -1721,7 +1726,7 @@
           <a:p>
             <a:fld id="{4C8643DD-90E0-4107-8D69-F122CF1CE135}" type="datetimeFigureOut">
               <a:rPr lang="en-US" smtClean="0"/>
-              <a:t>6/22/2015</a:t>
+              <a:t>7/1/2015</a:t>
             </a:fld>
             <a:endParaRPr lang="en-US"/>
           </a:p>
@@ -1816,7 +1821,7 @@
           <a:p>
             <a:fld id="{4C8643DD-90E0-4107-8D69-F122CF1CE135}" type="datetimeFigureOut">
               <a:rPr lang="en-US" smtClean="0"/>
-              <a:t>6/22/2015</a:t>
+              <a:t>7/1/2015</a:t>
             </a:fld>
             <a:endParaRPr lang="en-US"/>
           </a:p>
@@ -2093,7 +2098,7 @@
           <a:p>
             <a:fld id="{4C8643DD-90E0-4107-8D69-F122CF1CE135}" type="datetimeFigureOut">
               <a:rPr lang="en-US" smtClean="0"/>
-              <a:t>6/22/2015</a:t>
+              <a:t>7/1/2015</a:t>
             </a:fld>
             <a:endParaRPr lang="en-US"/>
           </a:p>
@@ -2346,7 +2351,7 @@
           <a:p>
             <a:fld id="{4C8643DD-90E0-4107-8D69-F122CF1CE135}" type="datetimeFigureOut">
               <a:rPr lang="en-US" smtClean="0"/>
-              <a:t>6/22/2015</a:t>
+              <a:t>7/1/2015</a:t>
             </a:fld>
             <a:endParaRPr lang="en-US"/>
           </a:p>
@@ -2559,7 +2564,7 @@
           <a:p>
             <a:fld id="{4C8643DD-90E0-4107-8D69-F122CF1CE135}" type="datetimeFigureOut">
               <a:rPr lang="en-US" smtClean="0"/>
-              <a:t>6/22/2015</a:t>
+              <a:t>7/1/2015</a:t>
             </a:fld>
             <a:endParaRPr lang="en-US"/>
           </a:p>
@@ -3045,7 +3050,7 @@
         </p:nvSpPr>
         <p:spPr bwMode="auto">
           <a:xfrm>
-            <a:off x="8848724" y="4086905"/>
+            <a:off x="9257217" y="4571840"/>
             <a:ext cx="428625" cy="409575"/>
           </a:xfrm>
           <a:prstGeom prst="ellipse">
@@ -3132,7 +3137,7 @@
         </p:nvSpPr>
         <p:spPr bwMode="auto">
           <a:xfrm>
-            <a:off x="9169719" y="3291563"/>
+            <a:off x="9234780" y="3805182"/>
             <a:ext cx="428625" cy="409575"/>
           </a:xfrm>
           <a:prstGeom prst="ellipse">
@@ -3219,7 +3224,7 @@
         </p:nvSpPr>
         <p:spPr bwMode="auto">
           <a:xfrm>
-            <a:off x="9531122" y="2597654"/>
+            <a:off x="9638780" y="2888234"/>
             <a:ext cx="428625" cy="409575"/>
           </a:xfrm>
           <a:prstGeom prst="ellipse">
@@ -3306,7 +3311,7 @@
         </p:nvSpPr>
         <p:spPr bwMode="auto">
           <a:xfrm>
-            <a:off x="8512319" y="1872341"/>
+            <a:off x="8742697" y="2092029"/>
             <a:ext cx="428625" cy="409575"/>
           </a:xfrm>
           <a:prstGeom prst="ellipse">
@@ -3385,7 +3390,7 @@
         </p:nvSpPr>
         <p:spPr bwMode="auto">
           <a:xfrm>
-            <a:off x="8395590" y="1198109"/>
+            <a:off x="8508854" y="1248187"/>
             <a:ext cx="428625" cy="409575"/>
           </a:xfrm>
           <a:prstGeom prst="ellipse">
@@ -3464,7 +3469,7 @@
         </p:nvSpPr>
         <p:spPr bwMode="auto">
           <a:xfrm>
-            <a:off x="7488411" y="405490"/>
+            <a:off x="7621761" y="615040"/>
             <a:ext cx="428625" cy="409575"/>
           </a:xfrm>
           <a:prstGeom prst="ellipse">
@@ -3554,9 +3559,9 @@
           </a:stretch>
         </p:blipFill>
         <p:spPr>
-          <a:xfrm rot="14143565">
-            <a:off x="6789609" y="3306623"/>
-            <a:ext cx="884557" cy="3193036"/>
+          <a:xfrm rot="15234035">
+            <a:off x="7007852" y="3134028"/>
+            <a:ext cx="941888" cy="3399986"/>
           </a:xfrm>
           <a:prstGeom prst="rect">
             <a:avLst/>
@@ -3584,8 +3589,8 @@
           </a:stretch>
         </p:blipFill>
         <p:spPr>
-          <a:xfrm rot="14143565">
-            <a:off x="7802007" y="2904408"/>
+          <a:xfrm rot="14934727">
+            <a:off x="7877458" y="3113934"/>
             <a:ext cx="572974" cy="2068297"/>
           </a:xfrm>
           <a:prstGeom prst="rect">
@@ -3614,9 +3619,9 @@
           </a:stretch>
         </p:blipFill>
         <p:spPr>
-          <a:xfrm rot="14143565">
-            <a:off x="8188063" y="2197518"/>
-            <a:ext cx="572974" cy="2068297"/>
+          <a:xfrm rot="14581177">
+            <a:off x="8256784" y="2293934"/>
+            <a:ext cx="585410" cy="2113188"/>
           </a:xfrm>
           <a:prstGeom prst="rect">
             <a:avLst/>
@@ -3645,8 +3650,8 @@
         </p:blipFill>
         <p:spPr>
           <a:xfrm rot="8843385">
-            <a:off x="4710320" y="683242"/>
-            <a:ext cx="417744" cy="1507955"/>
+            <a:off x="4604225" y="320548"/>
+            <a:ext cx="518641" cy="1872169"/>
           </a:xfrm>
           <a:prstGeom prst="rect">
             <a:avLst/>
@@ -3674,9 +3679,9 @@
           </a:stretch>
         </p:blipFill>
         <p:spPr>
-          <a:xfrm rot="5862735">
-            <a:off x="3729435" y="1831132"/>
-            <a:ext cx="400478" cy="1445628"/>
+          <a:xfrm rot="2869124">
+            <a:off x="3401105" y="2204230"/>
+            <a:ext cx="553152" cy="1996744"/>
           </a:xfrm>
           <a:prstGeom prst="rect">
             <a:avLst/>
@@ -3704,9 +3709,9 @@
           </a:stretch>
         </p:blipFill>
         <p:spPr>
-          <a:xfrm rot="5028337">
-            <a:off x="3766769" y="2832402"/>
-            <a:ext cx="572974" cy="2068297"/>
+          <a:xfrm rot="2471502">
+            <a:off x="3678220" y="3406441"/>
+            <a:ext cx="723812" cy="2612787"/>
           </a:xfrm>
           <a:prstGeom prst="rect">
             <a:avLst/>
@@ -3734,9 +3739,9 @@
           </a:stretch>
         </p:blipFill>
         <p:spPr>
-          <a:xfrm rot="5174921">
-            <a:off x="3544839" y="2085256"/>
-            <a:ext cx="534235" cy="1928458"/>
+          <a:xfrm rot="2504184">
+            <a:off x="3513768" y="2640392"/>
+            <a:ext cx="577995" cy="2431933"/>
           </a:xfrm>
           <a:prstGeom prst="rect">
             <a:avLst/>
@@ -3764,9 +3769,9 @@
           </a:stretch>
         </p:blipFill>
         <p:spPr>
-          <a:xfrm rot="7995929">
-            <a:off x="4598122" y="1185145"/>
-            <a:ext cx="470939" cy="1699976"/>
+          <a:xfrm rot="7845659">
+            <a:off x="4374686" y="871765"/>
+            <a:ext cx="577495" cy="2084616"/>
           </a:xfrm>
           <a:prstGeom prst="rect">
             <a:avLst/>
@@ -3794,9 +3799,9 @@
           </a:stretch>
         </p:blipFill>
         <p:spPr>
-          <a:xfrm rot="8091361">
-            <a:off x="4555164" y="1702897"/>
-            <a:ext cx="619004" cy="2234454"/>
+          <a:xfrm rot="7934390">
+            <a:off x="4354189" y="1437646"/>
+            <a:ext cx="708532" cy="2557627"/>
           </a:xfrm>
           <a:prstGeom prst="rect">
             <a:avLst/>
@@ -3824,9 +3829,9 @@
           </a:stretch>
         </p:blipFill>
         <p:spPr>
-          <a:xfrm rot="11058583">
-            <a:off x="5860276" y="645974"/>
-            <a:ext cx="301580" cy="1088631"/>
+          <a:xfrm rot="8331613">
+            <a:off x="5544246" y="837925"/>
+            <a:ext cx="265688" cy="959071"/>
           </a:xfrm>
           <a:prstGeom prst="rect">
             <a:avLst/>
@@ -3854,9 +3859,9 @@
           </a:stretch>
         </p:blipFill>
         <p:spPr>
-          <a:xfrm rot="9066144">
-            <a:off x="5493218" y="1045098"/>
-            <a:ext cx="393129" cy="1419100"/>
+          <a:xfrm rot="11021896">
+            <a:off x="5836103" y="553731"/>
+            <a:ext cx="533127" cy="1924459"/>
           </a:xfrm>
           <a:prstGeom prst="rect">
             <a:avLst/>
@@ -3915,8 +3920,8 @@
         </p:blipFill>
         <p:spPr>
           <a:xfrm rot="13788628">
-            <a:off x="7109718" y="955540"/>
-            <a:ext cx="572974" cy="2068297"/>
+            <a:off x="7162663" y="901584"/>
+            <a:ext cx="601187" cy="2170139"/>
           </a:xfrm>
           <a:prstGeom prst="rect">
             <a:avLst/>
@@ -3944,9 +3949,9 @@
           </a:stretch>
         </p:blipFill>
         <p:spPr>
-          <a:xfrm rot="13539613">
-            <a:off x="7017532" y="1591382"/>
-            <a:ext cx="688017" cy="2483574"/>
+          <a:xfrm rot="13897894">
+            <a:off x="7112416" y="1553794"/>
+            <a:ext cx="733093" cy="2646287"/>
           </a:xfrm>
           <a:prstGeom prst="rect">
             <a:avLst/>
@@ -3963,7 +3968,7 @@
         </p:nvSpPr>
         <p:spPr bwMode="auto">
           <a:xfrm>
-            <a:off x="5980758" y="107373"/>
+            <a:off x="5104907" y="325885"/>
             <a:ext cx="539800" cy="507043"/>
           </a:xfrm>
           <a:prstGeom prst="ellipse">
@@ -4042,7 +4047,7 @@
         </p:nvSpPr>
         <p:spPr bwMode="auto">
           <a:xfrm>
-            <a:off x="5139789" y="612557"/>
+            <a:off x="6231160" y="136630"/>
             <a:ext cx="428625" cy="409575"/>
           </a:xfrm>
           <a:prstGeom prst="ellipse">
@@ -4116,7 +4121,7 @@
         </p:nvSpPr>
         <p:spPr bwMode="auto">
           <a:xfrm>
-            <a:off x="6934889" y="-95888"/>
+            <a:off x="7185607" y="-103736"/>
             <a:ext cx="428625" cy="409575"/>
           </a:xfrm>
           <a:prstGeom prst="ellipse">
@@ -4195,7 +4200,7 @@
         </p:nvSpPr>
         <p:spPr bwMode="auto">
           <a:xfrm>
-            <a:off x="4357524" y="150210"/>
+            <a:off x="4123040" y="-158461"/>
             <a:ext cx="539800" cy="507043"/>
           </a:xfrm>
           <a:prstGeom prst="ellipse">
@@ -4266,7 +4271,7 @@
       </p:sp>
       <p:sp>
         <p:nvSpPr>
-          <p:cNvPr id="100" name="Oval 32"/>
+          <p:cNvPr id="101" name="Oval 32"/>
           <p:cNvSpPr>
             <a:spLocks noChangeArrowheads="1"/>
           </p:cNvSpPr>
@@ -4274,7 +4279,7 @@
         </p:nvSpPr>
         <p:spPr bwMode="auto">
           <a:xfrm>
-            <a:off x="3956568" y="764571"/>
+            <a:off x="3397175" y="1369276"/>
             <a:ext cx="539800" cy="507043"/>
           </a:xfrm>
           <a:prstGeom prst="ellipse">
@@ -4328,7 +4333,7 @@
                 <a:latin typeface="Calibri" panose="020F0502020204030204" pitchFamily="34" charset="0"/>
                 <a:cs typeface="Times New Roman" panose="02020603050405020304" pitchFamily="18" charset="0"/>
               </a:rPr>
-              <a:t>12</a:t>
+              <a:t>13</a:t>
             </a:r>
             <a:endParaRPr kumimoji="0" lang="en-US" altLang="en-US" sz="1800" b="0" i="0" u="none" strike="noStrike" cap="none" normalizeH="0" baseline="0" dirty="0" smtClean="0">
               <a:ln>
@@ -4345,7 +4350,7 @@
       </p:sp>
       <p:sp>
         <p:nvSpPr>
-          <p:cNvPr id="101" name="Oval 32"/>
+          <p:cNvPr id="102" name="Oval 32"/>
           <p:cNvSpPr>
             <a:spLocks noChangeArrowheads="1"/>
           </p:cNvSpPr>
@@ -4353,7 +4358,7 @@
         </p:nvSpPr>
         <p:spPr bwMode="auto">
           <a:xfrm>
-            <a:off x="3763022" y="1391341"/>
+            <a:off x="2201866" y="3457759"/>
             <a:ext cx="539800" cy="507043"/>
           </a:xfrm>
           <a:prstGeom prst="ellipse">
@@ -4407,7 +4412,7 @@
                 <a:latin typeface="Calibri" panose="020F0502020204030204" pitchFamily="34" charset="0"/>
                 <a:cs typeface="Times New Roman" panose="02020603050405020304" pitchFamily="18" charset="0"/>
               </a:rPr>
-              <a:t>13</a:t>
+              <a:t>14</a:t>
             </a:r>
             <a:endParaRPr kumimoji="0" lang="en-US" altLang="en-US" sz="1800" b="0" i="0" u="none" strike="noStrike" cap="none" normalizeH="0" baseline="0" dirty="0" smtClean="0">
               <a:ln>
@@ -4424,7 +4429,7 @@
       </p:sp>
       <p:sp>
         <p:nvSpPr>
-          <p:cNvPr id="102" name="Oval 32"/>
+          <p:cNvPr id="103" name="Oval 32"/>
           <p:cNvSpPr>
             <a:spLocks noChangeArrowheads="1"/>
           </p:cNvSpPr>
@@ -4432,7 +4437,7 @@
         </p:nvSpPr>
         <p:spPr bwMode="auto">
           <a:xfrm>
-            <a:off x="2697166" y="1838509"/>
+            <a:off x="2216846" y="4410462"/>
             <a:ext cx="539800" cy="507043"/>
           </a:xfrm>
           <a:prstGeom prst="ellipse">
@@ -4486,24 +4491,14 @@
                 <a:latin typeface="Calibri" panose="020F0502020204030204" pitchFamily="34" charset="0"/>
                 <a:cs typeface="Times New Roman" panose="02020603050405020304" pitchFamily="18" charset="0"/>
               </a:rPr>
-              <a:t>14</a:t>
-            </a:r>
-            <a:endParaRPr kumimoji="0" lang="en-US" altLang="en-US" sz="1800" b="0" i="0" u="none" strike="noStrike" cap="none" normalizeH="0" baseline="0" dirty="0" smtClean="0">
-              <a:ln>
-                <a:noFill/>
-              </a:ln>
-              <a:solidFill>
-                <a:schemeClr val="tx1"/>
-              </a:solidFill>
-              <a:effectLst/>
-              <a:latin typeface="Arial" panose="020B0604020202020204" pitchFamily="34" charset="0"/>
-            </a:endParaRPr>
-          </a:p>
-        </p:txBody>
-      </p:sp>
-      <p:sp>
-        <p:nvSpPr>
-          <p:cNvPr id="103" name="Oval 32"/>
+              <a:t>15</a:t>
+            </a:r>
+          </a:p>
+        </p:txBody>
+      </p:sp>
+      <p:sp>
+        <p:nvSpPr>
+          <p:cNvPr id="104" name="Oval 32"/>
           <p:cNvSpPr>
             <a:spLocks noChangeArrowheads="1"/>
           </p:cNvSpPr>
@@ -4511,7 +4506,7 @@
         </p:nvSpPr>
         <p:spPr bwMode="auto">
           <a:xfrm>
-            <a:off x="2245421" y="2543562"/>
+            <a:off x="2395079" y="5344868"/>
             <a:ext cx="539800" cy="507043"/>
           </a:xfrm>
           <a:prstGeom prst="ellipse">
@@ -4565,14 +4560,168 @@
                 <a:latin typeface="Calibri" panose="020F0502020204030204" pitchFamily="34" charset="0"/>
                 <a:cs typeface="Times New Roman" panose="02020603050405020304" pitchFamily="18" charset="0"/>
               </a:rPr>
-              <a:t>15</a:t>
-            </a:r>
-          </a:p>
-        </p:txBody>
-      </p:sp>
-      <p:sp>
-        <p:nvSpPr>
-          <p:cNvPr id="104" name="Oval 32"/>
+              <a:t>16</a:t>
+            </a:r>
+            <a:endParaRPr kumimoji="0" lang="en-US" altLang="en-US" sz="1800" b="0" i="0" u="none" strike="noStrike" cap="none" normalizeH="0" baseline="0" dirty="0" smtClean="0">
+              <a:ln>
+                <a:noFill/>
+              </a:ln>
+              <a:solidFill>
+                <a:schemeClr val="tx1"/>
+              </a:solidFill>
+              <a:effectLst/>
+              <a:latin typeface="Arial" panose="020B0604020202020204" pitchFamily="34" charset="0"/>
+            </a:endParaRPr>
+          </a:p>
+        </p:txBody>
+      </p:sp>
+      <p:sp>
+        <p:nvSpPr>
+          <p:cNvPr id="2068" name="TextBox 2067"/>
+          <p:cNvSpPr txBox="1"/>
+          <p:nvPr/>
+        </p:nvSpPr>
+        <p:spPr>
+          <a:xfrm>
+            <a:off x="9646049" y="4591962"/>
+            <a:ext cx="1492992" cy="369332"/>
+          </a:xfrm>
+          <a:prstGeom prst="rect">
+            <a:avLst/>
+          </a:prstGeom>
+          <a:noFill/>
+          <a:ln>
+            <a:noFill/>
+          </a:ln>
+        </p:spPr>
+        <p:txBody>
+          <a:bodyPr wrap="square" rtlCol="0">
+            <a:spAutoFit/>
+          </a:bodyPr>
+          <a:lstStyle/>
+          <a:p>
+            <a:r>
+              <a:rPr lang="en-US" dirty="0" smtClean="0"/>
+              <a:t>Center of Paw</a:t>
+            </a:r>
+            <a:endParaRPr lang="en-US" dirty="0"/>
+          </a:p>
+        </p:txBody>
+      </p:sp>
+      <p:sp>
+        <p:nvSpPr>
+          <p:cNvPr id="106" name="TextBox 105"/>
+          <p:cNvSpPr txBox="1"/>
+          <p:nvPr/>
+        </p:nvSpPr>
+        <p:spPr>
+          <a:xfrm>
+            <a:off x="9646049" y="3711476"/>
+            <a:ext cx="2425535" cy="803277"/>
+          </a:xfrm>
+          <a:prstGeom prst="rect">
+            <a:avLst/>
+          </a:prstGeom>
+          <a:noFill/>
+          <a:ln>
+            <a:noFill/>
+          </a:ln>
+        </p:spPr>
+        <p:txBody>
+          <a:bodyPr wrap="square" rtlCol="0">
+            <a:normAutofit fontScale="92500"/>
+          </a:bodyPr>
+          <a:lstStyle/>
+          <a:p>
+            <a:r>
+              <a:rPr lang="en-US" dirty="0" smtClean="0"/>
+              <a:t>Thumb Metacarpal- Proximal Phalanges Joint</a:t>
+            </a:r>
+            <a:endParaRPr lang="en-US" dirty="0"/>
+          </a:p>
+        </p:txBody>
+      </p:sp>
+      <p:sp>
+        <p:nvSpPr>
+          <p:cNvPr id="107" name="TextBox 106"/>
+          <p:cNvSpPr txBox="1"/>
+          <p:nvPr/>
+        </p:nvSpPr>
+        <p:spPr>
+          <a:xfrm>
+            <a:off x="10002567" y="2786615"/>
+            <a:ext cx="2077192" cy="683534"/>
+          </a:xfrm>
+          <a:prstGeom prst="rect">
+            <a:avLst/>
+          </a:prstGeom>
+          <a:noFill/>
+          <a:ln>
+            <a:noFill/>
+          </a:ln>
+        </p:spPr>
+        <p:txBody>
+          <a:bodyPr wrap="square" rtlCol="0">
+            <a:normAutofit fontScale="92500"/>
+          </a:bodyPr>
+          <a:lstStyle/>
+          <a:p>
+            <a:r>
+              <a:rPr lang="en-US" dirty="0" smtClean="0"/>
+              <a:t>Thumb Proximal-Distal Phalanges Joint</a:t>
+            </a:r>
+            <a:endParaRPr lang="en-US" dirty="0"/>
+          </a:p>
+        </p:txBody>
+      </p:sp>
+      <p:sp>
+        <p:nvSpPr>
+          <p:cNvPr id="108" name="TextBox 107"/>
+          <p:cNvSpPr txBox="1"/>
+          <p:nvPr/>
+        </p:nvSpPr>
+        <p:spPr>
+          <a:xfrm>
+            <a:off x="9138958" y="2021650"/>
+            <a:ext cx="3100451" cy="562555"/>
+          </a:xfrm>
+          <a:prstGeom prst="rect">
+            <a:avLst/>
+          </a:prstGeom>
+          <a:noFill/>
+          <a:ln>
+            <a:noFill/>
+          </a:ln>
+        </p:spPr>
+        <p:txBody>
+          <a:bodyPr wrap="square" rtlCol="0">
+            <a:normAutofit fontScale="92500" lnSpcReduction="10000"/>
+          </a:bodyPr>
+          <a:lstStyle/>
+          <a:p>
+            <a:r>
+              <a:rPr lang="en-US" dirty="0"/>
+              <a:t>Index </a:t>
+            </a:r>
+            <a:r>
+              <a:rPr lang="en-US" dirty="0" smtClean="0"/>
+              <a:t>Finger Metacarpal- </a:t>
+            </a:r>
+            <a:r>
+              <a:rPr lang="en-US" dirty="0"/>
+              <a:t>Proximal Phalanges </a:t>
+            </a:r>
+            <a:r>
+              <a:rPr lang="en-US" dirty="0" smtClean="0"/>
+              <a:t>Joint</a:t>
+            </a:r>
+            <a:endParaRPr lang="en-US" dirty="0"/>
+          </a:p>
+        </p:txBody>
+      </p:sp>
+      <p:sp>
+        <p:nvSpPr>
+          <p:cNvPr id="109" name="Oval 27"/>
           <p:cNvSpPr>
             <a:spLocks noChangeArrowheads="1"/>
           </p:cNvSpPr>
@@ -4580,8 +4729,8 @@
         </p:nvSpPr>
         <p:spPr bwMode="auto">
           <a:xfrm>
-            <a:off x="2413578" y="3407024"/>
-            <a:ext cx="539800" cy="507043"/>
+            <a:off x="9407107" y="5130217"/>
+            <a:ext cx="428625" cy="409575"/>
           </a:xfrm>
           <a:prstGeom prst="ellipse">
             <a:avLst/>
@@ -4630,11 +4779,11 @@
               <a:tabLst/>
             </a:pPr>
             <a:r>
-              <a:rPr lang="en-US" altLang="en-US" sz="1400" b="1" dirty="0" smtClean="0">
+              <a:rPr lang="en-US" altLang="en-US" sz="1400" b="1" dirty="0">
                 <a:latin typeface="Calibri" panose="020F0502020204030204" pitchFamily="34" charset="0"/>
                 <a:cs typeface="Times New Roman" panose="02020603050405020304" pitchFamily="18" charset="0"/>
               </a:rPr>
-              <a:t>16</a:t>
+              <a:t>1</a:t>
             </a:r>
             <a:endParaRPr kumimoji="0" lang="en-US" altLang="en-US" sz="1800" b="0" i="0" u="none" strike="noStrike" cap="none" normalizeH="0" baseline="0" dirty="0" smtClean="0">
               <a:ln>
@@ -4651,14 +4800,14 @@
       </p:sp>
       <p:sp>
         <p:nvSpPr>
-          <p:cNvPr id="2068" name="TextBox 2067"/>
+          <p:cNvPr id="110" name="TextBox 109"/>
           <p:cNvSpPr txBox="1"/>
           <p:nvPr/>
         </p:nvSpPr>
         <p:spPr>
           <a:xfrm>
-            <a:off x="9349179" y="4089172"/>
-            <a:ext cx="1492992" cy="369332"/>
+            <a:off x="9795494" y="5153252"/>
+            <a:ext cx="1645392" cy="369332"/>
           </a:xfrm>
           <a:prstGeom prst="rect">
             <a:avLst/>
@@ -4676,7 +4825,7 @@
           <a:p>
             <a:r>
               <a:rPr lang="en-US" dirty="0" smtClean="0"/>
-              <a:t>Center of Paw</a:t>
+              <a:t>Center of Pellet</a:t>
             </a:r>
             <a:endParaRPr lang="en-US" dirty="0"/>
           </a:p>
@@ -4684,14 +4833,14 @@
       </p:sp>
       <p:sp>
         <p:nvSpPr>
-          <p:cNvPr id="106" name="TextBox 105"/>
+          <p:cNvPr id="111" name="TextBox 110"/>
           <p:cNvSpPr txBox="1"/>
           <p:nvPr/>
         </p:nvSpPr>
         <p:spPr>
           <a:xfrm>
-            <a:off x="9664865" y="3283630"/>
-            <a:ext cx="1776022" cy="369332"/>
+            <a:off x="8885766" y="1154921"/>
+            <a:ext cx="3209308" cy="632856"/>
           </a:xfrm>
           <a:prstGeom prst="rect">
             <a:avLst/>
@@ -4703,28 +4852,36 @@
         </p:spPr>
         <p:txBody>
           <a:bodyPr wrap="square" rtlCol="0">
-            <a:spAutoFit/>
+            <a:normAutofit/>
           </a:bodyPr>
           <a:lstStyle/>
           <a:p>
             <a:r>
-              <a:rPr lang="en-US" dirty="0" smtClean="0"/>
-              <a:t>Far Thumb Joint</a:t>
-            </a:r>
-            <a:endParaRPr lang="en-US" dirty="0"/>
-          </a:p>
-        </p:txBody>
-      </p:sp>
-      <p:sp>
-        <p:nvSpPr>
-          <p:cNvPr id="107" name="TextBox 106"/>
+              <a:rPr lang="en-US" sz="1700" dirty="0" smtClean="0"/>
+              <a:t>Index Finger </a:t>
+            </a:r>
+            <a:r>
+              <a:rPr lang="en-US" sz="1700" dirty="0"/>
+              <a:t>Proximal-Middle Phalanges </a:t>
+            </a:r>
+            <a:r>
+              <a:rPr lang="en-US" sz="1700" dirty="0" smtClean="0"/>
+              <a:t>Joint</a:t>
+            </a:r>
+            <a:endParaRPr lang="en-US" sz="1700" dirty="0"/>
+          </a:p>
+        </p:txBody>
+      </p:sp>
+      <p:sp>
+        <p:nvSpPr>
+          <p:cNvPr id="112" name="TextBox 111"/>
           <p:cNvSpPr txBox="1"/>
           <p:nvPr/>
         </p:nvSpPr>
         <p:spPr>
           <a:xfrm>
-            <a:off x="10013207" y="2597827"/>
-            <a:ext cx="1863108" cy="369332"/>
+            <a:off x="8005791" y="648152"/>
+            <a:ext cx="4134598" cy="618211"/>
           </a:xfrm>
           <a:prstGeom prst="rect">
             <a:avLst/>
@@ -4736,28 +4893,36 @@
         </p:spPr>
         <p:txBody>
           <a:bodyPr wrap="square" rtlCol="0">
-            <a:spAutoFit/>
+            <a:normAutofit/>
           </a:bodyPr>
           <a:lstStyle/>
           <a:p>
             <a:r>
-              <a:rPr lang="en-US" dirty="0" smtClean="0"/>
-              <a:t>Near Thumb Joint</a:t>
-            </a:r>
-            <a:endParaRPr lang="en-US" dirty="0"/>
-          </a:p>
-        </p:txBody>
-      </p:sp>
-      <p:sp>
-        <p:nvSpPr>
-          <p:cNvPr id="108" name="TextBox 107"/>
+              <a:rPr lang="en-US" sz="1700" dirty="0" smtClean="0"/>
+              <a:t>Index Finger </a:t>
+            </a:r>
+            <a:r>
+              <a:rPr lang="en-US" sz="1700" dirty="0"/>
+              <a:t>Middle-Distal Phalanges </a:t>
+            </a:r>
+            <a:r>
+              <a:rPr lang="en-US" sz="1700" dirty="0" smtClean="0"/>
+              <a:t>Joint</a:t>
+            </a:r>
+            <a:endParaRPr lang="en-US" sz="1700" dirty="0"/>
+          </a:p>
+        </p:txBody>
+      </p:sp>
+      <p:sp>
+        <p:nvSpPr>
+          <p:cNvPr id="113" name="TextBox 112"/>
           <p:cNvSpPr txBox="1"/>
           <p:nvPr/>
         </p:nvSpPr>
         <p:spPr>
           <a:xfrm>
-            <a:off x="8989948" y="1879375"/>
-            <a:ext cx="2363852" cy="369332"/>
+            <a:off x="-358803" y="3496350"/>
+            <a:ext cx="2599435" cy="515746"/>
           </a:xfrm>
           <a:prstGeom prst="rect">
             <a:avLst/>
@@ -4769,13 +4934,29 @@
         </p:spPr>
         <p:txBody>
           <a:bodyPr wrap="square" rtlCol="0">
-            <a:spAutoFit/>
+            <a:normAutofit fontScale="92500" lnSpcReduction="20000"/>
           </a:bodyPr>
           <a:lstStyle/>
           <a:p>
+            <a:pPr algn="r"/>
             <a:r>
               <a:rPr lang="en-US" dirty="0" smtClean="0"/>
-              <a:t>Far Index Finger Joint</a:t>
+              <a:t>Pinky Finger Middle-</a:t>
+            </a:r>
+          </a:p>
+          <a:p>
+            <a:pPr algn="r"/>
+            <a:r>
+              <a:rPr lang="en-US" dirty="0" smtClean="0"/>
+              <a:t>Distal </a:t>
+            </a:r>
+            <a:r>
+              <a:rPr lang="en-US" dirty="0"/>
+              <a:t>Phalanges </a:t>
+            </a:r>
+            <a:r>
+              <a:rPr lang="en-US" dirty="0" smtClean="0"/>
+              <a:t>Joint</a:t>
             </a:r>
             <a:endParaRPr lang="en-US" dirty="0"/>
           </a:p>
@@ -4783,7 +4964,803 @@
       </p:sp>
       <p:sp>
         <p:nvSpPr>
-          <p:cNvPr id="109" name="Oval 27"/>
+          <p:cNvPr id="115" name="TextBox 114"/>
+          <p:cNvSpPr txBox="1"/>
+          <p:nvPr/>
+        </p:nvSpPr>
+        <p:spPr>
+          <a:xfrm>
+            <a:off x="-286557" y="4428222"/>
+            <a:ext cx="2514609" cy="507217"/>
+          </a:xfrm>
+          <a:prstGeom prst="rect">
+            <a:avLst/>
+          </a:prstGeom>
+          <a:noFill/>
+          <a:ln>
+            <a:noFill/>
+          </a:ln>
+        </p:spPr>
+        <p:txBody>
+          <a:bodyPr wrap="square" rtlCol="0">
+            <a:normAutofit fontScale="92500" lnSpcReduction="20000"/>
+          </a:bodyPr>
+          <a:lstStyle/>
+          <a:p>
+            <a:pPr algn="r"/>
+            <a:r>
+              <a:rPr lang="en-US" dirty="0" smtClean="0"/>
+              <a:t>Pinky Finger Proximal-</a:t>
+            </a:r>
+          </a:p>
+          <a:p>
+            <a:pPr algn="r"/>
+            <a:r>
+              <a:rPr lang="en-US" dirty="0" smtClean="0"/>
+              <a:t>Middle </a:t>
+            </a:r>
+            <a:r>
+              <a:rPr lang="en-US" dirty="0"/>
+              <a:t>Phalanges </a:t>
+            </a:r>
+            <a:r>
+              <a:rPr lang="en-US" dirty="0" smtClean="0"/>
+              <a:t>Joint</a:t>
+            </a:r>
+            <a:endParaRPr lang="en-US" dirty="0"/>
+          </a:p>
+        </p:txBody>
+      </p:sp>
+      <p:sp>
+        <p:nvSpPr>
+          <p:cNvPr id="116" name="TextBox 115"/>
+          <p:cNvSpPr txBox="1"/>
+          <p:nvPr/>
+        </p:nvSpPr>
+        <p:spPr>
+          <a:xfrm>
+            <a:off x="22356" y="5192936"/>
+            <a:ext cx="2346486" cy="810909"/>
+          </a:xfrm>
+          <a:prstGeom prst="rect">
+            <a:avLst/>
+          </a:prstGeom>
+          <a:noFill/>
+          <a:ln>
+            <a:noFill/>
+          </a:ln>
+        </p:spPr>
+        <p:txBody>
+          <a:bodyPr wrap="square" rtlCol="0">
+            <a:noAutofit/>
+          </a:bodyPr>
+          <a:lstStyle/>
+          <a:p>
+            <a:pPr algn="r"/>
+            <a:r>
+              <a:rPr lang="en-US" sz="1700" dirty="0"/>
+              <a:t>Pinky Finger Metacarpal- </a:t>
+            </a:r>
+          </a:p>
+          <a:p>
+            <a:pPr algn="r"/>
+            <a:r>
+              <a:rPr lang="en-US" sz="1700" dirty="0" smtClean="0"/>
+              <a:t>Proximal </a:t>
+            </a:r>
+            <a:r>
+              <a:rPr lang="en-US" sz="1700" dirty="0"/>
+              <a:t>Phalanges </a:t>
+            </a:r>
+            <a:r>
+              <a:rPr lang="en-US" sz="1700" dirty="0" smtClean="0"/>
+              <a:t>Joint</a:t>
+            </a:r>
+            <a:endParaRPr lang="en-US" sz="1700" dirty="0"/>
+          </a:p>
+        </p:txBody>
+      </p:sp>
+      <p:sp>
+        <p:nvSpPr>
+          <p:cNvPr id="118" name="TextBox 117"/>
+          <p:cNvSpPr txBox="1"/>
+          <p:nvPr/>
+        </p:nvSpPr>
+        <p:spPr>
+          <a:xfrm>
+            <a:off x="-127121" y="-89632"/>
+            <a:ext cx="4308492" cy="557141"/>
+          </a:xfrm>
+          <a:prstGeom prst="rect">
+            <a:avLst/>
+          </a:prstGeom>
+          <a:noFill/>
+          <a:ln>
+            <a:noFill/>
+          </a:ln>
+        </p:spPr>
+        <p:txBody>
+          <a:bodyPr wrap="square" rtlCol="0">
+            <a:normAutofit fontScale="92500" lnSpcReduction="20000"/>
+          </a:bodyPr>
+          <a:lstStyle/>
+          <a:p>
+            <a:pPr algn="r"/>
+            <a:r>
+              <a:rPr lang="en-US" dirty="0" smtClean="0"/>
+              <a:t>Ring Finger Middle-</a:t>
+            </a:r>
+          </a:p>
+          <a:p>
+            <a:pPr algn="r"/>
+            <a:r>
+              <a:rPr lang="en-US" dirty="0" smtClean="0"/>
+              <a:t>Distal </a:t>
+            </a:r>
+            <a:r>
+              <a:rPr lang="en-US" dirty="0"/>
+              <a:t>Phalanges </a:t>
+            </a:r>
+            <a:r>
+              <a:rPr lang="en-US" dirty="0" smtClean="0"/>
+              <a:t>Joint</a:t>
+            </a:r>
+            <a:endParaRPr lang="en-US" dirty="0"/>
+          </a:p>
+        </p:txBody>
+      </p:sp>
+      <p:sp>
+        <p:nvSpPr>
+          <p:cNvPr id="119" name="TextBox 118"/>
+          <p:cNvSpPr txBox="1"/>
+          <p:nvPr/>
+        </p:nvSpPr>
+        <p:spPr>
+          <a:xfrm>
+            <a:off x="-293785" y="505827"/>
+            <a:ext cx="3869852" cy="619745"/>
+          </a:xfrm>
+          <a:prstGeom prst="rect">
+            <a:avLst/>
+          </a:prstGeom>
+          <a:noFill/>
+          <a:ln>
+            <a:noFill/>
+          </a:ln>
+        </p:spPr>
+        <p:txBody>
+          <a:bodyPr wrap="square" rtlCol="0">
+            <a:noAutofit/>
+          </a:bodyPr>
+          <a:lstStyle/>
+          <a:p>
+            <a:pPr algn="r"/>
+            <a:r>
+              <a:rPr lang="en-US" sz="1700" dirty="0" smtClean="0"/>
+              <a:t>Ring Finger Proximal-</a:t>
+            </a:r>
+          </a:p>
+          <a:p>
+            <a:pPr algn="r"/>
+            <a:r>
+              <a:rPr lang="en-US" sz="1700" dirty="0" smtClean="0"/>
+              <a:t>Middle </a:t>
+            </a:r>
+            <a:r>
+              <a:rPr lang="en-US" sz="1700" dirty="0"/>
+              <a:t>Phalanges </a:t>
+            </a:r>
+            <a:r>
+              <a:rPr lang="en-US" sz="1700" dirty="0" smtClean="0"/>
+              <a:t>Joint</a:t>
+            </a:r>
+            <a:endParaRPr lang="en-US" sz="1700" dirty="0"/>
+          </a:p>
+        </p:txBody>
+      </p:sp>
+      <p:sp>
+        <p:nvSpPr>
+          <p:cNvPr id="120" name="TextBox 119"/>
+          <p:cNvSpPr txBox="1"/>
+          <p:nvPr/>
+        </p:nvSpPr>
+        <p:spPr>
+          <a:xfrm>
+            <a:off x="-329245" y="1367091"/>
+            <a:ext cx="3707202" cy="508229"/>
+          </a:xfrm>
+          <a:prstGeom prst="rect">
+            <a:avLst/>
+          </a:prstGeom>
+          <a:noFill/>
+          <a:ln>
+            <a:noFill/>
+          </a:ln>
+        </p:spPr>
+        <p:txBody>
+          <a:bodyPr wrap="square" rtlCol="0">
+            <a:normAutofit fontScale="92500" lnSpcReduction="20000"/>
+          </a:bodyPr>
+          <a:lstStyle/>
+          <a:p>
+            <a:pPr algn="r"/>
+            <a:r>
+              <a:rPr lang="en-US" dirty="0"/>
+              <a:t>Ring Finger Metacarpal- </a:t>
+            </a:r>
+            <a:endParaRPr lang="en-US" dirty="0" smtClean="0"/>
+          </a:p>
+          <a:p>
+            <a:pPr algn="r"/>
+            <a:r>
+              <a:rPr lang="en-US" dirty="0" smtClean="0"/>
+              <a:t>Proximal </a:t>
+            </a:r>
+            <a:r>
+              <a:rPr lang="en-US" dirty="0"/>
+              <a:t>Phalanges Joint</a:t>
+            </a:r>
+          </a:p>
+          <a:p>
+            <a:pPr algn="r"/>
+            <a:endParaRPr lang="en-US" dirty="0"/>
+          </a:p>
+        </p:txBody>
+      </p:sp>
+      <p:sp>
+        <p:nvSpPr>
+          <p:cNvPr id="121" name="TextBox 120"/>
+          <p:cNvSpPr txBox="1"/>
+          <p:nvPr/>
+        </p:nvSpPr>
+        <p:spPr>
+          <a:xfrm>
+            <a:off x="7557580" y="-182563"/>
+            <a:ext cx="3301236" cy="563164"/>
+          </a:xfrm>
+          <a:prstGeom prst="rect">
+            <a:avLst/>
+          </a:prstGeom>
+          <a:noFill/>
+          <a:ln>
+            <a:noFill/>
+          </a:ln>
+        </p:spPr>
+        <p:txBody>
+          <a:bodyPr wrap="square" rtlCol="0">
+            <a:normAutofit fontScale="92500" lnSpcReduction="10000"/>
+          </a:bodyPr>
+          <a:lstStyle/>
+          <a:p>
+            <a:r>
+              <a:rPr lang="en-US" dirty="0"/>
+              <a:t>Middle Finger Metacarpal- Proximal Phalanges </a:t>
+            </a:r>
+            <a:r>
+              <a:rPr lang="en-US" dirty="0" smtClean="0"/>
+              <a:t>Joint </a:t>
+            </a:r>
+            <a:endParaRPr lang="en-US" dirty="0"/>
+          </a:p>
+        </p:txBody>
+      </p:sp>
+      <p:sp>
+        <p:nvSpPr>
+          <p:cNvPr id="122" name="TextBox 121"/>
+          <p:cNvSpPr txBox="1"/>
+          <p:nvPr/>
+        </p:nvSpPr>
+        <p:spPr>
+          <a:xfrm>
+            <a:off x="4793075" y="-1313894"/>
+            <a:ext cx="1127029" cy="1542174"/>
+          </a:xfrm>
+          <a:prstGeom prst="rect">
+            <a:avLst/>
+          </a:prstGeom>
+          <a:noFill/>
+          <a:ln>
+            <a:noFill/>
+          </a:ln>
+        </p:spPr>
+        <p:txBody>
+          <a:bodyPr wrap="square" rtlCol="0">
+            <a:noAutofit/>
+          </a:bodyPr>
+          <a:lstStyle/>
+          <a:p>
+            <a:pPr algn="ctr"/>
+            <a:r>
+              <a:rPr lang="en-US" sz="1700" dirty="0" smtClean="0"/>
+              <a:t>Middle Finger </a:t>
+            </a:r>
+            <a:r>
+              <a:rPr lang="en-US" sz="1700" dirty="0"/>
+              <a:t>Middle-Distal Phalanges </a:t>
+            </a:r>
+            <a:r>
+              <a:rPr lang="en-US" sz="1700" dirty="0" smtClean="0"/>
+              <a:t>Joint</a:t>
+            </a:r>
+            <a:endParaRPr lang="en-US" sz="1700" dirty="0"/>
+          </a:p>
+        </p:txBody>
+      </p:sp>
+      <p:sp>
+        <p:nvSpPr>
+          <p:cNvPr id="123" name="TextBox 122"/>
+          <p:cNvSpPr txBox="1"/>
+          <p:nvPr/>
+        </p:nvSpPr>
+        <p:spPr>
+          <a:xfrm>
+            <a:off x="5984046" y="-1486510"/>
+            <a:ext cx="1150397" cy="1934894"/>
+          </a:xfrm>
+          <a:prstGeom prst="rect">
+            <a:avLst/>
+          </a:prstGeom>
+          <a:noFill/>
+          <a:ln>
+            <a:noFill/>
+          </a:ln>
+        </p:spPr>
+        <p:txBody>
+          <a:bodyPr wrap="square" rtlCol="0">
+            <a:normAutofit/>
+          </a:bodyPr>
+          <a:lstStyle/>
+          <a:p>
+            <a:pPr algn="ctr"/>
+            <a:r>
+              <a:rPr lang="en-US" sz="1700" dirty="0" smtClean="0"/>
+              <a:t>Middle Finger </a:t>
+            </a:r>
+            <a:r>
+              <a:rPr lang="en-US" sz="1700" dirty="0"/>
+              <a:t>Proximal-Middle Phalanges </a:t>
+            </a:r>
+            <a:r>
+              <a:rPr lang="en-US" sz="1700" dirty="0" smtClean="0"/>
+              <a:t>Joint</a:t>
+            </a:r>
+            <a:endParaRPr lang="en-US" sz="1700" dirty="0"/>
+          </a:p>
+        </p:txBody>
+      </p:sp>
+      <p:sp>
+        <p:nvSpPr>
+          <p:cNvPr id="2070" name="Rectangle 2069"/>
+          <p:cNvSpPr/>
+          <p:nvPr/>
+        </p:nvSpPr>
+        <p:spPr>
+          <a:xfrm>
+            <a:off x="7966686" y="3459263"/>
+            <a:ext cx="317343" cy="168434"/>
+          </a:xfrm>
+          <a:prstGeom prst="rect">
+            <a:avLst/>
+          </a:prstGeom>
+          <a:solidFill>
+            <a:srgbClr val="FFFF00">
+              <a:alpha val="35000"/>
+            </a:srgbClr>
+          </a:solidFill>
+          <a:ln>
+            <a:noFill/>
+          </a:ln>
+        </p:spPr>
+        <p:style>
+          <a:lnRef idx="2">
+            <a:schemeClr val="accent1">
+              <a:shade val="50000"/>
+            </a:schemeClr>
+          </a:lnRef>
+          <a:fillRef idx="1">
+            <a:schemeClr val="accent1"/>
+          </a:fillRef>
+          <a:effectRef idx="0">
+            <a:schemeClr val="accent1"/>
+          </a:effectRef>
+          <a:fontRef idx="minor">
+            <a:schemeClr val="lt1"/>
+          </a:fontRef>
+        </p:style>
+        <p:txBody>
+          <a:bodyPr rtlCol="0" anchor="ctr"/>
+          <a:lstStyle/>
+          <a:p>
+            <a:pPr algn="ctr"/>
+            <a:endParaRPr lang="en-US"/>
+          </a:p>
+        </p:txBody>
+      </p:sp>
+      <p:sp>
+        <p:nvSpPr>
+          <p:cNvPr id="125" name="Rectangle 124"/>
+          <p:cNvSpPr/>
+          <p:nvPr/>
+        </p:nvSpPr>
+        <p:spPr>
+          <a:xfrm>
+            <a:off x="7716316" y="4036205"/>
+            <a:ext cx="415313" cy="153821"/>
+          </a:xfrm>
+          <a:prstGeom prst="rect">
+            <a:avLst/>
+          </a:prstGeom>
+          <a:solidFill>
+            <a:srgbClr val="FFFF00">
+              <a:alpha val="35000"/>
+            </a:srgbClr>
+          </a:solidFill>
+          <a:ln>
+            <a:noFill/>
+          </a:ln>
+        </p:spPr>
+        <p:style>
+          <a:lnRef idx="2">
+            <a:schemeClr val="accent1">
+              <a:shade val="50000"/>
+            </a:schemeClr>
+          </a:lnRef>
+          <a:fillRef idx="1">
+            <a:schemeClr val="accent1"/>
+          </a:fillRef>
+          <a:effectRef idx="0">
+            <a:schemeClr val="accent1"/>
+          </a:effectRef>
+          <a:fontRef idx="minor">
+            <a:schemeClr val="lt1"/>
+          </a:fontRef>
+        </p:style>
+        <p:txBody>
+          <a:bodyPr rtlCol="0" anchor="ctr"/>
+          <a:lstStyle/>
+          <a:p>
+            <a:pPr algn="ctr"/>
+            <a:endParaRPr lang="en-US"/>
+          </a:p>
+        </p:txBody>
+      </p:sp>
+      <p:sp>
+        <p:nvSpPr>
+          <p:cNvPr id="126" name="Rectangle 125"/>
+          <p:cNvSpPr/>
+          <p:nvPr/>
+        </p:nvSpPr>
+        <p:spPr>
+          <a:xfrm>
+            <a:off x="6856342" y="2904087"/>
+            <a:ext cx="415313" cy="153821"/>
+          </a:xfrm>
+          <a:prstGeom prst="rect">
+            <a:avLst/>
+          </a:prstGeom>
+          <a:solidFill>
+            <a:srgbClr val="FFFF00">
+              <a:alpha val="35000"/>
+            </a:srgbClr>
+          </a:solidFill>
+          <a:ln>
+            <a:noFill/>
+          </a:ln>
+        </p:spPr>
+        <p:style>
+          <a:lnRef idx="2">
+            <a:schemeClr val="accent1">
+              <a:shade val="50000"/>
+            </a:schemeClr>
+          </a:lnRef>
+          <a:fillRef idx="1">
+            <a:schemeClr val="accent1"/>
+          </a:fillRef>
+          <a:effectRef idx="0">
+            <a:schemeClr val="accent1"/>
+          </a:effectRef>
+          <a:fontRef idx="minor">
+            <a:schemeClr val="lt1"/>
+          </a:fontRef>
+        </p:style>
+        <p:txBody>
+          <a:bodyPr rtlCol="0" anchor="ctr"/>
+          <a:lstStyle/>
+          <a:p>
+            <a:pPr algn="ctr"/>
+            <a:endParaRPr lang="en-US"/>
+          </a:p>
+        </p:txBody>
+      </p:sp>
+      <p:sp>
+        <p:nvSpPr>
+          <p:cNvPr id="127" name="Rectangle 126"/>
+          <p:cNvSpPr/>
+          <p:nvPr/>
+        </p:nvSpPr>
+        <p:spPr>
+          <a:xfrm>
+            <a:off x="6965198" y="2120319"/>
+            <a:ext cx="415313" cy="153821"/>
+          </a:xfrm>
+          <a:prstGeom prst="rect">
+            <a:avLst/>
+          </a:prstGeom>
+          <a:solidFill>
+            <a:srgbClr val="FFFF00">
+              <a:alpha val="35000"/>
+            </a:srgbClr>
+          </a:solidFill>
+          <a:ln>
+            <a:noFill/>
+          </a:ln>
+        </p:spPr>
+        <p:style>
+          <a:lnRef idx="2">
+            <a:schemeClr val="accent1">
+              <a:shade val="50000"/>
+            </a:schemeClr>
+          </a:lnRef>
+          <a:fillRef idx="1">
+            <a:schemeClr val="accent1"/>
+          </a:fillRef>
+          <a:effectRef idx="0">
+            <a:schemeClr val="accent1"/>
+          </a:effectRef>
+          <a:fontRef idx="minor">
+            <a:schemeClr val="lt1"/>
+          </a:fontRef>
+        </p:style>
+        <p:txBody>
+          <a:bodyPr rtlCol="0" anchor="ctr"/>
+          <a:lstStyle/>
+          <a:p>
+            <a:pPr algn="ctr"/>
+            <a:endParaRPr lang="en-US"/>
+          </a:p>
+        </p:txBody>
+      </p:sp>
+      <p:sp>
+        <p:nvSpPr>
+          <p:cNvPr id="128" name="Rectangle 127"/>
+          <p:cNvSpPr/>
+          <p:nvPr/>
+        </p:nvSpPr>
+        <p:spPr>
+          <a:xfrm>
+            <a:off x="7008740" y="1641347"/>
+            <a:ext cx="317569" cy="197162"/>
+          </a:xfrm>
+          <a:prstGeom prst="rect">
+            <a:avLst/>
+          </a:prstGeom>
+          <a:solidFill>
+            <a:srgbClr val="FFFF00">
+              <a:alpha val="35000"/>
+            </a:srgbClr>
+          </a:solidFill>
+          <a:ln>
+            <a:noFill/>
+          </a:ln>
+        </p:spPr>
+        <p:style>
+          <a:lnRef idx="2">
+            <a:schemeClr val="accent1">
+              <a:shade val="50000"/>
+            </a:schemeClr>
+          </a:lnRef>
+          <a:fillRef idx="1">
+            <a:schemeClr val="accent1"/>
+          </a:fillRef>
+          <a:effectRef idx="0">
+            <a:schemeClr val="accent1"/>
+          </a:effectRef>
+          <a:fontRef idx="minor">
+            <a:schemeClr val="lt1"/>
+          </a:fontRef>
+        </p:style>
+        <p:txBody>
+          <a:bodyPr rtlCol="0" anchor="ctr"/>
+          <a:lstStyle/>
+          <a:p>
+            <a:pPr algn="ctr"/>
+            <a:endParaRPr lang="en-US"/>
+          </a:p>
+        </p:txBody>
+      </p:sp>
+      <p:sp>
+        <p:nvSpPr>
+          <p:cNvPr id="129" name="Rectangle 128"/>
+          <p:cNvSpPr/>
+          <p:nvPr/>
+        </p:nvSpPr>
+        <p:spPr>
+          <a:xfrm>
+            <a:off x="3487638" y="3201126"/>
+            <a:ext cx="565618" cy="197162"/>
+          </a:xfrm>
+          <a:prstGeom prst="rect">
+            <a:avLst/>
+          </a:prstGeom>
+          <a:solidFill>
+            <a:srgbClr val="FFFF00">
+              <a:alpha val="35000"/>
+            </a:srgbClr>
+          </a:solidFill>
+          <a:ln>
+            <a:noFill/>
+          </a:ln>
+        </p:spPr>
+        <p:style>
+          <a:lnRef idx="2">
+            <a:schemeClr val="accent1">
+              <a:shade val="50000"/>
+            </a:schemeClr>
+          </a:lnRef>
+          <a:fillRef idx="1">
+            <a:schemeClr val="accent1"/>
+          </a:fillRef>
+          <a:effectRef idx="0">
+            <a:schemeClr val="accent1"/>
+          </a:effectRef>
+          <a:fontRef idx="minor">
+            <a:schemeClr val="lt1"/>
+          </a:fontRef>
+        </p:style>
+        <p:txBody>
+          <a:bodyPr rtlCol="0" anchor="ctr"/>
+          <a:lstStyle/>
+          <a:p>
+            <a:pPr algn="ctr"/>
+            <a:endParaRPr lang="en-US"/>
+          </a:p>
+        </p:txBody>
+      </p:sp>
+      <p:sp>
+        <p:nvSpPr>
+          <p:cNvPr id="130" name="Rectangle 129"/>
+          <p:cNvSpPr/>
+          <p:nvPr/>
+        </p:nvSpPr>
+        <p:spPr>
+          <a:xfrm>
+            <a:off x="3568476" y="4339492"/>
+            <a:ext cx="565618" cy="197162"/>
+          </a:xfrm>
+          <a:prstGeom prst="rect">
+            <a:avLst/>
+          </a:prstGeom>
+          <a:solidFill>
+            <a:srgbClr val="FFFF00">
+              <a:alpha val="35000"/>
+            </a:srgbClr>
+          </a:solidFill>
+          <a:ln>
+            <a:noFill/>
+          </a:ln>
+        </p:spPr>
+        <p:style>
+          <a:lnRef idx="2">
+            <a:schemeClr val="accent1">
+              <a:shade val="50000"/>
+            </a:schemeClr>
+          </a:lnRef>
+          <a:fillRef idx="1">
+            <a:schemeClr val="accent1"/>
+          </a:fillRef>
+          <a:effectRef idx="0">
+            <a:schemeClr val="accent1"/>
+          </a:effectRef>
+          <a:fontRef idx="minor">
+            <a:schemeClr val="lt1"/>
+          </a:fontRef>
+        </p:style>
+        <p:txBody>
+          <a:bodyPr rtlCol="0" anchor="ctr"/>
+          <a:lstStyle/>
+          <a:p>
+            <a:pPr algn="ctr"/>
+            <a:endParaRPr lang="en-US"/>
+          </a:p>
+        </p:txBody>
+      </p:sp>
+      <p:sp>
+        <p:nvSpPr>
+          <p:cNvPr id="131" name="Rectangle 130"/>
+          <p:cNvSpPr/>
+          <p:nvPr/>
+        </p:nvSpPr>
+        <p:spPr>
+          <a:xfrm>
+            <a:off x="4357523" y="4676077"/>
+            <a:ext cx="452781" cy="150155"/>
+          </a:xfrm>
+          <a:prstGeom prst="rect">
+            <a:avLst/>
+          </a:prstGeom>
+          <a:solidFill>
+            <a:srgbClr val="FFFF00">
+              <a:alpha val="35000"/>
+            </a:srgbClr>
+          </a:solidFill>
+          <a:ln>
+            <a:noFill/>
+          </a:ln>
+        </p:spPr>
+        <p:style>
+          <a:lnRef idx="2">
+            <a:schemeClr val="accent1">
+              <a:shade val="50000"/>
+            </a:schemeClr>
+          </a:lnRef>
+          <a:fillRef idx="1">
+            <a:schemeClr val="accent1"/>
+          </a:fillRef>
+          <a:effectRef idx="0">
+            <a:schemeClr val="accent1"/>
+          </a:effectRef>
+          <a:fontRef idx="minor">
+            <a:schemeClr val="lt1"/>
+          </a:fontRef>
+        </p:style>
+        <p:txBody>
+          <a:bodyPr rtlCol="0" anchor="ctr"/>
+          <a:lstStyle/>
+          <a:p>
+            <a:pPr algn="ctr"/>
+            <a:endParaRPr lang="en-US"/>
+          </a:p>
+        </p:txBody>
+      </p:sp>
+      <p:sp>
+        <p:nvSpPr>
+          <p:cNvPr id="2" name="Rectangle 1"/>
+          <p:cNvSpPr/>
+          <p:nvPr/>
+        </p:nvSpPr>
+        <p:spPr>
+          <a:xfrm>
+            <a:off x="3487638" y="1154921"/>
+            <a:ext cx="190043" cy="162539"/>
+          </a:xfrm>
+          <a:prstGeom prst="rect">
+            <a:avLst/>
+          </a:prstGeom>
+          <a:solidFill>
+            <a:schemeClr val="bg1"/>
+          </a:solidFill>
+          <a:ln>
+            <a:noFill/>
+          </a:ln>
+        </p:spPr>
+        <p:style>
+          <a:lnRef idx="2">
+            <a:schemeClr val="accent1">
+              <a:shade val="50000"/>
+            </a:schemeClr>
+          </a:lnRef>
+          <a:fillRef idx="1">
+            <a:schemeClr val="accent1"/>
+          </a:fillRef>
+          <a:effectRef idx="0">
+            <a:schemeClr val="accent1"/>
+          </a:effectRef>
+          <a:fontRef idx="minor">
+            <a:schemeClr val="lt1"/>
+          </a:fontRef>
+        </p:style>
+        <p:txBody>
+          <a:bodyPr rtlCol="0" anchor="ctr"/>
+          <a:lstStyle/>
+          <a:p>
+            <a:pPr algn="ctr"/>
+            <a:endParaRPr lang="en-US"/>
+          </a:p>
+        </p:txBody>
+      </p:sp>
+      <p:sp>
+        <p:nvSpPr>
+          <p:cNvPr id="100" name="Oval 32"/>
           <p:cNvSpPr>
             <a:spLocks noChangeArrowheads="1"/>
           </p:cNvSpPr>
@@ -4791,8 +5768,8 @@
         </p:nvSpPr>
         <p:spPr bwMode="auto">
           <a:xfrm>
-            <a:off x="9295039" y="5131935"/>
-            <a:ext cx="428625" cy="409575"/>
+            <a:off x="3542584" y="599471"/>
+            <a:ext cx="539800" cy="507043"/>
           </a:xfrm>
           <a:prstGeom prst="ellipse">
             <a:avLst/>
@@ -4841,11 +5818,11 @@
               <a:tabLst/>
             </a:pPr>
             <a:r>
-              <a:rPr lang="en-US" altLang="en-US" sz="1400" b="1" dirty="0">
+              <a:rPr lang="en-US" altLang="en-US" sz="1400" b="1" dirty="0" smtClean="0">
                 <a:latin typeface="Calibri" panose="020F0502020204030204" pitchFamily="34" charset="0"/>
                 <a:cs typeface="Times New Roman" panose="02020603050405020304" pitchFamily="18" charset="0"/>
               </a:rPr>
-              <a:t>1</a:t>
+              <a:t>12</a:t>
             </a:r>
             <a:endParaRPr kumimoji="0" lang="en-US" altLang="en-US" sz="1800" b="0" i="0" u="none" strike="noStrike" cap="none" normalizeH="0" baseline="0" dirty="0" smtClean="0">
               <a:ln>
@@ -4862,464 +5839,1360 @@
       </p:sp>
       <p:sp>
         <p:nvSpPr>
-          <p:cNvPr id="110" name="TextBox 109"/>
-          <p:cNvSpPr txBox="1"/>
+          <p:cNvPr id="3" name="Freeform 2"/>
+          <p:cNvSpPr/>
           <p:nvPr/>
         </p:nvSpPr>
         <p:spPr>
           <a:xfrm>
-            <a:off x="9795494" y="5134202"/>
-            <a:ext cx="1645392" cy="369332"/>
-          </a:xfrm>
-          <a:prstGeom prst="rect">
+            <a:off x="4851400" y="3445933"/>
+            <a:ext cx="2556933" cy="2345267"/>
+          </a:xfrm>
+          <a:custGeom>
             <a:avLst/>
-          </a:prstGeom>
-          <a:noFill/>
-          <a:ln>
-            <a:noFill/>
-          </a:ln>
-        </p:spPr>
-        <p:txBody>
-          <a:bodyPr wrap="square" rtlCol="0">
-            <a:spAutoFit/>
-          </a:bodyPr>
-          <a:lstStyle/>
-          <a:p>
-            <a:r>
-              <a:rPr lang="en-US" dirty="0" smtClean="0"/>
-              <a:t>Center of Pellet</a:t>
-            </a:r>
-            <a:endParaRPr lang="en-US" dirty="0"/>
-          </a:p>
-        </p:txBody>
-      </p:sp>
-      <p:sp>
-        <p:nvSpPr>
-          <p:cNvPr id="111" name="TextBox 110"/>
-          <p:cNvSpPr txBox="1"/>
-          <p:nvPr/>
-        </p:nvSpPr>
-        <p:spPr>
-          <a:xfrm>
-            <a:off x="8881090" y="1193579"/>
-            <a:ext cx="2559796" cy="369332"/>
-          </a:xfrm>
-          <a:prstGeom prst="rect">
-            <a:avLst/>
-          </a:prstGeom>
-          <a:noFill/>
-          <a:ln>
-            <a:noFill/>
-          </a:ln>
-        </p:spPr>
-        <p:txBody>
-          <a:bodyPr wrap="square" rtlCol="0">
-            <a:spAutoFit/>
-          </a:bodyPr>
-          <a:lstStyle/>
-          <a:p>
-            <a:r>
-              <a:rPr lang="en-US" dirty="0" smtClean="0"/>
-              <a:t>Middle Index Finger Joint</a:t>
-            </a:r>
-            <a:endParaRPr lang="en-US" dirty="0"/>
-          </a:p>
-        </p:txBody>
-      </p:sp>
-      <p:sp>
-        <p:nvSpPr>
-          <p:cNvPr id="112" name="TextBox 111"/>
-          <p:cNvSpPr txBox="1"/>
-          <p:nvPr/>
-        </p:nvSpPr>
-        <p:spPr>
-          <a:xfrm>
-            <a:off x="7955800" y="409806"/>
-            <a:ext cx="2559796" cy="369332"/>
-          </a:xfrm>
-          <a:prstGeom prst="rect">
-            <a:avLst/>
-          </a:prstGeom>
-          <a:noFill/>
-          <a:ln>
-            <a:noFill/>
-          </a:ln>
-        </p:spPr>
-        <p:txBody>
-          <a:bodyPr wrap="square" rtlCol="0">
-            <a:spAutoFit/>
-          </a:bodyPr>
-          <a:lstStyle/>
-          <a:p>
-            <a:r>
-              <a:rPr lang="en-US" dirty="0" smtClean="0"/>
-              <a:t>Near Index Finger Joint</a:t>
-            </a:r>
-            <a:endParaRPr lang="en-US" dirty="0"/>
-          </a:p>
-        </p:txBody>
-      </p:sp>
-      <p:sp>
-        <p:nvSpPr>
-          <p:cNvPr id="113" name="TextBox 112"/>
-          <p:cNvSpPr txBox="1"/>
-          <p:nvPr/>
-        </p:nvSpPr>
-        <p:spPr>
-          <a:xfrm>
-            <a:off x="304802" y="1890812"/>
-            <a:ext cx="2353900" cy="369332"/>
-          </a:xfrm>
-          <a:prstGeom prst="rect">
-            <a:avLst/>
-          </a:prstGeom>
-          <a:noFill/>
-          <a:ln>
-            <a:noFill/>
-          </a:ln>
-        </p:spPr>
-        <p:txBody>
-          <a:bodyPr wrap="square" rtlCol="0">
-            <a:spAutoFit/>
-          </a:bodyPr>
-          <a:lstStyle/>
-          <a:p>
-            <a:pPr algn="r"/>
-            <a:r>
-              <a:rPr lang="en-US" dirty="0" smtClean="0"/>
-              <a:t>Near Pinky Finger Joint</a:t>
-            </a:r>
-            <a:endParaRPr lang="en-US" dirty="0"/>
-          </a:p>
-        </p:txBody>
-      </p:sp>
-      <p:sp>
-        <p:nvSpPr>
-          <p:cNvPr id="115" name="TextBox 114"/>
-          <p:cNvSpPr txBox="1"/>
-          <p:nvPr/>
-        </p:nvSpPr>
-        <p:spPr>
-          <a:xfrm>
-            <a:off x="-293915" y="2608723"/>
-            <a:ext cx="2514609" cy="369332"/>
-          </a:xfrm>
-          <a:prstGeom prst="rect">
-            <a:avLst/>
-          </a:prstGeom>
-          <a:noFill/>
-          <a:ln>
-            <a:noFill/>
-          </a:ln>
-        </p:spPr>
-        <p:txBody>
-          <a:bodyPr wrap="square" rtlCol="0">
-            <a:spAutoFit/>
-          </a:bodyPr>
-          <a:lstStyle/>
-          <a:p>
-            <a:pPr algn="r"/>
-            <a:r>
-              <a:rPr lang="en-US" dirty="0" smtClean="0"/>
-              <a:t>Middle Pinky Finger Joint</a:t>
-            </a:r>
-            <a:endParaRPr lang="en-US" dirty="0"/>
-          </a:p>
-        </p:txBody>
-      </p:sp>
-      <p:sp>
-        <p:nvSpPr>
-          <p:cNvPr id="116" name="TextBox 115"/>
-          <p:cNvSpPr txBox="1"/>
-          <p:nvPr/>
-        </p:nvSpPr>
-        <p:spPr>
-          <a:xfrm>
-            <a:off x="206828" y="3479577"/>
-            <a:ext cx="2198925" cy="369332"/>
-          </a:xfrm>
-          <a:prstGeom prst="rect">
-            <a:avLst/>
-          </a:prstGeom>
-          <a:noFill/>
-          <a:ln>
-            <a:noFill/>
-          </a:ln>
-        </p:spPr>
-        <p:txBody>
-          <a:bodyPr wrap="square" rtlCol="0">
-            <a:spAutoFit/>
-          </a:bodyPr>
-          <a:lstStyle/>
-          <a:p>
-            <a:pPr algn="r"/>
-            <a:r>
-              <a:rPr lang="en-US" dirty="0" smtClean="0"/>
-              <a:t>Far Pinky Finger Joint</a:t>
-            </a:r>
-            <a:endParaRPr lang="en-US" dirty="0"/>
-          </a:p>
-        </p:txBody>
-      </p:sp>
-      <p:sp>
-        <p:nvSpPr>
-          <p:cNvPr id="2069" name="TextBox 2068"/>
-          <p:cNvSpPr txBox="1"/>
-          <p:nvPr/>
-        </p:nvSpPr>
-        <p:spPr>
-          <a:xfrm>
-            <a:off x="9295039" y="5705479"/>
-            <a:ext cx="2896961" cy="1069634"/>
-          </a:xfrm>
-          <a:prstGeom prst="rect">
-            <a:avLst/>
-          </a:prstGeom>
-          <a:noFill/>
-        </p:spPr>
-        <p:txBody>
-          <a:bodyPr wrap="square" rtlCol="0">
-            <a:noAutofit/>
-          </a:bodyPr>
-          <a:lstStyle/>
-          <a:p>
-            <a:pPr algn="just"/>
-            <a:r>
-              <a:rPr lang="en-US" sz="1400" dirty="0" smtClean="0"/>
-              <a:t>The far/middle/near designation was conceived in reference to the center frame, i.e. the farthest joint from the view of the person marking</a:t>
-            </a:r>
-            <a:endParaRPr lang="en-US" sz="1400" dirty="0"/>
-          </a:p>
-        </p:txBody>
-      </p:sp>
-      <p:sp>
-        <p:nvSpPr>
-          <p:cNvPr id="118" name="TextBox 117"/>
-          <p:cNvSpPr txBox="1"/>
-          <p:nvPr/>
-        </p:nvSpPr>
-        <p:spPr>
-          <a:xfrm>
-            <a:off x="2013858" y="127325"/>
-            <a:ext cx="2353901" cy="369332"/>
-          </a:xfrm>
-          <a:prstGeom prst="rect">
-            <a:avLst/>
-          </a:prstGeom>
-          <a:noFill/>
-          <a:ln>
-            <a:noFill/>
-          </a:ln>
-        </p:spPr>
-        <p:txBody>
-          <a:bodyPr wrap="square" rtlCol="0">
-            <a:spAutoFit/>
-          </a:bodyPr>
-          <a:lstStyle/>
-          <a:p>
-            <a:pPr algn="r"/>
-            <a:r>
-              <a:rPr lang="en-US" dirty="0" smtClean="0"/>
-              <a:t>Near Ring Finger Joint</a:t>
-            </a:r>
-            <a:endParaRPr lang="en-US" dirty="0"/>
-          </a:p>
-        </p:txBody>
-      </p:sp>
-      <p:sp>
-        <p:nvSpPr>
-          <p:cNvPr id="119" name="TextBox 118"/>
-          <p:cNvSpPr txBox="1"/>
-          <p:nvPr/>
-        </p:nvSpPr>
-        <p:spPr>
-          <a:xfrm>
-            <a:off x="1426028" y="725634"/>
-            <a:ext cx="2503091" cy="369332"/>
-          </a:xfrm>
-          <a:prstGeom prst="rect">
-            <a:avLst/>
-          </a:prstGeom>
-          <a:noFill/>
-          <a:ln>
-            <a:noFill/>
-          </a:ln>
-        </p:spPr>
-        <p:txBody>
-          <a:bodyPr wrap="square" rtlCol="0">
-            <a:spAutoFit/>
-          </a:bodyPr>
-          <a:lstStyle/>
-          <a:p>
-            <a:pPr algn="r"/>
-            <a:r>
-              <a:rPr lang="en-US" dirty="0" smtClean="0"/>
-              <a:t>Middle Ring Finger Joint</a:t>
-            </a:r>
-            <a:endParaRPr lang="en-US" dirty="0"/>
-          </a:p>
-        </p:txBody>
-      </p:sp>
-      <p:sp>
-        <p:nvSpPr>
-          <p:cNvPr id="120" name="TextBox 119"/>
-          <p:cNvSpPr txBox="1"/>
-          <p:nvPr/>
-        </p:nvSpPr>
-        <p:spPr>
-          <a:xfrm>
-            <a:off x="1644675" y="1291550"/>
-            <a:ext cx="2121794" cy="369332"/>
-          </a:xfrm>
-          <a:prstGeom prst="rect">
-            <a:avLst/>
-          </a:prstGeom>
-          <a:noFill/>
-          <a:ln>
-            <a:noFill/>
-          </a:ln>
-        </p:spPr>
-        <p:txBody>
-          <a:bodyPr wrap="square" rtlCol="0">
-            <a:spAutoFit/>
-          </a:bodyPr>
-          <a:lstStyle/>
-          <a:p>
-            <a:pPr algn="r"/>
-            <a:r>
-              <a:rPr lang="en-US" dirty="0" smtClean="0"/>
-              <a:t>Far Ring Finger Joint</a:t>
-            </a:r>
-            <a:endParaRPr lang="en-US" dirty="0"/>
-          </a:p>
-        </p:txBody>
-      </p:sp>
-      <p:sp>
-        <p:nvSpPr>
-          <p:cNvPr id="121" name="TextBox 120"/>
-          <p:cNvSpPr txBox="1"/>
-          <p:nvPr/>
-        </p:nvSpPr>
-        <p:spPr>
-          <a:xfrm>
-            <a:off x="7400632" y="-112707"/>
-            <a:ext cx="2363852" cy="369332"/>
-          </a:xfrm>
-          <a:prstGeom prst="rect">
-            <a:avLst/>
-          </a:prstGeom>
-          <a:noFill/>
-          <a:ln>
-            <a:noFill/>
-          </a:ln>
-        </p:spPr>
-        <p:txBody>
-          <a:bodyPr wrap="square" rtlCol="0">
-            <a:spAutoFit/>
-          </a:bodyPr>
-          <a:lstStyle/>
-          <a:p>
-            <a:r>
-              <a:rPr lang="en-US" dirty="0" smtClean="0"/>
-              <a:t>Far Middle Finger Joint</a:t>
-            </a:r>
-            <a:endParaRPr lang="en-US" dirty="0"/>
-          </a:p>
-        </p:txBody>
-      </p:sp>
-      <p:sp>
-        <p:nvSpPr>
-          <p:cNvPr id="122" name="TextBox 121"/>
-          <p:cNvSpPr txBox="1"/>
-          <p:nvPr/>
-        </p:nvSpPr>
-        <p:spPr>
-          <a:xfrm>
-            <a:off x="5775202" y="-354370"/>
-            <a:ext cx="1127029" cy="504580"/>
-          </a:xfrm>
-          <a:prstGeom prst="rect">
-            <a:avLst/>
-          </a:prstGeom>
-          <a:noFill/>
-          <a:ln>
-            <a:noFill/>
-          </a:ln>
-        </p:spPr>
-        <p:txBody>
-          <a:bodyPr wrap="square" rtlCol="0">
-            <a:normAutofit lnSpcReduction="10000"/>
-          </a:bodyPr>
-          <a:lstStyle/>
-          <a:p>
-            <a:pPr algn="ctr"/>
-            <a:r>
-              <a:rPr lang="en-US" sz="1400" dirty="0" smtClean="0"/>
-              <a:t>Near Middle F. J.</a:t>
-            </a:r>
-            <a:endParaRPr lang="en-US" sz="1400" dirty="0"/>
-          </a:p>
-        </p:txBody>
-      </p:sp>
-      <p:sp>
-        <p:nvSpPr>
-          <p:cNvPr id="123" name="TextBox 122"/>
-          <p:cNvSpPr txBox="1"/>
-          <p:nvPr/>
-        </p:nvSpPr>
-        <p:spPr>
-          <a:xfrm>
-            <a:off x="4911172" y="107749"/>
-            <a:ext cx="1030822" cy="492680"/>
-          </a:xfrm>
-          <a:prstGeom prst="rect">
-            <a:avLst/>
-          </a:prstGeom>
-          <a:noFill/>
-          <a:ln>
-            <a:noFill/>
-          </a:ln>
-        </p:spPr>
-        <p:txBody>
-          <a:bodyPr wrap="square" rtlCol="0">
-            <a:noAutofit/>
-          </a:bodyPr>
-          <a:lstStyle/>
-          <a:p>
-            <a:pPr algn="ctr"/>
-            <a:r>
-              <a:rPr lang="en-US" sz="1400" dirty="0" smtClean="0"/>
-              <a:t>Middle </a:t>
-            </a:r>
-            <a:r>
-              <a:rPr lang="en-US" sz="1400" dirty="0" smtClean="0"/>
-              <a:t>Middle</a:t>
-            </a:r>
-            <a:r>
-              <a:rPr lang="en-US" sz="1400" dirty="0" smtClean="0"/>
-              <a:t> F. J.</a:t>
-            </a:r>
-            <a:endParaRPr lang="en-US" sz="1400" dirty="0"/>
-          </a:p>
-        </p:txBody>
-      </p:sp>
-      <p:sp>
-        <p:nvSpPr>
-          <p:cNvPr id="2070" name="Rectangle 2069"/>
-          <p:cNvSpPr/>
-          <p:nvPr/>
-        </p:nvSpPr>
-        <p:spPr>
-          <a:xfrm>
-            <a:off x="7966686" y="3459263"/>
-            <a:ext cx="317343" cy="168434"/>
-          </a:xfrm>
-          <a:prstGeom prst="rect">
-            <a:avLst/>
-          </a:prstGeom>
+            <a:gdLst>
+              <a:gd name="connsiteX0" fmla="*/ 16933 w 2556933"/>
+              <a:gd name="connsiteY0" fmla="*/ 575734 h 2345267"/>
+              <a:gd name="connsiteX1" fmla="*/ 16933 w 2556933"/>
+              <a:gd name="connsiteY1" fmla="*/ 575734 h 2345267"/>
+              <a:gd name="connsiteX2" fmla="*/ 93133 w 2556933"/>
+              <a:gd name="connsiteY2" fmla="*/ 541867 h 2345267"/>
+              <a:gd name="connsiteX3" fmla="*/ 101600 w 2556933"/>
+              <a:gd name="connsiteY3" fmla="*/ 516467 h 2345267"/>
+              <a:gd name="connsiteX4" fmla="*/ 127000 w 2556933"/>
+              <a:gd name="connsiteY4" fmla="*/ 491067 h 2345267"/>
+              <a:gd name="connsiteX5" fmla="*/ 160867 w 2556933"/>
+              <a:gd name="connsiteY5" fmla="*/ 474134 h 2345267"/>
+              <a:gd name="connsiteX6" fmla="*/ 279400 w 2556933"/>
+              <a:gd name="connsiteY6" fmla="*/ 448734 h 2345267"/>
+              <a:gd name="connsiteX7" fmla="*/ 296333 w 2556933"/>
+              <a:gd name="connsiteY7" fmla="*/ 431800 h 2345267"/>
+              <a:gd name="connsiteX8" fmla="*/ 321733 w 2556933"/>
+              <a:gd name="connsiteY8" fmla="*/ 414867 h 2345267"/>
+              <a:gd name="connsiteX9" fmla="*/ 338667 w 2556933"/>
+              <a:gd name="connsiteY9" fmla="*/ 389467 h 2345267"/>
+              <a:gd name="connsiteX10" fmla="*/ 355600 w 2556933"/>
+              <a:gd name="connsiteY10" fmla="*/ 338667 h 2345267"/>
+              <a:gd name="connsiteX11" fmla="*/ 364067 w 2556933"/>
+              <a:gd name="connsiteY11" fmla="*/ 313267 h 2345267"/>
+              <a:gd name="connsiteX12" fmla="*/ 389467 w 2556933"/>
+              <a:gd name="connsiteY12" fmla="*/ 287867 h 2345267"/>
+              <a:gd name="connsiteX13" fmla="*/ 533400 w 2556933"/>
+              <a:gd name="connsiteY13" fmla="*/ 262467 h 2345267"/>
+              <a:gd name="connsiteX14" fmla="*/ 677333 w 2556933"/>
+              <a:gd name="connsiteY14" fmla="*/ 254000 h 2345267"/>
+              <a:gd name="connsiteX15" fmla="*/ 711200 w 2556933"/>
+              <a:gd name="connsiteY15" fmla="*/ 245534 h 2345267"/>
+              <a:gd name="connsiteX16" fmla="*/ 745067 w 2556933"/>
+              <a:gd name="connsiteY16" fmla="*/ 211667 h 2345267"/>
+              <a:gd name="connsiteX17" fmla="*/ 787400 w 2556933"/>
+              <a:gd name="connsiteY17" fmla="*/ 160867 h 2345267"/>
+              <a:gd name="connsiteX18" fmla="*/ 812800 w 2556933"/>
+              <a:gd name="connsiteY18" fmla="*/ 135467 h 2345267"/>
+              <a:gd name="connsiteX19" fmla="*/ 838200 w 2556933"/>
+              <a:gd name="connsiteY19" fmla="*/ 84667 h 2345267"/>
+              <a:gd name="connsiteX20" fmla="*/ 863600 w 2556933"/>
+              <a:gd name="connsiteY20" fmla="*/ 59267 h 2345267"/>
+              <a:gd name="connsiteX21" fmla="*/ 1303867 w 2556933"/>
+              <a:gd name="connsiteY21" fmla="*/ 50800 h 2345267"/>
+              <a:gd name="connsiteX22" fmla="*/ 1354667 w 2556933"/>
+              <a:gd name="connsiteY22" fmla="*/ 42334 h 2345267"/>
+              <a:gd name="connsiteX23" fmla="*/ 1388533 w 2556933"/>
+              <a:gd name="connsiteY23" fmla="*/ 33867 h 2345267"/>
+              <a:gd name="connsiteX24" fmla="*/ 1397000 w 2556933"/>
+              <a:gd name="connsiteY24" fmla="*/ 0 h 2345267"/>
+              <a:gd name="connsiteX25" fmla="*/ 1490133 w 2556933"/>
+              <a:gd name="connsiteY25" fmla="*/ 8467 h 2345267"/>
+              <a:gd name="connsiteX26" fmla="*/ 1540933 w 2556933"/>
+              <a:gd name="connsiteY26" fmla="*/ 33867 h 2345267"/>
+              <a:gd name="connsiteX27" fmla="*/ 1566333 w 2556933"/>
+              <a:gd name="connsiteY27" fmla="*/ 42334 h 2345267"/>
+              <a:gd name="connsiteX28" fmla="*/ 1634067 w 2556933"/>
+              <a:gd name="connsiteY28" fmla="*/ 59267 h 2345267"/>
+              <a:gd name="connsiteX29" fmla="*/ 1659467 w 2556933"/>
+              <a:gd name="connsiteY29" fmla="*/ 67734 h 2345267"/>
+              <a:gd name="connsiteX30" fmla="*/ 1735667 w 2556933"/>
+              <a:gd name="connsiteY30" fmla="*/ 76200 h 2345267"/>
+              <a:gd name="connsiteX31" fmla="*/ 1769533 w 2556933"/>
+              <a:gd name="connsiteY31" fmla="*/ 118534 h 2345267"/>
+              <a:gd name="connsiteX32" fmla="*/ 1786467 w 2556933"/>
+              <a:gd name="connsiteY32" fmla="*/ 135467 h 2345267"/>
+              <a:gd name="connsiteX33" fmla="*/ 1803400 w 2556933"/>
+              <a:gd name="connsiteY33" fmla="*/ 160867 h 2345267"/>
+              <a:gd name="connsiteX34" fmla="*/ 1828800 w 2556933"/>
+              <a:gd name="connsiteY34" fmla="*/ 186267 h 2345267"/>
+              <a:gd name="connsiteX35" fmla="*/ 1845733 w 2556933"/>
+              <a:gd name="connsiteY35" fmla="*/ 211667 h 2345267"/>
+              <a:gd name="connsiteX36" fmla="*/ 1888067 w 2556933"/>
+              <a:gd name="connsiteY36" fmla="*/ 245534 h 2345267"/>
+              <a:gd name="connsiteX37" fmla="*/ 1921933 w 2556933"/>
+              <a:gd name="connsiteY37" fmla="*/ 296334 h 2345267"/>
+              <a:gd name="connsiteX38" fmla="*/ 1938867 w 2556933"/>
+              <a:gd name="connsiteY38" fmla="*/ 321734 h 2345267"/>
+              <a:gd name="connsiteX39" fmla="*/ 1955800 w 2556933"/>
+              <a:gd name="connsiteY39" fmla="*/ 347134 h 2345267"/>
+              <a:gd name="connsiteX40" fmla="*/ 1964267 w 2556933"/>
+              <a:gd name="connsiteY40" fmla="*/ 372534 h 2345267"/>
+              <a:gd name="connsiteX41" fmla="*/ 1998133 w 2556933"/>
+              <a:gd name="connsiteY41" fmla="*/ 423334 h 2345267"/>
+              <a:gd name="connsiteX42" fmla="*/ 2015067 w 2556933"/>
+              <a:gd name="connsiteY42" fmla="*/ 448734 h 2345267"/>
+              <a:gd name="connsiteX43" fmla="*/ 2040467 w 2556933"/>
+              <a:gd name="connsiteY43" fmla="*/ 499534 h 2345267"/>
+              <a:gd name="connsiteX44" fmla="*/ 2048933 w 2556933"/>
+              <a:gd name="connsiteY44" fmla="*/ 524934 h 2345267"/>
+              <a:gd name="connsiteX45" fmla="*/ 2065867 w 2556933"/>
+              <a:gd name="connsiteY45" fmla="*/ 541867 h 2345267"/>
+              <a:gd name="connsiteX46" fmla="*/ 2082800 w 2556933"/>
+              <a:gd name="connsiteY46" fmla="*/ 567267 h 2345267"/>
+              <a:gd name="connsiteX47" fmla="*/ 2108200 w 2556933"/>
+              <a:gd name="connsiteY47" fmla="*/ 618067 h 2345267"/>
+              <a:gd name="connsiteX48" fmla="*/ 2133600 w 2556933"/>
+              <a:gd name="connsiteY48" fmla="*/ 635000 h 2345267"/>
+              <a:gd name="connsiteX49" fmla="*/ 2150533 w 2556933"/>
+              <a:gd name="connsiteY49" fmla="*/ 660400 h 2345267"/>
+              <a:gd name="connsiteX50" fmla="*/ 2167467 w 2556933"/>
+              <a:gd name="connsiteY50" fmla="*/ 677334 h 2345267"/>
+              <a:gd name="connsiteX51" fmla="*/ 2175933 w 2556933"/>
+              <a:gd name="connsiteY51" fmla="*/ 702734 h 2345267"/>
+              <a:gd name="connsiteX52" fmla="*/ 2209800 w 2556933"/>
+              <a:gd name="connsiteY52" fmla="*/ 753534 h 2345267"/>
+              <a:gd name="connsiteX53" fmla="*/ 2243667 w 2556933"/>
+              <a:gd name="connsiteY53" fmla="*/ 804334 h 2345267"/>
+              <a:gd name="connsiteX54" fmla="*/ 2319867 w 2556933"/>
+              <a:gd name="connsiteY54" fmla="*/ 838200 h 2345267"/>
+              <a:gd name="connsiteX55" fmla="*/ 2345267 w 2556933"/>
+              <a:gd name="connsiteY55" fmla="*/ 846667 h 2345267"/>
+              <a:gd name="connsiteX56" fmla="*/ 2370667 w 2556933"/>
+              <a:gd name="connsiteY56" fmla="*/ 855134 h 2345267"/>
+              <a:gd name="connsiteX57" fmla="*/ 2387600 w 2556933"/>
+              <a:gd name="connsiteY57" fmla="*/ 880534 h 2345267"/>
+              <a:gd name="connsiteX58" fmla="*/ 2463800 w 2556933"/>
+              <a:gd name="connsiteY58" fmla="*/ 922867 h 2345267"/>
+              <a:gd name="connsiteX59" fmla="*/ 2489200 w 2556933"/>
+              <a:gd name="connsiteY59" fmla="*/ 948267 h 2345267"/>
+              <a:gd name="connsiteX60" fmla="*/ 2514600 w 2556933"/>
+              <a:gd name="connsiteY60" fmla="*/ 965200 h 2345267"/>
+              <a:gd name="connsiteX61" fmla="*/ 2548467 w 2556933"/>
+              <a:gd name="connsiteY61" fmla="*/ 999067 h 2345267"/>
+              <a:gd name="connsiteX62" fmla="*/ 2556933 w 2556933"/>
+              <a:gd name="connsiteY62" fmla="*/ 1032934 h 2345267"/>
+              <a:gd name="connsiteX63" fmla="*/ 2548467 w 2556933"/>
+              <a:gd name="connsiteY63" fmla="*/ 1058334 h 2345267"/>
+              <a:gd name="connsiteX64" fmla="*/ 2506133 w 2556933"/>
+              <a:gd name="connsiteY64" fmla="*/ 1100667 h 2345267"/>
+              <a:gd name="connsiteX65" fmla="*/ 2463800 w 2556933"/>
+              <a:gd name="connsiteY65" fmla="*/ 1159934 h 2345267"/>
+              <a:gd name="connsiteX66" fmla="*/ 2429933 w 2556933"/>
+              <a:gd name="connsiteY66" fmla="*/ 1202267 h 2345267"/>
+              <a:gd name="connsiteX67" fmla="*/ 2396067 w 2556933"/>
+              <a:gd name="connsiteY67" fmla="*/ 1253067 h 2345267"/>
+              <a:gd name="connsiteX68" fmla="*/ 2362200 w 2556933"/>
+              <a:gd name="connsiteY68" fmla="*/ 1295400 h 2345267"/>
+              <a:gd name="connsiteX69" fmla="*/ 2345267 w 2556933"/>
+              <a:gd name="connsiteY69" fmla="*/ 1312334 h 2345267"/>
+              <a:gd name="connsiteX70" fmla="*/ 2311400 w 2556933"/>
+              <a:gd name="connsiteY70" fmla="*/ 1363134 h 2345267"/>
+              <a:gd name="connsiteX71" fmla="*/ 2286000 w 2556933"/>
+              <a:gd name="connsiteY71" fmla="*/ 1388534 h 2345267"/>
+              <a:gd name="connsiteX72" fmla="*/ 2252133 w 2556933"/>
+              <a:gd name="connsiteY72" fmla="*/ 1439334 h 2345267"/>
+              <a:gd name="connsiteX73" fmla="*/ 2209800 w 2556933"/>
+              <a:gd name="connsiteY73" fmla="*/ 1481667 h 2345267"/>
+              <a:gd name="connsiteX74" fmla="*/ 2159000 w 2556933"/>
+              <a:gd name="connsiteY74" fmla="*/ 1540934 h 2345267"/>
+              <a:gd name="connsiteX75" fmla="*/ 2133600 w 2556933"/>
+              <a:gd name="connsiteY75" fmla="*/ 1566334 h 2345267"/>
+              <a:gd name="connsiteX76" fmla="*/ 2065867 w 2556933"/>
+              <a:gd name="connsiteY76" fmla="*/ 1667934 h 2345267"/>
+              <a:gd name="connsiteX77" fmla="*/ 2048933 w 2556933"/>
+              <a:gd name="connsiteY77" fmla="*/ 1693334 h 2345267"/>
+              <a:gd name="connsiteX78" fmla="*/ 2032000 w 2556933"/>
+              <a:gd name="connsiteY78" fmla="*/ 1718734 h 2345267"/>
+              <a:gd name="connsiteX79" fmla="*/ 2006600 w 2556933"/>
+              <a:gd name="connsiteY79" fmla="*/ 1735667 h 2345267"/>
+              <a:gd name="connsiteX80" fmla="*/ 1955800 w 2556933"/>
+              <a:gd name="connsiteY80" fmla="*/ 1786467 h 2345267"/>
+              <a:gd name="connsiteX81" fmla="*/ 1930400 w 2556933"/>
+              <a:gd name="connsiteY81" fmla="*/ 1803400 h 2345267"/>
+              <a:gd name="connsiteX82" fmla="*/ 1896533 w 2556933"/>
+              <a:gd name="connsiteY82" fmla="*/ 1845734 h 2345267"/>
+              <a:gd name="connsiteX83" fmla="*/ 1871133 w 2556933"/>
+              <a:gd name="connsiteY83" fmla="*/ 1871134 h 2345267"/>
+              <a:gd name="connsiteX84" fmla="*/ 1794933 w 2556933"/>
+              <a:gd name="connsiteY84" fmla="*/ 1913467 h 2345267"/>
+              <a:gd name="connsiteX85" fmla="*/ 1744133 w 2556933"/>
+              <a:gd name="connsiteY85" fmla="*/ 1947334 h 2345267"/>
+              <a:gd name="connsiteX86" fmla="*/ 1693333 w 2556933"/>
+              <a:gd name="connsiteY86" fmla="*/ 1981200 h 2345267"/>
+              <a:gd name="connsiteX87" fmla="*/ 1659467 w 2556933"/>
+              <a:gd name="connsiteY87" fmla="*/ 2023534 h 2345267"/>
+              <a:gd name="connsiteX88" fmla="*/ 1642533 w 2556933"/>
+              <a:gd name="connsiteY88" fmla="*/ 2040467 h 2345267"/>
+              <a:gd name="connsiteX89" fmla="*/ 1634067 w 2556933"/>
+              <a:gd name="connsiteY89" fmla="*/ 2065867 h 2345267"/>
+              <a:gd name="connsiteX90" fmla="*/ 1608667 w 2556933"/>
+              <a:gd name="connsiteY90" fmla="*/ 2082800 h 2345267"/>
+              <a:gd name="connsiteX91" fmla="*/ 1591733 w 2556933"/>
+              <a:gd name="connsiteY91" fmla="*/ 2099734 h 2345267"/>
+              <a:gd name="connsiteX92" fmla="*/ 1473200 w 2556933"/>
+              <a:gd name="connsiteY92" fmla="*/ 2116667 h 2345267"/>
+              <a:gd name="connsiteX93" fmla="*/ 1422400 w 2556933"/>
+              <a:gd name="connsiteY93" fmla="*/ 2142067 h 2345267"/>
+              <a:gd name="connsiteX94" fmla="*/ 1397000 w 2556933"/>
+              <a:gd name="connsiteY94" fmla="*/ 2150534 h 2345267"/>
+              <a:gd name="connsiteX95" fmla="*/ 1371600 w 2556933"/>
+              <a:gd name="connsiteY95" fmla="*/ 2167467 h 2345267"/>
+              <a:gd name="connsiteX96" fmla="*/ 1346200 w 2556933"/>
+              <a:gd name="connsiteY96" fmla="*/ 2175934 h 2345267"/>
+              <a:gd name="connsiteX97" fmla="*/ 1286933 w 2556933"/>
+              <a:gd name="connsiteY97" fmla="*/ 2201334 h 2345267"/>
+              <a:gd name="connsiteX98" fmla="*/ 1261533 w 2556933"/>
+              <a:gd name="connsiteY98" fmla="*/ 2218267 h 2345267"/>
+              <a:gd name="connsiteX99" fmla="*/ 1168400 w 2556933"/>
+              <a:gd name="connsiteY99" fmla="*/ 2243667 h 2345267"/>
+              <a:gd name="connsiteX100" fmla="*/ 1117600 w 2556933"/>
+              <a:gd name="connsiteY100" fmla="*/ 2260600 h 2345267"/>
+              <a:gd name="connsiteX101" fmla="*/ 1083733 w 2556933"/>
+              <a:gd name="connsiteY101" fmla="*/ 2277534 h 2345267"/>
+              <a:gd name="connsiteX102" fmla="*/ 999067 w 2556933"/>
+              <a:gd name="connsiteY102" fmla="*/ 2286000 h 2345267"/>
+              <a:gd name="connsiteX103" fmla="*/ 973667 w 2556933"/>
+              <a:gd name="connsiteY103" fmla="*/ 2294467 h 2345267"/>
+              <a:gd name="connsiteX104" fmla="*/ 914400 w 2556933"/>
+              <a:gd name="connsiteY104" fmla="*/ 2311400 h 2345267"/>
+              <a:gd name="connsiteX105" fmla="*/ 889000 w 2556933"/>
+              <a:gd name="connsiteY105" fmla="*/ 2328334 h 2345267"/>
+              <a:gd name="connsiteX106" fmla="*/ 829733 w 2556933"/>
+              <a:gd name="connsiteY106" fmla="*/ 2345267 h 2345267"/>
+              <a:gd name="connsiteX107" fmla="*/ 745067 w 2556933"/>
+              <a:gd name="connsiteY107" fmla="*/ 2319867 h 2345267"/>
+              <a:gd name="connsiteX108" fmla="*/ 694267 w 2556933"/>
+              <a:gd name="connsiteY108" fmla="*/ 2302934 h 2345267"/>
+              <a:gd name="connsiteX109" fmla="*/ 575733 w 2556933"/>
+              <a:gd name="connsiteY109" fmla="*/ 2286000 h 2345267"/>
+              <a:gd name="connsiteX110" fmla="*/ 524933 w 2556933"/>
+              <a:gd name="connsiteY110" fmla="*/ 2243667 h 2345267"/>
+              <a:gd name="connsiteX111" fmla="*/ 499533 w 2556933"/>
+              <a:gd name="connsiteY111" fmla="*/ 2226734 h 2345267"/>
+              <a:gd name="connsiteX112" fmla="*/ 457200 w 2556933"/>
+              <a:gd name="connsiteY112" fmla="*/ 2184400 h 2345267"/>
+              <a:gd name="connsiteX113" fmla="*/ 431800 w 2556933"/>
+              <a:gd name="connsiteY113" fmla="*/ 2099734 h 2345267"/>
+              <a:gd name="connsiteX114" fmla="*/ 406400 w 2556933"/>
+              <a:gd name="connsiteY114" fmla="*/ 1710267 h 2345267"/>
+              <a:gd name="connsiteX115" fmla="*/ 389467 w 2556933"/>
+              <a:gd name="connsiteY115" fmla="*/ 1676400 h 2345267"/>
+              <a:gd name="connsiteX116" fmla="*/ 372533 w 2556933"/>
+              <a:gd name="connsiteY116" fmla="*/ 1625600 h 2345267"/>
+              <a:gd name="connsiteX117" fmla="*/ 347133 w 2556933"/>
+              <a:gd name="connsiteY117" fmla="*/ 1600200 h 2345267"/>
+              <a:gd name="connsiteX118" fmla="*/ 313267 w 2556933"/>
+              <a:gd name="connsiteY118" fmla="*/ 1549400 h 2345267"/>
+              <a:gd name="connsiteX119" fmla="*/ 287867 w 2556933"/>
+              <a:gd name="connsiteY119" fmla="*/ 1464734 h 2345267"/>
+              <a:gd name="connsiteX120" fmla="*/ 270933 w 2556933"/>
+              <a:gd name="connsiteY120" fmla="*/ 1439334 h 2345267"/>
+              <a:gd name="connsiteX121" fmla="*/ 254000 w 2556933"/>
+              <a:gd name="connsiteY121" fmla="*/ 1388534 h 2345267"/>
+              <a:gd name="connsiteX122" fmla="*/ 245533 w 2556933"/>
+              <a:gd name="connsiteY122" fmla="*/ 1363134 h 2345267"/>
+              <a:gd name="connsiteX123" fmla="*/ 228600 w 2556933"/>
+              <a:gd name="connsiteY123" fmla="*/ 1253067 h 2345267"/>
+              <a:gd name="connsiteX124" fmla="*/ 220133 w 2556933"/>
+              <a:gd name="connsiteY124" fmla="*/ 1202267 h 2345267"/>
+              <a:gd name="connsiteX125" fmla="*/ 211667 w 2556933"/>
+              <a:gd name="connsiteY125" fmla="*/ 1176867 h 2345267"/>
+              <a:gd name="connsiteX126" fmla="*/ 203200 w 2556933"/>
+              <a:gd name="connsiteY126" fmla="*/ 1143000 h 2345267"/>
+              <a:gd name="connsiteX127" fmla="*/ 160867 w 2556933"/>
+              <a:gd name="connsiteY127" fmla="*/ 1092200 h 2345267"/>
+              <a:gd name="connsiteX128" fmla="*/ 152400 w 2556933"/>
+              <a:gd name="connsiteY128" fmla="*/ 1066800 h 2345267"/>
+              <a:gd name="connsiteX129" fmla="*/ 118533 w 2556933"/>
+              <a:gd name="connsiteY129" fmla="*/ 1016000 h 2345267"/>
+              <a:gd name="connsiteX130" fmla="*/ 93133 w 2556933"/>
+              <a:gd name="connsiteY130" fmla="*/ 965200 h 2345267"/>
+              <a:gd name="connsiteX131" fmla="*/ 76200 w 2556933"/>
+              <a:gd name="connsiteY131" fmla="*/ 914400 h 2345267"/>
+              <a:gd name="connsiteX132" fmla="*/ 59267 w 2556933"/>
+              <a:gd name="connsiteY132" fmla="*/ 863600 h 2345267"/>
+              <a:gd name="connsiteX133" fmla="*/ 33867 w 2556933"/>
+              <a:gd name="connsiteY133" fmla="*/ 778934 h 2345267"/>
+              <a:gd name="connsiteX134" fmla="*/ 8467 w 2556933"/>
+              <a:gd name="connsiteY134" fmla="*/ 702734 h 2345267"/>
+              <a:gd name="connsiteX135" fmla="*/ 0 w 2556933"/>
+              <a:gd name="connsiteY135" fmla="*/ 677334 h 2345267"/>
+              <a:gd name="connsiteX136" fmla="*/ 16933 w 2556933"/>
+              <a:gd name="connsiteY136" fmla="*/ 575734 h 2345267"/>
+            </a:gdLst>
+            <a:ahLst/>
+            <a:cxnLst>
+              <a:cxn ang="0">
+                <a:pos x="connsiteX0" y="connsiteY0"/>
+              </a:cxn>
+              <a:cxn ang="0">
+                <a:pos x="connsiteX1" y="connsiteY1"/>
+              </a:cxn>
+              <a:cxn ang="0">
+                <a:pos x="connsiteX2" y="connsiteY2"/>
+              </a:cxn>
+              <a:cxn ang="0">
+                <a:pos x="connsiteX3" y="connsiteY3"/>
+              </a:cxn>
+              <a:cxn ang="0">
+                <a:pos x="connsiteX4" y="connsiteY4"/>
+              </a:cxn>
+              <a:cxn ang="0">
+                <a:pos x="connsiteX5" y="connsiteY5"/>
+              </a:cxn>
+              <a:cxn ang="0">
+                <a:pos x="connsiteX6" y="connsiteY6"/>
+              </a:cxn>
+              <a:cxn ang="0">
+                <a:pos x="connsiteX7" y="connsiteY7"/>
+              </a:cxn>
+              <a:cxn ang="0">
+                <a:pos x="connsiteX8" y="connsiteY8"/>
+              </a:cxn>
+              <a:cxn ang="0">
+                <a:pos x="connsiteX9" y="connsiteY9"/>
+              </a:cxn>
+              <a:cxn ang="0">
+                <a:pos x="connsiteX10" y="connsiteY10"/>
+              </a:cxn>
+              <a:cxn ang="0">
+                <a:pos x="connsiteX11" y="connsiteY11"/>
+              </a:cxn>
+              <a:cxn ang="0">
+                <a:pos x="connsiteX12" y="connsiteY12"/>
+              </a:cxn>
+              <a:cxn ang="0">
+                <a:pos x="connsiteX13" y="connsiteY13"/>
+              </a:cxn>
+              <a:cxn ang="0">
+                <a:pos x="connsiteX14" y="connsiteY14"/>
+              </a:cxn>
+              <a:cxn ang="0">
+                <a:pos x="connsiteX15" y="connsiteY15"/>
+              </a:cxn>
+              <a:cxn ang="0">
+                <a:pos x="connsiteX16" y="connsiteY16"/>
+              </a:cxn>
+              <a:cxn ang="0">
+                <a:pos x="connsiteX17" y="connsiteY17"/>
+              </a:cxn>
+              <a:cxn ang="0">
+                <a:pos x="connsiteX18" y="connsiteY18"/>
+              </a:cxn>
+              <a:cxn ang="0">
+                <a:pos x="connsiteX19" y="connsiteY19"/>
+              </a:cxn>
+              <a:cxn ang="0">
+                <a:pos x="connsiteX20" y="connsiteY20"/>
+              </a:cxn>
+              <a:cxn ang="0">
+                <a:pos x="connsiteX21" y="connsiteY21"/>
+              </a:cxn>
+              <a:cxn ang="0">
+                <a:pos x="connsiteX22" y="connsiteY22"/>
+              </a:cxn>
+              <a:cxn ang="0">
+                <a:pos x="connsiteX23" y="connsiteY23"/>
+              </a:cxn>
+              <a:cxn ang="0">
+                <a:pos x="connsiteX24" y="connsiteY24"/>
+              </a:cxn>
+              <a:cxn ang="0">
+                <a:pos x="connsiteX25" y="connsiteY25"/>
+              </a:cxn>
+              <a:cxn ang="0">
+                <a:pos x="connsiteX26" y="connsiteY26"/>
+              </a:cxn>
+              <a:cxn ang="0">
+                <a:pos x="connsiteX27" y="connsiteY27"/>
+              </a:cxn>
+              <a:cxn ang="0">
+                <a:pos x="connsiteX28" y="connsiteY28"/>
+              </a:cxn>
+              <a:cxn ang="0">
+                <a:pos x="connsiteX29" y="connsiteY29"/>
+              </a:cxn>
+              <a:cxn ang="0">
+                <a:pos x="connsiteX30" y="connsiteY30"/>
+              </a:cxn>
+              <a:cxn ang="0">
+                <a:pos x="connsiteX31" y="connsiteY31"/>
+              </a:cxn>
+              <a:cxn ang="0">
+                <a:pos x="connsiteX32" y="connsiteY32"/>
+              </a:cxn>
+              <a:cxn ang="0">
+                <a:pos x="connsiteX33" y="connsiteY33"/>
+              </a:cxn>
+              <a:cxn ang="0">
+                <a:pos x="connsiteX34" y="connsiteY34"/>
+              </a:cxn>
+              <a:cxn ang="0">
+                <a:pos x="connsiteX35" y="connsiteY35"/>
+              </a:cxn>
+              <a:cxn ang="0">
+                <a:pos x="connsiteX36" y="connsiteY36"/>
+              </a:cxn>
+              <a:cxn ang="0">
+                <a:pos x="connsiteX37" y="connsiteY37"/>
+              </a:cxn>
+              <a:cxn ang="0">
+                <a:pos x="connsiteX38" y="connsiteY38"/>
+              </a:cxn>
+              <a:cxn ang="0">
+                <a:pos x="connsiteX39" y="connsiteY39"/>
+              </a:cxn>
+              <a:cxn ang="0">
+                <a:pos x="connsiteX40" y="connsiteY40"/>
+              </a:cxn>
+              <a:cxn ang="0">
+                <a:pos x="connsiteX41" y="connsiteY41"/>
+              </a:cxn>
+              <a:cxn ang="0">
+                <a:pos x="connsiteX42" y="connsiteY42"/>
+              </a:cxn>
+              <a:cxn ang="0">
+                <a:pos x="connsiteX43" y="connsiteY43"/>
+              </a:cxn>
+              <a:cxn ang="0">
+                <a:pos x="connsiteX44" y="connsiteY44"/>
+              </a:cxn>
+              <a:cxn ang="0">
+                <a:pos x="connsiteX45" y="connsiteY45"/>
+              </a:cxn>
+              <a:cxn ang="0">
+                <a:pos x="connsiteX46" y="connsiteY46"/>
+              </a:cxn>
+              <a:cxn ang="0">
+                <a:pos x="connsiteX47" y="connsiteY47"/>
+              </a:cxn>
+              <a:cxn ang="0">
+                <a:pos x="connsiteX48" y="connsiteY48"/>
+              </a:cxn>
+              <a:cxn ang="0">
+                <a:pos x="connsiteX49" y="connsiteY49"/>
+              </a:cxn>
+              <a:cxn ang="0">
+                <a:pos x="connsiteX50" y="connsiteY50"/>
+              </a:cxn>
+              <a:cxn ang="0">
+                <a:pos x="connsiteX51" y="connsiteY51"/>
+              </a:cxn>
+              <a:cxn ang="0">
+                <a:pos x="connsiteX52" y="connsiteY52"/>
+              </a:cxn>
+              <a:cxn ang="0">
+                <a:pos x="connsiteX53" y="connsiteY53"/>
+              </a:cxn>
+              <a:cxn ang="0">
+                <a:pos x="connsiteX54" y="connsiteY54"/>
+              </a:cxn>
+              <a:cxn ang="0">
+                <a:pos x="connsiteX55" y="connsiteY55"/>
+              </a:cxn>
+              <a:cxn ang="0">
+                <a:pos x="connsiteX56" y="connsiteY56"/>
+              </a:cxn>
+              <a:cxn ang="0">
+                <a:pos x="connsiteX57" y="connsiteY57"/>
+              </a:cxn>
+              <a:cxn ang="0">
+                <a:pos x="connsiteX58" y="connsiteY58"/>
+              </a:cxn>
+              <a:cxn ang="0">
+                <a:pos x="connsiteX59" y="connsiteY59"/>
+              </a:cxn>
+              <a:cxn ang="0">
+                <a:pos x="connsiteX60" y="connsiteY60"/>
+              </a:cxn>
+              <a:cxn ang="0">
+                <a:pos x="connsiteX61" y="connsiteY61"/>
+              </a:cxn>
+              <a:cxn ang="0">
+                <a:pos x="connsiteX62" y="connsiteY62"/>
+              </a:cxn>
+              <a:cxn ang="0">
+                <a:pos x="connsiteX63" y="connsiteY63"/>
+              </a:cxn>
+              <a:cxn ang="0">
+                <a:pos x="connsiteX64" y="connsiteY64"/>
+              </a:cxn>
+              <a:cxn ang="0">
+                <a:pos x="connsiteX65" y="connsiteY65"/>
+              </a:cxn>
+              <a:cxn ang="0">
+                <a:pos x="connsiteX66" y="connsiteY66"/>
+              </a:cxn>
+              <a:cxn ang="0">
+                <a:pos x="connsiteX67" y="connsiteY67"/>
+              </a:cxn>
+              <a:cxn ang="0">
+                <a:pos x="connsiteX68" y="connsiteY68"/>
+              </a:cxn>
+              <a:cxn ang="0">
+                <a:pos x="connsiteX69" y="connsiteY69"/>
+              </a:cxn>
+              <a:cxn ang="0">
+                <a:pos x="connsiteX70" y="connsiteY70"/>
+              </a:cxn>
+              <a:cxn ang="0">
+                <a:pos x="connsiteX71" y="connsiteY71"/>
+              </a:cxn>
+              <a:cxn ang="0">
+                <a:pos x="connsiteX72" y="connsiteY72"/>
+              </a:cxn>
+              <a:cxn ang="0">
+                <a:pos x="connsiteX73" y="connsiteY73"/>
+              </a:cxn>
+              <a:cxn ang="0">
+                <a:pos x="connsiteX74" y="connsiteY74"/>
+              </a:cxn>
+              <a:cxn ang="0">
+                <a:pos x="connsiteX75" y="connsiteY75"/>
+              </a:cxn>
+              <a:cxn ang="0">
+                <a:pos x="connsiteX76" y="connsiteY76"/>
+              </a:cxn>
+              <a:cxn ang="0">
+                <a:pos x="connsiteX77" y="connsiteY77"/>
+              </a:cxn>
+              <a:cxn ang="0">
+                <a:pos x="connsiteX78" y="connsiteY78"/>
+              </a:cxn>
+              <a:cxn ang="0">
+                <a:pos x="connsiteX79" y="connsiteY79"/>
+              </a:cxn>
+              <a:cxn ang="0">
+                <a:pos x="connsiteX80" y="connsiteY80"/>
+              </a:cxn>
+              <a:cxn ang="0">
+                <a:pos x="connsiteX81" y="connsiteY81"/>
+              </a:cxn>
+              <a:cxn ang="0">
+                <a:pos x="connsiteX82" y="connsiteY82"/>
+              </a:cxn>
+              <a:cxn ang="0">
+                <a:pos x="connsiteX83" y="connsiteY83"/>
+              </a:cxn>
+              <a:cxn ang="0">
+                <a:pos x="connsiteX84" y="connsiteY84"/>
+              </a:cxn>
+              <a:cxn ang="0">
+                <a:pos x="connsiteX85" y="connsiteY85"/>
+              </a:cxn>
+              <a:cxn ang="0">
+                <a:pos x="connsiteX86" y="connsiteY86"/>
+              </a:cxn>
+              <a:cxn ang="0">
+                <a:pos x="connsiteX87" y="connsiteY87"/>
+              </a:cxn>
+              <a:cxn ang="0">
+                <a:pos x="connsiteX88" y="connsiteY88"/>
+              </a:cxn>
+              <a:cxn ang="0">
+                <a:pos x="connsiteX89" y="connsiteY89"/>
+              </a:cxn>
+              <a:cxn ang="0">
+                <a:pos x="connsiteX90" y="connsiteY90"/>
+              </a:cxn>
+              <a:cxn ang="0">
+                <a:pos x="connsiteX91" y="connsiteY91"/>
+              </a:cxn>
+              <a:cxn ang="0">
+                <a:pos x="connsiteX92" y="connsiteY92"/>
+              </a:cxn>
+              <a:cxn ang="0">
+                <a:pos x="connsiteX93" y="connsiteY93"/>
+              </a:cxn>
+              <a:cxn ang="0">
+                <a:pos x="connsiteX94" y="connsiteY94"/>
+              </a:cxn>
+              <a:cxn ang="0">
+                <a:pos x="connsiteX95" y="connsiteY95"/>
+              </a:cxn>
+              <a:cxn ang="0">
+                <a:pos x="connsiteX96" y="connsiteY96"/>
+              </a:cxn>
+              <a:cxn ang="0">
+                <a:pos x="connsiteX97" y="connsiteY97"/>
+              </a:cxn>
+              <a:cxn ang="0">
+                <a:pos x="connsiteX98" y="connsiteY98"/>
+              </a:cxn>
+              <a:cxn ang="0">
+                <a:pos x="connsiteX99" y="connsiteY99"/>
+              </a:cxn>
+              <a:cxn ang="0">
+                <a:pos x="connsiteX100" y="connsiteY100"/>
+              </a:cxn>
+              <a:cxn ang="0">
+                <a:pos x="connsiteX101" y="connsiteY101"/>
+              </a:cxn>
+              <a:cxn ang="0">
+                <a:pos x="connsiteX102" y="connsiteY102"/>
+              </a:cxn>
+              <a:cxn ang="0">
+                <a:pos x="connsiteX103" y="connsiteY103"/>
+              </a:cxn>
+              <a:cxn ang="0">
+                <a:pos x="connsiteX104" y="connsiteY104"/>
+              </a:cxn>
+              <a:cxn ang="0">
+                <a:pos x="connsiteX105" y="connsiteY105"/>
+              </a:cxn>
+              <a:cxn ang="0">
+                <a:pos x="connsiteX106" y="connsiteY106"/>
+              </a:cxn>
+              <a:cxn ang="0">
+                <a:pos x="connsiteX107" y="connsiteY107"/>
+              </a:cxn>
+              <a:cxn ang="0">
+                <a:pos x="connsiteX108" y="connsiteY108"/>
+              </a:cxn>
+              <a:cxn ang="0">
+                <a:pos x="connsiteX109" y="connsiteY109"/>
+              </a:cxn>
+              <a:cxn ang="0">
+                <a:pos x="connsiteX110" y="connsiteY110"/>
+              </a:cxn>
+              <a:cxn ang="0">
+                <a:pos x="connsiteX111" y="connsiteY111"/>
+              </a:cxn>
+              <a:cxn ang="0">
+                <a:pos x="connsiteX112" y="connsiteY112"/>
+              </a:cxn>
+              <a:cxn ang="0">
+                <a:pos x="connsiteX113" y="connsiteY113"/>
+              </a:cxn>
+              <a:cxn ang="0">
+                <a:pos x="connsiteX114" y="connsiteY114"/>
+              </a:cxn>
+              <a:cxn ang="0">
+                <a:pos x="connsiteX115" y="connsiteY115"/>
+              </a:cxn>
+              <a:cxn ang="0">
+                <a:pos x="connsiteX116" y="connsiteY116"/>
+              </a:cxn>
+              <a:cxn ang="0">
+                <a:pos x="connsiteX117" y="connsiteY117"/>
+              </a:cxn>
+              <a:cxn ang="0">
+                <a:pos x="connsiteX118" y="connsiteY118"/>
+              </a:cxn>
+              <a:cxn ang="0">
+                <a:pos x="connsiteX119" y="connsiteY119"/>
+              </a:cxn>
+              <a:cxn ang="0">
+                <a:pos x="connsiteX120" y="connsiteY120"/>
+              </a:cxn>
+              <a:cxn ang="0">
+                <a:pos x="connsiteX121" y="connsiteY121"/>
+              </a:cxn>
+              <a:cxn ang="0">
+                <a:pos x="connsiteX122" y="connsiteY122"/>
+              </a:cxn>
+              <a:cxn ang="0">
+                <a:pos x="connsiteX123" y="connsiteY123"/>
+              </a:cxn>
+              <a:cxn ang="0">
+                <a:pos x="connsiteX124" y="connsiteY124"/>
+              </a:cxn>
+              <a:cxn ang="0">
+                <a:pos x="connsiteX125" y="connsiteY125"/>
+              </a:cxn>
+              <a:cxn ang="0">
+                <a:pos x="connsiteX126" y="connsiteY126"/>
+              </a:cxn>
+              <a:cxn ang="0">
+                <a:pos x="connsiteX127" y="connsiteY127"/>
+              </a:cxn>
+              <a:cxn ang="0">
+                <a:pos x="connsiteX128" y="connsiteY128"/>
+              </a:cxn>
+              <a:cxn ang="0">
+                <a:pos x="connsiteX129" y="connsiteY129"/>
+              </a:cxn>
+              <a:cxn ang="0">
+                <a:pos x="connsiteX130" y="connsiteY130"/>
+              </a:cxn>
+              <a:cxn ang="0">
+                <a:pos x="connsiteX131" y="connsiteY131"/>
+              </a:cxn>
+              <a:cxn ang="0">
+                <a:pos x="connsiteX132" y="connsiteY132"/>
+              </a:cxn>
+              <a:cxn ang="0">
+                <a:pos x="connsiteX133" y="connsiteY133"/>
+              </a:cxn>
+              <a:cxn ang="0">
+                <a:pos x="connsiteX134" y="connsiteY134"/>
+              </a:cxn>
+              <a:cxn ang="0">
+                <a:pos x="connsiteX135" y="connsiteY135"/>
+              </a:cxn>
+              <a:cxn ang="0">
+                <a:pos x="connsiteX136" y="connsiteY136"/>
+              </a:cxn>
+            </a:cxnLst>
+            <a:rect l="l" t="t" r="r" b="b"/>
+            <a:pathLst>
+              <a:path w="2556933" h="2345267">
+                <a:moveTo>
+                  <a:pt x="16933" y="575734"/>
+                </a:moveTo>
+                <a:lnTo>
+                  <a:pt x="16933" y="575734"/>
+                </a:lnTo>
+                <a:cubicBezTo>
+                  <a:pt x="42333" y="564445"/>
+                  <a:pt x="70362" y="557807"/>
+                  <a:pt x="93133" y="541867"/>
+                </a:cubicBezTo>
+                <a:cubicBezTo>
+                  <a:pt x="100444" y="536749"/>
+                  <a:pt x="96649" y="523893"/>
+                  <a:pt x="101600" y="516467"/>
+                </a:cubicBezTo>
+                <a:cubicBezTo>
+                  <a:pt x="108242" y="506504"/>
+                  <a:pt x="117257" y="498026"/>
+                  <a:pt x="127000" y="491067"/>
+                </a:cubicBezTo>
+                <a:cubicBezTo>
+                  <a:pt x="137271" y="483731"/>
+                  <a:pt x="149148" y="478821"/>
+                  <a:pt x="160867" y="474134"/>
+                </a:cubicBezTo>
+                <a:cubicBezTo>
+                  <a:pt x="215708" y="452197"/>
+                  <a:pt x="216320" y="456618"/>
+                  <a:pt x="279400" y="448734"/>
+                </a:cubicBezTo>
+                <a:cubicBezTo>
+                  <a:pt x="285044" y="443089"/>
+                  <a:pt x="290100" y="436787"/>
+                  <a:pt x="296333" y="431800"/>
+                </a:cubicBezTo>
+                <a:cubicBezTo>
+                  <a:pt x="304279" y="425443"/>
+                  <a:pt x="314538" y="422062"/>
+                  <a:pt x="321733" y="414867"/>
+                </a:cubicBezTo>
+                <a:cubicBezTo>
+                  <a:pt x="328928" y="407672"/>
+                  <a:pt x="333022" y="397934"/>
+                  <a:pt x="338667" y="389467"/>
+                </a:cubicBezTo>
+                <a:lnTo>
+                  <a:pt x="355600" y="338667"/>
+                </a:lnTo>
+                <a:cubicBezTo>
+                  <a:pt x="358422" y="330200"/>
+                  <a:pt x="357756" y="319578"/>
+                  <a:pt x="364067" y="313267"/>
+                </a:cubicBezTo>
+                <a:cubicBezTo>
+                  <a:pt x="372534" y="304800"/>
+                  <a:pt x="379000" y="293682"/>
+                  <a:pt x="389467" y="287867"/>
+                </a:cubicBezTo>
+                <a:cubicBezTo>
+                  <a:pt x="430391" y="265132"/>
+                  <a:pt x="491385" y="265468"/>
+                  <a:pt x="533400" y="262467"/>
+                </a:cubicBezTo>
+                <a:cubicBezTo>
+                  <a:pt x="581338" y="259043"/>
+                  <a:pt x="629355" y="256822"/>
+                  <a:pt x="677333" y="254000"/>
+                </a:cubicBezTo>
+                <a:cubicBezTo>
+                  <a:pt x="688622" y="251178"/>
+                  <a:pt x="701332" y="251701"/>
+                  <a:pt x="711200" y="245534"/>
+                </a:cubicBezTo>
+                <a:cubicBezTo>
+                  <a:pt x="724738" y="237073"/>
+                  <a:pt x="733778" y="222956"/>
+                  <a:pt x="745067" y="211667"/>
+                </a:cubicBezTo>
+                <a:cubicBezTo>
+                  <a:pt x="819274" y="137460"/>
+                  <a:pt x="728463" y="231593"/>
+                  <a:pt x="787400" y="160867"/>
+                </a:cubicBezTo>
+                <a:cubicBezTo>
+                  <a:pt x="795065" y="151669"/>
+                  <a:pt x="805135" y="144665"/>
+                  <a:pt x="812800" y="135467"/>
+                </a:cubicBezTo>
+                <a:cubicBezTo>
+                  <a:pt x="879411" y="55533"/>
+                  <a:pt x="787286" y="161037"/>
+                  <a:pt x="838200" y="84667"/>
+                </a:cubicBezTo>
+                <a:cubicBezTo>
+                  <a:pt x="844842" y="74704"/>
+                  <a:pt x="851658" y="60136"/>
+                  <a:pt x="863600" y="59267"/>
+                </a:cubicBezTo>
+                <a:cubicBezTo>
+                  <a:pt x="1009996" y="48620"/>
+                  <a:pt x="1157111" y="53622"/>
+                  <a:pt x="1303867" y="50800"/>
+                </a:cubicBezTo>
+                <a:cubicBezTo>
+                  <a:pt x="1320800" y="47978"/>
+                  <a:pt x="1337833" y="45701"/>
+                  <a:pt x="1354667" y="42334"/>
+                </a:cubicBezTo>
+                <a:cubicBezTo>
+                  <a:pt x="1366077" y="40052"/>
+                  <a:pt x="1380305" y="42095"/>
+                  <a:pt x="1388533" y="33867"/>
+                </a:cubicBezTo>
+                <a:cubicBezTo>
+                  <a:pt x="1396761" y="25639"/>
+                  <a:pt x="1394178" y="11289"/>
+                  <a:pt x="1397000" y="0"/>
+                </a:cubicBezTo>
+                <a:cubicBezTo>
+                  <a:pt x="1428044" y="2822"/>
+                  <a:pt x="1459274" y="4058"/>
+                  <a:pt x="1490133" y="8467"/>
+                </a:cubicBezTo>
+                <a:cubicBezTo>
+                  <a:pt x="1519925" y="12723"/>
+                  <a:pt x="1514106" y="20454"/>
+                  <a:pt x="1540933" y="33867"/>
+                </a:cubicBezTo>
+                <a:cubicBezTo>
+                  <a:pt x="1548915" y="37858"/>
+                  <a:pt x="1557723" y="39986"/>
+                  <a:pt x="1566333" y="42334"/>
+                </a:cubicBezTo>
+                <a:cubicBezTo>
+                  <a:pt x="1588786" y="48457"/>
+                  <a:pt x="1611989" y="51907"/>
+                  <a:pt x="1634067" y="59267"/>
+                </a:cubicBezTo>
+                <a:cubicBezTo>
+                  <a:pt x="1642534" y="62089"/>
+                  <a:pt x="1650664" y="66267"/>
+                  <a:pt x="1659467" y="67734"/>
+                </a:cubicBezTo>
+                <a:cubicBezTo>
+                  <a:pt x="1684676" y="71935"/>
+                  <a:pt x="1710267" y="73378"/>
+                  <a:pt x="1735667" y="76200"/>
+                </a:cubicBezTo>
+                <a:cubicBezTo>
+                  <a:pt x="1776561" y="117096"/>
+                  <a:pt x="1726800" y="65119"/>
+                  <a:pt x="1769533" y="118534"/>
+                </a:cubicBezTo>
+                <a:cubicBezTo>
+                  <a:pt x="1774520" y="124767"/>
+                  <a:pt x="1781480" y="129234"/>
+                  <a:pt x="1786467" y="135467"/>
+                </a:cubicBezTo>
+                <a:cubicBezTo>
+                  <a:pt x="1792824" y="143413"/>
+                  <a:pt x="1796886" y="153050"/>
+                  <a:pt x="1803400" y="160867"/>
+                </a:cubicBezTo>
+                <a:cubicBezTo>
+                  <a:pt x="1811065" y="170065"/>
+                  <a:pt x="1821135" y="177069"/>
+                  <a:pt x="1828800" y="186267"/>
+                </a:cubicBezTo>
+                <a:cubicBezTo>
+                  <a:pt x="1835314" y="194084"/>
+                  <a:pt x="1838538" y="204472"/>
+                  <a:pt x="1845733" y="211667"/>
+                </a:cubicBezTo>
+                <a:cubicBezTo>
+                  <a:pt x="1879060" y="244994"/>
+                  <a:pt x="1862930" y="212018"/>
+                  <a:pt x="1888067" y="245534"/>
+                </a:cubicBezTo>
+                <a:cubicBezTo>
+                  <a:pt x="1900278" y="261815"/>
+                  <a:pt x="1910644" y="279401"/>
+                  <a:pt x="1921933" y="296334"/>
+                </a:cubicBezTo>
+                <a:lnTo>
+                  <a:pt x="1938867" y="321734"/>
+                </a:lnTo>
+                <a:cubicBezTo>
+                  <a:pt x="1944511" y="330201"/>
+                  <a:pt x="1952582" y="337481"/>
+                  <a:pt x="1955800" y="347134"/>
+                </a:cubicBezTo>
+                <a:cubicBezTo>
+                  <a:pt x="1958622" y="355601"/>
+                  <a:pt x="1959933" y="364732"/>
+                  <a:pt x="1964267" y="372534"/>
+                </a:cubicBezTo>
+                <a:cubicBezTo>
+                  <a:pt x="1974150" y="390324"/>
+                  <a:pt x="1986844" y="406401"/>
+                  <a:pt x="1998133" y="423334"/>
+                </a:cubicBezTo>
+                <a:lnTo>
+                  <a:pt x="2015067" y="448734"/>
+                </a:lnTo>
+                <a:cubicBezTo>
+                  <a:pt x="2036346" y="512577"/>
+                  <a:pt x="2007641" y="433883"/>
+                  <a:pt x="2040467" y="499534"/>
+                </a:cubicBezTo>
+                <a:cubicBezTo>
+                  <a:pt x="2044458" y="507516"/>
+                  <a:pt x="2044341" y="517281"/>
+                  <a:pt x="2048933" y="524934"/>
+                </a:cubicBezTo>
+                <a:cubicBezTo>
+                  <a:pt x="2053040" y="531779"/>
+                  <a:pt x="2060880" y="535634"/>
+                  <a:pt x="2065867" y="541867"/>
+                </a:cubicBezTo>
+                <a:cubicBezTo>
+                  <a:pt x="2072224" y="549813"/>
+                  <a:pt x="2078249" y="558166"/>
+                  <a:pt x="2082800" y="567267"/>
+                </a:cubicBezTo>
+                <a:cubicBezTo>
+                  <a:pt x="2096571" y="594810"/>
+                  <a:pt x="2083938" y="593805"/>
+                  <a:pt x="2108200" y="618067"/>
+                </a:cubicBezTo>
+                <a:cubicBezTo>
+                  <a:pt x="2115395" y="625262"/>
+                  <a:pt x="2125133" y="629356"/>
+                  <a:pt x="2133600" y="635000"/>
+                </a:cubicBezTo>
+                <a:cubicBezTo>
+                  <a:pt x="2139244" y="643467"/>
+                  <a:pt x="2144176" y="652454"/>
+                  <a:pt x="2150533" y="660400"/>
+                </a:cubicBezTo>
+                <a:cubicBezTo>
+                  <a:pt x="2155520" y="666634"/>
+                  <a:pt x="2163360" y="670489"/>
+                  <a:pt x="2167467" y="677334"/>
+                </a:cubicBezTo>
+                <a:cubicBezTo>
+                  <a:pt x="2172059" y="684987"/>
+                  <a:pt x="2171599" y="694932"/>
+                  <a:pt x="2175933" y="702734"/>
+                </a:cubicBezTo>
+                <a:cubicBezTo>
+                  <a:pt x="2185816" y="720524"/>
+                  <a:pt x="2198511" y="736601"/>
+                  <a:pt x="2209800" y="753534"/>
+                </a:cubicBezTo>
+                <a:lnTo>
+                  <a:pt x="2243667" y="804334"/>
+                </a:lnTo>
+                <a:cubicBezTo>
+                  <a:pt x="2283919" y="831168"/>
+                  <a:pt x="2259412" y="818048"/>
+                  <a:pt x="2319867" y="838200"/>
+                </a:cubicBezTo>
+                <a:lnTo>
+                  <a:pt x="2345267" y="846667"/>
+                </a:lnTo>
+                <a:lnTo>
+                  <a:pt x="2370667" y="855134"/>
+                </a:lnTo>
+                <a:cubicBezTo>
+                  <a:pt x="2376311" y="863601"/>
+                  <a:pt x="2379942" y="873833"/>
+                  <a:pt x="2387600" y="880534"/>
+                </a:cubicBezTo>
+                <a:cubicBezTo>
+                  <a:pt x="2423430" y="911885"/>
+                  <a:pt x="2428915" y="911238"/>
+                  <a:pt x="2463800" y="922867"/>
+                </a:cubicBezTo>
+                <a:cubicBezTo>
+                  <a:pt x="2472267" y="931334"/>
+                  <a:pt x="2480002" y="940602"/>
+                  <a:pt x="2489200" y="948267"/>
+                </a:cubicBezTo>
+                <a:cubicBezTo>
+                  <a:pt x="2497017" y="954781"/>
+                  <a:pt x="2506874" y="958578"/>
+                  <a:pt x="2514600" y="965200"/>
+                </a:cubicBezTo>
+                <a:cubicBezTo>
+                  <a:pt x="2526722" y="975590"/>
+                  <a:pt x="2548467" y="999067"/>
+                  <a:pt x="2548467" y="999067"/>
+                </a:cubicBezTo>
+                <a:cubicBezTo>
+                  <a:pt x="2551289" y="1010356"/>
+                  <a:pt x="2556933" y="1021298"/>
+                  <a:pt x="2556933" y="1032934"/>
+                </a:cubicBezTo>
+                <a:cubicBezTo>
+                  <a:pt x="2556933" y="1041859"/>
+                  <a:pt x="2553822" y="1051194"/>
+                  <a:pt x="2548467" y="1058334"/>
+                </a:cubicBezTo>
+                <a:cubicBezTo>
+                  <a:pt x="2536493" y="1074299"/>
+                  <a:pt x="2517203" y="1084062"/>
+                  <a:pt x="2506133" y="1100667"/>
+                </a:cubicBezTo>
+                <a:cubicBezTo>
+                  <a:pt x="2481373" y="1137808"/>
+                  <a:pt x="2495305" y="1117926"/>
+                  <a:pt x="2463800" y="1159934"/>
+                </a:cubicBezTo>
+                <a:cubicBezTo>
+                  <a:pt x="2444732" y="1217135"/>
+                  <a:pt x="2471177" y="1155131"/>
+                  <a:pt x="2429933" y="1202267"/>
+                </a:cubicBezTo>
+                <a:cubicBezTo>
+                  <a:pt x="2416532" y="1217583"/>
+                  <a:pt x="2410458" y="1238677"/>
+                  <a:pt x="2396067" y="1253067"/>
+                </a:cubicBezTo>
+                <a:cubicBezTo>
+                  <a:pt x="2355188" y="1293943"/>
+                  <a:pt x="2404912" y="1242009"/>
+                  <a:pt x="2362200" y="1295400"/>
+                </a:cubicBezTo>
+                <a:cubicBezTo>
+                  <a:pt x="2357213" y="1301633"/>
+                  <a:pt x="2350056" y="1305948"/>
+                  <a:pt x="2345267" y="1312334"/>
+                </a:cubicBezTo>
+                <a:cubicBezTo>
+                  <a:pt x="2333056" y="1328615"/>
+                  <a:pt x="2325791" y="1348743"/>
+                  <a:pt x="2311400" y="1363134"/>
+                </a:cubicBezTo>
+                <a:lnTo>
+                  <a:pt x="2286000" y="1388534"/>
+                </a:lnTo>
+                <a:cubicBezTo>
+                  <a:pt x="2271120" y="1433172"/>
+                  <a:pt x="2287368" y="1397052"/>
+                  <a:pt x="2252133" y="1439334"/>
+                </a:cubicBezTo>
+                <a:cubicBezTo>
+                  <a:pt x="2216856" y="1481667"/>
+                  <a:pt x="2256367" y="1450623"/>
+                  <a:pt x="2209800" y="1481667"/>
+                </a:cubicBezTo>
+                <a:cubicBezTo>
+                  <a:pt x="2184011" y="1520351"/>
+                  <a:pt x="2200062" y="1499872"/>
+                  <a:pt x="2159000" y="1540934"/>
+                </a:cubicBezTo>
+                <a:cubicBezTo>
+                  <a:pt x="2150533" y="1549401"/>
+                  <a:pt x="2140242" y="1556371"/>
+                  <a:pt x="2133600" y="1566334"/>
+                </a:cubicBezTo>
+                <a:lnTo>
+                  <a:pt x="2065867" y="1667934"/>
+                </a:lnTo>
+                <a:lnTo>
+                  <a:pt x="2048933" y="1693334"/>
+                </a:lnTo>
+                <a:cubicBezTo>
+                  <a:pt x="2043289" y="1701801"/>
+                  <a:pt x="2040467" y="1713090"/>
+                  <a:pt x="2032000" y="1718734"/>
+                </a:cubicBezTo>
+                <a:cubicBezTo>
+                  <a:pt x="2023533" y="1724378"/>
+                  <a:pt x="2014205" y="1728907"/>
+                  <a:pt x="2006600" y="1735667"/>
+                </a:cubicBezTo>
+                <a:cubicBezTo>
+                  <a:pt x="1988701" y="1751577"/>
+                  <a:pt x="1975726" y="1773184"/>
+                  <a:pt x="1955800" y="1786467"/>
+                </a:cubicBezTo>
+                <a:lnTo>
+                  <a:pt x="1930400" y="1803400"/>
+                </a:lnTo>
+                <a:cubicBezTo>
+                  <a:pt x="1916500" y="1845097"/>
+                  <a:pt x="1931884" y="1816275"/>
+                  <a:pt x="1896533" y="1845734"/>
+                </a:cubicBezTo>
+                <a:cubicBezTo>
+                  <a:pt x="1887335" y="1853399"/>
+                  <a:pt x="1880584" y="1863783"/>
+                  <a:pt x="1871133" y="1871134"/>
+                </a:cubicBezTo>
+                <a:cubicBezTo>
+                  <a:pt x="1827465" y="1905098"/>
+                  <a:pt x="1833256" y="1900692"/>
+                  <a:pt x="1794933" y="1913467"/>
+                </a:cubicBezTo>
+                <a:cubicBezTo>
+                  <a:pt x="1713905" y="1994495"/>
+                  <a:pt x="1817651" y="1898321"/>
+                  <a:pt x="1744133" y="1947334"/>
+                </a:cubicBezTo>
+                <a:cubicBezTo>
+                  <a:pt x="1680715" y="1989613"/>
+                  <a:pt x="1753725" y="1961071"/>
+                  <a:pt x="1693333" y="1981200"/>
+                </a:cubicBezTo>
+                <a:cubicBezTo>
+                  <a:pt x="1652439" y="2022096"/>
+                  <a:pt x="1702200" y="1970119"/>
+                  <a:pt x="1659467" y="2023534"/>
+                </a:cubicBezTo>
+                <a:cubicBezTo>
+                  <a:pt x="1654480" y="2029767"/>
+                  <a:pt x="1648178" y="2034823"/>
+                  <a:pt x="1642533" y="2040467"/>
+                </a:cubicBezTo>
+                <a:cubicBezTo>
+                  <a:pt x="1639711" y="2048934"/>
+                  <a:pt x="1639642" y="2058898"/>
+                  <a:pt x="1634067" y="2065867"/>
+                </a:cubicBezTo>
+                <a:cubicBezTo>
+                  <a:pt x="1627710" y="2073813"/>
+                  <a:pt x="1616613" y="2076443"/>
+                  <a:pt x="1608667" y="2082800"/>
+                </a:cubicBezTo>
+                <a:cubicBezTo>
+                  <a:pt x="1602433" y="2087787"/>
+                  <a:pt x="1599208" y="2096931"/>
+                  <a:pt x="1591733" y="2099734"/>
+                </a:cubicBezTo>
+                <a:cubicBezTo>
+                  <a:pt x="1579531" y="2104310"/>
+                  <a:pt x="1477061" y="2116184"/>
+                  <a:pt x="1473200" y="2116667"/>
+                </a:cubicBezTo>
+                <a:cubicBezTo>
+                  <a:pt x="1409356" y="2137949"/>
+                  <a:pt x="1488052" y="2109241"/>
+                  <a:pt x="1422400" y="2142067"/>
+                </a:cubicBezTo>
+                <a:cubicBezTo>
+                  <a:pt x="1414418" y="2146058"/>
+                  <a:pt x="1404982" y="2146543"/>
+                  <a:pt x="1397000" y="2150534"/>
+                </a:cubicBezTo>
+                <a:cubicBezTo>
+                  <a:pt x="1387899" y="2155085"/>
+                  <a:pt x="1380701" y="2162916"/>
+                  <a:pt x="1371600" y="2167467"/>
+                </a:cubicBezTo>
+                <a:cubicBezTo>
+                  <a:pt x="1363618" y="2171458"/>
+                  <a:pt x="1354182" y="2171943"/>
+                  <a:pt x="1346200" y="2175934"/>
+                </a:cubicBezTo>
+                <a:cubicBezTo>
+                  <a:pt x="1287731" y="2205169"/>
+                  <a:pt x="1357416" y="2183713"/>
+                  <a:pt x="1286933" y="2201334"/>
+                </a:cubicBezTo>
+                <a:cubicBezTo>
+                  <a:pt x="1278466" y="2206978"/>
+                  <a:pt x="1270832" y="2214134"/>
+                  <a:pt x="1261533" y="2218267"/>
+                </a:cubicBezTo>
+                <a:cubicBezTo>
+                  <a:pt x="1207355" y="2242345"/>
+                  <a:pt x="1219952" y="2229607"/>
+                  <a:pt x="1168400" y="2243667"/>
+                </a:cubicBezTo>
+                <a:cubicBezTo>
+                  <a:pt x="1151180" y="2248363"/>
+                  <a:pt x="1133565" y="2252617"/>
+                  <a:pt x="1117600" y="2260600"/>
+                </a:cubicBezTo>
+                <a:cubicBezTo>
+                  <a:pt x="1106311" y="2266245"/>
+                  <a:pt x="1096074" y="2274889"/>
+                  <a:pt x="1083733" y="2277534"/>
+                </a:cubicBezTo>
+                <a:cubicBezTo>
+                  <a:pt x="1056000" y="2283477"/>
+                  <a:pt x="1027289" y="2283178"/>
+                  <a:pt x="999067" y="2286000"/>
+                </a:cubicBezTo>
+                <a:cubicBezTo>
+                  <a:pt x="990600" y="2288822"/>
+                  <a:pt x="982248" y="2292015"/>
+                  <a:pt x="973667" y="2294467"/>
+                </a:cubicBezTo>
+                <a:cubicBezTo>
+                  <a:pt x="899222" y="2315738"/>
+                  <a:pt x="975320" y="2291095"/>
+                  <a:pt x="914400" y="2311400"/>
+                </a:cubicBezTo>
+                <a:cubicBezTo>
+                  <a:pt x="905933" y="2317045"/>
+                  <a:pt x="898102" y="2323783"/>
+                  <a:pt x="889000" y="2328334"/>
+                </a:cubicBezTo>
+                <a:cubicBezTo>
+                  <a:pt x="876858" y="2334405"/>
+                  <a:pt x="840577" y="2342556"/>
+                  <a:pt x="829733" y="2345267"/>
+                </a:cubicBezTo>
+                <a:cubicBezTo>
+                  <a:pt x="778554" y="2332471"/>
+                  <a:pt x="806901" y="2340478"/>
+                  <a:pt x="745067" y="2319867"/>
+                </a:cubicBezTo>
+                <a:lnTo>
+                  <a:pt x="694267" y="2302934"/>
+                </a:lnTo>
+                <a:lnTo>
+                  <a:pt x="575733" y="2286000"/>
+                </a:lnTo>
+                <a:cubicBezTo>
+                  <a:pt x="512670" y="2243959"/>
+                  <a:pt x="590123" y="2297992"/>
+                  <a:pt x="524933" y="2243667"/>
+                </a:cubicBezTo>
+                <a:cubicBezTo>
+                  <a:pt x="517116" y="2237153"/>
+                  <a:pt x="507191" y="2233435"/>
+                  <a:pt x="499533" y="2226734"/>
+                </a:cubicBezTo>
+                <a:cubicBezTo>
+                  <a:pt x="484514" y="2213593"/>
+                  <a:pt x="457200" y="2184400"/>
+                  <a:pt x="457200" y="2184400"/>
+                </a:cubicBezTo>
+                <a:cubicBezTo>
+                  <a:pt x="436587" y="2122561"/>
+                  <a:pt x="444596" y="2150916"/>
+                  <a:pt x="431800" y="2099734"/>
+                </a:cubicBezTo>
+                <a:cubicBezTo>
+                  <a:pt x="431652" y="2093796"/>
+                  <a:pt x="457657" y="1812784"/>
+                  <a:pt x="406400" y="1710267"/>
+                </a:cubicBezTo>
+                <a:cubicBezTo>
+                  <a:pt x="400756" y="1698978"/>
+                  <a:pt x="394154" y="1688119"/>
+                  <a:pt x="389467" y="1676400"/>
+                </a:cubicBezTo>
+                <a:cubicBezTo>
+                  <a:pt x="382838" y="1659827"/>
+                  <a:pt x="385154" y="1638221"/>
+                  <a:pt x="372533" y="1625600"/>
+                </a:cubicBezTo>
+                <a:cubicBezTo>
+                  <a:pt x="364066" y="1617133"/>
+                  <a:pt x="354484" y="1609651"/>
+                  <a:pt x="347133" y="1600200"/>
+                </a:cubicBezTo>
+                <a:cubicBezTo>
+                  <a:pt x="334639" y="1584136"/>
+                  <a:pt x="313267" y="1549400"/>
+                  <a:pt x="313267" y="1549400"/>
+                </a:cubicBezTo>
+                <a:cubicBezTo>
+                  <a:pt x="308534" y="1530471"/>
+                  <a:pt x="296110" y="1477098"/>
+                  <a:pt x="287867" y="1464734"/>
+                </a:cubicBezTo>
+                <a:lnTo>
+                  <a:pt x="270933" y="1439334"/>
+                </a:lnTo>
+                <a:lnTo>
+                  <a:pt x="254000" y="1388534"/>
+                </a:lnTo>
+                <a:lnTo>
+                  <a:pt x="245533" y="1363134"/>
+                </a:lnTo>
+                <a:cubicBezTo>
+                  <a:pt x="224401" y="1236333"/>
+                  <a:pt x="250405" y="1394795"/>
+                  <a:pt x="228600" y="1253067"/>
+                </a:cubicBezTo>
+                <a:cubicBezTo>
+                  <a:pt x="225990" y="1236100"/>
+                  <a:pt x="223857" y="1219025"/>
+                  <a:pt x="220133" y="1202267"/>
+                </a:cubicBezTo>
+                <a:cubicBezTo>
+                  <a:pt x="218197" y="1193555"/>
+                  <a:pt x="214119" y="1185448"/>
+                  <a:pt x="211667" y="1176867"/>
+                </a:cubicBezTo>
+                <a:cubicBezTo>
+                  <a:pt x="208470" y="1165678"/>
+                  <a:pt x="208404" y="1153408"/>
+                  <a:pt x="203200" y="1143000"/>
+                </a:cubicBezTo>
+                <a:cubicBezTo>
+                  <a:pt x="193138" y="1122877"/>
+                  <a:pt x="176391" y="1107725"/>
+                  <a:pt x="160867" y="1092200"/>
+                </a:cubicBezTo>
+                <a:cubicBezTo>
+                  <a:pt x="158045" y="1083733"/>
+                  <a:pt x="156734" y="1074602"/>
+                  <a:pt x="152400" y="1066800"/>
+                </a:cubicBezTo>
+                <a:cubicBezTo>
+                  <a:pt x="142516" y="1049010"/>
+                  <a:pt x="118533" y="1016000"/>
+                  <a:pt x="118533" y="1016000"/>
+                </a:cubicBezTo>
+                <a:cubicBezTo>
+                  <a:pt x="87661" y="923378"/>
+                  <a:pt x="136896" y="1063665"/>
+                  <a:pt x="93133" y="965200"/>
+                </a:cubicBezTo>
+                <a:cubicBezTo>
+                  <a:pt x="85884" y="948889"/>
+                  <a:pt x="81844" y="931333"/>
+                  <a:pt x="76200" y="914400"/>
+                </a:cubicBezTo>
+                <a:lnTo>
+                  <a:pt x="59267" y="863600"/>
+                </a:lnTo>
+                <a:cubicBezTo>
+                  <a:pt x="46471" y="812421"/>
+                  <a:pt x="54478" y="840768"/>
+                  <a:pt x="33867" y="778934"/>
+                </a:cubicBezTo>
+                <a:lnTo>
+                  <a:pt x="8467" y="702734"/>
+                </a:lnTo>
+                <a:lnTo>
+                  <a:pt x="0" y="677334"/>
+                </a:lnTo>
+                <a:lnTo>
+                  <a:pt x="16933" y="575734"/>
+                </a:lnTo>
+                <a:close/>
+              </a:path>
+            </a:pathLst>
+          </a:custGeom>
           <a:solidFill>
-            <a:srgbClr val="FFFF00">
-              <a:alpha val="35000"/>
+            <a:srgbClr val="7030A0">
+              <a:alpha val="60000"/>
             </a:srgbClr>
           </a:solidFill>
           <a:ln>
@@ -5346,440 +7219,27 @@
           <a:bodyPr rtlCol="0" anchor="ctr"/>
           <a:lstStyle/>
           <a:p>
-            <a:pPr algn="ctr"/>
-            <a:endParaRPr lang="en-US"/>
-          </a:p>
-        </p:txBody>
-      </p:sp>
-      <p:sp>
-        <p:nvSpPr>
-          <p:cNvPr id="125" name="Rectangle 124"/>
-          <p:cNvSpPr/>
-          <p:nvPr/>
-        </p:nvSpPr>
-        <p:spPr>
-          <a:xfrm>
-            <a:off x="7716316" y="4036205"/>
-            <a:ext cx="415313" cy="153821"/>
-          </a:xfrm>
-          <a:prstGeom prst="rect">
-            <a:avLst/>
-          </a:prstGeom>
-          <a:solidFill>
-            <a:srgbClr val="FFFF00">
-              <a:alpha val="35000"/>
-            </a:srgbClr>
-          </a:solidFill>
-          <a:ln>
-            <a:noFill/>
-          </a:ln>
-        </p:spPr>
-        <p:style>
-          <a:lnRef idx="2">
-            <a:schemeClr val="accent1">
-              <a:shade val="50000"/>
-            </a:schemeClr>
-          </a:lnRef>
-          <a:fillRef idx="1">
-            <a:schemeClr val="accent1"/>
-          </a:fillRef>
-          <a:effectRef idx="0">
-            <a:schemeClr val="accent1"/>
-          </a:effectRef>
-          <a:fontRef idx="minor">
-            <a:schemeClr val="lt1"/>
-          </a:fontRef>
-        </p:style>
-        <p:txBody>
-          <a:bodyPr rtlCol="0" anchor="ctr"/>
-          <a:lstStyle/>
-          <a:p>
-            <a:pPr algn="ctr"/>
-            <a:endParaRPr lang="en-US"/>
-          </a:p>
-        </p:txBody>
-      </p:sp>
-      <p:sp>
-        <p:nvSpPr>
-          <p:cNvPr id="126" name="Rectangle 125"/>
-          <p:cNvSpPr/>
-          <p:nvPr/>
-        </p:nvSpPr>
-        <p:spPr>
-          <a:xfrm>
-            <a:off x="6856342" y="2904087"/>
-            <a:ext cx="415313" cy="153821"/>
-          </a:xfrm>
-          <a:prstGeom prst="rect">
-            <a:avLst/>
-          </a:prstGeom>
-          <a:solidFill>
-            <a:srgbClr val="FFFF00">
-              <a:alpha val="35000"/>
-            </a:srgbClr>
-          </a:solidFill>
-          <a:ln>
-            <a:noFill/>
-          </a:ln>
-        </p:spPr>
-        <p:style>
-          <a:lnRef idx="2">
-            <a:schemeClr val="accent1">
-              <a:shade val="50000"/>
-            </a:schemeClr>
-          </a:lnRef>
-          <a:fillRef idx="1">
-            <a:schemeClr val="accent1"/>
-          </a:fillRef>
-          <a:effectRef idx="0">
-            <a:schemeClr val="accent1"/>
-          </a:effectRef>
-          <a:fontRef idx="minor">
-            <a:schemeClr val="lt1"/>
-          </a:fontRef>
-        </p:style>
-        <p:txBody>
-          <a:bodyPr rtlCol="0" anchor="ctr"/>
-          <a:lstStyle/>
-          <a:p>
-            <a:pPr algn="ctr"/>
-            <a:endParaRPr lang="en-US"/>
-          </a:p>
-        </p:txBody>
-      </p:sp>
-      <p:sp>
-        <p:nvSpPr>
-          <p:cNvPr id="127" name="Rectangle 126"/>
-          <p:cNvSpPr/>
-          <p:nvPr/>
-        </p:nvSpPr>
-        <p:spPr>
-          <a:xfrm>
-            <a:off x="6965198" y="2120319"/>
-            <a:ext cx="415313" cy="153821"/>
-          </a:xfrm>
-          <a:prstGeom prst="rect">
-            <a:avLst/>
-          </a:prstGeom>
-          <a:solidFill>
-            <a:srgbClr val="FFFF00">
-              <a:alpha val="35000"/>
-            </a:srgbClr>
-          </a:solidFill>
-          <a:ln>
-            <a:noFill/>
-          </a:ln>
-        </p:spPr>
-        <p:style>
-          <a:lnRef idx="2">
-            <a:schemeClr val="accent1">
-              <a:shade val="50000"/>
-            </a:schemeClr>
-          </a:lnRef>
-          <a:fillRef idx="1">
-            <a:schemeClr val="accent1"/>
-          </a:fillRef>
-          <a:effectRef idx="0">
-            <a:schemeClr val="accent1"/>
-          </a:effectRef>
-          <a:fontRef idx="minor">
-            <a:schemeClr val="lt1"/>
-          </a:fontRef>
-        </p:style>
-        <p:txBody>
-          <a:bodyPr rtlCol="0" anchor="ctr"/>
-          <a:lstStyle/>
-          <a:p>
-            <a:pPr algn="ctr"/>
-            <a:endParaRPr lang="en-US"/>
-          </a:p>
-        </p:txBody>
-      </p:sp>
-      <p:sp>
-        <p:nvSpPr>
-          <p:cNvPr id="128" name="Rectangle 127"/>
-          <p:cNvSpPr/>
-          <p:nvPr/>
-        </p:nvSpPr>
-        <p:spPr>
-          <a:xfrm>
-            <a:off x="7008740" y="1641347"/>
-            <a:ext cx="317569" cy="197162"/>
-          </a:xfrm>
-          <a:prstGeom prst="rect">
-            <a:avLst/>
-          </a:prstGeom>
-          <a:solidFill>
-            <a:srgbClr val="FFFF00">
-              <a:alpha val="35000"/>
-            </a:srgbClr>
-          </a:solidFill>
-          <a:ln>
-            <a:noFill/>
-          </a:ln>
-        </p:spPr>
-        <p:style>
-          <a:lnRef idx="2">
-            <a:schemeClr val="accent1">
-              <a:shade val="50000"/>
-            </a:schemeClr>
-          </a:lnRef>
-          <a:fillRef idx="1">
-            <a:schemeClr val="accent1"/>
-          </a:fillRef>
-          <a:effectRef idx="0">
-            <a:schemeClr val="accent1"/>
-          </a:effectRef>
-          <a:fontRef idx="minor">
-            <a:schemeClr val="lt1"/>
-          </a:fontRef>
-        </p:style>
-        <p:txBody>
-          <a:bodyPr rtlCol="0" anchor="ctr"/>
-          <a:lstStyle/>
-          <a:p>
-            <a:pPr algn="ctr"/>
-            <a:endParaRPr lang="en-US"/>
-          </a:p>
-        </p:txBody>
-      </p:sp>
-      <p:sp>
-        <p:nvSpPr>
-          <p:cNvPr id="129" name="Rectangle 128"/>
-          <p:cNvSpPr/>
-          <p:nvPr/>
-        </p:nvSpPr>
-        <p:spPr>
-          <a:xfrm>
-            <a:off x="3487638" y="3201126"/>
-            <a:ext cx="565618" cy="197162"/>
-          </a:xfrm>
-          <a:prstGeom prst="rect">
-            <a:avLst/>
-          </a:prstGeom>
-          <a:solidFill>
-            <a:srgbClr val="FFFF00">
-              <a:alpha val="35000"/>
-            </a:srgbClr>
-          </a:solidFill>
-          <a:ln>
-            <a:noFill/>
-          </a:ln>
-        </p:spPr>
-        <p:style>
-          <a:lnRef idx="2">
-            <a:schemeClr val="accent1">
-              <a:shade val="50000"/>
-            </a:schemeClr>
-          </a:lnRef>
-          <a:fillRef idx="1">
-            <a:schemeClr val="accent1"/>
-          </a:fillRef>
-          <a:effectRef idx="0">
-            <a:schemeClr val="accent1"/>
-          </a:effectRef>
-          <a:fontRef idx="minor">
-            <a:schemeClr val="lt1"/>
-          </a:fontRef>
-        </p:style>
-        <p:txBody>
-          <a:bodyPr rtlCol="0" anchor="ctr"/>
-          <a:lstStyle/>
-          <a:p>
-            <a:pPr algn="ctr"/>
-            <a:endParaRPr lang="en-US"/>
-          </a:p>
-        </p:txBody>
-      </p:sp>
-      <p:sp>
-        <p:nvSpPr>
-          <p:cNvPr id="130" name="Rectangle 129"/>
-          <p:cNvSpPr/>
-          <p:nvPr/>
-        </p:nvSpPr>
-        <p:spPr>
-          <a:xfrm>
-            <a:off x="3568476" y="4339492"/>
-            <a:ext cx="565618" cy="197162"/>
-          </a:xfrm>
-          <a:prstGeom prst="rect">
-            <a:avLst/>
-          </a:prstGeom>
-          <a:solidFill>
-            <a:srgbClr val="FFFF00">
-              <a:alpha val="35000"/>
-            </a:srgbClr>
-          </a:solidFill>
-          <a:ln>
-            <a:noFill/>
-          </a:ln>
-        </p:spPr>
-        <p:style>
-          <a:lnRef idx="2">
-            <a:schemeClr val="accent1">
-              <a:shade val="50000"/>
-            </a:schemeClr>
-          </a:lnRef>
-          <a:fillRef idx="1">
-            <a:schemeClr val="accent1"/>
-          </a:fillRef>
-          <a:effectRef idx="0">
-            <a:schemeClr val="accent1"/>
-          </a:effectRef>
-          <a:fontRef idx="minor">
-            <a:schemeClr val="lt1"/>
-          </a:fontRef>
-        </p:style>
-        <p:txBody>
-          <a:bodyPr rtlCol="0" anchor="ctr"/>
-          <a:lstStyle/>
-          <a:p>
-            <a:pPr algn="ctr"/>
-            <a:endParaRPr lang="en-US"/>
-          </a:p>
-        </p:txBody>
-      </p:sp>
-      <p:sp>
-        <p:nvSpPr>
-          <p:cNvPr id="131" name="Rectangle 130"/>
-          <p:cNvSpPr/>
-          <p:nvPr/>
-        </p:nvSpPr>
-        <p:spPr>
-          <a:xfrm>
-            <a:off x="4357523" y="4676077"/>
-            <a:ext cx="452781" cy="150155"/>
-          </a:xfrm>
-          <a:prstGeom prst="rect">
-            <a:avLst/>
-          </a:prstGeom>
-          <a:solidFill>
-            <a:srgbClr val="FFFF00">
-              <a:alpha val="35000"/>
-            </a:srgbClr>
-          </a:solidFill>
-          <a:ln>
-            <a:noFill/>
-          </a:ln>
-        </p:spPr>
-        <p:style>
-          <a:lnRef idx="2">
-            <a:schemeClr val="accent1">
-              <a:shade val="50000"/>
-            </a:schemeClr>
-          </a:lnRef>
-          <a:fillRef idx="1">
-            <a:schemeClr val="accent1"/>
-          </a:fillRef>
-          <a:effectRef idx="0">
-            <a:schemeClr val="accent1"/>
-          </a:effectRef>
-          <a:fontRef idx="minor">
-            <a:schemeClr val="lt1"/>
-          </a:fontRef>
-        </p:style>
-        <p:txBody>
-          <a:bodyPr rtlCol="0" anchor="ctr"/>
-          <a:lstStyle/>
-          <a:p>
-            <a:pPr algn="ctr"/>
-            <a:endParaRPr lang="en-US"/>
-          </a:p>
-        </p:txBody>
-      </p:sp>
-      <p:sp>
-        <p:nvSpPr>
-          <p:cNvPr id="132" name="Rectangle 131"/>
-          <p:cNvSpPr/>
-          <p:nvPr/>
-        </p:nvSpPr>
-        <p:spPr>
-          <a:xfrm>
-            <a:off x="4346479" y="5217592"/>
-            <a:ext cx="452781" cy="150155"/>
-          </a:xfrm>
-          <a:prstGeom prst="rect">
-            <a:avLst/>
-          </a:prstGeom>
-          <a:solidFill>
-            <a:srgbClr val="FFFF00">
-              <a:alpha val="35000"/>
-            </a:srgbClr>
-          </a:solidFill>
-          <a:ln>
-            <a:noFill/>
-          </a:ln>
-        </p:spPr>
-        <p:style>
-          <a:lnRef idx="2">
-            <a:schemeClr val="accent1">
-              <a:shade val="50000"/>
-            </a:schemeClr>
-          </a:lnRef>
-          <a:fillRef idx="1">
-            <a:schemeClr val="accent1"/>
-          </a:fillRef>
-          <a:effectRef idx="0">
-            <a:schemeClr val="accent1"/>
-          </a:effectRef>
-          <a:fontRef idx="minor">
-            <a:schemeClr val="lt1"/>
-          </a:fontRef>
-        </p:style>
-        <p:txBody>
-          <a:bodyPr rtlCol="0" anchor="ctr"/>
-          <a:lstStyle/>
-          <a:p>
-            <a:pPr algn="ctr"/>
-            <a:endParaRPr lang="en-US"/>
-          </a:p>
-        </p:txBody>
-      </p:sp>
-      <p:sp>
-        <p:nvSpPr>
-          <p:cNvPr id="133" name="Rectangle 132"/>
-          <p:cNvSpPr/>
-          <p:nvPr/>
-        </p:nvSpPr>
-        <p:spPr>
-          <a:xfrm>
-            <a:off x="4373629" y="5931027"/>
-            <a:ext cx="452781" cy="150155"/>
-          </a:xfrm>
-          <a:prstGeom prst="rect">
-            <a:avLst/>
-          </a:prstGeom>
-          <a:solidFill>
-            <a:srgbClr val="FFFF00">
-              <a:alpha val="35000"/>
-            </a:srgbClr>
-          </a:solidFill>
-          <a:ln>
-            <a:noFill/>
-          </a:ln>
-        </p:spPr>
-        <p:style>
-          <a:lnRef idx="2">
-            <a:schemeClr val="accent1">
-              <a:shade val="50000"/>
-            </a:schemeClr>
-          </a:lnRef>
-          <a:fillRef idx="1">
-            <a:schemeClr val="accent1"/>
-          </a:fillRef>
-          <a:effectRef idx="0">
-            <a:schemeClr val="accent1"/>
-          </a:effectRef>
-          <a:fontRef idx="minor">
-            <a:schemeClr val="lt1"/>
-          </a:fontRef>
-        </p:style>
-        <p:txBody>
-          <a:bodyPr rtlCol="0" anchor="ctr"/>
-          <a:lstStyle/>
-          <a:p>
-            <a:pPr algn="ctr"/>
-            <a:endParaRPr lang="en-US"/>
+            <a:r>
+              <a:rPr lang="en-US" sz="3200" b="1" dirty="0" smtClean="0">
+                <a:solidFill>
+                  <a:schemeClr val="bg1"/>
+                </a:solidFill>
+              </a:rPr>
+              <a:t>       </a:t>
+            </a:r>
+            <a:r>
+              <a:rPr lang="en-US" sz="3200" b="1" dirty="0" smtClean="0">
+                <a:solidFill>
+                  <a:schemeClr val="bg1"/>
+                </a:solidFill>
+              </a:rPr>
+              <a:t> Palm</a:t>
+            </a:r>
+            <a:endParaRPr lang="en-US" sz="3200" b="1" dirty="0">
+              <a:solidFill>
+                <a:schemeClr val="bg1"/>
+              </a:solidFill>
+            </a:endParaRPr>
           </a:p>
         </p:txBody>
       </p:sp>

</xml_diff>